<commit_message>
baseline model with pretrained encoder
</commit_message>
<xml_diff>
--- a/meeting_updates/07.07.25.pptx
+++ b/meeting_updates/07.07.25.pptx
@@ -5,7 +5,9 @@
     <p:sldMasterId id="2147483648" r:id="rId1"/>
   </p:sldMasterIdLst>
   <p:sldIdLst>
-    <p:sldId id="276" r:id="rId2"/>
+    <p:sldId id="278" r:id="rId2"/>
+    <p:sldId id="276" r:id="rId3"/>
+    <p:sldId id="277" r:id="rId4"/>
   </p:sldIdLst>
   <p:sldSz cx="12192000" cy="6858000"/>
   <p:notesSz cx="6858000" cy="9144000"/>
@@ -3314,6 +3316,536 @@
   <p:cSld>
     <p:spTree>
       <p:nvGrpSpPr>
+        <p:cNvPr id="1" name="">
+          <a:extLst>
+            <a:ext uri="{FF2B5EF4-FFF2-40B4-BE49-F238E27FC236}">
+              <a16:creationId xmlns:a16="http://schemas.microsoft.com/office/drawing/2014/main" id="{82192579-53EA-3844-A5B9-E024885DE246}"/>
+            </a:ext>
+          </a:extLst>
+        </p:cNvPr>
+        <p:cNvGrpSpPr/>
+        <p:nvPr/>
+      </p:nvGrpSpPr>
+      <p:grpSpPr>
+        <a:xfrm>
+          <a:off x="0" y="0"/>
+          <a:ext cx="0" cy="0"/>
+          <a:chOff x="0" y="0"/>
+          <a:chExt cx="0" cy="0"/>
+        </a:xfrm>
+      </p:grpSpPr>
+      <p:sp>
+        <p:nvSpPr>
+          <p:cNvPr id="2" name="TextBox 1">
+            <a:extLst>
+              <a:ext uri="{FF2B5EF4-FFF2-40B4-BE49-F238E27FC236}">
+                <a16:creationId xmlns:a16="http://schemas.microsoft.com/office/drawing/2014/main" id="{9A0F9B53-88A1-74B5-2F20-A14DEC41F9E1}"/>
+              </a:ext>
+            </a:extLst>
+          </p:cNvPr>
+          <p:cNvSpPr txBox="1"/>
+          <p:nvPr/>
+        </p:nvSpPr>
+        <p:spPr>
+          <a:xfrm>
+            <a:off x="1234440" y="722376"/>
+            <a:ext cx="2688336" cy="369332"/>
+          </a:xfrm>
+          <a:prstGeom prst="rect">
+            <a:avLst/>
+          </a:prstGeom>
+          <a:noFill/>
+        </p:spPr>
+        <p:txBody>
+          <a:bodyPr wrap="square" rtlCol="0">
+            <a:spAutoFit/>
+          </a:bodyPr>
+          <a:lstStyle/>
+          <a:p>
+            <a:r>
+              <a:rPr lang="en-US" dirty="0"/>
+              <a:t>Experiment 0: </a:t>
+            </a:r>
+          </a:p>
+        </p:txBody>
+      </p:sp>
+      <p:sp>
+        <p:nvSpPr>
+          <p:cNvPr id="3" name="TextBox 2">
+            <a:extLst>
+              <a:ext uri="{FF2B5EF4-FFF2-40B4-BE49-F238E27FC236}">
+                <a16:creationId xmlns:a16="http://schemas.microsoft.com/office/drawing/2014/main" id="{0FA8D6C2-7854-45EC-C95D-3D9DA78EB3CC}"/>
+              </a:ext>
+            </a:extLst>
+          </p:cNvPr>
+          <p:cNvSpPr txBox="1"/>
+          <p:nvPr/>
+        </p:nvSpPr>
+        <p:spPr>
+          <a:xfrm>
+            <a:off x="1325880" y="1335024"/>
+            <a:ext cx="5513832" cy="1477328"/>
+          </a:xfrm>
+          <a:prstGeom prst="rect">
+            <a:avLst/>
+          </a:prstGeom>
+          <a:noFill/>
+        </p:spPr>
+        <p:txBody>
+          <a:bodyPr wrap="square" rtlCol="0">
+            <a:spAutoFit/>
+          </a:bodyPr>
+          <a:lstStyle/>
+          <a:p>
+            <a:r>
+              <a:rPr lang="en-US" dirty="0"/>
+              <a:t>Details: </a:t>
+            </a:r>
+          </a:p>
+          <a:p>
+            <a:endParaRPr lang="en-US" dirty="0"/>
+          </a:p>
+          <a:p>
+            <a:pPr marL="285750" indent="-285750">
+              <a:buFont typeface="Arial" panose="020B0604020202020204" pitchFamily="34" charset="0"/>
+              <a:buChar char="•"/>
+            </a:pPr>
+            <a:r>
+              <a:rPr lang="en-US" dirty="0"/>
+              <a:t>Binary Classification Setup </a:t>
+            </a:r>
+          </a:p>
+          <a:p>
+            <a:pPr marL="285750" indent="-285750">
+              <a:buFont typeface="Arial" panose="020B0604020202020204" pitchFamily="34" charset="0"/>
+              <a:buChar char="•"/>
+            </a:pPr>
+            <a:r>
+              <a:rPr lang="en-US" dirty="0"/>
+              <a:t>Classification Based on US Image Only</a:t>
+            </a:r>
+          </a:p>
+          <a:p>
+            <a:pPr marL="285750" indent="-285750">
+              <a:buFont typeface="Arial" panose="020B0604020202020204" pitchFamily="34" charset="0"/>
+              <a:buChar char="•"/>
+            </a:pPr>
+            <a:endParaRPr lang="en-US" dirty="0"/>
+          </a:p>
+        </p:txBody>
+      </p:sp>
+      <p:sp>
+        <p:nvSpPr>
+          <p:cNvPr id="4" name="Flowchart: Manual Operation 3">
+            <a:extLst>
+              <a:ext uri="{FF2B5EF4-FFF2-40B4-BE49-F238E27FC236}">
+                <a16:creationId xmlns:a16="http://schemas.microsoft.com/office/drawing/2014/main" id="{7EEEEBCE-802B-F6BD-B951-E4348ECF2A14}"/>
+              </a:ext>
+            </a:extLst>
+          </p:cNvPr>
+          <p:cNvSpPr/>
+          <p:nvPr/>
+        </p:nvSpPr>
+        <p:spPr>
+          <a:xfrm rot="16200000">
+            <a:off x="7621524" y="2712095"/>
+            <a:ext cx="1234440" cy="1536192"/>
+          </a:xfrm>
+          <a:prstGeom prst="flowChartManualOperation">
+            <a:avLst/>
+          </a:prstGeom>
+        </p:spPr>
+        <p:style>
+          <a:lnRef idx="2">
+            <a:schemeClr val="accent1">
+              <a:shade val="15000"/>
+            </a:schemeClr>
+          </a:lnRef>
+          <a:fillRef idx="1">
+            <a:schemeClr val="accent1"/>
+          </a:fillRef>
+          <a:effectRef idx="0">
+            <a:schemeClr val="accent1"/>
+          </a:effectRef>
+          <a:fontRef idx="minor">
+            <a:schemeClr val="lt1"/>
+          </a:fontRef>
+        </p:style>
+        <p:txBody>
+          <a:bodyPr rtlCol="0" anchor="ctr"/>
+          <a:lstStyle/>
+          <a:p>
+            <a:pPr algn="ctr"/>
+            <a:endParaRPr lang="en-US" dirty="0"/>
+          </a:p>
+        </p:txBody>
+      </p:sp>
+      <p:sp>
+        <p:nvSpPr>
+          <p:cNvPr id="6" name="Rectangle 5">
+            <a:extLst>
+              <a:ext uri="{FF2B5EF4-FFF2-40B4-BE49-F238E27FC236}">
+                <a16:creationId xmlns:a16="http://schemas.microsoft.com/office/drawing/2014/main" id="{E7D6AA3B-2B0E-FEA6-3B09-6DDDBB02DFE3}"/>
+              </a:ext>
+            </a:extLst>
+          </p:cNvPr>
+          <p:cNvSpPr/>
+          <p:nvPr/>
+        </p:nvSpPr>
+        <p:spPr>
+          <a:xfrm>
+            <a:off x="9496044" y="3073283"/>
+            <a:ext cx="612648" cy="813816"/>
+          </a:xfrm>
+          <a:prstGeom prst="rect">
+            <a:avLst/>
+          </a:prstGeom>
+        </p:spPr>
+        <p:style>
+          <a:lnRef idx="2">
+            <a:schemeClr val="accent1">
+              <a:shade val="15000"/>
+            </a:schemeClr>
+          </a:lnRef>
+          <a:fillRef idx="1">
+            <a:schemeClr val="accent1"/>
+          </a:fillRef>
+          <a:effectRef idx="0">
+            <a:schemeClr val="accent1"/>
+          </a:effectRef>
+          <a:fontRef idx="minor">
+            <a:schemeClr val="lt1"/>
+          </a:fontRef>
+        </p:style>
+        <p:txBody>
+          <a:bodyPr rtlCol="0" anchor="ctr"/>
+          <a:lstStyle/>
+          <a:p>
+            <a:pPr algn="ctr"/>
+            <a:r>
+              <a:rPr lang="en-US" sz="1000" dirty="0"/>
+              <a:t>FC Layer</a:t>
+            </a:r>
+          </a:p>
+        </p:txBody>
+      </p:sp>
+      <p:sp>
+        <p:nvSpPr>
+          <p:cNvPr id="8" name="Oval 7">
+            <a:extLst>
+              <a:ext uri="{FF2B5EF4-FFF2-40B4-BE49-F238E27FC236}">
+                <a16:creationId xmlns:a16="http://schemas.microsoft.com/office/drawing/2014/main" id="{954107C6-7068-606E-847C-53570AC9B82D}"/>
+              </a:ext>
+            </a:extLst>
+          </p:cNvPr>
+          <p:cNvSpPr/>
+          <p:nvPr/>
+        </p:nvSpPr>
+        <p:spPr>
+          <a:xfrm>
+            <a:off x="10735056" y="3114431"/>
+            <a:ext cx="813816" cy="731520"/>
+          </a:xfrm>
+          <a:prstGeom prst="ellipse">
+            <a:avLst/>
+          </a:prstGeom>
+        </p:spPr>
+        <p:style>
+          <a:lnRef idx="2">
+            <a:schemeClr val="accent1">
+              <a:shade val="15000"/>
+            </a:schemeClr>
+          </a:lnRef>
+          <a:fillRef idx="1">
+            <a:schemeClr val="accent1"/>
+          </a:fillRef>
+          <a:effectRef idx="0">
+            <a:schemeClr val="accent1"/>
+          </a:effectRef>
+          <a:fontRef idx="minor">
+            <a:schemeClr val="lt1"/>
+          </a:fontRef>
+        </p:style>
+        <p:txBody>
+          <a:bodyPr rtlCol="0" anchor="ctr"/>
+          <a:lstStyle/>
+          <a:p>
+            <a:pPr algn="ctr"/>
+            <a:r>
+              <a:rPr lang="en-US" dirty="0"/>
+              <a:t>0/1</a:t>
+            </a:r>
+          </a:p>
+        </p:txBody>
+      </p:sp>
+      <p:pic>
+        <p:nvPicPr>
+          <p:cNvPr id="13" name="Picture 12" descr="An ultrasound of a baby&#10;&#10;AI-generated content may be incorrect.">
+            <a:extLst>
+              <a:ext uri="{FF2B5EF4-FFF2-40B4-BE49-F238E27FC236}">
+                <a16:creationId xmlns:a16="http://schemas.microsoft.com/office/drawing/2014/main" id="{AE5D36BE-6624-3E38-B85E-6875E5F68E43}"/>
+              </a:ext>
+            </a:extLst>
+          </p:cNvPr>
+          <p:cNvPicPr>
+            <a:picLocks noChangeAspect="1"/>
+          </p:cNvPicPr>
+          <p:nvPr/>
+        </p:nvPicPr>
+        <p:blipFill>
+          <a:blip r:embed="rId2">
+            <a:extLst>
+              <a:ext uri="{28A0092B-C50C-407E-A947-70E740481C1C}">
+                <a14:useLocalDpi xmlns:a14="http://schemas.microsoft.com/office/drawing/2010/main" val="0"/>
+              </a:ext>
+            </a:extLst>
+          </a:blip>
+          <a:stretch>
+            <a:fillRect/>
+          </a:stretch>
+        </p:blipFill>
+        <p:spPr>
+          <a:xfrm>
+            <a:off x="5879592" y="3019205"/>
+            <a:ext cx="960120" cy="921972"/>
+          </a:xfrm>
+          <a:prstGeom prst="rect">
+            <a:avLst/>
+          </a:prstGeom>
+        </p:spPr>
+      </p:pic>
+      <p:cxnSp>
+        <p:nvCxnSpPr>
+          <p:cNvPr id="16" name="Straight Arrow Connector 15">
+            <a:extLst>
+              <a:ext uri="{FF2B5EF4-FFF2-40B4-BE49-F238E27FC236}">
+                <a16:creationId xmlns:a16="http://schemas.microsoft.com/office/drawing/2014/main" id="{FB7810E9-2813-6A7D-4077-0340A5158DEE}"/>
+              </a:ext>
+            </a:extLst>
+          </p:cNvPr>
+          <p:cNvCxnSpPr>
+            <a:stCxn id="13" idx="3"/>
+            <a:endCxn id="4" idx="0"/>
+          </p:cNvCxnSpPr>
+          <p:nvPr/>
+        </p:nvCxnSpPr>
+        <p:spPr>
+          <a:xfrm>
+            <a:off x="6839712" y="3480191"/>
+            <a:ext cx="630936" cy="0"/>
+          </a:xfrm>
+          <a:prstGeom prst="straightConnector1">
+            <a:avLst/>
+          </a:prstGeom>
+          <a:ln>
+            <a:tailEnd type="triangle"/>
+          </a:ln>
+        </p:spPr>
+        <p:style>
+          <a:lnRef idx="2">
+            <a:schemeClr val="accent1"/>
+          </a:lnRef>
+          <a:fillRef idx="0">
+            <a:schemeClr val="accent1"/>
+          </a:fillRef>
+          <a:effectRef idx="1">
+            <a:schemeClr val="accent1"/>
+          </a:effectRef>
+          <a:fontRef idx="minor">
+            <a:schemeClr val="tx1"/>
+          </a:fontRef>
+        </p:style>
+      </p:cxnSp>
+      <p:cxnSp>
+        <p:nvCxnSpPr>
+          <p:cNvPr id="19" name="Straight Arrow Connector 18">
+            <a:extLst>
+              <a:ext uri="{FF2B5EF4-FFF2-40B4-BE49-F238E27FC236}">
+                <a16:creationId xmlns:a16="http://schemas.microsoft.com/office/drawing/2014/main" id="{DBA3FF26-E795-7E70-DF6C-5765A1767210}"/>
+              </a:ext>
+            </a:extLst>
+          </p:cNvPr>
+          <p:cNvCxnSpPr>
+            <a:stCxn id="4" idx="2"/>
+            <a:endCxn id="6" idx="1"/>
+          </p:cNvCxnSpPr>
+          <p:nvPr/>
+        </p:nvCxnSpPr>
+        <p:spPr>
+          <a:xfrm>
+            <a:off x="9006840" y="3480191"/>
+            <a:ext cx="489204" cy="0"/>
+          </a:xfrm>
+          <a:prstGeom prst="straightConnector1">
+            <a:avLst/>
+          </a:prstGeom>
+          <a:ln>
+            <a:tailEnd type="triangle"/>
+          </a:ln>
+        </p:spPr>
+        <p:style>
+          <a:lnRef idx="2">
+            <a:schemeClr val="accent1"/>
+          </a:lnRef>
+          <a:fillRef idx="0">
+            <a:schemeClr val="accent1"/>
+          </a:fillRef>
+          <a:effectRef idx="1">
+            <a:schemeClr val="accent1"/>
+          </a:effectRef>
+          <a:fontRef idx="minor">
+            <a:schemeClr val="tx1"/>
+          </a:fontRef>
+        </p:style>
+      </p:cxnSp>
+      <p:cxnSp>
+        <p:nvCxnSpPr>
+          <p:cNvPr id="21" name="Straight Arrow Connector 20">
+            <a:extLst>
+              <a:ext uri="{FF2B5EF4-FFF2-40B4-BE49-F238E27FC236}">
+                <a16:creationId xmlns:a16="http://schemas.microsoft.com/office/drawing/2014/main" id="{43E16731-950E-6139-72F8-B7D31EB1376E}"/>
+              </a:ext>
+            </a:extLst>
+          </p:cNvPr>
+          <p:cNvCxnSpPr>
+            <a:cxnSpLocks/>
+            <a:stCxn id="6" idx="3"/>
+            <a:endCxn id="8" idx="2"/>
+          </p:cNvCxnSpPr>
+          <p:nvPr/>
+        </p:nvCxnSpPr>
+        <p:spPr>
+          <a:xfrm>
+            <a:off x="10108692" y="3480191"/>
+            <a:ext cx="626364" cy="0"/>
+          </a:xfrm>
+          <a:prstGeom prst="straightConnector1">
+            <a:avLst/>
+          </a:prstGeom>
+          <a:ln>
+            <a:tailEnd type="triangle"/>
+          </a:ln>
+        </p:spPr>
+        <p:style>
+          <a:lnRef idx="2">
+            <a:schemeClr val="accent1"/>
+          </a:lnRef>
+          <a:fillRef idx="0">
+            <a:schemeClr val="accent1"/>
+          </a:fillRef>
+          <a:effectRef idx="1">
+            <a:schemeClr val="accent1"/>
+          </a:effectRef>
+          <a:fontRef idx="minor">
+            <a:schemeClr val="tx1"/>
+          </a:fontRef>
+        </p:style>
+      </p:cxnSp>
+      <p:sp>
+        <p:nvSpPr>
+          <p:cNvPr id="32" name="TextBox 31">
+            <a:extLst>
+              <a:ext uri="{FF2B5EF4-FFF2-40B4-BE49-F238E27FC236}">
+                <a16:creationId xmlns:a16="http://schemas.microsoft.com/office/drawing/2014/main" id="{F24FED50-EBAD-FA5D-FE77-079A9876B14F}"/>
+              </a:ext>
+            </a:extLst>
+          </p:cNvPr>
+          <p:cNvSpPr txBox="1"/>
+          <p:nvPr/>
+        </p:nvSpPr>
+        <p:spPr>
+          <a:xfrm>
+            <a:off x="7594092" y="3280136"/>
+            <a:ext cx="1106424" cy="553998"/>
+          </a:xfrm>
+          <a:prstGeom prst="rect">
+            <a:avLst/>
+          </a:prstGeom>
+          <a:noFill/>
+        </p:spPr>
+        <p:txBody>
+          <a:bodyPr wrap="square" rtlCol="0">
+            <a:spAutoFit/>
+          </a:bodyPr>
+          <a:lstStyle/>
+          <a:p>
+            <a:pPr algn="ctr"/>
+            <a:r>
+              <a:rPr lang="en-US" sz="1000" dirty="0">
+                <a:solidFill>
+                  <a:schemeClr val="bg1"/>
+                </a:solidFill>
+              </a:rPr>
+              <a:t>Pretrained Encoder</a:t>
+            </a:r>
+          </a:p>
+          <a:p>
+            <a:pPr algn="ctr"/>
+            <a:r>
+              <a:rPr lang="en-US" sz="1000" dirty="0">
+                <a:solidFill>
+                  <a:schemeClr val="bg1"/>
+                </a:solidFill>
+              </a:rPr>
+              <a:t>(Frozen)</a:t>
+            </a:r>
+          </a:p>
+        </p:txBody>
+      </p:sp>
+      <p:pic>
+        <p:nvPicPr>
+          <p:cNvPr id="39" name="Picture 38" descr="A graph of a curve&#10;&#10;AI-generated content may be incorrect.">
+            <a:extLst>
+              <a:ext uri="{FF2B5EF4-FFF2-40B4-BE49-F238E27FC236}">
+                <a16:creationId xmlns:a16="http://schemas.microsoft.com/office/drawing/2014/main" id="{379DE014-B402-3957-50FB-A12DFD8674FB}"/>
+              </a:ext>
+            </a:extLst>
+          </p:cNvPr>
+          <p:cNvPicPr>
+            <a:picLocks noChangeAspect="1"/>
+          </p:cNvPicPr>
+          <p:nvPr/>
+        </p:nvPicPr>
+        <p:blipFill>
+          <a:blip r:embed="rId3">
+            <a:extLst>
+              <a:ext uri="{28A0092B-C50C-407E-A947-70E740481C1C}">
+                <a14:useLocalDpi xmlns:a14="http://schemas.microsoft.com/office/drawing/2010/main" val="0"/>
+              </a:ext>
+            </a:extLst>
+          </a:blip>
+          <a:stretch>
+            <a:fillRect/>
+          </a:stretch>
+        </p:blipFill>
+        <p:spPr>
+          <a:xfrm>
+            <a:off x="1102967" y="2767666"/>
+            <a:ext cx="4257313" cy="3192985"/>
+          </a:xfrm>
+          <a:prstGeom prst="rect">
+            <a:avLst/>
+          </a:prstGeom>
+        </p:spPr>
+      </p:pic>
+    </p:spTree>
+    <p:extLst>
+      <p:ext uri="{BB962C8B-B14F-4D97-AF65-F5344CB8AC3E}">
+        <p14:creationId xmlns:p14="http://schemas.microsoft.com/office/powerpoint/2010/main" val="2306649895"/>
+      </p:ext>
+    </p:extLst>
+  </p:cSld>
+  <p:clrMapOvr>
+    <a:masterClrMapping/>
+  </p:clrMapOvr>
+</p:sld>
+</file>
+
+<file path=ppt/slides/slide2.xml><?xml version="1.0" encoding="utf-8"?>
+<p:sld xmlns:a="http://schemas.openxmlformats.org/drawingml/2006/main" xmlns:r="http://schemas.openxmlformats.org/officeDocument/2006/relationships" xmlns:p="http://schemas.openxmlformats.org/presentationml/2006/main">
+  <p:cSld>
+    <p:spTree>
+      <p:nvGrpSpPr>
         <p:cNvPr id="1" name=""/>
         <p:cNvGrpSpPr/>
         <p:nvPr/>
@@ -4235,6 +4767,936 @@
     <p:extLst>
       <p:ext uri="{BB962C8B-B14F-4D97-AF65-F5344CB8AC3E}">
         <p14:creationId xmlns:p14="http://schemas.microsoft.com/office/powerpoint/2010/main" val="1540443184"/>
+      </p:ext>
+    </p:extLst>
+  </p:cSld>
+  <p:clrMapOvr>
+    <a:masterClrMapping/>
+  </p:clrMapOvr>
+</p:sld>
+</file>
+
+<file path=ppt/slides/slide3.xml><?xml version="1.0" encoding="utf-8"?>
+<p:sld xmlns:a="http://schemas.openxmlformats.org/drawingml/2006/main" xmlns:r="http://schemas.openxmlformats.org/officeDocument/2006/relationships" xmlns:p="http://schemas.openxmlformats.org/presentationml/2006/main">
+  <p:cSld>
+    <p:spTree>
+      <p:nvGrpSpPr>
+        <p:cNvPr id="1" name="">
+          <a:extLst>
+            <a:ext uri="{FF2B5EF4-FFF2-40B4-BE49-F238E27FC236}">
+              <a16:creationId xmlns:a16="http://schemas.microsoft.com/office/drawing/2014/main" id="{01430D4D-2BC7-F455-8ABF-9EB3FE1CCA70}"/>
+            </a:ext>
+          </a:extLst>
+        </p:cNvPr>
+        <p:cNvGrpSpPr/>
+        <p:nvPr/>
+      </p:nvGrpSpPr>
+      <p:grpSpPr>
+        <a:xfrm>
+          <a:off x="0" y="0"/>
+          <a:ext cx="0" cy="0"/>
+          <a:chOff x="0" y="0"/>
+          <a:chExt cx="0" cy="0"/>
+        </a:xfrm>
+      </p:grpSpPr>
+      <p:sp>
+        <p:nvSpPr>
+          <p:cNvPr id="2" name="TextBox 1">
+            <a:extLst>
+              <a:ext uri="{FF2B5EF4-FFF2-40B4-BE49-F238E27FC236}">
+                <a16:creationId xmlns:a16="http://schemas.microsoft.com/office/drawing/2014/main" id="{8A2B4680-587D-35FB-51A4-B4142FDD39E5}"/>
+              </a:ext>
+            </a:extLst>
+          </p:cNvPr>
+          <p:cNvSpPr txBox="1"/>
+          <p:nvPr/>
+        </p:nvSpPr>
+        <p:spPr>
+          <a:xfrm>
+            <a:off x="1234440" y="722376"/>
+            <a:ext cx="2688336" cy="369332"/>
+          </a:xfrm>
+          <a:prstGeom prst="rect">
+            <a:avLst/>
+          </a:prstGeom>
+          <a:noFill/>
+        </p:spPr>
+        <p:txBody>
+          <a:bodyPr wrap="square" rtlCol="0">
+            <a:spAutoFit/>
+          </a:bodyPr>
+          <a:lstStyle/>
+          <a:p>
+            <a:r>
+              <a:rPr lang="en-US" dirty="0"/>
+              <a:t>Experiment 2: </a:t>
+            </a:r>
+          </a:p>
+        </p:txBody>
+      </p:sp>
+      <p:sp>
+        <p:nvSpPr>
+          <p:cNvPr id="3" name="TextBox 2">
+            <a:extLst>
+              <a:ext uri="{FF2B5EF4-FFF2-40B4-BE49-F238E27FC236}">
+                <a16:creationId xmlns:a16="http://schemas.microsoft.com/office/drawing/2014/main" id="{4CF58A08-16A3-8B04-DC8F-9A3195337000}"/>
+              </a:ext>
+            </a:extLst>
+          </p:cNvPr>
+          <p:cNvSpPr txBox="1"/>
+          <p:nvPr/>
+        </p:nvSpPr>
+        <p:spPr>
+          <a:xfrm>
+            <a:off x="1325880" y="1335024"/>
+            <a:ext cx="5513832" cy="1477328"/>
+          </a:xfrm>
+          <a:prstGeom prst="rect">
+            <a:avLst/>
+          </a:prstGeom>
+          <a:noFill/>
+        </p:spPr>
+        <p:txBody>
+          <a:bodyPr wrap="square" rtlCol="0">
+            <a:spAutoFit/>
+          </a:bodyPr>
+          <a:lstStyle/>
+          <a:p>
+            <a:r>
+              <a:rPr lang="en-US" dirty="0"/>
+              <a:t>Details: </a:t>
+            </a:r>
+          </a:p>
+          <a:p>
+            <a:endParaRPr lang="en-US" dirty="0"/>
+          </a:p>
+          <a:p>
+            <a:pPr marL="285750" indent="-285750">
+              <a:buFont typeface="Arial" panose="020B0604020202020204" pitchFamily="34" charset="0"/>
+              <a:buChar char="•"/>
+            </a:pPr>
+            <a:r>
+              <a:rPr lang="en-US" dirty="0"/>
+              <a:t>Binary Classification Setup </a:t>
+            </a:r>
+          </a:p>
+          <a:p>
+            <a:pPr marL="285750" indent="-285750">
+              <a:buFont typeface="Arial" panose="020B0604020202020204" pitchFamily="34" charset="0"/>
+              <a:buChar char="•"/>
+            </a:pPr>
+            <a:r>
+              <a:rPr lang="en-US" dirty="0"/>
+              <a:t>Classification Based on US Image Only</a:t>
+            </a:r>
+          </a:p>
+          <a:p>
+            <a:pPr marL="285750" indent="-285750">
+              <a:buFont typeface="Arial" panose="020B0604020202020204" pitchFamily="34" charset="0"/>
+              <a:buChar char="•"/>
+            </a:pPr>
+            <a:endParaRPr lang="en-US" dirty="0"/>
+          </a:p>
+        </p:txBody>
+      </p:sp>
+      <p:sp>
+        <p:nvSpPr>
+          <p:cNvPr id="4" name="Flowchart: Manual Operation 3">
+            <a:extLst>
+              <a:ext uri="{FF2B5EF4-FFF2-40B4-BE49-F238E27FC236}">
+                <a16:creationId xmlns:a16="http://schemas.microsoft.com/office/drawing/2014/main" id="{302F1A45-DC6C-A462-A01D-757D6E6A7B51}"/>
+              </a:ext>
+            </a:extLst>
+          </p:cNvPr>
+          <p:cNvSpPr/>
+          <p:nvPr/>
+        </p:nvSpPr>
+        <p:spPr>
+          <a:xfrm rot="16200000">
+            <a:off x="7616952" y="1427036"/>
+            <a:ext cx="1234440" cy="1536192"/>
+          </a:xfrm>
+          <a:prstGeom prst="flowChartManualOperation">
+            <a:avLst/>
+          </a:prstGeom>
+        </p:spPr>
+        <p:style>
+          <a:lnRef idx="2">
+            <a:schemeClr val="accent1">
+              <a:shade val="15000"/>
+            </a:schemeClr>
+          </a:lnRef>
+          <a:fillRef idx="1">
+            <a:schemeClr val="accent1"/>
+          </a:fillRef>
+          <a:effectRef idx="0">
+            <a:schemeClr val="accent1"/>
+          </a:effectRef>
+          <a:fontRef idx="minor">
+            <a:schemeClr val="lt1"/>
+          </a:fontRef>
+        </p:style>
+        <p:txBody>
+          <a:bodyPr rtlCol="0" anchor="ctr"/>
+          <a:lstStyle/>
+          <a:p>
+            <a:pPr algn="ctr"/>
+            <a:endParaRPr lang="en-US" dirty="0"/>
+          </a:p>
+        </p:txBody>
+      </p:sp>
+      <p:sp>
+        <p:nvSpPr>
+          <p:cNvPr id="5" name="Flowchart: Manual Operation 4">
+            <a:extLst>
+              <a:ext uri="{FF2B5EF4-FFF2-40B4-BE49-F238E27FC236}">
+                <a16:creationId xmlns:a16="http://schemas.microsoft.com/office/drawing/2014/main" id="{C8AF3E5F-84C8-E22D-4525-CBC8B5DE240F}"/>
+              </a:ext>
+            </a:extLst>
+          </p:cNvPr>
+          <p:cNvSpPr/>
+          <p:nvPr/>
+        </p:nvSpPr>
+        <p:spPr>
+          <a:xfrm rot="16200000">
+            <a:off x="7616952" y="3242120"/>
+            <a:ext cx="1234440" cy="1536192"/>
+          </a:xfrm>
+          <a:prstGeom prst="flowChartManualOperation">
+            <a:avLst/>
+          </a:prstGeom>
+        </p:spPr>
+        <p:style>
+          <a:lnRef idx="2">
+            <a:schemeClr val="accent1">
+              <a:shade val="15000"/>
+            </a:schemeClr>
+          </a:lnRef>
+          <a:fillRef idx="1">
+            <a:schemeClr val="accent1"/>
+          </a:fillRef>
+          <a:effectRef idx="0">
+            <a:schemeClr val="accent1"/>
+          </a:effectRef>
+          <a:fontRef idx="minor">
+            <a:schemeClr val="lt1"/>
+          </a:fontRef>
+        </p:style>
+        <p:txBody>
+          <a:bodyPr rtlCol="0" anchor="ctr"/>
+          <a:lstStyle/>
+          <a:p>
+            <a:pPr algn="ctr"/>
+            <a:endParaRPr lang="en-US"/>
+          </a:p>
+        </p:txBody>
+      </p:sp>
+      <p:sp>
+        <p:nvSpPr>
+          <p:cNvPr id="6" name="Rectangle 5">
+            <a:extLst>
+              <a:ext uri="{FF2B5EF4-FFF2-40B4-BE49-F238E27FC236}">
+                <a16:creationId xmlns:a16="http://schemas.microsoft.com/office/drawing/2014/main" id="{3A2570F5-D7A2-318B-8C59-202645F67C38}"/>
+              </a:ext>
+            </a:extLst>
+          </p:cNvPr>
+          <p:cNvSpPr/>
+          <p:nvPr/>
+        </p:nvSpPr>
+        <p:spPr>
+          <a:xfrm>
+            <a:off x="9491472" y="1788224"/>
+            <a:ext cx="612648" cy="813816"/>
+          </a:xfrm>
+          <a:prstGeom prst="rect">
+            <a:avLst/>
+          </a:prstGeom>
+        </p:spPr>
+        <p:style>
+          <a:lnRef idx="2">
+            <a:schemeClr val="accent1">
+              <a:shade val="15000"/>
+            </a:schemeClr>
+          </a:lnRef>
+          <a:fillRef idx="1">
+            <a:schemeClr val="accent1"/>
+          </a:fillRef>
+          <a:effectRef idx="0">
+            <a:schemeClr val="accent1"/>
+          </a:effectRef>
+          <a:fontRef idx="minor">
+            <a:schemeClr val="lt1"/>
+          </a:fontRef>
+        </p:style>
+        <p:txBody>
+          <a:bodyPr rtlCol="0" anchor="ctr"/>
+          <a:lstStyle/>
+          <a:p>
+            <a:pPr algn="ctr"/>
+            <a:r>
+              <a:rPr lang="en-US" sz="1000" dirty="0"/>
+              <a:t>FC Layer</a:t>
+            </a:r>
+          </a:p>
+        </p:txBody>
+      </p:sp>
+      <p:sp>
+        <p:nvSpPr>
+          <p:cNvPr id="7" name="Rectangle 6">
+            <a:extLst>
+              <a:ext uri="{FF2B5EF4-FFF2-40B4-BE49-F238E27FC236}">
+                <a16:creationId xmlns:a16="http://schemas.microsoft.com/office/drawing/2014/main" id="{5FCF431B-0E05-4707-9D34-22AA0D1AB5E7}"/>
+              </a:ext>
+            </a:extLst>
+          </p:cNvPr>
+          <p:cNvSpPr/>
+          <p:nvPr/>
+        </p:nvSpPr>
+        <p:spPr>
+          <a:xfrm>
+            <a:off x="9491472" y="3603308"/>
+            <a:ext cx="612648" cy="813816"/>
+          </a:xfrm>
+          <a:prstGeom prst="rect">
+            <a:avLst/>
+          </a:prstGeom>
+        </p:spPr>
+        <p:style>
+          <a:lnRef idx="2">
+            <a:schemeClr val="accent1">
+              <a:shade val="15000"/>
+            </a:schemeClr>
+          </a:lnRef>
+          <a:fillRef idx="1">
+            <a:schemeClr val="accent1"/>
+          </a:fillRef>
+          <a:effectRef idx="0">
+            <a:schemeClr val="accent1"/>
+          </a:effectRef>
+          <a:fontRef idx="minor">
+            <a:schemeClr val="lt1"/>
+          </a:fontRef>
+        </p:style>
+        <p:txBody>
+          <a:bodyPr rtlCol="0" anchor="ctr"/>
+          <a:lstStyle/>
+          <a:p>
+            <a:pPr algn="ctr"/>
+            <a:r>
+              <a:rPr lang="en-US" sz="1000" dirty="0"/>
+              <a:t>FC Layer</a:t>
+            </a:r>
+          </a:p>
+        </p:txBody>
+      </p:sp>
+      <p:sp>
+        <p:nvSpPr>
+          <p:cNvPr id="8" name="Oval 7">
+            <a:extLst>
+              <a:ext uri="{FF2B5EF4-FFF2-40B4-BE49-F238E27FC236}">
+                <a16:creationId xmlns:a16="http://schemas.microsoft.com/office/drawing/2014/main" id="{163C3524-98BF-978C-C5C3-7850F5809FFB}"/>
+              </a:ext>
+            </a:extLst>
+          </p:cNvPr>
+          <p:cNvSpPr/>
+          <p:nvPr/>
+        </p:nvSpPr>
+        <p:spPr>
+          <a:xfrm>
+            <a:off x="10730484" y="1829372"/>
+            <a:ext cx="813816" cy="731520"/>
+          </a:xfrm>
+          <a:prstGeom prst="ellipse">
+            <a:avLst/>
+          </a:prstGeom>
+        </p:spPr>
+        <p:style>
+          <a:lnRef idx="2">
+            <a:schemeClr val="accent1">
+              <a:shade val="15000"/>
+            </a:schemeClr>
+          </a:lnRef>
+          <a:fillRef idx="1">
+            <a:schemeClr val="accent1"/>
+          </a:fillRef>
+          <a:effectRef idx="0">
+            <a:schemeClr val="accent1"/>
+          </a:effectRef>
+          <a:fontRef idx="minor">
+            <a:schemeClr val="lt1"/>
+          </a:fontRef>
+        </p:style>
+        <p:txBody>
+          <a:bodyPr rtlCol="0" anchor="ctr"/>
+          <a:lstStyle/>
+          <a:p>
+            <a:pPr algn="ctr"/>
+            <a:r>
+              <a:rPr lang="en-US" dirty="0"/>
+              <a:t>0/1</a:t>
+            </a:r>
+          </a:p>
+        </p:txBody>
+      </p:sp>
+      <p:sp>
+        <p:nvSpPr>
+          <p:cNvPr id="9" name="Oval 8">
+            <a:extLst>
+              <a:ext uri="{FF2B5EF4-FFF2-40B4-BE49-F238E27FC236}">
+                <a16:creationId xmlns:a16="http://schemas.microsoft.com/office/drawing/2014/main" id="{B658680D-2C15-BA06-3964-78CD374232C4}"/>
+              </a:ext>
+            </a:extLst>
+          </p:cNvPr>
+          <p:cNvSpPr/>
+          <p:nvPr/>
+        </p:nvSpPr>
+        <p:spPr>
+          <a:xfrm>
+            <a:off x="10703052" y="3644456"/>
+            <a:ext cx="813816" cy="731520"/>
+          </a:xfrm>
+          <a:prstGeom prst="ellipse">
+            <a:avLst/>
+          </a:prstGeom>
+        </p:spPr>
+        <p:style>
+          <a:lnRef idx="2">
+            <a:schemeClr val="accent1">
+              <a:shade val="15000"/>
+            </a:schemeClr>
+          </a:lnRef>
+          <a:fillRef idx="1">
+            <a:schemeClr val="accent1"/>
+          </a:fillRef>
+          <a:effectRef idx="0">
+            <a:schemeClr val="accent1"/>
+          </a:effectRef>
+          <a:fontRef idx="minor">
+            <a:schemeClr val="lt1"/>
+          </a:fontRef>
+        </p:style>
+        <p:txBody>
+          <a:bodyPr rtlCol="0" anchor="ctr"/>
+          <a:lstStyle/>
+          <a:p>
+            <a:pPr algn="ctr"/>
+            <a:r>
+              <a:rPr lang="en-US" dirty="0"/>
+              <a:t>0/1</a:t>
+            </a:r>
+          </a:p>
+        </p:txBody>
+      </p:sp>
+      <p:pic>
+        <p:nvPicPr>
+          <p:cNvPr id="13" name="Picture 12" descr="An ultrasound of a baby&#10;&#10;AI-generated content may be incorrect.">
+            <a:extLst>
+              <a:ext uri="{FF2B5EF4-FFF2-40B4-BE49-F238E27FC236}">
+                <a16:creationId xmlns:a16="http://schemas.microsoft.com/office/drawing/2014/main" id="{0F892D30-26EE-1F63-05C3-8D2FD5D30C1C}"/>
+              </a:ext>
+            </a:extLst>
+          </p:cNvPr>
+          <p:cNvPicPr>
+            <a:picLocks noChangeAspect="1"/>
+          </p:cNvPicPr>
+          <p:nvPr/>
+        </p:nvPicPr>
+        <p:blipFill>
+          <a:blip r:embed="rId2">
+            <a:extLst>
+              <a:ext uri="{28A0092B-C50C-407E-A947-70E740481C1C}">
+                <a14:useLocalDpi xmlns:a14="http://schemas.microsoft.com/office/drawing/2010/main" val="0"/>
+              </a:ext>
+            </a:extLst>
+          </a:blip>
+          <a:stretch>
+            <a:fillRect/>
+          </a:stretch>
+        </p:blipFill>
+        <p:spPr>
+          <a:xfrm>
+            <a:off x="5875020" y="1734146"/>
+            <a:ext cx="960120" cy="921972"/>
+          </a:xfrm>
+          <a:prstGeom prst="rect">
+            <a:avLst/>
+          </a:prstGeom>
+        </p:spPr>
+      </p:pic>
+      <p:pic>
+        <p:nvPicPr>
+          <p:cNvPr id="14" name="Picture 13" descr="An ultrasound of a baby&#10;&#10;AI-generated content may be incorrect.">
+            <a:extLst>
+              <a:ext uri="{FF2B5EF4-FFF2-40B4-BE49-F238E27FC236}">
+                <a16:creationId xmlns:a16="http://schemas.microsoft.com/office/drawing/2014/main" id="{4D458491-45DE-92D0-EB9A-401A67D1BA2D}"/>
+              </a:ext>
+            </a:extLst>
+          </p:cNvPr>
+          <p:cNvPicPr>
+            <a:picLocks noChangeAspect="1"/>
+          </p:cNvPicPr>
+          <p:nvPr/>
+        </p:nvPicPr>
+        <p:blipFill>
+          <a:blip r:embed="rId2">
+            <a:extLst>
+              <a:ext uri="{28A0092B-C50C-407E-A947-70E740481C1C}">
+                <a14:useLocalDpi xmlns:a14="http://schemas.microsoft.com/office/drawing/2010/main" val="0"/>
+              </a:ext>
+            </a:extLst>
+          </a:blip>
+          <a:stretch>
+            <a:fillRect/>
+          </a:stretch>
+        </p:blipFill>
+        <p:spPr>
+          <a:xfrm>
+            <a:off x="5875020" y="3549230"/>
+            <a:ext cx="960120" cy="921972"/>
+          </a:xfrm>
+          <a:prstGeom prst="rect">
+            <a:avLst/>
+          </a:prstGeom>
+        </p:spPr>
+      </p:pic>
+      <p:cxnSp>
+        <p:nvCxnSpPr>
+          <p:cNvPr id="16" name="Straight Arrow Connector 15">
+            <a:extLst>
+              <a:ext uri="{FF2B5EF4-FFF2-40B4-BE49-F238E27FC236}">
+                <a16:creationId xmlns:a16="http://schemas.microsoft.com/office/drawing/2014/main" id="{38509EC4-C442-64A8-889A-FEB1A7390358}"/>
+              </a:ext>
+            </a:extLst>
+          </p:cNvPr>
+          <p:cNvCxnSpPr>
+            <a:stCxn id="13" idx="3"/>
+            <a:endCxn id="4" idx="0"/>
+          </p:cNvCxnSpPr>
+          <p:nvPr/>
+        </p:nvCxnSpPr>
+        <p:spPr>
+          <a:xfrm>
+            <a:off x="6835140" y="2195132"/>
+            <a:ext cx="630936" cy="0"/>
+          </a:xfrm>
+          <a:prstGeom prst="straightConnector1">
+            <a:avLst/>
+          </a:prstGeom>
+          <a:ln>
+            <a:tailEnd type="triangle"/>
+          </a:ln>
+        </p:spPr>
+        <p:style>
+          <a:lnRef idx="2">
+            <a:schemeClr val="accent1"/>
+          </a:lnRef>
+          <a:fillRef idx="0">
+            <a:schemeClr val="accent1"/>
+          </a:fillRef>
+          <a:effectRef idx="1">
+            <a:schemeClr val="accent1"/>
+          </a:effectRef>
+          <a:fontRef idx="minor">
+            <a:schemeClr val="tx1"/>
+          </a:fontRef>
+        </p:style>
+      </p:cxnSp>
+      <p:cxnSp>
+        <p:nvCxnSpPr>
+          <p:cNvPr id="19" name="Straight Arrow Connector 18">
+            <a:extLst>
+              <a:ext uri="{FF2B5EF4-FFF2-40B4-BE49-F238E27FC236}">
+                <a16:creationId xmlns:a16="http://schemas.microsoft.com/office/drawing/2014/main" id="{83A7E377-85CC-C51A-B69E-694CF4AB5337}"/>
+              </a:ext>
+            </a:extLst>
+          </p:cNvPr>
+          <p:cNvCxnSpPr>
+            <a:stCxn id="4" idx="2"/>
+            <a:endCxn id="6" idx="1"/>
+          </p:cNvCxnSpPr>
+          <p:nvPr/>
+        </p:nvCxnSpPr>
+        <p:spPr>
+          <a:xfrm>
+            <a:off x="9002268" y="2195132"/>
+            <a:ext cx="489204" cy="0"/>
+          </a:xfrm>
+          <a:prstGeom prst="straightConnector1">
+            <a:avLst/>
+          </a:prstGeom>
+          <a:ln>
+            <a:tailEnd type="triangle"/>
+          </a:ln>
+        </p:spPr>
+        <p:style>
+          <a:lnRef idx="2">
+            <a:schemeClr val="accent1"/>
+          </a:lnRef>
+          <a:fillRef idx="0">
+            <a:schemeClr val="accent1"/>
+          </a:fillRef>
+          <a:effectRef idx="1">
+            <a:schemeClr val="accent1"/>
+          </a:effectRef>
+          <a:fontRef idx="minor">
+            <a:schemeClr val="tx1"/>
+          </a:fontRef>
+        </p:style>
+      </p:cxnSp>
+      <p:cxnSp>
+        <p:nvCxnSpPr>
+          <p:cNvPr id="21" name="Straight Arrow Connector 20">
+            <a:extLst>
+              <a:ext uri="{FF2B5EF4-FFF2-40B4-BE49-F238E27FC236}">
+                <a16:creationId xmlns:a16="http://schemas.microsoft.com/office/drawing/2014/main" id="{6BFB1B60-0FA5-60FD-B156-8450336F3F2A}"/>
+              </a:ext>
+            </a:extLst>
+          </p:cNvPr>
+          <p:cNvCxnSpPr>
+            <a:cxnSpLocks/>
+            <a:stCxn id="6" idx="3"/>
+            <a:endCxn id="8" idx="2"/>
+          </p:cNvCxnSpPr>
+          <p:nvPr/>
+        </p:nvCxnSpPr>
+        <p:spPr>
+          <a:xfrm>
+            <a:off x="10104120" y="2195132"/>
+            <a:ext cx="626364" cy="0"/>
+          </a:xfrm>
+          <a:prstGeom prst="straightConnector1">
+            <a:avLst/>
+          </a:prstGeom>
+          <a:ln>
+            <a:tailEnd type="triangle"/>
+          </a:ln>
+        </p:spPr>
+        <p:style>
+          <a:lnRef idx="2">
+            <a:schemeClr val="accent1"/>
+          </a:lnRef>
+          <a:fillRef idx="0">
+            <a:schemeClr val="accent1"/>
+          </a:fillRef>
+          <a:effectRef idx="1">
+            <a:schemeClr val="accent1"/>
+          </a:effectRef>
+          <a:fontRef idx="minor">
+            <a:schemeClr val="tx1"/>
+          </a:fontRef>
+        </p:style>
+      </p:cxnSp>
+      <p:cxnSp>
+        <p:nvCxnSpPr>
+          <p:cNvPr id="26" name="Straight Arrow Connector 25">
+            <a:extLst>
+              <a:ext uri="{FF2B5EF4-FFF2-40B4-BE49-F238E27FC236}">
+                <a16:creationId xmlns:a16="http://schemas.microsoft.com/office/drawing/2014/main" id="{1CFAB591-E18F-7AD0-4A8D-6E88673F1716}"/>
+              </a:ext>
+            </a:extLst>
+          </p:cNvPr>
+          <p:cNvCxnSpPr>
+            <a:stCxn id="14" idx="3"/>
+            <a:endCxn id="5" idx="0"/>
+          </p:cNvCxnSpPr>
+          <p:nvPr/>
+        </p:nvCxnSpPr>
+        <p:spPr>
+          <a:xfrm>
+            <a:off x="6835140" y="4010216"/>
+            <a:ext cx="630936" cy="0"/>
+          </a:xfrm>
+          <a:prstGeom prst="straightConnector1">
+            <a:avLst/>
+          </a:prstGeom>
+          <a:ln>
+            <a:tailEnd type="triangle"/>
+          </a:ln>
+        </p:spPr>
+        <p:style>
+          <a:lnRef idx="2">
+            <a:schemeClr val="accent1"/>
+          </a:lnRef>
+          <a:fillRef idx="0">
+            <a:schemeClr val="accent1"/>
+          </a:fillRef>
+          <a:effectRef idx="1">
+            <a:schemeClr val="accent1"/>
+          </a:effectRef>
+          <a:fontRef idx="minor">
+            <a:schemeClr val="tx1"/>
+          </a:fontRef>
+        </p:style>
+      </p:cxnSp>
+      <p:cxnSp>
+        <p:nvCxnSpPr>
+          <p:cNvPr id="28" name="Straight Arrow Connector 27">
+            <a:extLst>
+              <a:ext uri="{FF2B5EF4-FFF2-40B4-BE49-F238E27FC236}">
+                <a16:creationId xmlns:a16="http://schemas.microsoft.com/office/drawing/2014/main" id="{7FBA367D-8FF2-7C93-66DD-4630E07D8D8C}"/>
+              </a:ext>
+            </a:extLst>
+          </p:cNvPr>
+          <p:cNvCxnSpPr>
+            <a:stCxn id="5" idx="2"/>
+            <a:endCxn id="7" idx="1"/>
+          </p:cNvCxnSpPr>
+          <p:nvPr/>
+        </p:nvCxnSpPr>
+        <p:spPr>
+          <a:xfrm>
+            <a:off x="9002268" y="4010216"/>
+            <a:ext cx="489204" cy="0"/>
+          </a:xfrm>
+          <a:prstGeom prst="straightConnector1">
+            <a:avLst/>
+          </a:prstGeom>
+          <a:ln>
+            <a:tailEnd type="triangle"/>
+          </a:ln>
+        </p:spPr>
+        <p:style>
+          <a:lnRef idx="2">
+            <a:schemeClr val="accent1"/>
+          </a:lnRef>
+          <a:fillRef idx="0">
+            <a:schemeClr val="accent1"/>
+          </a:fillRef>
+          <a:effectRef idx="1">
+            <a:schemeClr val="accent1"/>
+          </a:effectRef>
+          <a:fontRef idx="minor">
+            <a:schemeClr val="tx1"/>
+          </a:fontRef>
+        </p:style>
+      </p:cxnSp>
+      <p:cxnSp>
+        <p:nvCxnSpPr>
+          <p:cNvPr id="30" name="Straight Arrow Connector 29">
+            <a:extLst>
+              <a:ext uri="{FF2B5EF4-FFF2-40B4-BE49-F238E27FC236}">
+                <a16:creationId xmlns:a16="http://schemas.microsoft.com/office/drawing/2014/main" id="{C666D514-400C-0D17-0F5E-B1EFA23BE366}"/>
+              </a:ext>
+            </a:extLst>
+          </p:cNvPr>
+          <p:cNvCxnSpPr>
+            <a:stCxn id="7" idx="3"/>
+            <a:endCxn id="9" idx="2"/>
+          </p:cNvCxnSpPr>
+          <p:nvPr/>
+        </p:nvCxnSpPr>
+        <p:spPr>
+          <a:xfrm>
+            <a:off x="10104120" y="4010216"/>
+            <a:ext cx="598932" cy="0"/>
+          </a:xfrm>
+          <a:prstGeom prst="straightConnector1">
+            <a:avLst/>
+          </a:prstGeom>
+          <a:ln>
+            <a:tailEnd type="triangle"/>
+          </a:ln>
+        </p:spPr>
+        <p:style>
+          <a:lnRef idx="2">
+            <a:schemeClr val="accent1"/>
+          </a:lnRef>
+          <a:fillRef idx="0">
+            <a:schemeClr val="accent1"/>
+          </a:fillRef>
+          <a:effectRef idx="1">
+            <a:schemeClr val="accent1"/>
+          </a:effectRef>
+          <a:fontRef idx="minor">
+            <a:schemeClr val="tx1"/>
+          </a:fontRef>
+        </p:style>
+      </p:cxnSp>
+      <p:sp>
+        <p:nvSpPr>
+          <p:cNvPr id="32" name="TextBox 31">
+            <a:extLst>
+              <a:ext uri="{FF2B5EF4-FFF2-40B4-BE49-F238E27FC236}">
+                <a16:creationId xmlns:a16="http://schemas.microsoft.com/office/drawing/2014/main" id="{26EB92D6-9A44-BCFC-F38F-B3B24324F063}"/>
+              </a:ext>
+            </a:extLst>
+          </p:cNvPr>
+          <p:cNvSpPr txBox="1"/>
+          <p:nvPr/>
+        </p:nvSpPr>
+        <p:spPr>
+          <a:xfrm>
+            <a:off x="7589520" y="1995077"/>
+            <a:ext cx="1106424" cy="553998"/>
+          </a:xfrm>
+          <a:prstGeom prst="rect">
+            <a:avLst/>
+          </a:prstGeom>
+          <a:noFill/>
+        </p:spPr>
+        <p:txBody>
+          <a:bodyPr wrap="square" rtlCol="0">
+            <a:spAutoFit/>
+          </a:bodyPr>
+          <a:lstStyle/>
+          <a:p>
+            <a:pPr algn="ctr"/>
+            <a:r>
+              <a:rPr lang="en-US" sz="1000" dirty="0">
+                <a:solidFill>
+                  <a:schemeClr val="bg1"/>
+                </a:solidFill>
+              </a:rPr>
+              <a:t>Pretrained Encoder</a:t>
+            </a:r>
+          </a:p>
+          <a:p>
+            <a:pPr algn="ctr"/>
+            <a:r>
+              <a:rPr lang="en-US" sz="1000" dirty="0">
+                <a:solidFill>
+                  <a:schemeClr val="bg1"/>
+                </a:solidFill>
+              </a:rPr>
+              <a:t>(Frozen)</a:t>
+            </a:r>
+          </a:p>
+        </p:txBody>
+      </p:sp>
+      <p:sp>
+        <p:nvSpPr>
+          <p:cNvPr id="34" name="TextBox 33">
+            <a:extLst>
+              <a:ext uri="{FF2B5EF4-FFF2-40B4-BE49-F238E27FC236}">
+                <a16:creationId xmlns:a16="http://schemas.microsoft.com/office/drawing/2014/main" id="{835210DF-C242-34B5-1648-D651D2E629EB}"/>
+              </a:ext>
+            </a:extLst>
+          </p:cNvPr>
+          <p:cNvSpPr txBox="1"/>
+          <p:nvPr/>
+        </p:nvSpPr>
+        <p:spPr>
+          <a:xfrm>
+            <a:off x="7642098" y="3810161"/>
+            <a:ext cx="1106424" cy="553998"/>
+          </a:xfrm>
+          <a:prstGeom prst="rect">
+            <a:avLst/>
+          </a:prstGeom>
+          <a:noFill/>
+        </p:spPr>
+        <p:txBody>
+          <a:bodyPr wrap="square" rtlCol="0">
+            <a:spAutoFit/>
+          </a:bodyPr>
+          <a:lstStyle/>
+          <a:p>
+            <a:pPr algn="ctr"/>
+            <a:r>
+              <a:rPr lang="en-US" sz="1000" dirty="0">
+                <a:solidFill>
+                  <a:schemeClr val="bg1"/>
+                </a:solidFill>
+              </a:rPr>
+              <a:t>Pretrained Encoder</a:t>
+            </a:r>
+          </a:p>
+          <a:p>
+            <a:pPr algn="ctr"/>
+            <a:r>
+              <a:rPr lang="en-US" sz="1000" dirty="0">
+                <a:solidFill>
+                  <a:schemeClr val="bg1"/>
+                </a:solidFill>
+              </a:rPr>
+              <a:t>(Trainable)</a:t>
+            </a:r>
+          </a:p>
+        </p:txBody>
+      </p:sp>
+      <p:cxnSp>
+        <p:nvCxnSpPr>
+          <p:cNvPr id="36" name="Straight Arrow Connector 35">
+            <a:extLst>
+              <a:ext uri="{FF2B5EF4-FFF2-40B4-BE49-F238E27FC236}">
+                <a16:creationId xmlns:a16="http://schemas.microsoft.com/office/drawing/2014/main" id="{D7911DB7-98AE-6B20-7F3B-2E2E3119E6DF}"/>
+              </a:ext>
+            </a:extLst>
+          </p:cNvPr>
+          <p:cNvCxnSpPr>
+            <a:cxnSpLocks/>
+            <a:stCxn id="5" idx="2"/>
+            <a:endCxn id="6" idx="1"/>
+          </p:cNvCxnSpPr>
+          <p:nvPr/>
+        </p:nvCxnSpPr>
+        <p:spPr>
+          <a:xfrm flipV="1">
+            <a:off x="9002268" y="2195132"/>
+            <a:ext cx="489204" cy="1815084"/>
+          </a:xfrm>
+          <a:prstGeom prst="straightConnector1">
+            <a:avLst/>
+          </a:prstGeom>
+          <a:ln>
+            <a:tailEnd type="triangle"/>
+          </a:ln>
+        </p:spPr>
+        <p:style>
+          <a:lnRef idx="2">
+            <a:schemeClr val="accent1"/>
+          </a:lnRef>
+          <a:fillRef idx="0">
+            <a:schemeClr val="accent1"/>
+          </a:fillRef>
+          <a:effectRef idx="1">
+            <a:schemeClr val="accent1"/>
+          </a:effectRef>
+          <a:fontRef idx="minor">
+            <a:schemeClr val="tx1"/>
+          </a:fontRef>
+        </p:style>
+      </p:cxnSp>
+      <p:pic>
+        <p:nvPicPr>
+          <p:cNvPr id="11" name="Picture 10" descr="A graph of a curve&#10;&#10;AI-generated content may be incorrect.">
+            <a:extLst>
+              <a:ext uri="{FF2B5EF4-FFF2-40B4-BE49-F238E27FC236}">
+                <a16:creationId xmlns:a16="http://schemas.microsoft.com/office/drawing/2014/main" id="{EE7104E5-CBAF-886F-F07A-DA60FABF4E86}"/>
+              </a:ext>
+            </a:extLst>
+          </p:cNvPr>
+          <p:cNvPicPr>
+            <a:picLocks noChangeAspect="1"/>
+          </p:cNvPicPr>
+          <p:nvPr/>
+        </p:nvPicPr>
+        <p:blipFill>
+          <a:blip r:embed="rId3">
+            <a:extLst>
+              <a:ext uri="{28A0092B-C50C-407E-A947-70E740481C1C}">
+                <a14:useLocalDpi xmlns:a14="http://schemas.microsoft.com/office/drawing/2010/main" val="0"/>
+              </a:ext>
+            </a:extLst>
+          </a:blip>
+          <a:stretch>
+            <a:fillRect/>
+          </a:stretch>
+        </p:blipFill>
+        <p:spPr>
+          <a:xfrm>
+            <a:off x="1488948" y="2812352"/>
+            <a:ext cx="3546347" cy="2659760"/>
+          </a:xfrm>
+          <a:prstGeom prst="rect">
+            <a:avLst/>
+          </a:prstGeom>
+        </p:spPr>
+      </p:pic>
+    </p:spTree>
+    <p:extLst>
+      <p:ext uri="{BB962C8B-B14F-4D97-AF65-F5344CB8AC3E}">
+        <p14:creationId xmlns:p14="http://schemas.microsoft.com/office/powerpoint/2010/main" val="336239155"/>
       </p:ext>
     </p:extLst>
   </p:cSld>

</xml_diff>

<commit_message>
testing set included into evaluation
</commit_message>
<xml_diff>
--- a/meeting_updates/07.07.25.pptx
+++ b/meeting_updates/07.07.25.pptx
@@ -3794,10 +3794,10 @@
       </p:sp>
       <p:pic>
         <p:nvPicPr>
-          <p:cNvPr id="39" name="Picture 38" descr="A graph of a curve&#10;&#10;AI-generated content may be incorrect.">
-            <a:extLst>
-              <a:ext uri="{FF2B5EF4-FFF2-40B4-BE49-F238E27FC236}">
-                <a16:creationId xmlns:a16="http://schemas.microsoft.com/office/drawing/2014/main" id="{379DE014-B402-3957-50FB-A12DFD8674FB}"/>
+          <p:cNvPr id="7" name="Picture 6" descr="A graph of a curve&#10;&#10;AI-generated content may be incorrect.">
+            <a:extLst>
+              <a:ext uri="{FF2B5EF4-FFF2-40B4-BE49-F238E27FC236}">
+                <a16:creationId xmlns:a16="http://schemas.microsoft.com/office/drawing/2014/main" id="{E9F44E64-34A2-EC9E-B396-061CEC691102}"/>
               </a:ext>
             </a:extLst>
           </p:cNvPr>
@@ -3820,8 +3820,8 @@
         </p:blipFill>
         <p:spPr>
           <a:xfrm>
-            <a:off x="1102967" y="2767666"/>
-            <a:ext cx="4257313" cy="3192985"/>
+            <a:off x="699517" y="2629799"/>
+            <a:ext cx="4857314" cy="3642986"/>
           </a:xfrm>
           <a:prstGeom prst="rect">
             <a:avLst/>

</xml_diff>

<commit_message>
two tail concated network
</commit_message>
<xml_diff>
--- a/meeting_updates/07.07.25.pptx
+++ b/meeting_updates/07.07.25.pptx
@@ -8,6 +8,9 @@
     <p:sldId id="278" r:id="rId2"/>
     <p:sldId id="277" r:id="rId3"/>
     <p:sldId id="276" r:id="rId4"/>
+    <p:sldId id="280" r:id="rId5"/>
+    <p:sldId id="281" r:id="rId6"/>
+    <p:sldId id="282" r:id="rId7"/>
   </p:sldIdLst>
   <p:sldSz cx="12192000" cy="6858000"/>
   <p:notesSz cx="6858000" cy="9144000"/>
@@ -6004,6 +6007,3494 @@
 </p:sld>
 </file>
 
+<file path=ppt/slides/slide4.xml><?xml version="1.0" encoding="utf-8"?>
+<p:sld xmlns:a="http://schemas.openxmlformats.org/drawingml/2006/main" xmlns:r="http://schemas.openxmlformats.org/officeDocument/2006/relationships" xmlns:p="http://schemas.openxmlformats.org/presentationml/2006/main">
+  <p:cSld>
+    <p:spTree>
+      <p:nvGrpSpPr>
+        <p:cNvPr id="1" name="">
+          <a:extLst>
+            <a:ext uri="{FF2B5EF4-FFF2-40B4-BE49-F238E27FC236}">
+              <a16:creationId xmlns:a16="http://schemas.microsoft.com/office/drawing/2014/main" id="{C6A86EE5-7C58-F89E-BF67-ECE8B5073503}"/>
+            </a:ext>
+          </a:extLst>
+        </p:cNvPr>
+        <p:cNvGrpSpPr/>
+        <p:nvPr/>
+      </p:nvGrpSpPr>
+      <p:grpSpPr>
+        <a:xfrm>
+          <a:off x="0" y="0"/>
+          <a:ext cx="0" cy="0"/>
+          <a:chOff x="0" y="0"/>
+          <a:chExt cx="0" cy="0"/>
+        </a:xfrm>
+      </p:grpSpPr>
+      <p:sp>
+        <p:nvSpPr>
+          <p:cNvPr id="2" name="TextBox 1">
+            <a:extLst>
+              <a:ext uri="{FF2B5EF4-FFF2-40B4-BE49-F238E27FC236}">
+                <a16:creationId xmlns:a16="http://schemas.microsoft.com/office/drawing/2014/main" id="{88605246-FFBB-93D2-3E46-E44047BE222E}"/>
+              </a:ext>
+            </a:extLst>
+          </p:cNvPr>
+          <p:cNvSpPr txBox="1"/>
+          <p:nvPr/>
+        </p:nvSpPr>
+        <p:spPr>
+          <a:xfrm>
+            <a:off x="1234440" y="722376"/>
+            <a:ext cx="2688336" cy="369332"/>
+          </a:xfrm>
+          <a:prstGeom prst="rect">
+            <a:avLst/>
+          </a:prstGeom>
+          <a:noFill/>
+        </p:spPr>
+        <p:txBody>
+          <a:bodyPr wrap="square" rtlCol="0">
+            <a:spAutoFit/>
+          </a:bodyPr>
+          <a:lstStyle/>
+          <a:p>
+            <a:r>
+              <a:rPr lang="en-US" dirty="0"/>
+              <a:t>Experiment 3.1: </a:t>
+            </a:r>
+          </a:p>
+        </p:txBody>
+      </p:sp>
+      <p:sp>
+        <p:nvSpPr>
+          <p:cNvPr id="3" name="TextBox 2">
+            <a:extLst>
+              <a:ext uri="{FF2B5EF4-FFF2-40B4-BE49-F238E27FC236}">
+                <a16:creationId xmlns:a16="http://schemas.microsoft.com/office/drawing/2014/main" id="{A8476247-B28E-792A-A9CD-30EC71651F6F}"/>
+              </a:ext>
+            </a:extLst>
+          </p:cNvPr>
+          <p:cNvSpPr txBox="1"/>
+          <p:nvPr/>
+        </p:nvSpPr>
+        <p:spPr>
+          <a:xfrm>
+            <a:off x="1229489" y="1183363"/>
+            <a:ext cx="4426839" cy="2585323"/>
+          </a:xfrm>
+          <a:prstGeom prst="rect">
+            <a:avLst/>
+          </a:prstGeom>
+          <a:noFill/>
+        </p:spPr>
+        <p:txBody>
+          <a:bodyPr wrap="square" rtlCol="0">
+            <a:spAutoFit/>
+          </a:bodyPr>
+          <a:lstStyle/>
+          <a:p>
+            <a:endParaRPr lang="en-US" dirty="0"/>
+          </a:p>
+          <a:p>
+            <a:pPr marL="285750" indent="-285750">
+              <a:buFont typeface="Arial" panose="020B0604020202020204" pitchFamily="34" charset="0"/>
+              <a:buChar char="•"/>
+            </a:pPr>
+            <a:r>
+              <a:rPr lang="en-US" dirty="0"/>
+              <a:t>Binary Classification Setup </a:t>
+            </a:r>
+          </a:p>
+          <a:p>
+            <a:pPr marL="285750" indent="-285750">
+              <a:buFont typeface="Arial" panose="020B0604020202020204" pitchFamily="34" charset="0"/>
+              <a:buChar char="•"/>
+            </a:pPr>
+            <a:r>
+              <a:rPr lang="en-US" dirty="0"/>
+              <a:t>Classification Based on US Image Only</a:t>
+            </a:r>
+          </a:p>
+          <a:p>
+            <a:pPr marL="285750" indent="-285750">
+              <a:buFont typeface="Arial" panose="020B0604020202020204" pitchFamily="34" charset="0"/>
+              <a:buChar char="•"/>
+            </a:pPr>
+            <a:r>
+              <a:rPr lang="en-US" dirty="0"/>
+              <a:t>Weighted Score</a:t>
+            </a:r>
+          </a:p>
+          <a:p>
+            <a:pPr marL="285750" indent="-285750">
+              <a:buFont typeface="Arial" panose="020B0604020202020204" pitchFamily="34" charset="0"/>
+              <a:buChar char="•"/>
+            </a:pPr>
+            <a:r>
+              <a:rPr lang="en-US" dirty="0" err="1"/>
+              <a:t>Testset</a:t>
+            </a:r>
+            <a:r>
+              <a:rPr lang="en-US" dirty="0"/>
+              <a:t> on 120 to 143 Patient IDs:</a:t>
+            </a:r>
+          </a:p>
+          <a:p>
+            <a:pPr marL="742950" lvl="1" indent="-285750">
+              <a:buFont typeface="Arial" panose="020B0604020202020204" pitchFamily="34" charset="0"/>
+              <a:buChar char="•"/>
+            </a:pPr>
+            <a:r>
+              <a:rPr lang="en-US" dirty="0"/>
+              <a:t>Total images 82</a:t>
+            </a:r>
+          </a:p>
+          <a:p>
+            <a:pPr marL="742950" lvl="1" indent="-285750">
+              <a:buFont typeface="Arial" panose="020B0604020202020204" pitchFamily="34" charset="0"/>
+              <a:buChar char="•"/>
+            </a:pPr>
+            <a:r>
+              <a:rPr lang="en-US" dirty="0"/>
+              <a:t>Malignant 35, Benign 47</a:t>
+            </a:r>
+          </a:p>
+          <a:p>
+            <a:pPr marL="285750" indent="-285750">
+              <a:buFont typeface="Arial" panose="020B0604020202020204" pitchFamily="34" charset="0"/>
+              <a:buChar char="•"/>
+            </a:pPr>
+            <a:endParaRPr lang="en-US" dirty="0"/>
+          </a:p>
+          <a:p>
+            <a:pPr marL="285750" indent="-285750">
+              <a:buFont typeface="Arial" panose="020B0604020202020204" pitchFamily="34" charset="0"/>
+              <a:buChar char="•"/>
+            </a:pPr>
+            <a:endParaRPr lang="en-US" dirty="0"/>
+          </a:p>
+        </p:txBody>
+      </p:sp>
+      <p:sp>
+        <p:nvSpPr>
+          <p:cNvPr id="4" name="Flowchart: Manual Operation 3">
+            <a:extLst>
+              <a:ext uri="{FF2B5EF4-FFF2-40B4-BE49-F238E27FC236}">
+                <a16:creationId xmlns:a16="http://schemas.microsoft.com/office/drawing/2014/main" id="{7B49D038-DF08-3504-F5E9-F99E87C40E91}"/>
+              </a:ext>
+            </a:extLst>
+          </p:cNvPr>
+          <p:cNvSpPr/>
+          <p:nvPr/>
+        </p:nvSpPr>
+        <p:spPr>
+          <a:xfrm rot="16200000">
+            <a:off x="7597142" y="1399032"/>
+            <a:ext cx="1234440" cy="1536192"/>
+          </a:xfrm>
+          <a:prstGeom prst="flowChartManualOperation">
+            <a:avLst/>
+          </a:prstGeom>
+        </p:spPr>
+        <p:style>
+          <a:lnRef idx="2">
+            <a:schemeClr val="accent1">
+              <a:shade val="15000"/>
+            </a:schemeClr>
+          </a:lnRef>
+          <a:fillRef idx="1">
+            <a:schemeClr val="accent1"/>
+          </a:fillRef>
+          <a:effectRef idx="0">
+            <a:schemeClr val="accent1"/>
+          </a:effectRef>
+          <a:fontRef idx="minor">
+            <a:schemeClr val="lt1"/>
+          </a:fontRef>
+        </p:style>
+        <p:txBody>
+          <a:bodyPr rtlCol="0" anchor="ctr"/>
+          <a:lstStyle/>
+          <a:p>
+            <a:pPr algn="ctr"/>
+            <a:endParaRPr lang="en-US" dirty="0"/>
+          </a:p>
+        </p:txBody>
+      </p:sp>
+      <p:sp>
+        <p:nvSpPr>
+          <p:cNvPr id="5" name="Flowchart: Manual Operation 4">
+            <a:extLst>
+              <a:ext uri="{FF2B5EF4-FFF2-40B4-BE49-F238E27FC236}">
+                <a16:creationId xmlns:a16="http://schemas.microsoft.com/office/drawing/2014/main" id="{B557A036-08EA-1D0F-55C4-1FA8899AB4E4}"/>
+              </a:ext>
+            </a:extLst>
+          </p:cNvPr>
+          <p:cNvSpPr/>
+          <p:nvPr/>
+        </p:nvSpPr>
+        <p:spPr>
+          <a:xfrm rot="16200000">
+            <a:off x="7597142" y="3214116"/>
+            <a:ext cx="1234440" cy="1536192"/>
+          </a:xfrm>
+          <a:prstGeom prst="flowChartManualOperation">
+            <a:avLst/>
+          </a:prstGeom>
+        </p:spPr>
+        <p:style>
+          <a:lnRef idx="2">
+            <a:schemeClr val="accent1">
+              <a:shade val="15000"/>
+            </a:schemeClr>
+          </a:lnRef>
+          <a:fillRef idx="1">
+            <a:schemeClr val="accent1"/>
+          </a:fillRef>
+          <a:effectRef idx="0">
+            <a:schemeClr val="accent1"/>
+          </a:effectRef>
+          <a:fontRef idx="minor">
+            <a:schemeClr val="lt1"/>
+          </a:fontRef>
+        </p:style>
+        <p:txBody>
+          <a:bodyPr rtlCol="0" anchor="ctr"/>
+          <a:lstStyle/>
+          <a:p>
+            <a:pPr algn="ctr"/>
+            <a:endParaRPr lang="en-US"/>
+          </a:p>
+        </p:txBody>
+      </p:sp>
+      <p:sp>
+        <p:nvSpPr>
+          <p:cNvPr id="6" name="Rectangle 5">
+            <a:extLst>
+              <a:ext uri="{FF2B5EF4-FFF2-40B4-BE49-F238E27FC236}">
+                <a16:creationId xmlns:a16="http://schemas.microsoft.com/office/drawing/2014/main" id="{87A66D7E-88DC-85F1-2712-22351F41168D}"/>
+              </a:ext>
+            </a:extLst>
+          </p:cNvPr>
+          <p:cNvSpPr/>
+          <p:nvPr/>
+        </p:nvSpPr>
+        <p:spPr>
+          <a:xfrm>
+            <a:off x="9471662" y="1760220"/>
+            <a:ext cx="612648" cy="813816"/>
+          </a:xfrm>
+          <a:prstGeom prst="rect">
+            <a:avLst/>
+          </a:prstGeom>
+        </p:spPr>
+        <p:style>
+          <a:lnRef idx="2">
+            <a:schemeClr val="accent1">
+              <a:shade val="15000"/>
+            </a:schemeClr>
+          </a:lnRef>
+          <a:fillRef idx="1">
+            <a:schemeClr val="accent1"/>
+          </a:fillRef>
+          <a:effectRef idx="0">
+            <a:schemeClr val="accent1"/>
+          </a:effectRef>
+          <a:fontRef idx="minor">
+            <a:schemeClr val="lt1"/>
+          </a:fontRef>
+        </p:style>
+        <p:txBody>
+          <a:bodyPr rtlCol="0" anchor="ctr"/>
+          <a:lstStyle/>
+          <a:p>
+            <a:pPr algn="ctr"/>
+            <a:r>
+              <a:rPr lang="en-US" sz="1000" dirty="0"/>
+              <a:t>FC Layer</a:t>
+            </a:r>
+          </a:p>
+        </p:txBody>
+      </p:sp>
+      <p:sp>
+        <p:nvSpPr>
+          <p:cNvPr id="7" name="Rectangle 6">
+            <a:extLst>
+              <a:ext uri="{FF2B5EF4-FFF2-40B4-BE49-F238E27FC236}">
+                <a16:creationId xmlns:a16="http://schemas.microsoft.com/office/drawing/2014/main" id="{B8688716-49D4-B346-7169-777320EF8F78}"/>
+              </a:ext>
+            </a:extLst>
+          </p:cNvPr>
+          <p:cNvSpPr/>
+          <p:nvPr/>
+        </p:nvSpPr>
+        <p:spPr>
+          <a:xfrm>
+            <a:off x="9471662" y="3575304"/>
+            <a:ext cx="612648" cy="813816"/>
+          </a:xfrm>
+          <a:prstGeom prst="rect">
+            <a:avLst/>
+          </a:prstGeom>
+        </p:spPr>
+        <p:style>
+          <a:lnRef idx="2">
+            <a:schemeClr val="accent1">
+              <a:shade val="15000"/>
+            </a:schemeClr>
+          </a:lnRef>
+          <a:fillRef idx="1">
+            <a:schemeClr val="accent1"/>
+          </a:fillRef>
+          <a:effectRef idx="0">
+            <a:schemeClr val="accent1"/>
+          </a:effectRef>
+          <a:fontRef idx="minor">
+            <a:schemeClr val="lt1"/>
+          </a:fontRef>
+        </p:style>
+        <p:txBody>
+          <a:bodyPr rtlCol="0" anchor="ctr"/>
+          <a:lstStyle/>
+          <a:p>
+            <a:pPr algn="ctr"/>
+            <a:r>
+              <a:rPr lang="en-US" sz="1000" dirty="0"/>
+              <a:t>FC Layer</a:t>
+            </a:r>
+          </a:p>
+        </p:txBody>
+      </p:sp>
+      <p:sp>
+        <p:nvSpPr>
+          <p:cNvPr id="8" name="Oval 7">
+            <a:extLst>
+              <a:ext uri="{FF2B5EF4-FFF2-40B4-BE49-F238E27FC236}">
+                <a16:creationId xmlns:a16="http://schemas.microsoft.com/office/drawing/2014/main" id="{3D045E91-267A-C76D-EE3B-66078AA487D0}"/>
+              </a:ext>
+            </a:extLst>
+          </p:cNvPr>
+          <p:cNvSpPr/>
+          <p:nvPr/>
+        </p:nvSpPr>
+        <p:spPr>
+          <a:xfrm>
+            <a:off x="10710674" y="1801368"/>
+            <a:ext cx="813816" cy="731520"/>
+          </a:xfrm>
+          <a:prstGeom prst="ellipse">
+            <a:avLst/>
+          </a:prstGeom>
+        </p:spPr>
+        <p:style>
+          <a:lnRef idx="2">
+            <a:schemeClr val="accent1">
+              <a:shade val="15000"/>
+            </a:schemeClr>
+          </a:lnRef>
+          <a:fillRef idx="1">
+            <a:schemeClr val="accent1"/>
+          </a:fillRef>
+          <a:effectRef idx="0">
+            <a:schemeClr val="accent1"/>
+          </a:effectRef>
+          <a:fontRef idx="minor">
+            <a:schemeClr val="lt1"/>
+          </a:fontRef>
+        </p:style>
+        <p:txBody>
+          <a:bodyPr rtlCol="0" anchor="ctr"/>
+          <a:lstStyle/>
+          <a:p>
+            <a:pPr algn="ctr"/>
+            <a:r>
+              <a:rPr lang="en-US" dirty="0"/>
+              <a:t>0/1</a:t>
+            </a:r>
+          </a:p>
+        </p:txBody>
+      </p:sp>
+      <p:sp>
+        <p:nvSpPr>
+          <p:cNvPr id="9" name="Oval 8">
+            <a:extLst>
+              <a:ext uri="{FF2B5EF4-FFF2-40B4-BE49-F238E27FC236}">
+                <a16:creationId xmlns:a16="http://schemas.microsoft.com/office/drawing/2014/main" id="{9A97D5FB-6817-1C7A-7C13-283D3E0D01A4}"/>
+              </a:ext>
+            </a:extLst>
+          </p:cNvPr>
+          <p:cNvSpPr/>
+          <p:nvPr/>
+        </p:nvSpPr>
+        <p:spPr>
+          <a:xfrm>
+            <a:off x="10683242" y="3616452"/>
+            <a:ext cx="813816" cy="731520"/>
+          </a:xfrm>
+          <a:prstGeom prst="ellipse">
+            <a:avLst/>
+          </a:prstGeom>
+        </p:spPr>
+        <p:style>
+          <a:lnRef idx="2">
+            <a:schemeClr val="accent1">
+              <a:shade val="15000"/>
+            </a:schemeClr>
+          </a:lnRef>
+          <a:fillRef idx="1">
+            <a:schemeClr val="accent1"/>
+          </a:fillRef>
+          <a:effectRef idx="0">
+            <a:schemeClr val="accent1"/>
+          </a:effectRef>
+          <a:fontRef idx="minor">
+            <a:schemeClr val="lt1"/>
+          </a:fontRef>
+        </p:style>
+        <p:txBody>
+          <a:bodyPr rtlCol="0" anchor="ctr"/>
+          <a:lstStyle/>
+          <a:p>
+            <a:pPr algn="ctr"/>
+            <a:r>
+              <a:rPr lang="en-US" dirty="0"/>
+              <a:t>0/1</a:t>
+            </a:r>
+          </a:p>
+        </p:txBody>
+      </p:sp>
+      <p:pic>
+        <p:nvPicPr>
+          <p:cNvPr id="13" name="Picture 12" descr="An ultrasound of a baby&#10;&#10;AI-generated content may be incorrect.">
+            <a:extLst>
+              <a:ext uri="{FF2B5EF4-FFF2-40B4-BE49-F238E27FC236}">
+                <a16:creationId xmlns:a16="http://schemas.microsoft.com/office/drawing/2014/main" id="{8AD0A89A-7EB5-C0AD-67A7-7F595DEF5201}"/>
+              </a:ext>
+            </a:extLst>
+          </p:cNvPr>
+          <p:cNvPicPr>
+            <a:picLocks noChangeAspect="1"/>
+          </p:cNvPicPr>
+          <p:nvPr/>
+        </p:nvPicPr>
+        <p:blipFill>
+          <a:blip r:embed="rId2">
+            <a:extLst>
+              <a:ext uri="{28A0092B-C50C-407E-A947-70E740481C1C}">
+                <a14:useLocalDpi xmlns:a14="http://schemas.microsoft.com/office/drawing/2010/main" val="0"/>
+              </a:ext>
+            </a:extLst>
+          </a:blip>
+          <a:stretch>
+            <a:fillRect/>
+          </a:stretch>
+        </p:blipFill>
+        <p:spPr>
+          <a:xfrm>
+            <a:off x="5855210" y="1706142"/>
+            <a:ext cx="960120" cy="921972"/>
+          </a:xfrm>
+          <a:prstGeom prst="rect">
+            <a:avLst/>
+          </a:prstGeom>
+        </p:spPr>
+      </p:pic>
+      <p:pic>
+        <p:nvPicPr>
+          <p:cNvPr id="14" name="Picture 13" descr="An ultrasound of a baby&#10;&#10;AI-generated content may be incorrect.">
+            <a:extLst>
+              <a:ext uri="{FF2B5EF4-FFF2-40B4-BE49-F238E27FC236}">
+                <a16:creationId xmlns:a16="http://schemas.microsoft.com/office/drawing/2014/main" id="{6DC013A1-3BAE-E151-597D-66B57BFB1A0D}"/>
+              </a:ext>
+            </a:extLst>
+          </p:cNvPr>
+          <p:cNvPicPr>
+            <a:picLocks noChangeAspect="1"/>
+          </p:cNvPicPr>
+          <p:nvPr/>
+        </p:nvPicPr>
+        <p:blipFill>
+          <a:blip r:embed="rId2">
+            <a:extLst>
+              <a:ext uri="{28A0092B-C50C-407E-A947-70E740481C1C}">
+                <a14:useLocalDpi xmlns:a14="http://schemas.microsoft.com/office/drawing/2010/main" val="0"/>
+              </a:ext>
+            </a:extLst>
+          </a:blip>
+          <a:stretch>
+            <a:fillRect/>
+          </a:stretch>
+        </p:blipFill>
+        <p:spPr>
+          <a:xfrm>
+            <a:off x="5855210" y="3521226"/>
+            <a:ext cx="960120" cy="921972"/>
+          </a:xfrm>
+          <a:prstGeom prst="rect">
+            <a:avLst/>
+          </a:prstGeom>
+        </p:spPr>
+      </p:pic>
+      <p:cxnSp>
+        <p:nvCxnSpPr>
+          <p:cNvPr id="16" name="Straight Arrow Connector 15">
+            <a:extLst>
+              <a:ext uri="{FF2B5EF4-FFF2-40B4-BE49-F238E27FC236}">
+                <a16:creationId xmlns:a16="http://schemas.microsoft.com/office/drawing/2014/main" id="{842E5294-E26C-AC02-53B3-B81F49950149}"/>
+              </a:ext>
+            </a:extLst>
+          </p:cNvPr>
+          <p:cNvCxnSpPr>
+            <a:stCxn id="13" idx="3"/>
+            <a:endCxn id="4" idx="0"/>
+          </p:cNvCxnSpPr>
+          <p:nvPr/>
+        </p:nvCxnSpPr>
+        <p:spPr>
+          <a:xfrm>
+            <a:off x="6815330" y="2167128"/>
+            <a:ext cx="630936" cy="0"/>
+          </a:xfrm>
+          <a:prstGeom prst="straightConnector1">
+            <a:avLst/>
+          </a:prstGeom>
+          <a:ln>
+            <a:tailEnd type="triangle"/>
+          </a:ln>
+        </p:spPr>
+        <p:style>
+          <a:lnRef idx="2">
+            <a:schemeClr val="accent1"/>
+          </a:lnRef>
+          <a:fillRef idx="0">
+            <a:schemeClr val="accent1"/>
+          </a:fillRef>
+          <a:effectRef idx="1">
+            <a:schemeClr val="accent1"/>
+          </a:effectRef>
+          <a:fontRef idx="minor">
+            <a:schemeClr val="tx1"/>
+          </a:fontRef>
+        </p:style>
+      </p:cxnSp>
+      <p:cxnSp>
+        <p:nvCxnSpPr>
+          <p:cNvPr id="19" name="Straight Arrow Connector 18">
+            <a:extLst>
+              <a:ext uri="{FF2B5EF4-FFF2-40B4-BE49-F238E27FC236}">
+                <a16:creationId xmlns:a16="http://schemas.microsoft.com/office/drawing/2014/main" id="{5BB1F066-5A9E-2AFD-EF30-F0A29DD40971}"/>
+              </a:ext>
+            </a:extLst>
+          </p:cNvPr>
+          <p:cNvCxnSpPr>
+            <a:stCxn id="4" idx="2"/>
+            <a:endCxn id="6" idx="1"/>
+          </p:cNvCxnSpPr>
+          <p:nvPr/>
+        </p:nvCxnSpPr>
+        <p:spPr>
+          <a:xfrm>
+            <a:off x="8982458" y="2167128"/>
+            <a:ext cx="489204" cy="0"/>
+          </a:xfrm>
+          <a:prstGeom prst="straightConnector1">
+            <a:avLst/>
+          </a:prstGeom>
+          <a:ln>
+            <a:tailEnd type="triangle"/>
+          </a:ln>
+        </p:spPr>
+        <p:style>
+          <a:lnRef idx="2">
+            <a:schemeClr val="accent1"/>
+          </a:lnRef>
+          <a:fillRef idx="0">
+            <a:schemeClr val="accent1"/>
+          </a:fillRef>
+          <a:effectRef idx="1">
+            <a:schemeClr val="accent1"/>
+          </a:effectRef>
+          <a:fontRef idx="minor">
+            <a:schemeClr val="tx1"/>
+          </a:fontRef>
+        </p:style>
+      </p:cxnSp>
+      <p:cxnSp>
+        <p:nvCxnSpPr>
+          <p:cNvPr id="21" name="Straight Arrow Connector 20">
+            <a:extLst>
+              <a:ext uri="{FF2B5EF4-FFF2-40B4-BE49-F238E27FC236}">
+                <a16:creationId xmlns:a16="http://schemas.microsoft.com/office/drawing/2014/main" id="{A847C455-3C11-EC23-B6ED-C4FE645739B3}"/>
+              </a:ext>
+            </a:extLst>
+          </p:cNvPr>
+          <p:cNvCxnSpPr>
+            <a:cxnSpLocks/>
+            <a:stCxn id="6" idx="3"/>
+            <a:endCxn id="8" idx="2"/>
+          </p:cNvCxnSpPr>
+          <p:nvPr/>
+        </p:nvCxnSpPr>
+        <p:spPr>
+          <a:xfrm>
+            <a:off x="10084310" y="2167128"/>
+            <a:ext cx="626364" cy="0"/>
+          </a:xfrm>
+          <a:prstGeom prst="straightConnector1">
+            <a:avLst/>
+          </a:prstGeom>
+          <a:ln>
+            <a:tailEnd type="triangle"/>
+          </a:ln>
+        </p:spPr>
+        <p:style>
+          <a:lnRef idx="2">
+            <a:schemeClr val="accent1"/>
+          </a:lnRef>
+          <a:fillRef idx="0">
+            <a:schemeClr val="accent1"/>
+          </a:fillRef>
+          <a:effectRef idx="1">
+            <a:schemeClr val="accent1"/>
+          </a:effectRef>
+          <a:fontRef idx="minor">
+            <a:schemeClr val="tx1"/>
+          </a:fontRef>
+        </p:style>
+      </p:cxnSp>
+      <p:cxnSp>
+        <p:nvCxnSpPr>
+          <p:cNvPr id="26" name="Straight Arrow Connector 25">
+            <a:extLst>
+              <a:ext uri="{FF2B5EF4-FFF2-40B4-BE49-F238E27FC236}">
+                <a16:creationId xmlns:a16="http://schemas.microsoft.com/office/drawing/2014/main" id="{AC464E74-4504-0A25-9A69-80EA3C5A26A8}"/>
+              </a:ext>
+            </a:extLst>
+          </p:cNvPr>
+          <p:cNvCxnSpPr>
+            <a:stCxn id="14" idx="3"/>
+            <a:endCxn id="5" idx="0"/>
+          </p:cNvCxnSpPr>
+          <p:nvPr/>
+        </p:nvCxnSpPr>
+        <p:spPr>
+          <a:xfrm>
+            <a:off x="6815330" y="3982212"/>
+            <a:ext cx="630936" cy="0"/>
+          </a:xfrm>
+          <a:prstGeom prst="straightConnector1">
+            <a:avLst/>
+          </a:prstGeom>
+          <a:ln>
+            <a:tailEnd type="triangle"/>
+          </a:ln>
+        </p:spPr>
+        <p:style>
+          <a:lnRef idx="2">
+            <a:schemeClr val="accent1"/>
+          </a:lnRef>
+          <a:fillRef idx="0">
+            <a:schemeClr val="accent1"/>
+          </a:fillRef>
+          <a:effectRef idx="1">
+            <a:schemeClr val="accent1"/>
+          </a:effectRef>
+          <a:fontRef idx="minor">
+            <a:schemeClr val="tx1"/>
+          </a:fontRef>
+        </p:style>
+      </p:cxnSp>
+      <p:cxnSp>
+        <p:nvCxnSpPr>
+          <p:cNvPr id="28" name="Straight Arrow Connector 27">
+            <a:extLst>
+              <a:ext uri="{FF2B5EF4-FFF2-40B4-BE49-F238E27FC236}">
+                <a16:creationId xmlns:a16="http://schemas.microsoft.com/office/drawing/2014/main" id="{21D01D46-2198-9F0A-5A7B-5B1973BFFF9B}"/>
+              </a:ext>
+            </a:extLst>
+          </p:cNvPr>
+          <p:cNvCxnSpPr>
+            <a:stCxn id="5" idx="2"/>
+            <a:endCxn id="7" idx="1"/>
+          </p:cNvCxnSpPr>
+          <p:nvPr/>
+        </p:nvCxnSpPr>
+        <p:spPr>
+          <a:xfrm>
+            <a:off x="8982458" y="3982212"/>
+            <a:ext cx="489204" cy="0"/>
+          </a:xfrm>
+          <a:prstGeom prst="straightConnector1">
+            <a:avLst/>
+          </a:prstGeom>
+          <a:ln>
+            <a:tailEnd type="triangle"/>
+          </a:ln>
+        </p:spPr>
+        <p:style>
+          <a:lnRef idx="2">
+            <a:schemeClr val="accent1"/>
+          </a:lnRef>
+          <a:fillRef idx="0">
+            <a:schemeClr val="accent1"/>
+          </a:fillRef>
+          <a:effectRef idx="1">
+            <a:schemeClr val="accent1"/>
+          </a:effectRef>
+          <a:fontRef idx="minor">
+            <a:schemeClr val="tx1"/>
+          </a:fontRef>
+        </p:style>
+      </p:cxnSp>
+      <p:cxnSp>
+        <p:nvCxnSpPr>
+          <p:cNvPr id="30" name="Straight Arrow Connector 29">
+            <a:extLst>
+              <a:ext uri="{FF2B5EF4-FFF2-40B4-BE49-F238E27FC236}">
+                <a16:creationId xmlns:a16="http://schemas.microsoft.com/office/drawing/2014/main" id="{1E3755AB-F821-BFAB-6E0E-890359ED3A6A}"/>
+              </a:ext>
+            </a:extLst>
+          </p:cNvPr>
+          <p:cNvCxnSpPr>
+            <a:stCxn id="7" idx="3"/>
+            <a:endCxn id="9" idx="2"/>
+          </p:cNvCxnSpPr>
+          <p:nvPr/>
+        </p:nvCxnSpPr>
+        <p:spPr>
+          <a:xfrm>
+            <a:off x="10084310" y="3982212"/>
+            <a:ext cx="598932" cy="0"/>
+          </a:xfrm>
+          <a:prstGeom prst="straightConnector1">
+            <a:avLst/>
+          </a:prstGeom>
+          <a:ln>
+            <a:tailEnd type="triangle"/>
+          </a:ln>
+        </p:spPr>
+        <p:style>
+          <a:lnRef idx="2">
+            <a:schemeClr val="accent1"/>
+          </a:lnRef>
+          <a:fillRef idx="0">
+            <a:schemeClr val="accent1"/>
+          </a:fillRef>
+          <a:effectRef idx="1">
+            <a:schemeClr val="accent1"/>
+          </a:effectRef>
+          <a:fontRef idx="minor">
+            <a:schemeClr val="tx1"/>
+          </a:fontRef>
+        </p:style>
+      </p:cxnSp>
+      <p:sp>
+        <p:nvSpPr>
+          <p:cNvPr id="32" name="TextBox 31">
+            <a:extLst>
+              <a:ext uri="{FF2B5EF4-FFF2-40B4-BE49-F238E27FC236}">
+                <a16:creationId xmlns:a16="http://schemas.microsoft.com/office/drawing/2014/main" id="{7222FBEC-B713-AF0C-104D-F98257B77CE6}"/>
+              </a:ext>
+            </a:extLst>
+          </p:cNvPr>
+          <p:cNvSpPr txBox="1"/>
+          <p:nvPr/>
+        </p:nvSpPr>
+        <p:spPr>
+          <a:xfrm>
+            <a:off x="7569710" y="1967073"/>
+            <a:ext cx="1106424" cy="553998"/>
+          </a:xfrm>
+          <a:prstGeom prst="rect">
+            <a:avLst/>
+          </a:prstGeom>
+          <a:noFill/>
+        </p:spPr>
+        <p:txBody>
+          <a:bodyPr wrap="square" rtlCol="0">
+            <a:spAutoFit/>
+          </a:bodyPr>
+          <a:lstStyle/>
+          <a:p>
+            <a:pPr algn="ctr"/>
+            <a:r>
+              <a:rPr lang="en-US" sz="1000" dirty="0">
+                <a:solidFill>
+                  <a:schemeClr val="bg1"/>
+                </a:solidFill>
+              </a:rPr>
+              <a:t>Pretrained Encoder</a:t>
+            </a:r>
+          </a:p>
+          <a:p>
+            <a:pPr algn="ctr"/>
+            <a:r>
+              <a:rPr lang="en-US" sz="1000" dirty="0">
+                <a:solidFill>
+                  <a:schemeClr val="bg1"/>
+                </a:solidFill>
+              </a:rPr>
+              <a:t>(Frozen)</a:t>
+            </a:r>
+          </a:p>
+        </p:txBody>
+      </p:sp>
+      <p:sp>
+        <p:nvSpPr>
+          <p:cNvPr id="34" name="TextBox 33">
+            <a:extLst>
+              <a:ext uri="{FF2B5EF4-FFF2-40B4-BE49-F238E27FC236}">
+                <a16:creationId xmlns:a16="http://schemas.microsoft.com/office/drawing/2014/main" id="{BA8BE9D7-3A57-4353-64CC-7F679E18A83B}"/>
+              </a:ext>
+            </a:extLst>
+          </p:cNvPr>
+          <p:cNvSpPr txBox="1"/>
+          <p:nvPr/>
+        </p:nvSpPr>
+        <p:spPr>
+          <a:xfrm>
+            <a:off x="7622288" y="3782157"/>
+            <a:ext cx="1106424" cy="553998"/>
+          </a:xfrm>
+          <a:prstGeom prst="rect">
+            <a:avLst/>
+          </a:prstGeom>
+          <a:noFill/>
+        </p:spPr>
+        <p:txBody>
+          <a:bodyPr wrap="square" rtlCol="0">
+            <a:spAutoFit/>
+          </a:bodyPr>
+          <a:lstStyle/>
+          <a:p>
+            <a:pPr algn="ctr"/>
+            <a:r>
+              <a:rPr lang="en-US" sz="1000" dirty="0">
+                <a:solidFill>
+                  <a:schemeClr val="bg1"/>
+                </a:solidFill>
+              </a:rPr>
+              <a:t> Encoder</a:t>
+            </a:r>
+          </a:p>
+          <a:p>
+            <a:pPr algn="ctr"/>
+            <a:r>
+              <a:rPr lang="en-US" sz="1000" dirty="0">
+                <a:solidFill>
+                  <a:schemeClr val="bg1"/>
+                </a:solidFill>
+              </a:rPr>
+              <a:t>From Scratch</a:t>
+            </a:r>
+          </a:p>
+          <a:p>
+            <a:pPr algn="ctr"/>
+            <a:r>
+              <a:rPr lang="en-US" sz="1000" dirty="0">
+                <a:solidFill>
+                  <a:schemeClr val="bg1"/>
+                </a:solidFill>
+              </a:rPr>
+              <a:t>(Trainable)</a:t>
+            </a:r>
+          </a:p>
+        </p:txBody>
+      </p:sp>
+      <p:sp>
+        <p:nvSpPr>
+          <p:cNvPr id="22" name="TextBox 21">
+            <a:extLst>
+              <a:ext uri="{FF2B5EF4-FFF2-40B4-BE49-F238E27FC236}">
+                <a16:creationId xmlns:a16="http://schemas.microsoft.com/office/drawing/2014/main" id="{0EA7D63B-AA37-B8FC-B750-7EEB38A92C8D}"/>
+              </a:ext>
+            </a:extLst>
+          </p:cNvPr>
+          <p:cNvSpPr txBox="1"/>
+          <p:nvPr/>
+        </p:nvSpPr>
+        <p:spPr>
+          <a:xfrm>
+            <a:off x="1153959" y="6339221"/>
+            <a:ext cx="3442906" cy="369332"/>
+          </a:xfrm>
+          <a:prstGeom prst="rect">
+            <a:avLst/>
+          </a:prstGeom>
+          <a:noFill/>
+        </p:spPr>
+        <p:txBody>
+          <a:bodyPr wrap="square" rtlCol="0">
+            <a:spAutoFit/>
+          </a:bodyPr>
+          <a:lstStyle/>
+          <a:p>
+            <a:pPr algn="ctr"/>
+            <a:r>
+              <a:rPr lang="en-US" dirty="0"/>
+              <a:t>Test Result on 5 fold models</a:t>
+            </a:r>
+          </a:p>
+        </p:txBody>
+      </p:sp>
+      <p:sp>
+        <p:nvSpPr>
+          <p:cNvPr id="10" name="Oval 9">
+            <a:extLst>
+              <a:ext uri="{FF2B5EF4-FFF2-40B4-BE49-F238E27FC236}">
+                <a16:creationId xmlns:a16="http://schemas.microsoft.com/office/drawing/2014/main" id="{72C2C855-1FBC-572B-8A30-370D4F408F55}"/>
+              </a:ext>
+            </a:extLst>
+          </p:cNvPr>
+          <p:cNvSpPr/>
+          <p:nvPr/>
+        </p:nvSpPr>
+        <p:spPr>
+          <a:xfrm>
+            <a:off x="11146536" y="2784348"/>
+            <a:ext cx="726948" cy="580644"/>
+          </a:xfrm>
+          <a:prstGeom prst="ellipse">
+            <a:avLst/>
+          </a:prstGeom>
+        </p:spPr>
+        <p:style>
+          <a:lnRef idx="2">
+            <a:schemeClr val="accent1">
+              <a:shade val="15000"/>
+            </a:schemeClr>
+          </a:lnRef>
+          <a:fillRef idx="1">
+            <a:schemeClr val="accent1"/>
+          </a:fillRef>
+          <a:effectRef idx="0">
+            <a:schemeClr val="accent1"/>
+          </a:effectRef>
+          <a:fontRef idx="minor">
+            <a:schemeClr val="lt1"/>
+          </a:fontRef>
+        </p:style>
+        <p:txBody>
+          <a:bodyPr rtlCol="0" anchor="ctr"/>
+          <a:lstStyle/>
+          <a:p>
+            <a:pPr algn="ctr"/>
+            <a:r>
+              <a:rPr lang="en-US" dirty="0"/>
+              <a:t>0/1</a:t>
+            </a:r>
+          </a:p>
+        </p:txBody>
+      </p:sp>
+      <p:cxnSp>
+        <p:nvCxnSpPr>
+          <p:cNvPr id="24" name="Straight Arrow Connector 23">
+            <a:extLst>
+              <a:ext uri="{FF2B5EF4-FFF2-40B4-BE49-F238E27FC236}">
+                <a16:creationId xmlns:a16="http://schemas.microsoft.com/office/drawing/2014/main" id="{4628549F-F193-BBD3-EB3A-52005D26C6AC}"/>
+              </a:ext>
+            </a:extLst>
+          </p:cNvPr>
+          <p:cNvCxnSpPr>
+            <a:stCxn id="5" idx="2"/>
+            <a:endCxn id="6" idx="1"/>
+          </p:cNvCxnSpPr>
+          <p:nvPr/>
+        </p:nvCxnSpPr>
+        <p:spPr>
+          <a:xfrm flipV="1">
+            <a:off x="8982458" y="2167128"/>
+            <a:ext cx="489204" cy="1815084"/>
+          </a:xfrm>
+          <a:prstGeom prst="straightConnector1">
+            <a:avLst/>
+          </a:prstGeom>
+          <a:ln>
+            <a:tailEnd type="triangle"/>
+          </a:ln>
+        </p:spPr>
+        <p:style>
+          <a:lnRef idx="2">
+            <a:schemeClr val="accent1"/>
+          </a:lnRef>
+          <a:fillRef idx="0">
+            <a:schemeClr val="accent1"/>
+          </a:fillRef>
+          <a:effectRef idx="1">
+            <a:schemeClr val="accent1"/>
+          </a:effectRef>
+          <a:fontRef idx="minor">
+            <a:schemeClr val="tx1"/>
+          </a:fontRef>
+        </p:style>
+      </p:cxnSp>
+      <p:cxnSp>
+        <p:nvCxnSpPr>
+          <p:cNvPr id="27" name="Straight Arrow Connector 26">
+            <a:extLst>
+              <a:ext uri="{FF2B5EF4-FFF2-40B4-BE49-F238E27FC236}">
+                <a16:creationId xmlns:a16="http://schemas.microsoft.com/office/drawing/2014/main" id="{E6C87E84-1B63-4674-6D5E-1FF4F8428C09}"/>
+              </a:ext>
+            </a:extLst>
+          </p:cNvPr>
+          <p:cNvCxnSpPr>
+            <a:stCxn id="8" idx="4"/>
+            <a:endCxn id="10" idx="0"/>
+          </p:cNvCxnSpPr>
+          <p:nvPr/>
+        </p:nvCxnSpPr>
+        <p:spPr>
+          <a:xfrm>
+            <a:off x="11117582" y="2532888"/>
+            <a:ext cx="392428" cy="251460"/>
+          </a:xfrm>
+          <a:prstGeom prst="straightConnector1">
+            <a:avLst/>
+          </a:prstGeom>
+          <a:ln>
+            <a:tailEnd type="triangle"/>
+          </a:ln>
+        </p:spPr>
+        <p:style>
+          <a:lnRef idx="2">
+            <a:schemeClr val="accent1"/>
+          </a:lnRef>
+          <a:fillRef idx="0">
+            <a:schemeClr val="accent1"/>
+          </a:fillRef>
+          <a:effectRef idx="1">
+            <a:schemeClr val="accent1"/>
+          </a:effectRef>
+          <a:fontRef idx="minor">
+            <a:schemeClr val="tx1"/>
+          </a:fontRef>
+        </p:style>
+      </p:cxnSp>
+      <p:cxnSp>
+        <p:nvCxnSpPr>
+          <p:cNvPr id="35" name="Straight Arrow Connector 34">
+            <a:extLst>
+              <a:ext uri="{FF2B5EF4-FFF2-40B4-BE49-F238E27FC236}">
+                <a16:creationId xmlns:a16="http://schemas.microsoft.com/office/drawing/2014/main" id="{BA248992-0E1F-1669-A793-1EF9C10A7909}"/>
+              </a:ext>
+            </a:extLst>
+          </p:cNvPr>
+          <p:cNvCxnSpPr>
+            <a:stCxn id="9" idx="0"/>
+            <a:endCxn id="10" idx="4"/>
+          </p:cNvCxnSpPr>
+          <p:nvPr/>
+        </p:nvCxnSpPr>
+        <p:spPr>
+          <a:xfrm flipV="1">
+            <a:off x="11090150" y="3364992"/>
+            <a:ext cx="419860" cy="251460"/>
+          </a:xfrm>
+          <a:prstGeom prst="straightConnector1">
+            <a:avLst/>
+          </a:prstGeom>
+          <a:ln>
+            <a:tailEnd type="triangle"/>
+          </a:ln>
+        </p:spPr>
+        <p:style>
+          <a:lnRef idx="2">
+            <a:schemeClr val="accent1"/>
+          </a:lnRef>
+          <a:fillRef idx="0">
+            <a:schemeClr val="accent1"/>
+          </a:fillRef>
+          <a:effectRef idx="1">
+            <a:schemeClr val="accent1"/>
+          </a:effectRef>
+          <a:fontRef idx="minor">
+            <a:schemeClr val="tx1"/>
+          </a:fontRef>
+        </p:style>
+      </p:cxnSp>
+      <p:pic>
+        <p:nvPicPr>
+          <p:cNvPr id="38" name="Picture 37" descr="A graph of a curve&#10;&#10;AI-generated content may be incorrect.">
+            <a:extLst>
+              <a:ext uri="{FF2B5EF4-FFF2-40B4-BE49-F238E27FC236}">
+                <a16:creationId xmlns:a16="http://schemas.microsoft.com/office/drawing/2014/main" id="{5A0A1A03-7B1A-5FA0-97BB-CC6D52168321}"/>
+              </a:ext>
+            </a:extLst>
+          </p:cNvPr>
+          <p:cNvPicPr>
+            <a:picLocks noChangeAspect="1"/>
+          </p:cNvPicPr>
+          <p:nvPr/>
+        </p:nvPicPr>
+        <p:blipFill>
+          <a:blip r:embed="rId3">
+            <a:extLst>
+              <a:ext uri="{28A0092B-C50C-407E-A947-70E740481C1C}">
+                <a14:useLocalDpi xmlns:a14="http://schemas.microsoft.com/office/drawing/2010/main" val="0"/>
+              </a:ext>
+            </a:extLst>
+          </a:blip>
+          <a:stretch>
+            <a:fillRect/>
+          </a:stretch>
+        </p:blipFill>
+        <p:spPr>
+          <a:xfrm>
+            <a:off x="1216537" y="3575304"/>
+            <a:ext cx="3623307" cy="2717480"/>
+          </a:xfrm>
+          <a:prstGeom prst="rect">
+            <a:avLst/>
+          </a:prstGeom>
+        </p:spPr>
+      </p:pic>
+    </p:spTree>
+    <p:extLst>
+      <p:ext uri="{BB962C8B-B14F-4D97-AF65-F5344CB8AC3E}">
+        <p14:creationId xmlns:p14="http://schemas.microsoft.com/office/powerpoint/2010/main" val="4120425433"/>
+      </p:ext>
+    </p:extLst>
+  </p:cSld>
+  <p:clrMapOvr>
+    <a:masterClrMapping/>
+  </p:clrMapOvr>
+</p:sld>
+</file>
+
+<file path=ppt/slides/slide5.xml><?xml version="1.0" encoding="utf-8"?>
+<p:sld xmlns:a="http://schemas.openxmlformats.org/drawingml/2006/main" xmlns:r="http://schemas.openxmlformats.org/officeDocument/2006/relationships" xmlns:p="http://schemas.openxmlformats.org/presentationml/2006/main">
+  <p:cSld>
+    <p:spTree>
+      <p:nvGrpSpPr>
+        <p:cNvPr id="1" name="">
+          <a:extLst>
+            <a:ext uri="{FF2B5EF4-FFF2-40B4-BE49-F238E27FC236}">
+              <a16:creationId xmlns:a16="http://schemas.microsoft.com/office/drawing/2014/main" id="{BE71CE59-8F45-F848-5D2A-B5F97D88C58B}"/>
+            </a:ext>
+          </a:extLst>
+        </p:cNvPr>
+        <p:cNvGrpSpPr/>
+        <p:nvPr/>
+      </p:nvGrpSpPr>
+      <p:grpSpPr>
+        <a:xfrm>
+          <a:off x="0" y="0"/>
+          <a:ext cx="0" cy="0"/>
+          <a:chOff x="0" y="0"/>
+          <a:chExt cx="0" cy="0"/>
+        </a:xfrm>
+      </p:grpSpPr>
+      <p:sp>
+        <p:nvSpPr>
+          <p:cNvPr id="2" name="TextBox 1">
+            <a:extLst>
+              <a:ext uri="{FF2B5EF4-FFF2-40B4-BE49-F238E27FC236}">
+                <a16:creationId xmlns:a16="http://schemas.microsoft.com/office/drawing/2014/main" id="{6B8CE005-BB19-D678-4DAA-2D9B9D364A0E}"/>
+              </a:ext>
+            </a:extLst>
+          </p:cNvPr>
+          <p:cNvSpPr txBox="1"/>
+          <p:nvPr/>
+        </p:nvSpPr>
+        <p:spPr>
+          <a:xfrm>
+            <a:off x="1234440" y="722376"/>
+            <a:ext cx="2688336" cy="369332"/>
+          </a:xfrm>
+          <a:prstGeom prst="rect">
+            <a:avLst/>
+          </a:prstGeom>
+          <a:noFill/>
+        </p:spPr>
+        <p:txBody>
+          <a:bodyPr wrap="square" rtlCol="0">
+            <a:spAutoFit/>
+          </a:bodyPr>
+          <a:lstStyle/>
+          <a:p>
+            <a:r>
+              <a:rPr lang="en-US" dirty="0"/>
+              <a:t>Experiment 3.2: </a:t>
+            </a:r>
+          </a:p>
+        </p:txBody>
+      </p:sp>
+      <p:sp>
+        <p:nvSpPr>
+          <p:cNvPr id="3" name="TextBox 2">
+            <a:extLst>
+              <a:ext uri="{FF2B5EF4-FFF2-40B4-BE49-F238E27FC236}">
+                <a16:creationId xmlns:a16="http://schemas.microsoft.com/office/drawing/2014/main" id="{FF33EA76-F0E1-EA4F-E070-E6BA89D0844B}"/>
+              </a:ext>
+            </a:extLst>
+          </p:cNvPr>
+          <p:cNvSpPr txBox="1"/>
+          <p:nvPr/>
+        </p:nvSpPr>
+        <p:spPr>
+          <a:xfrm>
+            <a:off x="1229489" y="1031272"/>
+            <a:ext cx="4502277" cy="2862322"/>
+          </a:xfrm>
+          <a:prstGeom prst="rect">
+            <a:avLst/>
+          </a:prstGeom>
+          <a:noFill/>
+        </p:spPr>
+        <p:txBody>
+          <a:bodyPr wrap="square" rtlCol="0">
+            <a:spAutoFit/>
+          </a:bodyPr>
+          <a:lstStyle/>
+          <a:p>
+            <a:endParaRPr lang="en-US" dirty="0"/>
+          </a:p>
+          <a:p>
+            <a:pPr marL="285750" indent="-285750">
+              <a:buFont typeface="Arial" panose="020B0604020202020204" pitchFamily="34" charset="0"/>
+              <a:buChar char="•"/>
+            </a:pPr>
+            <a:r>
+              <a:rPr lang="en-US" dirty="0"/>
+              <a:t>Binary Classification Setup </a:t>
+            </a:r>
+          </a:p>
+          <a:p>
+            <a:pPr marL="285750" indent="-285750">
+              <a:buFont typeface="Arial" panose="020B0604020202020204" pitchFamily="34" charset="0"/>
+              <a:buChar char="•"/>
+            </a:pPr>
+            <a:r>
+              <a:rPr lang="en-US" dirty="0"/>
+              <a:t>Classification Based on US Image Only</a:t>
+            </a:r>
+          </a:p>
+          <a:p>
+            <a:pPr marL="285750" indent="-285750">
+              <a:buFont typeface="Arial" panose="020B0604020202020204" pitchFamily="34" charset="0"/>
+              <a:buChar char="•"/>
+            </a:pPr>
+            <a:r>
+              <a:rPr lang="en-US" dirty="0"/>
+              <a:t>Two separate encoder with detached tail</a:t>
+            </a:r>
+          </a:p>
+          <a:p>
+            <a:pPr marL="285750" indent="-285750">
+              <a:buFont typeface="Arial" panose="020B0604020202020204" pitchFamily="34" charset="0"/>
+              <a:buChar char="•"/>
+            </a:pPr>
+            <a:r>
+              <a:rPr lang="en-US" dirty="0"/>
+              <a:t>Weighted Score</a:t>
+            </a:r>
+          </a:p>
+          <a:p>
+            <a:pPr marL="285750" indent="-285750">
+              <a:buFont typeface="Arial" panose="020B0604020202020204" pitchFamily="34" charset="0"/>
+              <a:buChar char="•"/>
+            </a:pPr>
+            <a:r>
+              <a:rPr lang="en-US" dirty="0" err="1"/>
+              <a:t>Testset</a:t>
+            </a:r>
+            <a:r>
+              <a:rPr lang="en-US" dirty="0"/>
+              <a:t> on 120 to 143 Patient IDs:</a:t>
+            </a:r>
+          </a:p>
+          <a:p>
+            <a:pPr marL="742950" lvl="1" indent="-285750">
+              <a:buFont typeface="Arial" panose="020B0604020202020204" pitchFamily="34" charset="0"/>
+              <a:buChar char="•"/>
+            </a:pPr>
+            <a:r>
+              <a:rPr lang="en-US" dirty="0"/>
+              <a:t>Total images 82</a:t>
+            </a:r>
+          </a:p>
+          <a:p>
+            <a:pPr marL="742950" lvl="1" indent="-285750">
+              <a:buFont typeface="Arial" panose="020B0604020202020204" pitchFamily="34" charset="0"/>
+              <a:buChar char="•"/>
+            </a:pPr>
+            <a:r>
+              <a:rPr lang="en-US" dirty="0"/>
+              <a:t>Malignant 35, Benign 47</a:t>
+            </a:r>
+          </a:p>
+          <a:p>
+            <a:pPr marL="285750" indent="-285750">
+              <a:buFont typeface="Arial" panose="020B0604020202020204" pitchFamily="34" charset="0"/>
+              <a:buChar char="•"/>
+            </a:pPr>
+            <a:endParaRPr lang="en-US" dirty="0"/>
+          </a:p>
+          <a:p>
+            <a:pPr marL="285750" indent="-285750">
+              <a:buFont typeface="Arial" panose="020B0604020202020204" pitchFamily="34" charset="0"/>
+              <a:buChar char="•"/>
+            </a:pPr>
+            <a:endParaRPr lang="en-US" dirty="0"/>
+          </a:p>
+        </p:txBody>
+      </p:sp>
+      <p:sp>
+        <p:nvSpPr>
+          <p:cNvPr id="4" name="Flowchart: Manual Operation 3">
+            <a:extLst>
+              <a:ext uri="{FF2B5EF4-FFF2-40B4-BE49-F238E27FC236}">
+                <a16:creationId xmlns:a16="http://schemas.microsoft.com/office/drawing/2014/main" id="{4399836D-22F4-647F-0C00-FF12CCEAB76E}"/>
+              </a:ext>
+            </a:extLst>
+          </p:cNvPr>
+          <p:cNvSpPr/>
+          <p:nvPr/>
+        </p:nvSpPr>
+        <p:spPr>
+          <a:xfrm rot="16200000">
+            <a:off x="7597142" y="1399032"/>
+            <a:ext cx="1234440" cy="1536192"/>
+          </a:xfrm>
+          <a:prstGeom prst="flowChartManualOperation">
+            <a:avLst/>
+          </a:prstGeom>
+        </p:spPr>
+        <p:style>
+          <a:lnRef idx="2">
+            <a:schemeClr val="accent1">
+              <a:shade val="15000"/>
+            </a:schemeClr>
+          </a:lnRef>
+          <a:fillRef idx="1">
+            <a:schemeClr val="accent1"/>
+          </a:fillRef>
+          <a:effectRef idx="0">
+            <a:schemeClr val="accent1"/>
+          </a:effectRef>
+          <a:fontRef idx="minor">
+            <a:schemeClr val="lt1"/>
+          </a:fontRef>
+        </p:style>
+        <p:txBody>
+          <a:bodyPr rtlCol="0" anchor="ctr"/>
+          <a:lstStyle/>
+          <a:p>
+            <a:pPr algn="ctr"/>
+            <a:endParaRPr lang="en-US" dirty="0"/>
+          </a:p>
+        </p:txBody>
+      </p:sp>
+      <p:sp>
+        <p:nvSpPr>
+          <p:cNvPr id="5" name="Flowchart: Manual Operation 4">
+            <a:extLst>
+              <a:ext uri="{FF2B5EF4-FFF2-40B4-BE49-F238E27FC236}">
+                <a16:creationId xmlns:a16="http://schemas.microsoft.com/office/drawing/2014/main" id="{354C344E-C25F-58E8-904F-BD03BD874789}"/>
+              </a:ext>
+            </a:extLst>
+          </p:cNvPr>
+          <p:cNvSpPr/>
+          <p:nvPr/>
+        </p:nvSpPr>
+        <p:spPr>
+          <a:xfrm rot="16200000">
+            <a:off x="7597142" y="3214116"/>
+            <a:ext cx="1234440" cy="1536192"/>
+          </a:xfrm>
+          <a:prstGeom prst="flowChartManualOperation">
+            <a:avLst/>
+          </a:prstGeom>
+        </p:spPr>
+        <p:style>
+          <a:lnRef idx="2">
+            <a:schemeClr val="accent1">
+              <a:shade val="15000"/>
+            </a:schemeClr>
+          </a:lnRef>
+          <a:fillRef idx="1">
+            <a:schemeClr val="accent1"/>
+          </a:fillRef>
+          <a:effectRef idx="0">
+            <a:schemeClr val="accent1"/>
+          </a:effectRef>
+          <a:fontRef idx="minor">
+            <a:schemeClr val="lt1"/>
+          </a:fontRef>
+        </p:style>
+        <p:txBody>
+          <a:bodyPr rtlCol="0" anchor="ctr"/>
+          <a:lstStyle/>
+          <a:p>
+            <a:pPr algn="ctr"/>
+            <a:endParaRPr lang="en-US"/>
+          </a:p>
+        </p:txBody>
+      </p:sp>
+      <p:sp>
+        <p:nvSpPr>
+          <p:cNvPr id="6" name="Rectangle 5">
+            <a:extLst>
+              <a:ext uri="{FF2B5EF4-FFF2-40B4-BE49-F238E27FC236}">
+                <a16:creationId xmlns:a16="http://schemas.microsoft.com/office/drawing/2014/main" id="{6A1712FB-D0DF-505F-E86F-DE5DFC1F4A72}"/>
+              </a:ext>
+            </a:extLst>
+          </p:cNvPr>
+          <p:cNvSpPr/>
+          <p:nvPr/>
+        </p:nvSpPr>
+        <p:spPr>
+          <a:xfrm>
+            <a:off x="9471662" y="1760220"/>
+            <a:ext cx="612648" cy="813816"/>
+          </a:xfrm>
+          <a:prstGeom prst="rect">
+            <a:avLst/>
+          </a:prstGeom>
+        </p:spPr>
+        <p:style>
+          <a:lnRef idx="2">
+            <a:schemeClr val="accent1">
+              <a:shade val="15000"/>
+            </a:schemeClr>
+          </a:lnRef>
+          <a:fillRef idx="1">
+            <a:schemeClr val="accent1"/>
+          </a:fillRef>
+          <a:effectRef idx="0">
+            <a:schemeClr val="accent1"/>
+          </a:effectRef>
+          <a:fontRef idx="minor">
+            <a:schemeClr val="lt1"/>
+          </a:fontRef>
+        </p:style>
+        <p:txBody>
+          <a:bodyPr rtlCol="0" anchor="ctr"/>
+          <a:lstStyle/>
+          <a:p>
+            <a:pPr algn="ctr"/>
+            <a:r>
+              <a:rPr lang="en-US" sz="1000" dirty="0"/>
+              <a:t>FC Layer</a:t>
+            </a:r>
+          </a:p>
+        </p:txBody>
+      </p:sp>
+      <p:sp>
+        <p:nvSpPr>
+          <p:cNvPr id="7" name="Rectangle 6">
+            <a:extLst>
+              <a:ext uri="{FF2B5EF4-FFF2-40B4-BE49-F238E27FC236}">
+                <a16:creationId xmlns:a16="http://schemas.microsoft.com/office/drawing/2014/main" id="{034897E1-DEB5-AA5C-4F95-21209B7B150E}"/>
+              </a:ext>
+            </a:extLst>
+          </p:cNvPr>
+          <p:cNvSpPr/>
+          <p:nvPr/>
+        </p:nvSpPr>
+        <p:spPr>
+          <a:xfrm>
+            <a:off x="9471662" y="3575304"/>
+            <a:ext cx="612648" cy="813816"/>
+          </a:xfrm>
+          <a:prstGeom prst="rect">
+            <a:avLst/>
+          </a:prstGeom>
+        </p:spPr>
+        <p:style>
+          <a:lnRef idx="2">
+            <a:schemeClr val="accent1">
+              <a:shade val="15000"/>
+            </a:schemeClr>
+          </a:lnRef>
+          <a:fillRef idx="1">
+            <a:schemeClr val="accent1"/>
+          </a:fillRef>
+          <a:effectRef idx="0">
+            <a:schemeClr val="accent1"/>
+          </a:effectRef>
+          <a:fontRef idx="minor">
+            <a:schemeClr val="lt1"/>
+          </a:fontRef>
+        </p:style>
+        <p:txBody>
+          <a:bodyPr rtlCol="0" anchor="ctr"/>
+          <a:lstStyle/>
+          <a:p>
+            <a:pPr algn="ctr"/>
+            <a:r>
+              <a:rPr lang="en-US" sz="1000" dirty="0"/>
+              <a:t>FC Layer</a:t>
+            </a:r>
+          </a:p>
+        </p:txBody>
+      </p:sp>
+      <p:sp>
+        <p:nvSpPr>
+          <p:cNvPr id="8" name="Oval 7">
+            <a:extLst>
+              <a:ext uri="{FF2B5EF4-FFF2-40B4-BE49-F238E27FC236}">
+                <a16:creationId xmlns:a16="http://schemas.microsoft.com/office/drawing/2014/main" id="{10EA88A8-7D35-AEAC-0C81-CD232E1EB033}"/>
+              </a:ext>
+            </a:extLst>
+          </p:cNvPr>
+          <p:cNvSpPr/>
+          <p:nvPr/>
+        </p:nvSpPr>
+        <p:spPr>
+          <a:xfrm>
+            <a:off x="10710674" y="1801368"/>
+            <a:ext cx="813816" cy="731520"/>
+          </a:xfrm>
+          <a:prstGeom prst="ellipse">
+            <a:avLst/>
+          </a:prstGeom>
+        </p:spPr>
+        <p:style>
+          <a:lnRef idx="2">
+            <a:schemeClr val="accent1">
+              <a:shade val="15000"/>
+            </a:schemeClr>
+          </a:lnRef>
+          <a:fillRef idx="1">
+            <a:schemeClr val="accent1"/>
+          </a:fillRef>
+          <a:effectRef idx="0">
+            <a:schemeClr val="accent1"/>
+          </a:effectRef>
+          <a:fontRef idx="minor">
+            <a:schemeClr val="lt1"/>
+          </a:fontRef>
+        </p:style>
+        <p:txBody>
+          <a:bodyPr rtlCol="0" anchor="ctr"/>
+          <a:lstStyle/>
+          <a:p>
+            <a:pPr algn="ctr"/>
+            <a:r>
+              <a:rPr lang="en-US" dirty="0"/>
+              <a:t>0/1</a:t>
+            </a:r>
+          </a:p>
+        </p:txBody>
+      </p:sp>
+      <p:sp>
+        <p:nvSpPr>
+          <p:cNvPr id="9" name="Oval 8">
+            <a:extLst>
+              <a:ext uri="{FF2B5EF4-FFF2-40B4-BE49-F238E27FC236}">
+                <a16:creationId xmlns:a16="http://schemas.microsoft.com/office/drawing/2014/main" id="{364A7286-C058-1A66-D615-B7491E671C9C}"/>
+              </a:ext>
+            </a:extLst>
+          </p:cNvPr>
+          <p:cNvSpPr/>
+          <p:nvPr/>
+        </p:nvSpPr>
+        <p:spPr>
+          <a:xfrm>
+            <a:off x="10683242" y="3616452"/>
+            <a:ext cx="813816" cy="731520"/>
+          </a:xfrm>
+          <a:prstGeom prst="ellipse">
+            <a:avLst/>
+          </a:prstGeom>
+        </p:spPr>
+        <p:style>
+          <a:lnRef idx="2">
+            <a:schemeClr val="accent1">
+              <a:shade val="15000"/>
+            </a:schemeClr>
+          </a:lnRef>
+          <a:fillRef idx="1">
+            <a:schemeClr val="accent1"/>
+          </a:fillRef>
+          <a:effectRef idx="0">
+            <a:schemeClr val="accent1"/>
+          </a:effectRef>
+          <a:fontRef idx="minor">
+            <a:schemeClr val="lt1"/>
+          </a:fontRef>
+        </p:style>
+        <p:txBody>
+          <a:bodyPr rtlCol="0" anchor="ctr"/>
+          <a:lstStyle/>
+          <a:p>
+            <a:pPr algn="ctr"/>
+            <a:r>
+              <a:rPr lang="en-US" dirty="0"/>
+              <a:t>0/1</a:t>
+            </a:r>
+          </a:p>
+        </p:txBody>
+      </p:sp>
+      <p:pic>
+        <p:nvPicPr>
+          <p:cNvPr id="13" name="Picture 12" descr="An ultrasound of a baby&#10;&#10;AI-generated content may be incorrect.">
+            <a:extLst>
+              <a:ext uri="{FF2B5EF4-FFF2-40B4-BE49-F238E27FC236}">
+                <a16:creationId xmlns:a16="http://schemas.microsoft.com/office/drawing/2014/main" id="{EFA51018-D27E-70EA-463C-65C6D9507F45}"/>
+              </a:ext>
+            </a:extLst>
+          </p:cNvPr>
+          <p:cNvPicPr>
+            <a:picLocks noChangeAspect="1"/>
+          </p:cNvPicPr>
+          <p:nvPr/>
+        </p:nvPicPr>
+        <p:blipFill>
+          <a:blip r:embed="rId2">
+            <a:extLst>
+              <a:ext uri="{28A0092B-C50C-407E-A947-70E740481C1C}">
+                <a14:useLocalDpi xmlns:a14="http://schemas.microsoft.com/office/drawing/2010/main" val="0"/>
+              </a:ext>
+            </a:extLst>
+          </a:blip>
+          <a:stretch>
+            <a:fillRect/>
+          </a:stretch>
+        </p:blipFill>
+        <p:spPr>
+          <a:xfrm>
+            <a:off x="5855210" y="1706142"/>
+            <a:ext cx="960120" cy="921972"/>
+          </a:xfrm>
+          <a:prstGeom prst="rect">
+            <a:avLst/>
+          </a:prstGeom>
+        </p:spPr>
+      </p:pic>
+      <p:pic>
+        <p:nvPicPr>
+          <p:cNvPr id="14" name="Picture 13" descr="An ultrasound of a baby&#10;&#10;AI-generated content may be incorrect.">
+            <a:extLst>
+              <a:ext uri="{FF2B5EF4-FFF2-40B4-BE49-F238E27FC236}">
+                <a16:creationId xmlns:a16="http://schemas.microsoft.com/office/drawing/2014/main" id="{045E41DC-4134-B3B3-1FA2-6A2932433747}"/>
+              </a:ext>
+            </a:extLst>
+          </p:cNvPr>
+          <p:cNvPicPr>
+            <a:picLocks noChangeAspect="1"/>
+          </p:cNvPicPr>
+          <p:nvPr/>
+        </p:nvPicPr>
+        <p:blipFill>
+          <a:blip r:embed="rId2">
+            <a:extLst>
+              <a:ext uri="{28A0092B-C50C-407E-A947-70E740481C1C}">
+                <a14:useLocalDpi xmlns:a14="http://schemas.microsoft.com/office/drawing/2010/main" val="0"/>
+              </a:ext>
+            </a:extLst>
+          </a:blip>
+          <a:stretch>
+            <a:fillRect/>
+          </a:stretch>
+        </p:blipFill>
+        <p:spPr>
+          <a:xfrm>
+            <a:off x="5855210" y="3521226"/>
+            <a:ext cx="960120" cy="921972"/>
+          </a:xfrm>
+          <a:prstGeom prst="rect">
+            <a:avLst/>
+          </a:prstGeom>
+        </p:spPr>
+      </p:pic>
+      <p:cxnSp>
+        <p:nvCxnSpPr>
+          <p:cNvPr id="16" name="Straight Arrow Connector 15">
+            <a:extLst>
+              <a:ext uri="{FF2B5EF4-FFF2-40B4-BE49-F238E27FC236}">
+                <a16:creationId xmlns:a16="http://schemas.microsoft.com/office/drawing/2014/main" id="{647B5EA9-F99A-F2FC-2D5B-DE9F196920EE}"/>
+              </a:ext>
+            </a:extLst>
+          </p:cNvPr>
+          <p:cNvCxnSpPr>
+            <a:stCxn id="13" idx="3"/>
+            <a:endCxn id="4" idx="0"/>
+          </p:cNvCxnSpPr>
+          <p:nvPr/>
+        </p:nvCxnSpPr>
+        <p:spPr>
+          <a:xfrm>
+            <a:off x="6815330" y="2167128"/>
+            <a:ext cx="630936" cy="0"/>
+          </a:xfrm>
+          <a:prstGeom prst="straightConnector1">
+            <a:avLst/>
+          </a:prstGeom>
+          <a:ln>
+            <a:tailEnd type="triangle"/>
+          </a:ln>
+        </p:spPr>
+        <p:style>
+          <a:lnRef idx="2">
+            <a:schemeClr val="accent1"/>
+          </a:lnRef>
+          <a:fillRef idx="0">
+            <a:schemeClr val="accent1"/>
+          </a:fillRef>
+          <a:effectRef idx="1">
+            <a:schemeClr val="accent1"/>
+          </a:effectRef>
+          <a:fontRef idx="minor">
+            <a:schemeClr val="tx1"/>
+          </a:fontRef>
+        </p:style>
+      </p:cxnSp>
+      <p:cxnSp>
+        <p:nvCxnSpPr>
+          <p:cNvPr id="19" name="Straight Arrow Connector 18">
+            <a:extLst>
+              <a:ext uri="{FF2B5EF4-FFF2-40B4-BE49-F238E27FC236}">
+                <a16:creationId xmlns:a16="http://schemas.microsoft.com/office/drawing/2014/main" id="{81E9120B-E3FA-03BB-92E7-F06958F1C866}"/>
+              </a:ext>
+            </a:extLst>
+          </p:cNvPr>
+          <p:cNvCxnSpPr>
+            <a:stCxn id="4" idx="2"/>
+            <a:endCxn id="6" idx="1"/>
+          </p:cNvCxnSpPr>
+          <p:nvPr/>
+        </p:nvCxnSpPr>
+        <p:spPr>
+          <a:xfrm>
+            <a:off x="8982458" y="2167128"/>
+            <a:ext cx="489204" cy="0"/>
+          </a:xfrm>
+          <a:prstGeom prst="straightConnector1">
+            <a:avLst/>
+          </a:prstGeom>
+          <a:ln>
+            <a:tailEnd type="triangle"/>
+          </a:ln>
+        </p:spPr>
+        <p:style>
+          <a:lnRef idx="2">
+            <a:schemeClr val="accent1"/>
+          </a:lnRef>
+          <a:fillRef idx="0">
+            <a:schemeClr val="accent1"/>
+          </a:fillRef>
+          <a:effectRef idx="1">
+            <a:schemeClr val="accent1"/>
+          </a:effectRef>
+          <a:fontRef idx="minor">
+            <a:schemeClr val="tx1"/>
+          </a:fontRef>
+        </p:style>
+      </p:cxnSp>
+      <p:cxnSp>
+        <p:nvCxnSpPr>
+          <p:cNvPr id="21" name="Straight Arrow Connector 20">
+            <a:extLst>
+              <a:ext uri="{FF2B5EF4-FFF2-40B4-BE49-F238E27FC236}">
+                <a16:creationId xmlns:a16="http://schemas.microsoft.com/office/drawing/2014/main" id="{458C2A3E-1D62-4AE6-211D-73C5FB4FB85B}"/>
+              </a:ext>
+            </a:extLst>
+          </p:cNvPr>
+          <p:cNvCxnSpPr>
+            <a:cxnSpLocks/>
+            <a:stCxn id="6" idx="3"/>
+            <a:endCxn id="8" idx="2"/>
+          </p:cNvCxnSpPr>
+          <p:nvPr/>
+        </p:nvCxnSpPr>
+        <p:spPr>
+          <a:xfrm>
+            <a:off x="10084310" y="2167128"/>
+            <a:ext cx="626364" cy="0"/>
+          </a:xfrm>
+          <a:prstGeom prst="straightConnector1">
+            <a:avLst/>
+          </a:prstGeom>
+          <a:ln>
+            <a:tailEnd type="triangle"/>
+          </a:ln>
+        </p:spPr>
+        <p:style>
+          <a:lnRef idx="2">
+            <a:schemeClr val="accent1"/>
+          </a:lnRef>
+          <a:fillRef idx="0">
+            <a:schemeClr val="accent1"/>
+          </a:fillRef>
+          <a:effectRef idx="1">
+            <a:schemeClr val="accent1"/>
+          </a:effectRef>
+          <a:fontRef idx="minor">
+            <a:schemeClr val="tx1"/>
+          </a:fontRef>
+        </p:style>
+      </p:cxnSp>
+      <p:cxnSp>
+        <p:nvCxnSpPr>
+          <p:cNvPr id="26" name="Straight Arrow Connector 25">
+            <a:extLst>
+              <a:ext uri="{FF2B5EF4-FFF2-40B4-BE49-F238E27FC236}">
+                <a16:creationId xmlns:a16="http://schemas.microsoft.com/office/drawing/2014/main" id="{5319E04A-CD8F-FE7F-B55B-7C6B0358742F}"/>
+              </a:ext>
+            </a:extLst>
+          </p:cNvPr>
+          <p:cNvCxnSpPr>
+            <a:stCxn id="14" idx="3"/>
+            <a:endCxn id="5" idx="0"/>
+          </p:cNvCxnSpPr>
+          <p:nvPr/>
+        </p:nvCxnSpPr>
+        <p:spPr>
+          <a:xfrm>
+            <a:off x="6815330" y="3982212"/>
+            <a:ext cx="630936" cy="0"/>
+          </a:xfrm>
+          <a:prstGeom prst="straightConnector1">
+            <a:avLst/>
+          </a:prstGeom>
+          <a:ln>
+            <a:tailEnd type="triangle"/>
+          </a:ln>
+        </p:spPr>
+        <p:style>
+          <a:lnRef idx="2">
+            <a:schemeClr val="accent1"/>
+          </a:lnRef>
+          <a:fillRef idx="0">
+            <a:schemeClr val="accent1"/>
+          </a:fillRef>
+          <a:effectRef idx="1">
+            <a:schemeClr val="accent1"/>
+          </a:effectRef>
+          <a:fontRef idx="minor">
+            <a:schemeClr val="tx1"/>
+          </a:fontRef>
+        </p:style>
+      </p:cxnSp>
+      <p:cxnSp>
+        <p:nvCxnSpPr>
+          <p:cNvPr id="28" name="Straight Arrow Connector 27">
+            <a:extLst>
+              <a:ext uri="{FF2B5EF4-FFF2-40B4-BE49-F238E27FC236}">
+                <a16:creationId xmlns:a16="http://schemas.microsoft.com/office/drawing/2014/main" id="{7E894ADF-BA3B-C74B-ADEF-BF797AA4B9FF}"/>
+              </a:ext>
+            </a:extLst>
+          </p:cNvPr>
+          <p:cNvCxnSpPr>
+            <a:stCxn id="5" idx="2"/>
+            <a:endCxn id="7" idx="1"/>
+          </p:cNvCxnSpPr>
+          <p:nvPr/>
+        </p:nvCxnSpPr>
+        <p:spPr>
+          <a:xfrm>
+            <a:off x="8982458" y="3982212"/>
+            <a:ext cx="489204" cy="0"/>
+          </a:xfrm>
+          <a:prstGeom prst="straightConnector1">
+            <a:avLst/>
+          </a:prstGeom>
+          <a:ln>
+            <a:tailEnd type="triangle"/>
+          </a:ln>
+        </p:spPr>
+        <p:style>
+          <a:lnRef idx="2">
+            <a:schemeClr val="accent1"/>
+          </a:lnRef>
+          <a:fillRef idx="0">
+            <a:schemeClr val="accent1"/>
+          </a:fillRef>
+          <a:effectRef idx="1">
+            <a:schemeClr val="accent1"/>
+          </a:effectRef>
+          <a:fontRef idx="minor">
+            <a:schemeClr val="tx1"/>
+          </a:fontRef>
+        </p:style>
+      </p:cxnSp>
+      <p:cxnSp>
+        <p:nvCxnSpPr>
+          <p:cNvPr id="30" name="Straight Arrow Connector 29">
+            <a:extLst>
+              <a:ext uri="{FF2B5EF4-FFF2-40B4-BE49-F238E27FC236}">
+                <a16:creationId xmlns:a16="http://schemas.microsoft.com/office/drawing/2014/main" id="{0E4F090F-A633-F3C8-34A4-08F29CE2EC6D}"/>
+              </a:ext>
+            </a:extLst>
+          </p:cNvPr>
+          <p:cNvCxnSpPr>
+            <a:stCxn id="7" idx="3"/>
+            <a:endCxn id="9" idx="2"/>
+          </p:cNvCxnSpPr>
+          <p:nvPr/>
+        </p:nvCxnSpPr>
+        <p:spPr>
+          <a:xfrm>
+            <a:off x="10084310" y="3982212"/>
+            <a:ext cx="598932" cy="0"/>
+          </a:xfrm>
+          <a:prstGeom prst="straightConnector1">
+            <a:avLst/>
+          </a:prstGeom>
+          <a:ln>
+            <a:tailEnd type="triangle"/>
+          </a:ln>
+        </p:spPr>
+        <p:style>
+          <a:lnRef idx="2">
+            <a:schemeClr val="accent1"/>
+          </a:lnRef>
+          <a:fillRef idx="0">
+            <a:schemeClr val="accent1"/>
+          </a:fillRef>
+          <a:effectRef idx="1">
+            <a:schemeClr val="accent1"/>
+          </a:effectRef>
+          <a:fontRef idx="minor">
+            <a:schemeClr val="tx1"/>
+          </a:fontRef>
+        </p:style>
+      </p:cxnSp>
+      <p:sp>
+        <p:nvSpPr>
+          <p:cNvPr id="32" name="TextBox 31">
+            <a:extLst>
+              <a:ext uri="{FF2B5EF4-FFF2-40B4-BE49-F238E27FC236}">
+                <a16:creationId xmlns:a16="http://schemas.microsoft.com/office/drawing/2014/main" id="{25410761-6825-134D-1B17-0FF1A5D2A5A3}"/>
+              </a:ext>
+            </a:extLst>
+          </p:cNvPr>
+          <p:cNvSpPr txBox="1"/>
+          <p:nvPr/>
+        </p:nvSpPr>
+        <p:spPr>
+          <a:xfrm>
+            <a:off x="7569710" y="1967073"/>
+            <a:ext cx="1106424" cy="553998"/>
+          </a:xfrm>
+          <a:prstGeom prst="rect">
+            <a:avLst/>
+          </a:prstGeom>
+          <a:noFill/>
+        </p:spPr>
+        <p:txBody>
+          <a:bodyPr wrap="square" rtlCol="0">
+            <a:spAutoFit/>
+          </a:bodyPr>
+          <a:lstStyle/>
+          <a:p>
+            <a:pPr algn="ctr"/>
+            <a:r>
+              <a:rPr lang="en-US" sz="1000" dirty="0">
+                <a:solidFill>
+                  <a:schemeClr val="bg1"/>
+                </a:solidFill>
+              </a:rPr>
+              <a:t>Pretrained Encoder</a:t>
+            </a:r>
+          </a:p>
+          <a:p>
+            <a:pPr algn="ctr"/>
+            <a:r>
+              <a:rPr lang="en-US" sz="1000" dirty="0">
+                <a:solidFill>
+                  <a:schemeClr val="bg1"/>
+                </a:solidFill>
+              </a:rPr>
+              <a:t>(Frozen)</a:t>
+            </a:r>
+          </a:p>
+        </p:txBody>
+      </p:sp>
+      <p:sp>
+        <p:nvSpPr>
+          <p:cNvPr id="34" name="TextBox 33">
+            <a:extLst>
+              <a:ext uri="{FF2B5EF4-FFF2-40B4-BE49-F238E27FC236}">
+                <a16:creationId xmlns:a16="http://schemas.microsoft.com/office/drawing/2014/main" id="{4B79EFCE-5A95-F773-6063-1C9B53728537}"/>
+              </a:ext>
+            </a:extLst>
+          </p:cNvPr>
+          <p:cNvSpPr txBox="1"/>
+          <p:nvPr/>
+        </p:nvSpPr>
+        <p:spPr>
+          <a:xfrm>
+            <a:off x="7622288" y="3782157"/>
+            <a:ext cx="1106424" cy="553998"/>
+          </a:xfrm>
+          <a:prstGeom prst="rect">
+            <a:avLst/>
+          </a:prstGeom>
+          <a:noFill/>
+        </p:spPr>
+        <p:txBody>
+          <a:bodyPr wrap="square" rtlCol="0">
+            <a:spAutoFit/>
+          </a:bodyPr>
+          <a:lstStyle/>
+          <a:p>
+            <a:pPr algn="ctr"/>
+            <a:r>
+              <a:rPr lang="en-US" sz="1000" dirty="0">
+                <a:solidFill>
+                  <a:schemeClr val="bg1"/>
+                </a:solidFill>
+              </a:rPr>
+              <a:t> Encoder</a:t>
+            </a:r>
+          </a:p>
+          <a:p>
+            <a:pPr algn="ctr"/>
+            <a:r>
+              <a:rPr lang="en-US" sz="1000" dirty="0">
+                <a:solidFill>
+                  <a:schemeClr val="bg1"/>
+                </a:solidFill>
+              </a:rPr>
+              <a:t>From Scratch</a:t>
+            </a:r>
+          </a:p>
+          <a:p>
+            <a:pPr algn="ctr"/>
+            <a:r>
+              <a:rPr lang="en-US" sz="1000" dirty="0">
+                <a:solidFill>
+                  <a:schemeClr val="bg1"/>
+                </a:solidFill>
+              </a:rPr>
+              <a:t>(Trainable)</a:t>
+            </a:r>
+          </a:p>
+        </p:txBody>
+      </p:sp>
+      <p:sp>
+        <p:nvSpPr>
+          <p:cNvPr id="22" name="TextBox 21">
+            <a:extLst>
+              <a:ext uri="{FF2B5EF4-FFF2-40B4-BE49-F238E27FC236}">
+                <a16:creationId xmlns:a16="http://schemas.microsoft.com/office/drawing/2014/main" id="{4AB09501-3639-E09D-0F6E-391198CDB23A}"/>
+              </a:ext>
+            </a:extLst>
+          </p:cNvPr>
+          <p:cNvSpPr txBox="1"/>
+          <p:nvPr/>
+        </p:nvSpPr>
+        <p:spPr>
+          <a:xfrm>
+            <a:off x="1153959" y="6339221"/>
+            <a:ext cx="3442906" cy="369332"/>
+          </a:xfrm>
+          <a:prstGeom prst="rect">
+            <a:avLst/>
+          </a:prstGeom>
+          <a:noFill/>
+        </p:spPr>
+        <p:txBody>
+          <a:bodyPr wrap="square" rtlCol="0">
+            <a:spAutoFit/>
+          </a:bodyPr>
+          <a:lstStyle/>
+          <a:p>
+            <a:pPr algn="ctr"/>
+            <a:r>
+              <a:rPr lang="en-US" dirty="0"/>
+              <a:t>Test Result on 5 fold models</a:t>
+            </a:r>
+          </a:p>
+        </p:txBody>
+      </p:sp>
+      <p:sp>
+        <p:nvSpPr>
+          <p:cNvPr id="10" name="Oval 9">
+            <a:extLst>
+              <a:ext uri="{FF2B5EF4-FFF2-40B4-BE49-F238E27FC236}">
+                <a16:creationId xmlns:a16="http://schemas.microsoft.com/office/drawing/2014/main" id="{2557534E-7C15-2BD7-73CB-37A5B8A8F3D8}"/>
+              </a:ext>
+            </a:extLst>
+          </p:cNvPr>
+          <p:cNvSpPr/>
+          <p:nvPr/>
+        </p:nvSpPr>
+        <p:spPr>
+          <a:xfrm>
+            <a:off x="11146536" y="2784348"/>
+            <a:ext cx="726948" cy="580644"/>
+          </a:xfrm>
+          <a:prstGeom prst="ellipse">
+            <a:avLst/>
+          </a:prstGeom>
+        </p:spPr>
+        <p:style>
+          <a:lnRef idx="2">
+            <a:schemeClr val="accent1">
+              <a:shade val="15000"/>
+            </a:schemeClr>
+          </a:lnRef>
+          <a:fillRef idx="1">
+            <a:schemeClr val="accent1"/>
+          </a:fillRef>
+          <a:effectRef idx="0">
+            <a:schemeClr val="accent1"/>
+          </a:effectRef>
+          <a:fontRef idx="minor">
+            <a:schemeClr val="lt1"/>
+          </a:fontRef>
+        </p:style>
+        <p:txBody>
+          <a:bodyPr rtlCol="0" anchor="ctr"/>
+          <a:lstStyle/>
+          <a:p>
+            <a:pPr algn="ctr"/>
+            <a:r>
+              <a:rPr lang="en-US" dirty="0"/>
+              <a:t>0/1</a:t>
+            </a:r>
+          </a:p>
+        </p:txBody>
+      </p:sp>
+      <p:cxnSp>
+        <p:nvCxnSpPr>
+          <p:cNvPr id="24" name="Straight Arrow Connector 23">
+            <a:extLst>
+              <a:ext uri="{FF2B5EF4-FFF2-40B4-BE49-F238E27FC236}">
+                <a16:creationId xmlns:a16="http://schemas.microsoft.com/office/drawing/2014/main" id="{4ED16834-05AD-6092-0F90-41DA4E235D53}"/>
+              </a:ext>
+            </a:extLst>
+          </p:cNvPr>
+          <p:cNvCxnSpPr>
+            <a:stCxn id="5" idx="2"/>
+            <a:endCxn id="6" idx="1"/>
+          </p:cNvCxnSpPr>
+          <p:nvPr/>
+        </p:nvCxnSpPr>
+        <p:spPr>
+          <a:xfrm flipV="1">
+            <a:off x="8982458" y="2167128"/>
+            <a:ext cx="489204" cy="1815084"/>
+          </a:xfrm>
+          <a:prstGeom prst="straightConnector1">
+            <a:avLst/>
+          </a:prstGeom>
+          <a:ln>
+            <a:tailEnd type="triangle"/>
+          </a:ln>
+        </p:spPr>
+        <p:style>
+          <a:lnRef idx="2">
+            <a:schemeClr val="accent1"/>
+          </a:lnRef>
+          <a:fillRef idx="0">
+            <a:schemeClr val="accent1"/>
+          </a:fillRef>
+          <a:effectRef idx="1">
+            <a:schemeClr val="accent1"/>
+          </a:effectRef>
+          <a:fontRef idx="minor">
+            <a:schemeClr val="tx1"/>
+          </a:fontRef>
+        </p:style>
+      </p:cxnSp>
+      <p:cxnSp>
+        <p:nvCxnSpPr>
+          <p:cNvPr id="27" name="Straight Arrow Connector 26">
+            <a:extLst>
+              <a:ext uri="{FF2B5EF4-FFF2-40B4-BE49-F238E27FC236}">
+                <a16:creationId xmlns:a16="http://schemas.microsoft.com/office/drawing/2014/main" id="{0B1D57D0-3757-0BAB-1013-1F3B7B7150A0}"/>
+              </a:ext>
+            </a:extLst>
+          </p:cNvPr>
+          <p:cNvCxnSpPr>
+            <a:stCxn id="8" idx="4"/>
+            <a:endCxn id="10" idx="0"/>
+          </p:cNvCxnSpPr>
+          <p:nvPr/>
+        </p:nvCxnSpPr>
+        <p:spPr>
+          <a:xfrm>
+            <a:off x="11117582" y="2532888"/>
+            <a:ext cx="392428" cy="251460"/>
+          </a:xfrm>
+          <a:prstGeom prst="straightConnector1">
+            <a:avLst/>
+          </a:prstGeom>
+          <a:ln>
+            <a:tailEnd type="triangle"/>
+          </a:ln>
+        </p:spPr>
+        <p:style>
+          <a:lnRef idx="2">
+            <a:schemeClr val="accent1"/>
+          </a:lnRef>
+          <a:fillRef idx="0">
+            <a:schemeClr val="accent1"/>
+          </a:fillRef>
+          <a:effectRef idx="1">
+            <a:schemeClr val="accent1"/>
+          </a:effectRef>
+          <a:fontRef idx="minor">
+            <a:schemeClr val="tx1"/>
+          </a:fontRef>
+        </p:style>
+      </p:cxnSp>
+      <p:cxnSp>
+        <p:nvCxnSpPr>
+          <p:cNvPr id="35" name="Straight Arrow Connector 34">
+            <a:extLst>
+              <a:ext uri="{FF2B5EF4-FFF2-40B4-BE49-F238E27FC236}">
+                <a16:creationId xmlns:a16="http://schemas.microsoft.com/office/drawing/2014/main" id="{76C0954E-F665-56F9-D235-66CC61EA0FEE}"/>
+              </a:ext>
+            </a:extLst>
+          </p:cNvPr>
+          <p:cNvCxnSpPr>
+            <a:stCxn id="9" idx="0"/>
+            <a:endCxn id="10" idx="4"/>
+          </p:cNvCxnSpPr>
+          <p:nvPr/>
+        </p:nvCxnSpPr>
+        <p:spPr>
+          <a:xfrm flipV="1">
+            <a:off x="11090150" y="3364992"/>
+            <a:ext cx="419860" cy="251460"/>
+          </a:xfrm>
+          <a:prstGeom prst="straightConnector1">
+            <a:avLst/>
+          </a:prstGeom>
+          <a:ln>
+            <a:tailEnd type="triangle"/>
+          </a:ln>
+        </p:spPr>
+        <p:style>
+          <a:lnRef idx="2">
+            <a:schemeClr val="accent1"/>
+          </a:lnRef>
+          <a:fillRef idx="0">
+            <a:schemeClr val="accent1"/>
+          </a:fillRef>
+          <a:effectRef idx="1">
+            <a:schemeClr val="accent1"/>
+          </a:effectRef>
+          <a:fontRef idx="minor">
+            <a:schemeClr val="tx1"/>
+          </a:fontRef>
+        </p:style>
+      </p:cxnSp>
+      <p:pic>
+        <p:nvPicPr>
+          <p:cNvPr id="12" name="Picture 11" descr="A graph with different colored lines&#10;&#10;AI-generated content may be incorrect.">
+            <a:extLst>
+              <a:ext uri="{FF2B5EF4-FFF2-40B4-BE49-F238E27FC236}">
+                <a16:creationId xmlns:a16="http://schemas.microsoft.com/office/drawing/2014/main" id="{8E0E8EDE-6652-329B-64CE-69146B437D75}"/>
+              </a:ext>
+            </a:extLst>
+          </p:cNvPr>
+          <p:cNvPicPr>
+            <a:picLocks noChangeAspect="1"/>
+          </p:cNvPicPr>
+          <p:nvPr/>
+        </p:nvPicPr>
+        <p:blipFill>
+          <a:blip r:embed="rId3">
+            <a:extLst>
+              <a:ext uri="{28A0092B-C50C-407E-A947-70E740481C1C}">
+                <a14:useLocalDpi xmlns:a14="http://schemas.microsoft.com/office/drawing/2010/main" val="0"/>
+              </a:ext>
+            </a:extLst>
+          </a:blip>
+          <a:stretch>
+            <a:fillRect/>
+          </a:stretch>
+        </p:blipFill>
+        <p:spPr>
+          <a:xfrm>
+            <a:off x="1032939" y="3490722"/>
+            <a:ext cx="3816431" cy="2862323"/>
+          </a:xfrm>
+          <a:prstGeom prst="rect">
+            <a:avLst/>
+          </a:prstGeom>
+        </p:spPr>
+      </p:pic>
+    </p:spTree>
+    <p:extLst>
+      <p:ext uri="{BB962C8B-B14F-4D97-AF65-F5344CB8AC3E}">
+        <p14:creationId xmlns:p14="http://schemas.microsoft.com/office/powerpoint/2010/main" val="4233127886"/>
+      </p:ext>
+    </p:extLst>
+  </p:cSld>
+  <p:clrMapOvr>
+    <a:masterClrMapping/>
+  </p:clrMapOvr>
+</p:sld>
+</file>
+
+<file path=ppt/slides/slide6.xml><?xml version="1.0" encoding="utf-8"?>
+<p:sld xmlns:a="http://schemas.openxmlformats.org/drawingml/2006/main" xmlns:r="http://schemas.openxmlformats.org/officeDocument/2006/relationships" xmlns:p="http://schemas.openxmlformats.org/presentationml/2006/main">
+  <p:cSld>
+    <p:spTree>
+      <p:nvGrpSpPr>
+        <p:cNvPr id="1" name="">
+          <a:extLst>
+            <a:ext uri="{FF2B5EF4-FFF2-40B4-BE49-F238E27FC236}">
+              <a16:creationId xmlns:a16="http://schemas.microsoft.com/office/drawing/2014/main" id="{D5D22F4C-4B89-6033-F76D-C9CBE392ABF9}"/>
+            </a:ext>
+          </a:extLst>
+        </p:cNvPr>
+        <p:cNvGrpSpPr/>
+        <p:nvPr/>
+      </p:nvGrpSpPr>
+      <p:grpSpPr>
+        <a:xfrm>
+          <a:off x="0" y="0"/>
+          <a:ext cx="0" cy="0"/>
+          <a:chOff x="0" y="0"/>
+          <a:chExt cx="0" cy="0"/>
+        </a:xfrm>
+      </p:grpSpPr>
+      <p:sp>
+        <p:nvSpPr>
+          <p:cNvPr id="2" name="TextBox 1">
+            <a:extLst>
+              <a:ext uri="{FF2B5EF4-FFF2-40B4-BE49-F238E27FC236}">
+                <a16:creationId xmlns:a16="http://schemas.microsoft.com/office/drawing/2014/main" id="{BBAC367F-A540-B93A-F915-53FC2BF88A6F}"/>
+              </a:ext>
+            </a:extLst>
+          </p:cNvPr>
+          <p:cNvSpPr txBox="1"/>
+          <p:nvPr/>
+        </p:nvSpPr>
+        <p:spPr>
+          <a:xfrm>
+            <a:off x="1234440" y="722376"/>
+            <a:ext cx="2688336" cy="369332"/>
+          </a:xfrm>
+          <a:prstGeom prst="rect">
+            <a:avLst/>
+          </a:prstGeom>
+          <a:noFill/>
+        </p:spPr>
+        <p:txBody>
+          <a:bodyPr wrap="square" rtlCol="0">
+            <a:spAutoFit/>
+          </a:bodyPr>
+          <a:lstStyle/>
+          <a:p>
+            <a:r>
+              <a:rPr lang="en-US" dirty="0"/>
+              <a:t>Experiment 3.3: </a:t>
+            </a:r>
+          </a:p>
+        </p:txBody>
+      </p:sp>
+      <p:sp>
+        <p:nvSpPr>
+          <p:cNvPr id="3" name="TextBox 2">
+            <a:extLst>
+              <a:ext uri="{FF2B5EF4-FFF2-40B4-BE49-F238E27FC236}">
+                <a16:creationId xmlns:a16="http://schemas.microsoft.com/office/drawing/2014/main" id="{2C9F5D81-DD1F-992D-FE20-575EBC7D3B94}"/>
+              </a:ext>
+            </a:extLst>
+          </p:cNvPr>
+          <p:cNvSpPr txBox="1"/>
+          <p:nvPr/>
+        </p:nvSpPr>
+        <p:spPr>
+          <a:xfrm>
+            <a:off x="1229489" y="1031272"/>
+            <a:ext cx="4502277" cy="2862322"/>
+          </a:xfrm>
+          <a:prstGeom prst="rect">
+            <a:avLst/>
+          </a:prstGeom>
+          <a:noFill/>
+        </p:spPr>
+        <p:txBody>
+          <a:bodyPr wrap="square" rtlCol="0">
+            <a:spAutoFit/>
+          </a:bodyPr>
+          <a:lstStyle/>
+          <a:p>
+            <a:endParaRPr lang="en-US" dirty="0"/>
+          </a:p>
+          <a:p>
+            <a:pPr marL="285750" indent="-285750">
+              <a:buFont typeface="Arial" panose="020B0604020202020204" pitchFamily="34" charset="0"/>
+              <a:buChar char="•"/>
+            </a:pPr>
+            <a:r>
+              <a:rPr lang="en-US" dirty="0"/>
+              <a:t>Binary Classification Setup </a:t>
+            </a:r>
+          </a:p>
+          <a:p>
+            <a:pPr marL="285750" indent="-285750">
+              <a:buFont typeface="Arial" panose="020B0604020202020204" pitchFamily="34" charset="0"/>
+              <a:buChar char="•"/>
+            </a:pPr>
+            <a:r>
+              <a:rPr lang="en-US" dirty="0"/>
+              <a:t>Classification Based on US Image Only</a:t>
+            </a:r>
+          </a:p>
+          <a:p>
+            <a:pPr marL="285750" indent="-285750">
+              <a:buFont typeface="Arial" panose="020B0604020202020204" pitchFamily="34" charset="0"/>
+              <a:buChar char="•"/>
+            </a:pPr>
+            <a:r>
+              <a:rPr lang="en-US" dirty="0"/>
+              <a:t>Two separate encoder with detached tail</a:t>
+            </a:r>
+          </a:p>
+          <a:p>
+            <a:pPr marL="285750" indent="-285750">
+              <a:buFont typeface="Arial" panose="020B0604020202020204" pitchFamily="34" charset="0"/>
+              <a:buChar char="•"/>
+            </a:pPr>
+            <a:r>
+              <a:rPr lang="en-US" dirty="0"/>
+              <a:t>Weighted Score</a:t>
+            </a:r>
+          </a:p>
+          <a:p>
+            <a:pPr marL="285750" indent="-285750">
+              <a:buFont typeface="Arial" panose="020B0604020202020204" pitchFamily="34" charset="0"/>
+              <a:buChar char="•"/>
+            </a:pPr>
+            <a:r>
+              <a:rPr lang="en-US" dirty="0" err="1"/>
+              <a:t>Testset</a:t>
+            </a:r>
+            <a:r>
+              <a:rPr lang="en-US" dirty="0"/>
+              <a:t> on 120 to 143 Patient IDs:</a:t>
+            </a:r>
+          </a:p>
+          <a:p>
+            <a:pPr marL="742950" lvl="1" indent="-285750">
+              <a:buFont typeface="Arial" panose="020B0604020202020204" pitchFamily="34" charset="0"/>
+              <a:buChar char="•"/>
+            </a:pPr>
+            <a:r>
+              <a:rPr lang="en-US" dirty="0"/>
+              <a:t>Total images 82</a:t>
+            </a:r>
+          </a:p>
+          <a:p>
+            <a:pPr marL="742950" lvl="1" indent="-285750">
+              <a:buFont typeface="Arial" panose="020B0604020202020204" pitchFamily="34" charset="0"/>
+              <a:buChar char="•"/>
+            </a:pPr>
+            <a:r>
+              <a:rPr lang="en-US" dirty="0"/>
+              <a:t>Malignant 35, Benign 47</a:t>
+            </a:r>
+          </a:p>
+          <a:p>
+            <a:pPr marL="285750" indent="-285750">
+              <a:buFont typeface="Arial" panose="020B0604020202020204" pitchFamily="34" charset="0"/>
+              <a:buChar char="•"/>
+            </a:pPr>
+            <a:endParaRPr lang="en-US" dirty="0"/>
+          </a:p>
+          <a:p>
+            <a:pPr marL="285750" indent="-285750">
+              <a:buFont typeface="Arial" panose="020B0604020202020204" pitchFamily="34" charset="0"/>
+              <a:buChar char="•"/>
+            </a:pPr>
+            <a:endParaRPr lang="en-US" dirty="0"/>
+          </a:p>
+        </p:txBody>
+      </p:sp>
+      <p:sp>
+        <p:nvSpPr>
+          <p:cNvPr id="4" name="Flowchart: Manual Operation 3">
+            <a:extLst>
+              <a:ext uri="{FF2B5EF4-FFF2-40B4-BE49-F238E27FC236}">
+                <a16:creationId xmlns:a16="http://schemas.microsoft.com/office/drawing/2014/main" id="{1CE917B8-B257-5BA8-8FA6-BA325A3AA7E6}"/>
+              </a:ext>
+            </a:extLst>
+          </p:cNvPr>
+          <p:cNvSpPr/>
+          <p:nvPr/>
+        </p:nvSpPr>
+        <p:spPr>
+          <a:xfrm rot="16200000">
+            <a:off x="7597142" y="1399032"/>
+            <a:ext cx="1234440" cy="1536192"/>
+          </a:xfrm>
+          <a:prstGeom prst="flowChartManualOperation">
+            <a:avLst/>
+          </a:prstGeom>
+        </p:spPr>
+        <p:style>
+          <a:lnRef idx="2">
+            <a:schemeClr val="accent1">
+              <a:shade val="15000"/>
+            </a:schemeClr>
+          </a:lnRef>
+          <a:fillRef idx="1">
+            <a:schemeClr val="accent1"/>
+          </a:fillRef>
+          <a:effectRef idx="0">
+            <a:schemeClr val="accent1"/>
+          </a:effectRef>
+          <a:fontRef idx="minor">
+            <a:schemeClr val="lt1"/>
+          </a:fontRef>
+        </p:style>
+        <p:txBody>
+          <a:bodyPr rtlCol="0" anchor="ctr"/>
+          <a:lstStyle/>
+          <a:p>
+            <a:pPr algn="ctr"/>
+            <a:endParaRPr lang="en-US" dirty="0"/>
+          </a:p>
+        </p:txBody>
+      </p:sp>
+      <p:sp>
+        <p:nvSpPr>
+          <p:cNvPr id="5" name="Flowchart: Manual Operation 4">
+            <a:extLst>
+              <a:ext uri="{FF2B5EF4-FFF2-40B4-BE49-F238E27FC236}">
+                <a16:creationId xmlns:a16="http://schemas.microsoft.com/office/drawing/2014/main" id="{1B7629C8-4436-163A-FB13-86E43541C074}"/>
+              </a:ext>
+            </a:extLst>
+          </p:cNvPr>
+          <p:cNvSpPr/>
+          <p:nvPr/>
+        </p:nvSpPr>
+        <p:spPr>
+          <a:xfrm rot="16200000">
+            <a:off x="7597142" y="3214116"/>
+            <a:ext cx="1234440" cy="1536192"/>
+          </a:xfrm>
+          <a:prstGeom prst="flowChartManualOperation">
+            <a:avLst/>
+          </a:prstGeom>
+        </p:spPr>
+        <p:style>
+          <a:lnRef idx="2">
+            <a:schemeClr val="accent1">
+              <a:shade val="15000"/>
+            </a:schemeClr>
+          </a:lnRef>
+          <a:fillRef idx="1">
+            <a:schemeClr val="accent1"/>
+          </a:fillRef>
+          <a:effectRef idx="0">
+            <a:schemeClr val="accent1"/>
+          </a:effectRef>
+          <a:fontRef idx="minor">
+            <a:schemeClr val="lt1"/>
+          </a:fontRef>
+        </p:style>
+        <p:txBody>
+          <a:bodyPr rtlCol="0" anchor="ctr"/>
+          <a:lstStyle/>
+          <a:p>
+            <a:pPr algn="ctr"/>
+            <a:endParaRPr lang="en-US"/>
+          </a:p>
+        </p:txBody>
+      </p:sp>
+      <p:sp>
+        <p:nvSpPr>
+          <p:cNvPr id="6" name="Rectangle 5">
+            <a:extLst>
+              <a:ext uri="{FF2B5EF4-FFF2-40B4-BE49-F238E27FC236}">
+                <a16:creationId xmlns:a16="http://schemas.microsoft.com/office/drawing/2014/main" id="{8E8A2F4D-F8F9-510A-CF04-E82A4153BB2C}"/>
+              </a:ext>
+            </a:extLst>
+          </p:cNvPr>
+          <p:cNvSpPr/>
+          <p:nvPr/>
+        </p:nvSpPr>
+        <p:spPr>
+          <a:xfrm>
+            <a:off x="9471662" y="1760220"/>
+            <a:ext cx="612648" cy="813816"/>
+          </a:xfrm>
+          <a:prstGeom prst="rect">
+            <a:avLst/>
+          </a:prstGeom>
+        </p:spPr>
+        <p:style>
+          <a:lnRef idx="2">
+            <a:schemeClr val="accent1">
+              <a:shade val="15000"/>
+            </a:schemeClr>
+          </a:lnRef>
+          <a:fillRef idx="1">
+            <a:schemeClr val="accent1"/>
+          </a:fillRef>
+          <a:effectRef idx="0">
+            <a:schemeClr val="accent1"/>
+          </a:effectRef>
+          <a:fontRef idx="minor">
+            <a:schemeClr val="lt1"/>
+          </a:fontRef>
+        </p:style>
+        <p:txBody>
+          <a:bodyPr rtlCol="0" anchor="ctr"/>
+          <a:lstStyle/>
+          <a:p>
+            <a:pPr algn="ctr"/>
+            <a:r>
+              <a:rPr lang="en-US" sz="1000" dirty="0"/>
+              <a:t>FC Layer</a:t>
+            </a:r>
+          </a:p>
+        </p:txBody>
+      </p:sp>
+      <p:sp>
+        <p:nvSpPr>
+          <p:cNvPr id="7" name="Rectangle 6">
+            <a:extLst>
+              <a:ext uri="{FF2B5EF4-FFF2-40B4-BE49-F238E27FC236}">
+                <a16:creationId xmlns:a16="http://schemas.microsoft.com/office/drawing/2014/main" id="{DA21FA5E-A756-BB57-B491-7D711FAD8ED6}"/>
+              </a:ext>
+            </a:extLst>
+          </p:cNvPr>
+          <p:cNvSpPr/>
+          <p:nvPr/>
+        </p:nvSpPr>
+        <p:spPr>
+          <a:xfrm>
+            <a:off x="9471662" y="3575304"/>
+            <a:ext cx="612648" cy="813816"/>
+          </a:xfrm>
+          <a:prstGeom prst="rect">
+            <a:avLst/>
+          </a:prstGeom>
+        </p:spPr>
+        <p:style>
+          <a:lnRef idx="2">
+            <a:schemeClr val="accent1">
+              <a:shade val="15000"/>
+            </a:schemeClr>
+          </a:lnRef>
+          <a:fillRef idx="1">
+            <a:schemeClr val="accent1"/>
+          </a:fillRef>
+          <a:effectRef idx="0">
+            <a:schemeClr val="accent1"/>
+          </a:effectRef>
+          <a:fontRef idx="minor">
+            <a:schemeClr val="lt1"/>
+          </a:fontRef>
+        </p:style>
+        <p:txBody>
+          <a:bodyPr rtlCol="0" anchor="ctr"/>
+          <a:lstStyle/>
+          <a:p>
+            <a:pPr algn="ctr"/>
+            <a:r>
+              <a:rPr lang="en-US" sz="1000" dirty="0"/>
+              <a:t>FC Layer</a:t>
+            </a:r>
+          </a:p>
+        </p:txBody>
+      </p:sp>
+      <p:sp>
+        <p:nvSpPr>
+          <p:cNvPr id="8" name="Oval 7">
+            <a:extLst>
+              <a:ext uri="{FF2B5EF4-FFF2-40B4-BE49-F238E27FC236}">
+                <a16:creationId xmlns:a16="http://schemas.microsoft.com/office/drawing/2014/main" id="{92A30AC3-1129-4BE7-21A2-663AC8CC2971}"/>
+              </a:ext>
+            </a:extLst>
+          </p:cNvPr>
+          <p:cNvSpPr/>
+          <p:nvPr/>
+        </p:nvSpPr>
+        <p:spPr>
+          <a:xfrm>
+            <a:off x="10710674" y="1801368"/>
+            <a:ext cx="813816" cy="731520"/>
+          </a:xfrm>
+          <a:prstGeom prst="ellipse">
+            <a:avLst/>
+          </a:prstGeom>
+        </p:spPr>
+        <p:style>
+          <a:lnRef idx="2">
+            <a:schemeClr val="accent1">
+              <a:shade val="15000"/>
+            </a:schemeClr>
+          </a:lnRef>
+          <a:fillRef idx="1">
+            <a:schemeClr val="accent1"/>
+          </a:fillRef>
+          <a:effectRef idx="0">
+            <a:schemeClr val="accent1"/>
+          </a:effectRef>
+          <a:fontRef idx="minor">
+            <a:schemeClr val="lt1"/>
+          </a:fontRef>
+        </p:style>
+        <p:txBody>
+          <a:bodyPr rtlCol="0" anchor="ctr"/>
+          <a:lstStyle/>
+          <a:p>
+            <a:pPr algn="ctr"/>
+            <a:r>
+              <a:rPr lang="en-US" dirty="0"/>
+              <a:t>0/1</a:t>
+            </a:r>
+          </a:p>
+        </p:txBody>
+      </p:sp>
+      <p:sp>
+        <p:nvSpPr>
+          <p:cNvPr id="9" name="Oval 8">
+            <a:extLst>
+              <a:ext uri="{FF2B5EF4-FFF2-40B4-BE49-F238E27FC236}">
+                <a16:creationId xmlns:a16="http://schemas.microsoft.com/office/drawing/2014/main" id="{B5128894-C6E4-96A9-B167-DBA72AF226CE}"/>
+              </a:ext>
+            </a:extLst>
+          </p:cNvPr>
+          <p:cNvSpPr/>
+          <p:nvPr/>
+        </p:nvSpPr>
+        <p:spPr>
+          <a:xfrm>
+            <a:off x="10683242" y="3616452"/>
+            <a:ext cx="813816" cy="731520"/>
+          </a:xfrm>
+          <a:prstGeom prst="ellipse">
+            <a:avLst/>
+          </a:prstGeom>
+        </p:spPr>
+        <p:style>
+          <a:lnRef idx="2">
+            <a:schemeClr val="accent1">
+              <a:shade val="15000"/>
+            </a:schemeClr>
+          </a:lnRef>
+          <a:fillRef idx="1">
+            <a:schemeClr val="accent1"/>
+          </a:fillRef>
+          <a:effectRef idx="0">
+            <a:schemeClr val="accent1"/>
+          </a:effectRef>
+          <a:fontRef idx="minor">
+            <a:schemeClr val="lt1"/>
+          </a:fontRef>
+        </p:style>
+        <p:txBody>
+          <a:bodyPr rtlCol="0" anchor="ctr"/>
+          <a:lstStyle/>
+          <a:p>
+            <a:pPr algn="ctr"/>
+            <a:r>
+              <a:rPr lang="en-US" dirty="0"/>
+              <a:t>0/1</a:t>
+            </a:r>
+          </a:p>
+        </p:txBody>
+      </p:sp>
+      <p:pic>
+        <p:nvPicPr>
+          <p:cNvPr id="13" name="Picture 12" descr="An ultrasound of a baby&#10;&#10;AI-generated content may be incorrect.">
+            <a:extLst>
+              <a:ext uri="{FF2B5EF4-FFF2-40B4-BE49-F238E27FC236}">
+                <a16:creationId xmlns:a16="http://schemas.microsoft.com/office/drawing/2014/main" id="{0F85744C-19BA-51DF-4EB8-79FA3C9730A9}"/>
+              </a:ext>
+            </a:extLst>
+          </p:cNvPr>
+          <p:cNvPicPr>
+            <a:picLocks noChangeAspect="1"/>
+          </p:cNvPicPr>
+          <p:nvPr/>
+        </p:nvPicPr>
+        <p:blipFill>
+          <a:blip r:embed="rId2">
+            <a:extLst>
+              <a:ext uri="{28A0092B-C50C-407E-A947-70E740481C1C}">
+                <a14:useLocalDpi xmlns:a14="http://schemas.microsoft.com/office/drawing/2010/main" val="0"/>
+              </a:ext>
+            </a:extLst>
+          </a:blip>
+          <a:stretch>
+            <a:fillRect/>
+          </a:stretch>
+        </p:blipFill>
+        <p:spPr>
+          <a:xfrm>
+            <a:off x="5855210" y="1706142"/>
+            <a:ext cx="960120" cy="921972"/>
+          </a:xfrm>
+          <a:prstGeom prst="rect">
+            <a:avLst/>
+          </a:prstGeom>
+        </p:spPr>
+      </p:pic>
+      <p:pic>
+        <p:nvPicPr>
+          <p:cNvPr id="14" name="Picture 13" descr="An ultrasound of a baby&#10;&#10;AI-generated content may be incorrect.">
+            <a:extLst>
+              <a:ext uri="{FF2B5EF4-FFF2-40B4-BE49-F238E27FC236}">
+                <a16:creationId xmlns:a16="http://schemas.microsoft.com/office/drawing/2014/main" id="{0CFF7A12-0C6D-132D-AED2-AF1DFDB6D55C}"/>
+              </a:ext>
+            </a:extLst>
+          </p:cNvPr>
+          <p:cNvPicPr>
+            <a:picLocks noChangeAspect="1"/>
+          </p:cNvPicPr>
+          <p:nvPr/>
+        </p:nvPicPr>
+        <p:blipFill>
+          <a:blip r:embed="rId2">
+            <a:extLst>
+              <a:ext uri="{28A0092B-C50C-407E-A947-70E740481C1C}">
+                <a14:useLocalDpi xmlns:a14="http://schemas.microsoft.com/office/drawing/2010/main" val="0"/>
+              </a:ext>
+            </a:extLst>
+          </a:blip>
+          <a:stretch>
+            <a:fillRect/>
+          </a:stretch>
+        </p:blipFill>
+        <p:spPr>
+          <a:xfrm>
+            <a:off x="5855210" y="3521226"/>
+            <a:ext cx="960120" cy="921972"/>
+          </a:xfrm>
+          <a:prstGeom prst="rect">
+            <a:avLst/>
+          </a:prstGeom>
+        </p:spPr>
+      </p:pic>
+      <p:cxnSp>
+        <p:nvCxnSpPr>
+          <p:cNvPr id="16" name="Straight Arrow Connector 15">
+            <a:extLst>
+              <a:ext uri="{FF2B5EF4-FFF2-40B4-BE49-F238E27FC236}">
+                <a16:creationId xmlns:a16="http://schemas.microsoft.com/office/drawing/2014/main" id="{634BE88D-5907-E546-7E93-DA0740B19C75}"/>
+              </a:ext>
+            </a:extLst>
+          </p:cNvPr>
+          <p:cNvCxnSpPr>
+            <a:stCxn id="13" idx="3"/>
+            <a:endCxn id="4" idx="0"/>
+          </p:cNvCxnSpPr>
+          <p:nvPr/>
+        </p:nvCxnSpPr>
+        <p:spPr>
+          <a:xfrm>
+            <a:off x="6815330" y="2167128"/>
+            <a:ext cx="630936" cy="0"/>
+          </a:xfrm>
+          <a:prstGeom prst="straightConnector1">
+            <a:avLst/>
+          </a:prstGeom>
+          <a:ln>
+            <a:tailEnd type="triangle"/>
+          </a:ln>
+        </p:spPr>
+        <p:style>
+          <a:lnRef idx="2">
+            <a:schemeClr val="accent1"/>
+          </a:lnRef>
+          <a:fillRef idx="0">
+            <a:schemeClr val="accent1"/>
+          </a:fillRef>
+          <a:effectRef idx="1">
+            <a:schemeClr val="accent1"/>
+          </a:effectRef>
+          <a:fontRef idx="minor">
+            <a:schemeClr val="tx1"/>
+          </a:fontRef>
+        </p:style>
+      </p:cxnSp>
+      <p:cxnSp>
+        <p:nvCxnSpPr>
+          <p:cNvPr id="19" name="Straight Arrow Connector 18">
+            <a:extLst>
+              <a:ext uri="{FF2B5EF4-FFF2-40B4-BE49-F238E27FC236}">
+                <a16:creationId xmlns:a16="http://schemas.microsoft.com/office/drawing/2014/main" id="{E0599FE0-DC2D-EFF4-D4B5-99417688203F}"/>
+              </a:ext>
+            </a:extLst>
+          </p:cNvPr>
+          <p:cNvCxnSpPr>
+            <a:stCxn id="4" idx="2"/>
+            <a:endCxn id="6" idx="1"/>
+          </p:cNvCxnSpPr>
+          <p:nvPr/>
+        </p:nvCxnSpPr>
+        <p:spPr>
+          <a:xfrm>
+            <a:off x="8982458" y="2167128"/>
+            <a:ext cx="489204" cy="0"/>
+          </a:xfrm>
+          <a:prstGeom prst="straightConnector1">
+            <a:avLst/>
+          </a:prstGeom>
+          <a:ln>
+            <a:tailEnd type="triangle"/>
+          </a:ln>
+        </p:spPr>
+        <p:style>
+          <a:lnRef idx="2">
+            <a:schemeClr val="accent1"/>
+          </a:lnRef>
+          <a:fillRef idx="0">
+            <a:schemeClr val="accent1"/>
+          </a:fillRef>
+          <a:effectRef idx="1">
+            <a:schemeClr val="accent1"/>
+          </a:effectRef>
+          <a:fontRef idx="minor">
+            <a:schemeClr val="tx1"/>
+          </a:fontRef>
+        </p:style>
+      </p:cxnSp>
+      <p:cxnSp>
+        <p:nvCxnSpPr>
+          <p:cNvPr id="21" name="Straight Arrow Connector 20">
+            <a:extLst>
+              <a:ext uri="{FF2B5EF4-FFF2-40B4-BE49-F238E27FC236}">
+                <a16:creationId xmlns:a16="http://schemas.microsoft.com/office/drawing/2014/main" id="{81B2BC32-1F14-72B3-1CF3-97020A123C0B}"/>
+              </a:ext>
+            </a:extLst>
+          </p:cNvPr>
+          <p:cNvCxnSpPr>
+            <a:cxnSpLocks/>
+            <a:stCxn id="6" idx="3"/>
+            <a:endCxn id="8" idx="2"/>
+          </p:cNvCxnSpPr>
+          <p:nvPr/>
+        </p:nvCxnSpPr>
+        <p:spPr>
+          <a:xfrm>
+            <a:off x="10084310" y="2167128"/>
+            <a:ext cx="626364" cy="0"/>
+          </a:xfrm>
+          <a:prstGeom prst="straightConnector1">
+            <a:avLst/>
+          </a:prstGeom>
+          <a:ln>
+            <a:tailEnd type="triangle"/>
+          </a:ln>
+        </p:spPr>
+        <p:style>
+          <a:lnRef idx="2">
+            <a:schemeClr val="accent1"/>
+          </a:lnRef>
+          <a:fillRef idx="0">
+            <a:schemeClr val="accent1"/>
+          </a:fillRef>
+          <a:effectRef idx="1">
+            <a:schemeClr val="accent1"/>
+          </a:effectRef>
+          <a:fontRef idx="minor">
+            <a:schemeClr val="tx1"/>
+          </a:fontRef>
+        </p:style>
+      </p:cxnSp>
+      <p:cxnSp>
+        <p:nvCxnSpPr>
+          <p:cNvPr id="26" name="Straight Arrow Connector 25">
+            <a:extLst>
+              <a:ext uri="{FF2B5EF4-FFF2-40B4-BE49-F238E27FC236}">
+                <a16:creationId xmlns:a16="http://schemas.microsoft.com/office/drawing/2014/main" id="{96657093-2547-28E8-E422-D9D31D6C5FF7}"/>
+              </a:ext>
+            </a:extLst>
+          </p:cNvPr>
+          <p:cNvCxnSpPr>
+            <a:stCxn id="14" idx="3"/>
+            <a:endCxn id="5" idx="0"/>
+          </p:cNvCxnSpPr>
+          <p:nvPr/>
+        </p:nvCxnSpPr>
+        <p:spPr>
+          <a:xfrm>
+            <a:off x="6815330" y="3982212"/>
+            <a:ext cx="630936" cy="0"/>
+          </a:xfrm>
+          <a:prstGeom prst="straightConnector1">
+            <a:avLst/>
+          </a:prstGeom>
+          <a:ln>
+            <a:tailEnd type="triangle"/>
+          </a:ln>
+        </p:spPr>
+        <p:style>
+          <a:lnRef idx="2">
+            <a:schemeClr val="accent1"/>
+          </a:lnRef>
+          <a:fillRef idx="0">
+            <a:schemeClr val="accent1"/>
+          </a:fillRef>
+          <a:effectRef idx="1">
+            <a:schemeClr val="accent1"/>
+          </a:effectRef>
+          <a:fontRef idx="minor">
+            <a:schemeClr val="tx1"/>
+          </a:fontRef>
+        </p:style>
+      </p:cxnSp>
+      <p:cxnSp>
+        <p:nvCxnSpPr>
+          <p:cNvPr id="28" name="Straight Arrow Connector 27">
+            <a:extLst>
+              <a:ext uri="{FF2B5EF4-FFF2-40B4-BE49-F238E27FC236}">
+                <a16:creationId xmlns:a16="http://schemas.microsoft.com/office/drawing/2014/main" id="{E19E4B86-0056-913A-1A74-AF77DF9A413C}"/>
+              </a:ext>
+            </a:extLst>
+          </p:cNvPr>
+          <p:cNvCxnSpPr>
+            <a:stCxn id="5" idx="2"/>
+            <a:endCxn id="7" idx="1"/>
+          </p:cNvCxnSpPr>
+          <p:nvPr/>
+        </p:nvCxnSpPr>
+        <p:spPr>
+          <a:xfrm>
+            <a:off x="8982458" y="3982212"/>
+            <a:ext cx="489204" cy="0"/>
+          </a:xfrm>
+          <a:prstGeom prst="straightConnector1">
+            <a:avLst/>
+          </a:prstGeom>
+          <a:ln>
+            <a:tailEnd type="triangle"/>
+          </a:ln>
+        </p:spPr>
+        <p:style>
+          <a:lnRef idx="2">
+            <a:schemeClr val="accent1"/>
+          </a:lnRef>
+          <a:fillRef idx="0">
+            <a:schemeClr val="accent1"/>
+          </a:fillRef>
+          <a:effectRef idx="1">
+            <a:schemeClr val="accent1"/>
+          </a:effectRef>
+          <a:fontRef idx="minor">
+            <a:schemeClr val="tx1"/>
+          </a:fontRef>
+        </p:style>
+      </p:cxnSp>
+      <p:cxnSp>
+        <p:nvCxnSpPr>
+          <p:cNvPr id="30" name="Straight Arrow Connector 29">
+            <a:extLst>
+              <a:ext uri="{FF2B5EF4-FFF2-40B4-BE49-F238E27FC236}">
+                <a16:creationId xmlns:a16="http://schemas.microsoft.com/office/drawing/2014/main" id="{0EAB1C72-5838-03AC-D947-0C99D47013E9}"/>
+              </a:ext>
+            </a:extLst>
+          </p:cNvPr>
+          <p:cNvCxnSpPr>
+            <a:stCxn id="7" idx="3"/>
+            <a:endCxn id="9" idx="2"/>
+          </p:cNvCxnSpPr>
+          <p:nvPr/>
+        </p:nvCxnSpPr>
+        <p:spPr>
+          <a:xfrm>
+            <a:off x="10084310" y="3982212"/>
+            <a:ext cx="598932" cy="0"/>
+          </a:xfrm>
+          <a:prstGeom prst="straightConnector1">
+            <a:avLst/>
+          </a:prstGeom>
+          <a:ln>
+            <a:tailEnd type="triangle"/>
+          </a:ln>
+        </p:spPr>
+        <p:style>
+          <a:lnRef idx="2">
+            <a:schemeClr val="accent1"/>
+          </a:lnRef>
+          <a:fillRef idx="0">
+            <a:schemeClr val="accent1"/>
+          </a:fillRef>
+          <a:effectRef idx="1">
+            <a:schemeClr val="accent1"/>
+          </a:effectRef>
+          <a:fontRef idx="minor">
+            <a:schemeClr val="tx1"/>
+          </a:fontRef>
+        </p:style>
+      </p:cxnSp>
+      <p:sp>
+        <p:nvSpPr>
+          <p:cNvPr id="32" name="TextBox 31">
+            <a:extLst>
+              <a:ext uri="{FF2B5EF4-FFF2-40B4-BE49-F238E27FC236}">
+                <a16:creationId xmlns:a16="http://schemas.microsoft.com/office/drawing/2014/main" id="{2DB193EB-1B6C-9987-B832-62EB42D8E83A}"/>
+              </a:ext>
+            </a:extLst>
+          </p:cNvPr>
+          <p:cNvSpPr txBox="1"/>
+          <p:nvPr/>
+        </p:nvSpPr>
+        <p:spPr>
+          <a:xfrm>
+            <a:off x="7569710" y="1967073"/>
+            <a:ext cx="1106424" cy="553998"/>
+          </a:xfrm>
+          <a:prstGeom prst="rect">
+            <a:avLst/>
+          </a:prstGeom>
+          <a:noFill/>
+        </p:spPr>
+        <p:txBody>
+          <a:bodyPr wrap="square" rtlCol="0">
+            <a:spAutoFit/>
+          </a:bodyPr>
+          <a:lstStyle/>
+          <a:p>
+            <a:pPr algn="ctr"/>
+            <a:r>
+              <a:rPr lang="en-US" sz="1000" dirty="0">
+                <a:solidFill>
+                  <a:schemeClr val="bg1"/>
+                </a:solidFill>
+              </a:rPr>
+              <a:t>Pretrained Encoder</a:t>
+            </a:r>
+          </a:p>
+          <a:p>
+            <a:pPr algn="ctr"/>
+            <a:r>
+              <a:rPr lang="en-US" sz="1000" dirty="0">
+                <a:solidFill>
+                  <a:schemeClr val="bg1"/>
+                </a:solidFill>
+              </a:rPr>
+              <a:t>(Frozen)</a:t>
+            </a:r>
+          </a:p>
+        </p:txBody>
+      </p:sp>
+      <p:sp>
+        <p:nvSpPr>
+          <p:cNvPr id="34" name="TextBox 33">
+            <a:extLst>
+              <a:ext uri="{FF2B5EF4-FFF2-40B4-BE49-F238E27FC236}">
+                <a16:creationId xmlns:a16="http://schemas.microsoft.com/office/drawing/2014/main" id="{72F67960-9E73-763B-45B9-46B120A5DE32}"/>
+              </a:ext>
+            </a:extLst>
+          </p:cNvPr>
+          <p:cNvSpPr txBox="1"/>
+          <p:nvPr/>
+        </p:nvSpPr>
+        <p:spPr>
+          <a:xfrm>
+            <a:off x="7622288" y="3782157"/>
+            <a:ext cx="1106424" cy="553998"/>
+          </a:xfrm>
+          <a:prstGeom prst="rect">
+            <a:avLst/>
+          </a:prstGeom>
+          <a:noFill/>
+        </p:spPr>
+        <p:txBody>
+          <a:bodyPr wrap="square" rtlCol="0">
+            <a:spAutoFit/>
+          </a:bodyPr>
+          <a:lstStyle/>
+          <a:p>
+            <a:pPr algn="ctr"/>
+            <a:r>
+              <a:rPr lang="en-US" sz="1000" dirty="0">
+                <a:solidFill>
+                  <a:schemeClr val="bg1"/>
+                </a:solidFill>
+              </a:rPr>
+              <a:t> Encoder</a:t>
+            </a:r>
+          </a:p>
+          <a:p>
+            <a:pPr algn="ctr"/>
+            <a:r>
+              <a:rPr lang="en-US" sz="1000" dirty="0">
+                <a:solidFill>
+                  <a:schemeClr val="bg1"/>
+                </a:solidFill>
+              </a:rPr>
+              <a:t>From Scratch</a:t>
+            </a:r>
+          </a:p>
+          <a:p>
+            <a:pPr algn="ctr"/>
+            <a:r>
+              <a:rPr lang="en-US" sz="1000" dirty="0">
+                <a:solidFill>
+                  <a:schemeClr val="bg1"/>
+                </a:solidFill>
+              </a:rPr>
+              <a:t>(Trainable)</a:t>
+            </a:r>
+          </a:p>
+        </p:txBody>
+      </p:sp>
+      <p:sp>
+        <p:nvSpPr>
+          <p:cNvPr id="22" name="TextBox 21">
+            <a:extLst>
+              <a:ext uri="{FF2B5EF4-FFF2-40B4-BE49-F238E27FC236}">
+                <a16:creationId xmlns:a16="http://schemas.microsoft.com/office/drawing/2014/main" id="{19120E76-F3E4-A94E-13FB-FFBF80FAEB8E}"/>
+              </a:ext>
+            </a:extLst>
+          </p:cNvPr>
+          <p:cNvSpPr txBox="1"/>
+          <p:nvPr/>
+        </p:nvSpPr>
+        <p:spPr>
+          <a:xfrm>
+            <a:off x="1153959" y="6339221"/>
+            <a:ext cx="3442906" cy="369332"/>
+          </a:xfrm>
+          <a:prstGeom prst="rect">
+            <a:avLst/>
+          </a:prstGeom>
+          <a:noFill/>
+        </p:spPr>
+        <p:txBody>
+          <a:bodyPr wrap="square" rtlCol="0">
+            <a:spAutoFit/>
+          </a:bodyPr>
+          <a:lstStyle/>
+          <a:p>
+            <a:pPr algn="ctr"/>
+            <a:r>
+              <a:rPr lang="en-US" dirty="0"/>
+              <a:t>Test Result on 5 fold models</a:t>
+            </a:r>
+          </a:p>
+        </p:txBody>
+      </p:sp>
+      <p:sp>
+        <p:nvSpPr>
+          <p:cNvPr id="10" name="Oval 9">
+            <a:extLst>
+              <a:ext uri="{FF2B5EF4-FFF2-40B4-BE49-F238E27FC236}">
+                <a16:creationId xmlns:a16="http://schemas.microsoft.com/office/drawing/2014/main" id="{2CCB7B9F-0748-BF90-A364-A14A85294C26}"/>
+              </a:ext>
+            </a:extLst>
+          </p:cNvPr>
+          <p:cNvSpPr/>
+          <p:nvPr/>
+        </p:nvSpPr>
+        <p:spPr>
+          <a:xfrm>
+            <a:off x="11146536" y="2784348"/>
+            <a:ext cx="726948" cy="580644"/>
+          </a:xfrm>
+          <a:prstGeom prst="ellipse">
+            <a:avLst/>
+          </a:prstGeom>
+        </p:spPr>
+        <p:style>
+          <a:lnRef idx="2">
+            <a:schemeClr val="accent1">
+              <a:shade val="15000"/>
+            </a:schemeClr>
+          </a:lnRef>
+          <a:fillRef idx="1">
+            <a:schemeClr val="accent1"/>
+          </a:fillRef>
+          <a:effectRef idx="0">
+            <a:schemeClr val="accent1"/>
+          </a:effectRef>
+          <a:fontRef idx="minor">
+            <a:schemeClr val="lt1"/>
+          </a:fontRef>
+        </p:style>
+        <p:txBody>
+          <a:bodyPr rtlCol="0" anchor="ctr"/>
+          <a:lstStyle/>
+          <a:p>
+            <a:pPr algn="ctr"/>
+            <a:r>
+              <a:rPr lang="en-US" dirty="0"/>
+              <a:t>0/1</a:t>
+            </a:r>
+          </a:p>
+        </p:txBody>
+      </p:sp>
+      <p:cxnSp>
+        <p:nvCxnSpPr>
+          <p:cNvPr id="24" name="Straight Arrow Connector 23">
+            <a:extLst>
+              <a:ext uri="{FF2B5EF4-FFF2-40B4-BE49-F238E27FC236}">
+                <a16:creationId xmlns:a16="http://schemas.microsoft.com/office/drawing/2014/main" id="{B7C2FBD6-985B-D9CE-79A8-E6589FF70C52}"/>
+              </a:ext>
+            </a:extLst>
+          </p:cNvPr>
+          <p:cNvCxnSpPr>
+            <a:stCxn id="5" idx="2"/>
+            <a:endCxn id="6" idx="1"/>
+          </p:cNvCxnSpPr>
+          <p:nvPr/>
+        </p:nvCxnSpPr>
+        <p:spPr>
+          <a:xfrm flipV="1">
+            <a:off x="8982458" y="2167128"/>
+            <a:ext cx="489204" cy="1815084"/>
+          </a:xfrm>
+          <a:prstGeom prst="straightConnector1">
+            <a:avLst/>
+          </a:prstGeom>
+          <a:ln>
+            <a:tailEnd type="triangle"/>
+          </a:ln>
+        </p:spPr>
+        <p:style>
+          <a:lnRef idx="2">
+            <a:schemeClr val="accent1"/>
+          </a:lnRef>
+          <a:fillRef idx="0">
+            <a:schemeClr val="accent1"/>
+          </a:fillRef>
+          <a:effectRef idx="1">
+            <a:schemeClr val="accent1"/>
+          </a:effectRef>
+          <a:fontRef idx="minor">
+            <a:schemeClr val="tx1"/>
+          </a:fontRef>
+        </p:style>
+      </p:cxnSp>
+      <p:cxnSp>
+        <p:nvCxnSpPr>
+          <p:cNvPr id="27" name="Straight Arrow Connector 26">
+            <a:extLst>
+              <a:ext uri="{FF2B5EF4-FFF2-40B4-BE49-F238E27FC236}">
+                <a16:creationId xmlns:a16="http://schemas.microsoft.com/office/drawing/2014/main" id="{B3973300-8DCB-453E-342A-6DD701055923}"/>
+              </a:ext>
+            </a:extLst>
+          </p:cNvPr>
+          <p:cNvCxnSpPr>
+            <a:stCxn id="8" idx="4"/>
+            <a:endCxn id="10" idx="0"/>
+          </p:cNvCxnSpPr>
+          <p:nvPr/>
+        </p:nvCxnSpPr>
+        <p:spPr>
+          <a:xfrm>
+            <a:off x="11117582" y="2532888"/>
+            <a:ext cx="392428" cy="251460"/>
+          </a:xfrm>
+          <a:prstGeom prst="straightConnector1">
+            <a:avLst/>
+          </a:prstGeom>
+          <a:ln>
+            <a:tailEnd type="triangle"/>
+          </a:ln>
+        </p:spPr>
+        <p:style>
+          <a:lnRef idx="2">
+            <a:schemeClr val="accent1"/>
+          </a:lnRef>
+          <a:fillRef idx="0">
+            <a:schemeClr val="accent1"/>
+          </a:fillRef>
+          <a:effectRef idx="1">
+            <a:schemeClr val="accent1"/>
+          </a:effectRef>
+          <a:fontRef idx="minor">
+            <a:schemeClr val="tx1"/>
+          </a:fontRef>
+        </p:style>
+      </p:cxnSp>
+      <p:cxnSp>
+        <p:nvCxnSpPr>
+          <p:cNvPr id="35" name="Straight Arrow Connector 34">
+            <a:extLst>
+              <a:ext uri="{FF2B5EF4-FFF2-40B4-BE49-F238E27FC236}">
+                <a16:creationId xmlns:a16="http://schemas.microsoft.com/office/drawing/2014/main" id="{6D2D2F39-2175-E20E-91D6-997F2B2000B4}"/>
+              </a:ext>
+            </a:extLst>
+          </p:cNvPr>
+          <p:cNvCxnSpPr>
+            <a:stCxn id="9" idx="0"/>
+            <a:endCxn id="10" idx="4"/>
+          </p:cNvCxnSpPr>
+          <p:nvPr/>
+        </p:nvCxnSpPr>
+        <p:spPr>
+          <a:xfrm flipV="1">
+            <a:off x="11090150" y="3364992"/>
+            <a:ext cx="419860" cy="251460"/>
+          </a:xfrm>
+          <a:prstGeom prst="straightConnector1">
+            <a:avLst/>
+          </a:prstGeom>
+          <a:ln>
+            <a:tailEnd type="triangle"/>
+          </a:ln>
+        </p:spPr>
+        <p:style>
+          <a:lnRef idx="2">
+            <a:schemeClr val="accent1"/>
+          </a:lnRef>
+          <a:fillRef idx="0">
+            <a:schemeClr val="accent1"/>
+          </a:fillRef>
+          <a:effectRef idx="1">
+            <a:schemeClr val="accent1"/>
+          </a:effectRef>
+          <a:fontRef idx="minor">
+            <a:schemeClr val="tx1"/>
+          </a:fontRef>
+        </p:style>
+      </p:cxnSp>
+      <p:cxnSp>
+        <p:nvCxnSpPr>
+          <p:cNvPr id="15" name="Straight Arrow Connector 14">
+            <a:extLst>
+              <a:ext uri="{FF2B5EF4-FFF2-40B4-BE49-F238E27FC236}">
+                <a16:creationId xmlns:a16="http://schemas.microsoft.com/office/drawing/2014/main" id="{F67DCF1E-A549-CCBA-67C1-F0FD0B1391F4}"/>
+              </a:ext>
+            </a:extLst>
+          </p:cNvPr>
+          <p:cNvCxnSpPr>
+            <a:stCxn id="4" idx="2"/>
+            <a:endCxn id="7" idx="1"/>
+          </p:cNvCxnSpPr>
+          <p:nvPr/>
+        </p:nvCxnSpPr>
+        <p:spPr>
+          <a:xfrm>
+            <a:off x="8982458" y="2167128"/>
+            <a:ext cx="489204" cy="1815084"/>
+          </a:xfrm>
+          <a:prstGeom prst="straightConnector1">
+            <a:avLst/>
+          </a:prstGeom>
+          <a:ln>
+            <a:tailEnd type="triangle"/>
+          </a:ln>
+        </p:spPr>
+        <p:style>
+          <a:lnRef idx="2">
+            <a:schemeClr val="accent1"/>
+          </a:lnRef>
+          <a:fillRef idx="0">
+            <a:schemeClr val="accent1"/>
+          </a:fillRef>
+          <a:effectRef idx="1">
+            <a:schemeClr val="accent1"/>
+          </a:effectRef>
+          <a:fontRef idx="minor">
+            <a:schemeClr val="tx1"/>
+          </a:fontRef>
+        </p:style>
+      </p:cxnSp>
+    </p:spTree>
+    <p:extLst>
+      <p:ext uri="{BB962C8B-B14F-4D97-AF65-F5344CB8AC3E}">
+        <p14:creationId xmlns:p14="http://schemas.microsoft.com/office/powerpoint/2010/main" val="1431494686"/>
+      </p:ext>
+    </p:extLst>
+  </p:cSld>
+  <p:clrMapOvr>
+    <a:masterClrMapping/>
+  </p:clrMapOvr>
+</p:sld>
+</file>
+
 <file path=ppt/theme/theme1.xml><?xml version="1.0" encoding="utf-8"?>
 <a:theme xmlns:a="http://schemas.openxmlformats.org/drawingml/2006/main" name="Office Theme">
   <a:themeElements>

</xml_diff>

<commit_message>
not averaging the final score
</commit_message>
<xml_diff>
--- a/meeting_updates/07.07.25.pptx
+++ b/meeting_updates/07.07.25.pptx
@@ -9482,6 +9482,42 @@
           </a:fontRef>
         </p:style>
       </p:cxnSp>
+      <p:pic>
+        <p:nvPicPr>
+          <p:cNvPr id="12" name="Picture 11" descr="A graph of a curve&#10;&#10;AI-generated content may be incorrect.">
+            <a:extLst>
+              <a:ext uri="{FF2B5EF4-FFF2-40B4-BE49-F238E27FC236}">
+                <a16:creationId xmlns:a16="http://schemas.microsoft.com/office/drawing/2014/main" id="{37D73EFA-1008-61C4-6691-234B17A1BA19}"/>
+              </a:ext>
+            </a:extLst>
+          </p:cNvPr>
+          <p:cNvPicPr>
+            <a:picLocks noChangeAspect="1"/>
+          </p:cNvPicPr>
+          <p:nvPr/>
+        </p:nvPicPr>
+        <p:blipFill>
+          <a:blip r:embed="rId3">
+            <a:extLst>
+              <a:ext uri="{28A0092B-C50C-407E-A947-70E740481C1C}">
+                <a14:useLocalDpi xmlns:a14="http://schemas.microsoft.com/office/drawing/2010/main" val="0"/>
+              </a:ext>
+            </a:extLst>
+          </a:blip>
+          <a:stretch>
+            <a:fillRect/>
+          </a:stretch>
+        </p:blipFill>
+        <p:spPr>
+          <a:xfrm>
+            <a:off x="1252774" y="3521226"/>
+            <a:ext cx="3196307" cy="2397231"/>
+          </a:xfrm>
+          <a:prstGeom prst="rect">
+            <a:avLst/>
+          </a:prstGeom>
+        </p:spPr>
+      </p:pic>
     </p:spTree>
     <p:extLst>
       <p:ext uri="{BB962C8B-B14F-4D97-AF65-F5344CB8AC3E}">

</xml_diff>

<commit_message>
hybrid loss, 4 encoder sdf, kfold10
</commit_message>
<xml_diff>
--- a/meeting_updates/07.07.25.pptx
+++ b/meeting_updates/07.07.25.pptx
@@ -5880,6 +5880,42 @@
           </a:p>
         </p:txBody>
       </p:sp>
+      <p:pic>
+        <p:nvPicPr>
+          <p:cNvPr id="12" name="Picture 11" descr="A graph of a curve&#10;&#10;AI-generated content may be incorrect.">
+            <a:extLst>
+              <a:ext uri="{FF2B5EF4-FFF2-40B4-BE49-F238E27FC236}">
+                <a16:creationId xmlns:a16="http://schemas.microsoft.com/office/drawing/2014/main" id="{18B09439-BDB3-59FF-F583-B17D31321762}"/>
+              </a:ext>
+            </a:extLst>
+          </p:cNvPr>
+          <p:cNvPicPr>
+            <a:picLocks noChangeAspect="1"/>
+          </p:cNvPicPr>
+          <p:nvPr/>
+        </p:nvPicPr>
+        <p:blipFill>
+          <a:blip r:embed="rId3">
+            <a:extLst>
+              <a:ext uri="{28A0092B-C50C-407E-A947-70E740481C1C}">
+                <a14:useLocalDpi xmlns:a14="http://schemas.microsoft.com/office/drawing/2010/main" val="0"/>
+              </a:ext>
+            </a:extLst>
+          </a:blip>
+          <a:stretch>
+            <a:fillRect/>
+          </a:stretch>
+        </p:blipFill>
+        <p:spPr>
+          <a:xfrm>
+            <a:off x="1196598" y="3875590"/>
+            <a:ext cx="3204923" cy="2403692"/>
+          </a:xfrm>
+          <a:prstGeom prst="rect">
+            <a:avLst/>
+          </a:prstGeom>
+        </p:spPr>
+      </p:pic>
     </p:spTree>
     <p:extLst>
       <p:ext uri="{BB962C8B-B14F-4D97-AF65-F5344CB8AC3E}">
@@ -15646,6 +15682,42 @@
           </a:p>
         </p:txBody>
       </p:sp>
+      <p:pic>
+        <p:nvPicPr>
+          <p:cNvPr id="12" name="Picture 11" descr="A graph of a curve&#10;&#10;AI-generated content may be incorrect.">
+            <a:extLst>
+              <a:ext uri="{FF2B5EF4-FFF2-40B4-BE49-F238E27FC236}">
+                <a16:creationId xmlns:a16="http://schemas.microsoft.com/office/drawing/2014/main" id="{BC488883-309E-0436-8506-2CE1D2AB4C87}"/>
+              </a:ext>
+            </a:extLst>
+          </p:cNvPr>
+          <p:cNvPicPr>
+            <a:picLocks noChangeAspect="1"/>
+          </p:cNvPicPr>
+          <p:nvPr/>
+        </p:nvPicPr>
+        <p:blipFill>
+          <a:blip r:embed="rId3">
+            <a:extLst>
+              <a:ext uri="{28A0092B-C50C-407E-A947-70E740481C1C}">
+                <a14:useLocalDpi xmlns:a14="http://schemas.microsoft.com/office/drawing/2010/main" val="0"/>
+              </a:ext>
+            </a:extLst>
+          </a:blip>
+          <a:stretch>
+            <a:fillRect/>
+          </a:stretch>
+        </p:blipFill>
+        <p:spPr>
+          <a:xfrm>
+            <a:off x="1316934" y="3903139"/>
+            <a:ext cx="3357370" cy="2518028"/>
+          </a:xfrm>
+          <a:prstGeom prst="rect">
+            <a:avLst/>
+          </a:prstGeom>
+        </p:spPr>
+      </p:pic>
     </p:spTree>
     <p:extLst>
       <p:ext uri="{BB962C8B-B14F-4D97-AF65-F5344CB8AC3E}">

</xml_diff>

<commit_message>
updated pptx next experiment with the base models
</commit_message>
<xml_diff>
--- a/meeting_updates/07.07.25.pptx
+++ b/meeting_updates/07.07.25.pptx
@@ -269,7 +269,7 @@
           <a:p>
             <a:fld id="{27AD023B-DDDA-446C-B96B-9ECDFF117D91}" type="datetimeFigureOut">
               <a:rPr lang="en-US" smtClean="0"/>
-              <a:t>7/5/2025</a:t>
+              <a:t>7/6/2025</a:t>
             </a:fld>
             <a:endParaRPr lang="en-US"/>
           </a:p>
@@ -467,7 +467,7 @@
           <a:p>
             <a:fld id="{27AD023B-DDDA-446C-B96B-9ECDFF117D91}" type="datetimeFigureOut">
               <a:rPr lang="en-US" smtClean="0"/>
-              <a:t>7/5/2025</a:t>
+              <a:t>7/6/2025</a:t>
             </a:fld>
             <a:endParaRPr lang="en-US"/>
           </a:p>
@@ -675,7 +675,7 @@
           <a:p>
             <a:fld id="{27AD023B-DDDA-446C-B96B-9ECDFF117D91}" type="datetimeFigureOut">
               <a:rPr lang="en-US" smtClean="0"/>
-              <a:t>7/5/2025</a:t>
+              <a:t>7/6/2025</a:t>
             </a:fld>
             <a:endParaRPr lang="en-US"/>
           </a:p>
@@ -873,7 +873,7 @@
           <a:p>
             <a:fld id="{27AD023B-DDDA-446C-B96B-9ECDFF117D91}" type="datetimeFigureOut">
               <a:rPr lang="en-US" smtClean="0"/>
-              <a:t>7/5/2025</a:t>
+              <a:t>7/6/2025</a:t>
             </a:fld>
             <a:endParaRPr lang="en-US"/>
           </a:p>
@@ -1148,7 +1148,7 @@
           <a:p>
             <a:fld id="{27AD023B-DDDA-446C-B96B-9ECDFF117D91}" type="datetimeFigureOut">
               <a:rPr lang="en-US" smtClean="0"/>
-              <a:t>7/5/2025</a:t>
+              <a:t>7/6/2025</a:t>
             </a:fld>
             <a:endParaRPr lang="en-US"/>
           </a:p>
@@ -1413,7 +1413,7 @@
           <a:p>
             <a:fld id="{27AD023B-DDDA-446C-B96B-9ECDFF117D91}" type="datetimeFigureOut">
               <a:rPr lang="en-US" smtClean="0"/>
-              <a:t>7/5/2025</a:t>
+              <a:t>7/6/2025</a:t>
             </a:fld>
             <a:endParaRPr lang="en-US"/>
           </a:p>
@@ -1825,7 +1825,7 @@
           <a:p>
             <a:fld id="{27AD023B-DDDA-446C-B96B-9ECDFF117D91}" type="datetimeFigureOut">
               <a:rPr lang="en-US" smtClean="0"/>
-              <a:t>7/5/2025</a:t>
+              <a:t>7/6/2025</a:t>
             </a:fld>
             <a:endParaRPr lang="en-US"/>
           </a:p>
@@ -1966,7 +1966,7 @@
           <a:p>
             <a:fld id="{27AD023B-DDDA-446C-B96B-9ECDFF117D91}" type="datetimeFigureOut">
               <a:rPr lang="en-US" smtClean="0"/>
-              <a:t>7/5/2025</a:t>
+              <a:t>7/6/2025</a:t>
             </a:fld>
             <a:endParaRPr lang="en-US"/>
           </a:p>
@@ -2079,7 +2079,7 @@
           <a:p>
             <a:fld id="{27AD023B-DDDA-446C-B96B-9ECDFF117D91}" type="datetimeFigureOut">
               <a:rPr lang="en-US" smtClean="0"/>
-              <a:t>7/5/2025</a:t>
+              <a:t>7/6/2025</a:t>
             </a:fld>
             <a:endParaRPr lang="en-US"/>
           </a:p>
@@ -2390,7 +2390,7 @@
           <a:p>
             <a:fld id="{27AD023B-DDDA-446C-B96B-9ECDFF117D91}" type="datetimeFigureOut">
               <a:rPr lang="en-US" smtClean="0"/>
-              <a:t>7/5/2025</a:t>
+              <a:t>7/6/2025</a:t>
             </a:fld>
             <a:endParaRPr lang="en-US"/>
           </a:p>
@@ -2678,7 +2678,7 @@
           <a:p>
             <a:fld id="{27AD023B-DDDA-446C-B96B-9ECDFF117D91}" type="datetimeFigureOut">
               <a:rPr lang="en-US" smtClean="0"/>
-              <a:t>7/5/2025</a:t>
+              <a:t>7/6/2025</a:t>
             </a:fld>
             <a:endParaRPr lang="en-US"/>
           </a:p>
@@ -2919,7 +2919,7 @@
           <a:p>
             <a:fld id="{27AD023B-DDDA-446C-B96B-9ECDFF117D91}" type="datetimeFigureOut">
               <a:rPr lang="en-US" smtClean="0"/>
-              <a:t>7/5/2025</a:t>
+              <a:t>7/6/2025</a:t>
             </a:fld>
             <a:endParaRPr lang="en-US"/>
           </a:p>
@@ -4907,8 +4907,8 @@
         </p:nvSpPr>
         <p:spPr>
           <a:xfrm>
-            <a:off x="1153959" y="6339221"/>
-            <a:ext cx="3442906" cy="369332"/>
+            <a:off x="162090" y="6382866"/>
+            <a:ext cx="5781510" cy="369332"/>
           </a:xfrm>
           <a:prstGeom prst="rect">
             <a:avLst/>
@@ -4924,7 +4924,7 @@
             <a:pPr algn="ctr"/>
             <a:r>
               <a:rPr lang="en-US" dirty="0"/>
-              <a:t>Test Result on 5 fold models</a:t>
+              <a:t>Test Result on 5 fold models and 10 Fold Models</a:t>
             </a:r>
           </a:p>
         </p:txBody>
@@ -5908,8 +5908,44 @@
         </p:blipFill>
         <p:spPr>
           <a:xfrm>
-            <a:off x="1196598" y="3875590"/>
+            <a:off x="259269" y="3879199"/>
             <a:ext cx="3204923" cy="2403692"/>
+          </a:xfrm>
+          <a:prstGeom prst="rect">
+            <a:avLst/>
+          </a:prstGeom>
+        </p:spPr>
+      </p:pic>
+      <p:pic>
+        <p:nvPicPr>
+          <p:cNvPr id="15" name="Picture 14" descr="A graph with different colored lines&#10;&#10;AI-generated content may be incorrect.">
+            <a:extLst>
+              <a:ext uri="{FF2B5EF4-FFF2-40B4-BE49-F238E27FC236}">
+                <a16:creationId xmlns:a16="http://schemas.microsoft.com/office/drawing/2014/main" id="{C7676100-E557-3409-49D1-01DB5C54F8B2}"/>
+              </a:ext>
+            </a:extLst>
+          </p:cNvPr>
+          <p:cNvPicPr>
+            <a:picLocks noChangeAspect="1"/>
+          </p:cNvPicPr>
+          <p:nvPr/>
+        </p:nvPicPr>
+        <p:blipFill>
+          <a:blip r:embed="rId4">
+            <a:extLst>
+              <a:ext uri="{28A0092B-C50C-407E-A947-70E740481C1C}">
+                <a14:useLocalDpi xmlns:a14="http://schemas.microsoft.com/office/drawing/2010/main" val="0"/>
+              </a:ext>
+            </a:extLst>
+          </a:blip>
+          <a:stretch>
+            <a:fillRect/>
+          </a:stretch>
+        </p:blipFill>
+        <p:spPr>
+          <a:xfrm>
+            <a:off x="3161395" y="3943722"/>
+            <a:ext cx="3118892" cy="2339169"/>
           </a:xfrm>
           <a:prstGeom prst="rect">
             <a:avLst/>

</xml_diff>

<commit_message>
inception and hybrid loss
</commit_message>
<xml_diff>
--- a/meeting_updates/07.07.25.pptx
+++ b/meeting_updates/07.07.25.pptx
@@ -5,18 +5,19 @@
     <p:sldMasterId id="2147483648" r:id="rId1"/>
   </p:sldMasterIdLst>
   <p:sldIdLst>
-    <p:sldId id="278" r:id="rId2"/>
-    <p:sldId id="277" r:id="rId3"/>
-    <p:sldId id="276" r:id="rId4"/>
-    <p:sldId id="288" r:id="rId5"/>
-    <p:sldId id="280" r:id="rId6"/>
-    <p:sldId id="281" r:id="rId7"/>
-    <p:sldId id="282" r:id="rId8"/>
-    <p:sldId id="283" r:id="rId9"/>
-    <p:sldId id="285" r:id="rId10"/>
-    <p:sldId id="286" r:id="rId11"/>
-    <p:sldId id="287" r:id="rId12"/>
-    <p:sldId id="284" r:id="rId13"/>
+    <p:sldId id="289" r:id="rId2"/>
+    <p:sldId id="278" r:id="rId3"/>
+    <p:sldId id="277" r:id="rId4"/>
+    <p:sldId id="276" r:id="rId5"/>
+    <p:sldId id="288" r:id="rId6"/>
+    <p:sldId id="280" r:id="rId7"/>
+    <p:sldId id="281" r:id="rId8"/>
+    <p:sldId id="282" r:id="rId9"/>
+    <p:sldId id="283" r:id="rId10"/>
+    <p:sldId id="285" r:id="rId11"/>
+    <p:sldId id="286" r:id="rId12"/>
+    <p:sldId id="287" r:id="rId13"/>
+    <p:sldId id="284" r:id="rId14"/>
   </p:sldIdLst>
   <p:sldSz cx="12192000" cy="6858000"/>
   <p:notesSz cx="6858000" cy="9144000"/>
@@ -270,7 +271,7 @@
           <a:p>
             <a:fld id="{27AD023B-DDDA-446C-B96B-9ECDFF117D91}" type="datetimeFigureOut">
               <a:rPr lang="en-US" smtClean="0"/>
-              <a:t>7/6/2025</a:t>
+              <a:t>7/7/2025</a:t>
             </a:fld>
             <a:endParaRPr lang="en-US"/>
           </a:p>
@@ -468,7 +469,7 @@
           <a:p>
             <a:fld id="{27AD023B-DDDA-446C-B96B-9ECDFF117D91}" type="datetimeFigureOut">
               <a:rPr lang="en-US" smtClean="0"/>
-              <a:t>7/6/2025</a:t>
+              <a:t>7/7/2025</a:t>
             </a:fld>
             <a:endParaRPr lang="en-US"/>
           </a:p>
@@ -676,7 +677,7 @@
           <a:p>
             <a:fld id="{27AD023B-DDDA-446C-B96B-9ECDFF117D91}" type="datetimeFigureOut">
               <a:rPr lang="en-US" smtClean="0"/>
-              <a:t>7/6/2025</a:t>
+              <a:t>7/7/2025</a:t>
             </a:fld>
             <a:endParaRPr lang="en-US"/>
           </a:p>
@@ -874,7 +875,7 @@
           <a:p>
             <a:fld id="{27AD023B-DDDA-446C-B96B-9ECDFF117D91}" type="datetimeFigureOut">
               <a:rPr lang="en-US" smtClean="0"/>
-              <a:t>7/6/2025</a:t>
+              <a:t>7/7/2025</a:t>
             </a:fld>
             <a:endParaRPr lang="en-US"/>
           </a:p>
@@ -1149,7 +1150,7 @@
           <a:p>
             <a:fld id="{27AD023B-DDDA-446C-B96B-9ECDFF117D91}" type="datetimeFigureOut">
               <a:rPr lang="en-US" smtClean="0"/>
-              <a:t>7/6/2025</a:t>
+              <a:t>7/7/2025</a:t>
             </a:fld>
             <a:endParaRPr lang="en-US"/>
           </a:p>
@@ -1414,7 +1415,7 @@
           <a:p>
             <a:fld id="{27AD023B-DDDA-446C-B96B-9ECDFF117D91}" type="datetimeFigureOut">
               <a:rPr lang="en-US" smtClean="0"/>
-              <a:t>7/6/2025</a:t>
+              <a:t>7/7/2025</a:t>
             </a:fld>
             <a:endParaRPr lang="en-US"/>
           </a:p>
@@ -1826,7 +1827,7 @@
           <a:p>
             <a:fld id="{27AD023B-DDDA-446C-B96B-9ECDFF117D91}" type="datetimeFigureOut">
               <a:rPr lang="en-US" smtClean="0"/>
-              <a:t>7/6/2025</a:t>
+              <a:t>7/7/2025</a:t>
             </a:fld>
             <a:endParaRPr lang="en-US"/>
           </a:p>
@@ -1967,7 +1968,7 @@
           <a:p>
             <a:fld id="{27AD023B-DDDA-446C-B96B-9ECDFF117D91}" type="datetimeFigureOut">
               <a:rPr lang="en-US" smtClean="0"/>
-              <a:t>7/6/2025</a:t>
+              <a:t>7/7/2025</a:t>
             </a:fld>
             <a:endParaRPr lang="en-US"/>
           </a:p>
@@ -2080,7 +2081,7 @@
           <a:p>
             <a:fld id="{27AD023B-DDDA-446C-B96B-9ECDFF117D91}" type="datetimeFigureOut">
               <a:rPr lang="en-US" smtClean="0"/>
-              <a:t>7/6/2025</a:t>
+              <a:t>7/7/2025</a:t>
             </a:fld>
             <a:endParaRPr lang="en-US"/>
           </a:p>
@@ -2391,7 +2392,7 @@
           <a:p>
             <a:fld id="{27AD023B-DDDA-446C-B96B-9ECDFF117D91}" type="datetimeFigureOut">
               <a:rPr lang="en-US" smtClean="0"/>
-              <a:t>7/6/2025</a:t>
+              <a:t>7/7/2025</a:t>
             </a:fld>
             <a:endParaRPr lang="en-US"/>
           </a:p>
@@ -2679,7 +2680,7 @@
           <a:p>
             <a:fld id="{27AD023B-DDDA-446C-B96B-9ECDFF117D91}" type="datetimeFigureOut">
               <a:rPr lang="en-US" smtClean="0"/>
-              <a:t>7/6/2025</a:t>
+              <a:t>7/7/2025</a:t>
             </a:fld>
             <a:endParaRPr lang="en-US"/>
           </a:p>
@@ -2920,7 +2921,7 @@
           <a:p>
             <a:fld id="{27AD023B-DDDA-446C-B96B-9ECDFF117D91}" type="datetimeFigureOut">
               <a:rPr lang="en-US" smtClean="0"/>
-              <a:t>7/6/2025</a:t>
+              <a:t>7/7/2025</a:t>
             </a:fld>
             <a:endParaRPr lang="en-US"/>
           </a:p>
@@ -3325,10 +3326,230 @@
   <p:cSld>
     <p:spTree>
       <p:nvGrpSpPr>
+        <p:cNvPr id="1" name=""/>
+        <p:cNvGrpSpPr/>
+        <p:nvPr/>
+      </p:nvGrpSpPr>
+      <p:grpSpPr>
+        <a:xfrm>
+          <a:off x="0" y="0"/>
+          <a:ext cx="0" cy="0"/>
+          <a:chOff x="0" y="0"/>
+          <a:chExt cx="0" cy="0"/>
+        </a:xfrm>
+      </p:grpSpPr>
+      <p:graphicFrame>
+        <p:nvGraphicFramePr>
+          <p:cNvPr id="2" name="Table 1">
+            <a:extLst>
+              <a:ext uri="{FF2B5EF4-FFF2-40B4-BE49-F238E27FC236}">
+                <a16:creationId xmlns:a16="http://schemas.microsoft.com/office/drawing/2014/main" id="{BAC284CF-234C-4E00-A29B-6104AC190D19}"/>
+              </a:ext>
+            </a:extLst>
+          </p:cNvPr>
+          <p:cNvGraphicFramePr>
+            <a:graphicFrameLocks noGrp="1"/>
+          </p:cNvGraphicFramePr>
+          <p:nvPr>
+            <p:extLst>
+              <p:ext uri="{D42A27DB-BD31-4B8C-83A1-F6EECF244321}">
+                <p14:modId xmlns:p14="http://schemas.microsoft.com/office/powerpoint/2010/main" val="1228288310"/>
+              </p:ext>
+            </p:extLst>
+          </p:nvPr>
+        </p:nvGraphicFramePr>
+        <p:xfrm>
+          <a:off x="2032000" y="719666"/>
+          <a:ext cx="8127999" cy="1112520"/>
+        </p:xfrm>
+        <a:graphic>
+          <a:graphicData uri="http://schemas.openxmlformats.org/drawingml/2006/table">
+            <a:tbl>
+              <a:tblPr firstRow="1" bandRow="1">
+                <a:tableStyleId>{5C22544A-7EE6-4342-B048-85BDC9FD1C3A}</a:tableStyleId>
+              </a:tblPr>
+              <a:tblGrid>
+                <a:gridCol w="2709333">
+                  <a:extLst>
+                    <a:ext uri="{9D8B030D-6E8A-4147-A177-3AD203B41FA5}">
+                      <a16:colId xmlns:a16="http://schemas.microsoft.com/office/drawing/2014/main" val="1034557421"/>
+                    </a:ext>
+                  </a:extLst>
+                </a:gridCol>
+                <a:gridCol w="2709333">
+                  <a:extLst>
+                    <a:ext uri="{9D8B030D-6E8A-4147-A177-3AD203B41FA5}">
+                      <a16:colId xmlns:a16="http://schemas.microsoft.com/office/drawing/2014/main" val="614273410"/>
+                    </a:ext>
+                  </a:extLst>
+                </a:gridCol>
+                <a:gridCol w="2709333">
+                  <a:extLst>
+                    <a:ext uri="{9D8B030D-6E8A-4147-A177-3AD203B41FA5}">
+                      <a16:colId xmlns:a16="http://schemas.microsoft.com/office/drawing/2014/main" val="2540101904"/>
+                    </a:ext>
+                  </a:extLst>
+                </a:gridCol>
+              </a:tblGrid>
+              <a:tr h="370840">
+                <a:tc>
+                  <a:txBody>
+                    <a:bodyPr/>
+                    <a:lstStyle/>
+                    <a:p>
+                      <a:r>
+                        <a:rPr lang="en-US" dirty="0"/>
+                        <a:t>Model</a:t>
+                      </a:r>
+                    </a:p>
+                  </a:txBody>
+                  <a:tcPr/>
+                </a:tc>
+                <a:tc>
+                  <a:txBody>
+                    <a:bodyPr/>
+                    <a:lstStyle/>
+                    <a:p>
+                      <a:r>
+                        <a:rPr lang="en-US" dirty="0"/>
+                        <a:t>Loss Functions</a:t>
+                      </a:r>
+                    </a:p>
+                  </a:txBody>
+                  <a:tcPr/>
+                </a:tc>
+                <a:tc>
+                  <a:txBody>
+                    <a:bodyPr/>
+                    <a:lstStyle/>
+                    <a:p>
+                      <a:r>
+                        <a:rPr lang="en-US" dirty="0"/>
+                        <a:t>AUC</a:t>
+                      </a:r>
+                    </a:p>
+                  </a:txBody>
+                  <a:tcPr/>
+                </a:tc>
+                <a:extLst>
+                  <a:ext uri="{0D108BD9-81ED-4DB2-BD59-A6C34878D82A}">
+                    <a16:rowId xmlns:a16="http://schemas.microsoft.com/office/drawing/2014/main" val="2504948523"/>
+                  </a:ext>
+                </a:extLst>
+              </a:tr>
+              <a:tr h="370840">
+                <a:tc>
+                  <a:txBody>
+                    <a:bodyPr/>
+                    <a:lstStyle/>
+                    <a:p>
+                      <a:r>
+                        <a:rPr lang="en-US" dirty="0" err="1"/>
+                        <a:t>Densenet</a:t>
+                      </a:r>
+                      <a:endParaRPr lang="en-US" dirty="0"/>
+                    </a:p>
+                  </a:txBody>
+                  <a:tcPr/>
+                </a:tc>
+                <a:tc>
+                  <a:txBody>
+                    <a:bodyPr/>
+                    <a:lstStyle/>
+                    <a:p>
+                      <a:r>
+                        <a:rPr lang="en-US" dirty="0"/>
+                        <a:t>Asymmetric + Focal </a:t>
+                      </a:r>
+                    </a:p>
+                  </a:txBody>
+                  <a:tcPr/>
+                </a:tc>
+                <a:tc>
+                  <a:txBody>
+                    <a:bodyPr/>
+                    <a:lstStyle/>
+                    <a:p>
+                      <a:r>
+                        <a:rPr lang="en-US" dirty="0"/>
+                        <a:t>0.60</a:t>
+                      </a:r>
+                    </a:p>
+                  </a:txBody>
+                  <a:tcPr/>
+                </a:tc>
+                <a:extLst>
+                  <a:ext uri="{0D108BD9-81ED-4DB2-BD59-A6C34878D82A}">
+                    <a16:rowId xmlns:a16="http://schemas.microsoft.com/office/drawing/2014/main" val="2980389516"/>
+                  </a:ext>
+                </a:extLst>
+              </a:tr>
+              <a:tr h="370840">
+                <a:tc>
+                  <a:txBody>
+                    <a:bodyPr/>
+                    <a:lstStyle/>
+                    <a:p>
+                      <a:r>
+                        <a:rPr lang="en-US" dirty="0"/>
+                        <a:t>Resnet50</a:t>
+                      </a:r>
+                    </a:p>
+                  </a:txBody>
+                  <a:tcPr/>
+                </a:tc>
+                <a:tc>
+                  <a:txBody>
+                    <a:bodyPr/>
+                    <a:lstStyle/>
+                    <a:p>
+                      <a:endParaRPr lang="en-US" dirty="0"/>
+                    </a:p>
+                  </a:txBody>
+                  <a:tcPr/>
+                </a:tc>
+                <a:tc>
+                  <a:txBody>
+                    <a:bodyPr/>
+                    <a:lstStyle/>
+                    <a:p>
+                      <a:endParaRPr lang="en-US" dirty="0"/>
+                    </a:p>
+                  </a:txBody>
+                  <a:tcPr/>
+                </a:tc>
+                <a:extLst>
+                  <a:ext uri="{0D108BD9-81ED-4DB2-BD59-A6C34878D82A}">
+                    <a16:rowId xmlns:a16="http://schemas.microsoft.com/office/drawing/2014/main" val="1423515265"/>
+                  </a:ext>
+                </a:extLst>
+              </a:tr>
+            </a:tbl>
+          </a:graphicData>
+        </a:graphic>
+      </p:graphicFrame>
+    </p:spTree>
+    <p:extLst>
+      <p:ext uri="{BB962C8B-B14F-4D97-AF65-F5344CB8AC3E}">
+        <p14:creationId xmlns:p14="http://schemas.microsoft.com/office/powerpoint/2010/main" val="2206882170"/>
+      </p:ext>
+    </p:extLst>
+  </p:cSld>
+  <p:clrMapOvr>
+    <a:masterClrMapping/>
+  </p:clrMapOvr>
+</p:sld>
+</file>
+
+<file path=ppt/slides/slide10.xml><?xml version="1.0" encoding="utf-8"?>
+<p:sld xmlns:a="http://schemas.openxmlformats.org/drawingml/2006/main" xmlns:r="http://schemas.openxmlformats.org/officeDocument/2006/relationships" xmlns:p="http://schemas.openxmlformats.org/presentationml/2006/main">
+  <p:cSld>
+    <p:spTree>
+      <p:nvGrpSpPr>
         <p:cNvPr id="1" name="">
           <a:extLst>
             <a:ext uri="{FF2B5EF4-FFF2-40B4-BE49-F238E27FC236}">
-              <a16:creationId xmlns:a16="http://schemas.microsoft.com/office/drawing/2014/main" id="{82192579-53EA-3844-A5B9-E024885DE246}"/>
+              <a16:creationId xmlns:a16="http://schemas.microsoft.com/office/drawing/2014/main" id="{C725422C-9033-95CD-CFFB-AD12ABC5F95F}"/>
             </a:ext>
           </a:extLst>
         </p:cNvPr>
@@ -3345,10 +3566,56 @@
       </p:grpSpPr>
       <p:sp>
         <p:nvSpPr>
+          <p:cNvPr id="49" name="Flowchart: Manual Operation 48">
+            <a:extLst>
+              <a:ext uri="{FF2B5EF4-FFF2-40B4-BE49-F238E27FC236}">
+                <a16:creationId xmlns:a16="http://schemas.microsoft.com/office/drawing/2014/main" id="{0BB9B428-A661-2B2E-6B69-EEEEC9AA5086}"/>
+              </a:ext>
+            </a:extLst>
+          </p:cNvPr>
+          <p:cNvSpPr/>
+          <p:nvPr/>
+        </p:nvSpPr>
+        <p:spPr>
+          <a:xfrm rot="16200000">
+            <a:off x="7331960" y="3398895"/>
+            <a:ext cx="1234440" cy="1536192"/>
+          </a:xfrm>
+          <a:prstGeom prst="flowChartManualOperation">
+            <a:avLst/>
+          </a:prstGeom>
+        </p:spPr>
+        <p:style>
+          <a:lnRef idx="2">
+            <a:schemeClr val="accent1">
+              <a:shade val="15000"/>
+            </a:schemeClr>
+          </a:lnRef>
+          <a:fillRef idx="1">
+            <a:schemeClr val="accent1"/>
+          </a:fillRef>
+          <a:effectRef idx="0">
+            <a:schemeClr val="accent1"/>
+          </a:effectRef>
+          <a:fontRef idx="minor">
+            <a:schemeClr val="lt1"/>
+          </a:fontRef>
+        </p:style>
+        <p:txBody>
+          <a:bodyPr rtlCol="0" anchor="ctr"/>
+          <a:lstStyle/>
+          <a:p>
+            <a:pPr algn="ctr"/>
+            <a:endParaRPr lang="en-US" dirty="0"/>
+          </a:p>
+        </p:txBody>
+      </p:sp>
+      <p:sp>
+        <p:nvSpPr>
           <p:cNvPr id="2" name="TextBox 1">
             <a:extLst>
               <a:ext uri="{FF2B5EF4-FFF2-40B4-BE49-F238E27FC236}">
-                <a16:creationId xmlns:a16="http://schemas.microsoft.com/office/drawing/2014/main" id="{9A0F9B53-88A1-74B5-2F20-A14DEC41F9E1}"/>
+                <a16:creationId xmlns:a16="http://schemas.microsoft.com/office/drawing/2014/main" id="{8902DA50-BEE2-3646-12C9-9817174B6171}"/>
               </a:ext>
             </a:extLst>
           </p:cNvPr>
@@ -3357,7 +3624,7 @@
         </p:nvSpPr>
         <p:spPr>
           <a:xfrm>
-            <a:off x="1234440" y="722376"/>
+            <a:off x="797050" y="714205"/>
             <a:ext cx="2688336" cy="369332"/>
           </a:xfrm>
           <a:prstGeom prst="rect">
@@ -3373,7 +3640,7 @@
           <a:p>
             <a:r>
               <a:rPr lang="en-US" dirty="0"/>
-              <a:t>Experiment 0: </a:t>
+              <a:t>Experiment 4.1: </a:t>
             </a:r>
           </a:p>
         </p:txBody>
@@ -3383,7 +3650,7 @@
           <p:cNvPr id="3" name="TextBox 2">
             <a:extLst>
               <a:ext uri="{FF2B5EF4-FFF2-40B4-BE49-F238E27FC236}">
-                <a16:creationId xmlns:a16="http://schemas.microsoft.com/office/drawing/2014/main" id="{0FA8D6C2-7854-45EC-C95D-3D9DA78EB3CC}"/>
+                <a16:creationId xmlns:a16="http://schemas.microsoft.com/office/drawing/2014/main" id="{103F1B06-B3C8-057B-0821-DE4729575764}"/>
               </a:ext>
             </a:extLst>
           </p:cNvPr>
@@ -3392,8 +3659,8 @@
         </p:nvSpPr>
         <p:spPr>
           <a:xfrm>
-            <a:off x="1325880" y="1335024"/>
-            <a:ext cx="5513832" cy="1477328"/>
+            <a:off x="858201" y="914425"/>
+            <a:ext cx="4502277" cy="3416320"/>
           </a:xfrm>
           <a:prstGeom prst="rect">
             <a:avLst/>
@@ -3405,12 +3672,6 @@
             <a:spAutoFit/>
           </a:bodyPr>
           <a:lstStyle/>
-          <a:p>
-            <a:r>
-              <a:rPr lang="en-US" dirty="0"/>
-              <a:t>Details: </a:t>
-            </a:r>
-          </a:p>
           <a:p>
             <a:endParaRPr lang="en-US" dirty="0"/>
           </a:p>
@@ -3432,6 +3693,74 @@
             <a:r>
               <a:rPr lang="en-US" dirty="0"/>
               <a:t>Classification Based on US Image Only</a:t>
+            </a:r>
+          </a:p>
+          <a:p>
+            <a:pPr marL="285750" indent="-285750">
+              <a:buFont typeface="Arial" panose="020B0604020202020204" pitchFamily="34" charset="0"/>
+              <a:buChar char="•"/>
+            </a:pPr>
+            <a:r>
+              <a:rPr lang="en-US" dirty="0"/>
+              <a:t>4 separate encoder with different types of US input </a:t>
+            </a:r>
+          </a:p>
+          <a:p>
+            <a:pPr marL="285750" indent="-285750">
+              <a:buFont typeface="Arial" panose="020B0604020202020204" pitchFamily="34" charset="0"/>
+              <a:buChar char="•"/>
+            </a:pPr>
+            <a:r>
+              <a:rPr lang="en-US" dirty="0"/>
+              <a:t>Linear layer weighted score</a:t>
+            </a:r>
+          </a:p>
+          <a:p>
+            <a:pPr marL="285750" indent="-285750">
+              <a:buFont typeface="Arial" panose="020B0604020202020204" pitchFamily="34" charset="0"/>
+              <a:buChar char="•"/>
+            </a:pPr>
+            <a:r>
+              <a:rPr lang="en-US" dirty="0" err="1"/>
+              <a:t>BCEWithLogits</a:t>
+            </a:r>
+            <a:r>
+              <a:rPr lang="en-US" dirty="0"/>
+              <a:t> Loss</a:t>
+            </a:r>
+          </a:p>
+          <a:p>
+            <a:pPr marL="285750" indent="-285750">
+              <a:buFont typeface="Arial" panose="020B0604020202020204" pitchFamily="34" charset="0"/>
+              <a:buChar char="•"/>
+            </a:pPr>
+            <a:r>
+              <a:rPr lang="en-US" dirty="0" err="1"/>
+              <a:t>Testset</a:t>
+            </a:r>
+            <a:r>
+              <a:rPr lang="en-US" dirty="0"/>
+              <a:t> on 120 to 143 Patient IDs:</a:t>
+            </a:r>
+          </a:p>
+          <a:p>
+            <a:pPr marL="742950" lvl="1" indent="-285750">
+              <a:buFont typeface="Arial" panose="020B0604020202020204" pitchFamily="34" charset="0"/>
+              <a:buChar char="•"/>
+            </a:pPr>
+            <a:r>
+              <a:rPr lang="en-US" dirty="0"/>
+              <a:t>Total images 82</a:t>
+            </a:r>
+          </a:p>
+          <a:p>
+            <a:pPr marL="742950" lvl="1" indent="-285750">
+              <a:buFont typeface="Arial" panose="020B0604020202020204" pitchFamily="34" charset="0"/>
+              <a:buChar char="•"/>
+            </a:pPr>
+            <a:r>
+              <a:rPr lang="en-US" dirty="0"/>
+              <a:t>Malignant 35, Benign 47</a:t>
             </a:r>
           </a:p>
           <a:p>
@@ -3441,6 +3770,13 @@
             </a:pPr>
             <a:endParaRPr lang="en-US" dirty="0"/>
           </a:p>
+          <a:p>
+            <a:pPr marL="285750" indent="-285750">
+              <a:buFont typeface="Arial" panose="020B0604020202020204" pitchFamily="34" charset="0"/>
+              <a:buChar char="•"/>
+            </a:pPr>
+            <a:endParaRPr lang="en-US" dirty="0"/>
+          </a:p>
         </p:txBody>
       </p:sp>
       <p:sp>
@@ -3448,7 +3784,7 @@
           <p:cNvPr id="4" name="Flowchart: Manual Operation 3">
             <a:extLst>
               <a:ext uri="{FF2B5EF4-FFF2-40B4-BE49-F238E27FC236}">
-                <a16:creationId xmlns:a16="http://schemas.microsoft.com/office/drawing/2014/main" id="{7EEEEBCE-802B-F6BD-B951-E4348ECF2A14}"/>
+                <a16:creationId xmlns:a16="http://schemas.microsoft.com/office/drawing/2014/main" id="{CCBFDF2A-8A27-7CF7-F8A0-9F647BCD04A2}"/>
               </a:ext>
             </a:extLst>
           </p:cNvPr>
@@ -3457,7 +3793,7 @@
         </p:nvSpPr>
         <p:spPr>
           <a:xfrm rot="16200000">
-            <a:off x="7621524" y="2712095"/>
+            <a:off x="7339582" y="-37539"/>
             <a:ext cx="1234440" cy="1536192"/>
           </a:xfrm>
           <a:prstGeom prst="flowChartManualOperation">
@@ -3491,10 +3827,10 @@
       </p:sp>
       <p:sp>
         <p:nvSpPr>
-          <p:cNvPr id="6" name="Rectangle 5">
-            <a:extLst>
-              <a:ext uri="{FF2B5EF4-FFF2-40B4-BE49-F238E27FC236}">
-                <a16:creationId xmlns:a16="http://schemas.microsoft.com/office/drawing/2014/main" id="{E7D6AA3B-2B0E-FEA6-3B09-6DDDBB02DFE3}"/>
+          <p:cNvPr id="5" name="Flowchart: Manual Operation 4">
+            <a:extLst>
+              <a:ext uri="{FF2B5EF4-FFF2-40B4-BE49-F238E27FC236}">
+                <a16:creationId xmlns:a16="http://schemas.microsoft.com/office/drawing/2014/main" id="{ACE199C5-3769-70CE-9456-1B96C36D86EB}"/>
               </a:ext>
             </a:extLst>
           </p:cNvPr>
@@ -3502,11 +3838,11 @@
           <p:nvPr/>
         </p:nvSpPr>
         <p:spPr>
-          <a:xfrm>
-            <a:off x="9496044" y="3073283"/>
-            <a:ext cx="612648" cy="813816"/>
-          </a:xfrm>
-          <a:prstGeom prst="rect">
+          <a:xfrm rot="16200000">
+            <a:off x="7339582" y="1777545"/>
+            <a:ext cx="1234440" cy="1536192"/>
+          </a:xfrm>
+          <a:prstGeom prst="flowChartManualOperation">
             <a:avLst/>
           </a:prstGeom>
         </p:spPr>
@@ -3531,19 +3867,16 @@
           <a:lstStyle/>
           <a:p>
             <a:pPr algn="ctr"/>
-            <a:r>
-              <a:rPr lang="en-US" sz="1000" dirty="0"/>
-              <a:t>FC Layer</a:t>
-            </a:r>
-          </a:p>
-        </p:txBody>
-      </p:sp>
-      <p:sp>
-        <p:nvSpPr>
-          <p:cNvPr id="8" name="Oval 7">
-            <a:extLst>
-              <a:ext uri="{FF2B5EF4-FFF2-40B4-BE49-F238E27FC236}">
-                <a16:creationId xmlns:a16="http://schemas.microsoft.com/office/drawing/2014/main" id="{954107C6-7068-606E-847C-53570AC9B82D}"/>
+            <a:endParaRPr lang="en-US"/>
+          </a:p>
+        </p:txBody>
+      </p:sp>
+      <p:sp>
+        <p:nvSpPr>
+          <p:cNvPr id="6" name="Rectangle 5">
+            <a:extLst>
+              <a:ext uri="{FF2B5EF4-FFF2-40B4-BE49-F238E27FC236}">
+                <a16:creationId xmlns:a16="http://schemas.microsoft.com/office/drawing/2014/main" id="{873FB6F0-374A-360F-7B22-D9713AFF57BE}"/>
               </a:ext>
             </a:extLst>
           </p:cNvPr>
@@ -3552,10 +3885,10 @@
         </p:nvSpPr>
         <p:spPr>
           <a:xfrm>
-            <a:off x="10735056" y="3114431"/>
-            <a:ext cx="813816" cy="731520"/>
-          </a:xfrm>
-          <a:prstGeom prst="ellipse">
+            <a:off x="9214102" y="323649"/>
+            <a:ext cx="612648" cy="813816"/>
+          </a:xfrm>
+          <a:prstGeom prst="rect">
             <a:avLst/>
           </a:prstGeom>
         </p:spPr>
@@ -3581,6 +3914,153 @@
           <a:p>
             <a:pPr algn="ctr"/>
             <a:r>
+              <a:rPr lang="en-US" sz="1000" dirty="0"/>
+              <a:t>FC Layer</a:t>
+            </a:r>
+          </a:p>
+        </p:txBody>
+      </p:sp>
+      <p:sp>
+        <p:nvSpPr>
+          <p:cNvPr id="7" name="Rectangle 6">
+            <a:extLst>
+              <a:ext uri="{FF2B5EF4-FFF2-40B4-BE49-F238E27FC236}">
+                <a16:creationId xmlns:a16="http://schemas.microsoft.com/office/drawing/2014/main" id="{F56F813D-D5C2-B1D0-4973-15D93B1492D2}"/>
+              </a:ext>
+            </a:extLst>
+          </p:cNvPr>
+          <p:cNvSpPr/>
+          <p:nvPr/>
+        </p:nvSpPr>
+        <p:spPr>
+          <a:xfrm>
+            <a:off x="9214102" y="2138733"/>
+            <a:ext cx="612648" cy="813816"/>
+          </a:xfrm>
+          <a:prstGeom prst="rect">
+            <a:avLst/>
+          </a:prstGeom>
+        </p:spPr>
+        <p:style>
+          <a:lnRef idx="2">
+            <a:schemeClr val="accent1">
+              <a:shade val="15000"/>
+            </a:schemeClr>
+          </a:lnRef>
+          <a:fillRef idx="1">
+            <a:schemeClr val="accent1"/>
+          </a:fillRef>
+          <a:effectRef idx="0">
+            <a:schemeClr val="accent1"/>
+          </a:effectRef>
+          <a:fontRef idx="minor">
+            <a:schemeClr val="lt1"/>
+          </a:fontRef>
+        </p:style>
+        <p:txBody>
+          <a:bodyPr rtlCol="0" anchor="ctr"/>
+          <a:lstStyle/>
+          <a:p>
+            <a:pPr algn="ctr"/>
+            <a:r>
+              <a:rPr lang="en-US" sz="1000" dirty="0"/>
+              <a:t>FC Layer</a:t>
+            </a:r>
+          </a:p>
+        </p:txBody>
+      </p:sp>
+      <p:sp>
+        <p:nvSpPr>
+          <p:cNvPr id="8" name="Oval 7">
+            <a:extLst>
+              <a:ext uri="{FF2B5EF4-FFF2-40B4-BE49-F238E27FC236}">
+                <a16:creationId xmlns:a16="http://schemas.microsoft.com/office/drawing/2014/main" id="{2A3A6164-4302-73B7-F51C-9A2FC7188D95}"/>
+              </a:ext>
+            </a:extLst>
+          </p:cNvPr>
+          <p:cNvSpPr/>
+          <p:nvPr/>
+        </p:nvSpPr>
+        <p:spPr>
+          <a:xfrm>
+            <a:off x="10453114" y="364797"/>
+            <a:ext cx="813816" cy="731520"/>
+          </a:xfrm>
+          <a:prstGeom prst="ellipse">
+            <a:avLst/>
+          </a:prstGeom>
+        </p:spPr>
+        <p:style>
+          <a:lnRef idx="2">
+            <a:schemeClr val="accent1">
+              <a:shade val="15000"/>
+            </a:schemeClr>
+          </a:lnRef>
+          <a:fillRef idx="1">
+            <a:schemeClr val="accent1"/>
+          </a:fillRef>
+          <a:effectRef idx="0">
+            <a:schemeClr val="accent1"/>
+          </a:effectRef>
+          <a:fontRef idx="minor">
+            <a:schemeClr val="lt1"/>
+          </a:fontRef>
+        </p:style>
+        <p:txBody>
+          <a:bodyPr rtlCol="0" anchor="ctr"/>
+          <a:lstStyle/>
+          <a:p>
+            <a:pPr algn="ctr"/>
+            <a:r>
+              <a:rPr lang="en-US" dirty="0"/>
+              <a:t>0/1</a:t>
+            </a:r>
+          </a:p>
+        </p:txBody>
+      </p:sp>
+      <p:sp>
+        <p:nvSpPr>
+          <p:cNvPr id="9" name="Oval 8">
+            <a:extLst>
+              <a:ext uri="{FF2B5EF4-FFF2-40B4-BE49-F238E27FC236}">
+                <a16:creationId xmlns:a16="http://schemas.microsoft.com/office/drawing/2014/main" id="{BB6F1CE1-75A1-B714-5102-F4EF447EE099}"/>
+              </a:ext>
+            </a:extLst>
+          </p:cNvPr>
+          <p:cNvSpPr/>
+          <p:nvPr/>
+        </p:nvSpPr>
+        <p:spPr>
+          <a:xfrm>
+            <a:off x="10425682" y="2179881"/>
+            <a:ext cx="813816" cy="731520"/>
+          </a:xfrm>
+          <a:prstGeom prst="ellipse">
+            <a:avLst/>
+          </a:prstGeom>
+        </p:spPr>
+        <p:style>
+          <a:lnRef idx="2">
+            <a:schemeClr val="accent1">
+              <a:shade val="15000"/>
+            </a:schemeClr>
+          </a:lnRef>
+          <a:fillRef idx="1">
+            <a:schemeClr val="accent1"/>
+          </a:fillRef>
+          <a:effectRef idx="0">
+            <a:schemeClr val="accent1"/>
+          </a:effectRef>
+          <a:fontRef idx="minor">
+            <a:schemeClr val="lt1"/>
+          </a:fontRef>
+        </p:style>
+        <p:txBody>
+          <a:bodyPr rtlCol="0" anchor="ctr"/>
+          <a:lstStyle/>
+          <a:p>
+            <a:pPr algn="ctr"/>
+            <a:r>
               <a:rPr lang="en-US" dirty="0"/>
               <a:t>0/1</a:t>
             </a:r>
@@ -3592,7 +4072,7 @@
           <p:cNvPr id="13" name="Picture 12" descr="An ultrasound of a baby&#10;&#10;AI-generated content may be incorrect.">
             <a:extLst>
               <a:ext uri="{FF2B5EF4-FFF2-40B4-BE49-F238E27FC236}">
-                <a16:creationId xmlns:a16="http://schemas.microsoft.com/office/drawing/2014/main" id="{AE5D36BE-6624-3E38-B85E-6875E5F68E43}"/>
+                <a16:creationId xmlns:a16="http://schemas.microsoft.com/office/drawing/2014/main" id="{36AC841C-9079-793F-08AA-507B098F7AD0}"/>
               </a:ext>
             </a:extLst>
           </p:cNvPr>
@@ -3615,7 +4095,43 @@
         </p:blipFill>
         <p:spPr>
           <a:xfrm>
-            <a:off x="5879592" y="3019205"/>
+            <a:off x="5597650" y="269571"/>
+            <a:ext cx="960120" cy="921972"/>
+          </a:xfrm>
+          <a:prstGeom prst="rect">
+            <a:avLst/>
+          </a:prstGeom>
+        </p:spPr>
+      </p:pic>
+      <p:pic>
+        <p:nvPicPr>
+          <p:cNvPr id="14" name="Picture 13" descr="An ultrasound of a baby&#10;&#10;AI-generated content may be incorrect.">
+            <a:extLst>
+              <a:ext uri="{FF2B5EF4-FFF2-40B4-BE49-F238E27FC236}">
+                <a16:creationId xmlns:a16="http://schemas.microsoft.com/office/drawing/2014/main" id="{D7910DDD-0658-3254-C83F-DDB4118AAB01}"/>
+              </a:ext>
+            </a:extLst>
+          </p:cNvPr>
+          <p:cNvPicPr>
+            <a:picLocks noChangeAspect="1"/>
+          </p:cNvPicPr>
+          <p:nvPr/>
+        </p:nvPicPr>
+        <p:blipFill>
+          <a:blip r:embed="rId2">
+            <a:extLst>
+              <a:ext uri="{28A0092B-C50C-407E-A947-70E740481C1C}">
+                <a14:useLocalDpi xmlns:a14="http://schemas.microsoft.com/office/drawing/2010/main" val="0"/>
+              </a:ext>
+            </a:extLst>
+          </a:blip>
+          <a:stretch>
+            <a:fillRect/>
+          </a:stretch>
+        </p:blipFill>
+        <p:spPr>
+          <a:xfrm>
+            <a:off x="5597650" y="2084655"/>
             <a:ext cx="960120" cy="921972"/>
           </a:xfrm>
           <a:prstGeom prst="rect">
@@ -3628,7 +4144,7 @@
           <p:cNvPr id="16" name="Straight Arrow Connector 15">
             <a:extLst>
               <a:ext uri="{FF2B5EF4-FFF2-40B4-BE49-F238E27FC236}">
-                <a16:creationId xmlns:a16="http://schemas.microsoft.com/office/drawing/2014/main" id="{FB7810E9-2813-6A7D-4077-0340A5158DEE}"/>
+                <a16:creationId xmlns:a16="http://schemas.microsoft.com/office/drawing/2014/main" id="{F1D01259-B7EC-A93E-43E3-C5791596E57D}"/>
               </a:ext>
             </a:extLst>
           </p:cNvPr>
@@ -3640,7 +4156,7 @@
         </p:nvCxnSpPr>
         <p:spPr>
           <a:xfrm>
-            <a:off x="6839712" y="3480191"/>
+            <a:off x="6557770" y="730557"/>
             <a:ext cx="630936" cy="0"/>
           </a:xfrm>
           <a:prstGeom prst="straightConnector1">
@@ -3670,7 +4186,7 @@
           <p:cNvPr id="19" name="Straight Arrow Connector 18">
             <a:extLst>
               <a:ext uri="{FF2B5EF4-FFF2-40B4-BE49-F238E27FC236}">
-                <a16:creationId xmlns:a16="http://schemas.microsoft.com/office/drawing/2014/main" id="{DBA3FF26-E795-7E70-DF6C-5765A1767210}"/>
+                <a16:creationId xmlns:a16="http://schemas.microsoft.com/office/drawing/2014/main" id="{1D087629-8469-4DC6-9E1B-37C6F4339602}"/>
               </a:ext>
             </a:extLst>
           </p:cNvPr>
@@ -3682,7 +4198,7 @@
         </p:nvCxnSpPr>
         <p:spPr>
           <a:xfrm>
-            <a:off x="9006840" y="3480191"/>
+            <a:off x="8724898" y="730557"/>
             <a:ext cx="489204" cy="0"/>
           </a:xfrm>
           <a:prstGeom prst="straightConnector1">
@@ -3712,7 +4228,7 @@
           <p:cNvPr id="21" name="Straight Arrow Connector 20">
             <a:extLst>
               <a:ext uri="{FF2B5EF4-FFF2-40B4-BE49-F238E27FC236}">
-                <a16:creationId xmlns:a16="http://schemas.microsoft.com/office/drawing/2014/main" id="{43E16731-950E-6139-72F8-B7D31EB1376E}"/>
+                <a16:creationId xmlns:a16="http://schemas.microsoft.com/office/drawing/2014/main" id="{E630FAE1-930D-C136-96FF-1733901E092C}"/>
               </a:ext>
             </a:extLst>
           </p:cNvPr>
@@ -3725,7 +4241,7 @@
         </p:nvCxnSpPr>
         <p:spPr>
           <a:xfrm>
-            <a:off x="10108692" y="3480191"/>
+            <a:off x="9826750" y="730557"/>
             <a:ext cx="626364" cy="0"/>
           </a:xfrm>
           <a:prstGeom prst="straightConnector1">
@@ -3750,12 +4266,141 @@
           </a:fontRef>
         </p:style>
       </p:cxnSp>
+      <p:cxnSp>
+        <p:nvCxnSpPr>
+          <p:cNvPr id="26" name="Straight Arrow Connector 25">
+            <a:extLst>
+              <a:ext uri="{FF2B5EF4-FFF2-40B4-BE49-F238E27FC236}">
+                <a16:creationId xmlns:a16="http://schemas.microsoft.com/office/drawing/2014/main" id="{67869632-701E-5C16-DDDB-7524CA7C8C45}"/>
+              </a:ext>
+            </a:extLst>
+          </p:cNvPr>
+          <p:cNvCxnSpPr>
+            <a:cxnSpLocks/>
+            <a:stCxn id="14" idx="3"/>
+            <a:endCxn id="5" idx="0"/>
+          </p:cNvCxnSpPr>
+          <p:nvPr/>
+        </p:nvCxnSpPr>
+        <p:spPr>
+          <a:xfrm>
+            <a:off x="6557770" y="2545641"/>
+            <a:ext cx="630936" cy="0"/>
+          </a:xfrm>
+          <a:prstGeom prst="straightConnector1">
+            <a:avLst/>
+          </a:prstGeom>
+          <a:ln>
+            <a:tailEnd type="triangle"/>
+          </a:ln>
+        </p:spPr>
+        <p:style>
+          <a:lnRef idx="2">
+            <a:schemeClr val="accent1"/>
+          </a:lnRef>
+          <a:fillRef idx="0">
+            <a:schemeClr val="accent1"/>
+          </a:fillRef>
+          <a:effectRef idx="1">
+            <a:schemeClr val="accent1"/>
+          </a:effectRef>
+          <a:fontRef idx="minor">
+            <a:schemeClr val="tx1"/>
+          </a:fontRef>
+        </p:style>
+      </p:cxnSp>
+      <p:cxnSp>
+        <p:nvCxnSpPr>
+          <p:cNvPr id="28" name="Straight Arrow Connector 27">
+            <a:extLst>
+              <a:ext uri="{FF2B5EF4-FFF2-40B4-BE49-F238E27FC236}">
+                <a16:creationId xmlns:a16="http://schemas.microsoft.com/office/drawing/2014/main" id="{990373FD-EFEB-4B43-EF34-514755277E17}"/>
+              </a:ext>
+            </a:extLst>
+          </p:cNvPr>
+          <p:cNvCxnSpPr>
+            <a:cxnSpLocks/>
+            <a:stCxn id="5" idx="2"/>
+            <a:endCxn id="7" idx="1"/>
+          </p:cNvCxnSpPr>
+          <p:nvPr/>
+        </p:nvCxnSpPr>
+        <p:spPr>
+          <a:xfrm>
+            <a:off x="8724898" y="2545641"/>
+            <a:ext cx="489204" cy="0"/>
+          </a:xfrm>
+          <a:prstGeom prst="straightConnector1">
+            <a:avLst/>
+          </a:prstGeom>
+          <a:ln>
+            <a:tailEnd type="triangle"/>
+          </a:ln>
+        </p:spPr>
+        <p:style>
+          <a:lnRef idx="2">
+            <a:schemeClr val="accent1"/>
+          </a:lnRef>
+          <a:fillRef idx="0">
+            <a:schemeClr val="accent1"/>
+          </a:fillRef>
+          <a:effectRef idx="1">
+            <a:schemeClr val="accent1"/>
+          </a:effectRef>
+          <a:fontRef idx="minor">
+            <a:schemeClr val="tx1"/>
+          </a:fontRef>
+        </p:style>
+      </p:cxnSp>
+      <p:cxnSp>
+        <p:nvCxnSpPr>
+          <p:cNvPr id="30" name="Straight Arrow Connector 29">
+            <a:extLst>
+              <a:ext uri="{FF2B5EF4-FFF2-40B4-BE49-F238E27FC236}">
+                <a16:creationId xmlns:a16="http://schemas.microsoft.com/office/drawing/2014/main" id="{D14095D3-5249-6F4D-23EC-C77F8A7BF683}"/>
+              </a:ext>
+            </a:extLst>
+          </p:cNvPr>
+          <p:cNvCxnSpPr>
+            <a:cxnSpLocks/>
+            <a:stCxn id="7" idx="3"/>
+            <a:endCxn id="9" idx="2"/>
+          </p:cNvCxnSpPr>
+          <p:nvPr/>
+        </p:nvCxnSpPr>
+        <p:spPr>
+          <a:xfrm>
+            <a:off x="9826750" y="2545641"/>
+            <a:ext cx="598932" cy="0"/>
+          </a:xfrm>
+          <a:prstGeom prst="straightConnector1">
+            <a:avLst/>
+          </a:prstGeom>
+          <a:ln>
+            <a:tailEnd type="triangle"/>
+          </a:ln>
+        </p:spPr>
+        <p:style>
+          <a:lnRef idx="2">
+            <a:schemeClr val="accent1"/>
+          </a:lnRef>
+          <a:fillRef idx="0">
+            <a:schemeClr val="accent1"/>
+          </a:fillRef>
+          <a:effectRef idx="1">
+            <a:schemeClr val="accent1"/>
+          </a:effectRef>
+          <a:fontRef idx="minor">
+            <a:schemeClr val="tx1"/>
+          </a:fontRef>
+        </p:style>
+      </p:cxnSp>
       <p:sp>
         <p:nvSpPr>
           <p:cNvPr id="32" name="TextBox 31">
             <a:extLst>
               <a:ext uri="{FF2B5EF4-FFF2-40B4-BE49-F238E27FC236}">
-                <a16:creationId xmlns:a16="http://schemas.microsoft.com/office/drawing/2014/main" id="{F24FED50-EBAD-FA5D-FE77-079A9876B14F}"/>
+                <a16:creationId xmlns:a16="http://schemas.microsoft.com/office/drawing/2014/main" id="{03E23939-4C4F-57C3-2255-B03A4000055B}"/>
               </a:ext>
             </a:extLst>
           </p:cNvPr>
@@ -3764,7 +4409,7 @@
         </p:nvSpPr>
         <p:spPr>
           <a:xfrm>
-            <a:off x="7594092" y="3280136"/>
+            <a:off x="7312150" y="530502"/>
             <a:ext cx="1106424" cy="553998"/>
           </a:xfrm>
           <a:prstGeom prst="rect">
@@ -3801,12 +4446,529 @@
           </a:p>
         </p:txBody>
       </p:sp>
+      <p:sp>
+        <p:nvSpPr>
+          <p:cNvPr id="34" name="TextBox 33">
+            <a:extLst>
+              <a:ext uri="{FF2B5EF4-FFF2-40B4-BE49-F238E27FC236}">
+                <a16:creationId xmlns:a16="http://schemas.microsoft.com/office/drawing/2014/main" id="{7147B002-7A43-B620-E72C-8922C2199D80}"/>
+              </a:ext>
+            </a:extLst>
+          </p:cNvPr>
+          <p:cNvSpPr txBox="1"/>
+          <p:nvPr/>
+        </p:nvSpPr>
+        <p:spPr>
+          <a:xfrm>
+            <a:off x="7364728" y="2345586"/>
+            <a:ext cx="1106424" cy="553998"/>
+          </a:xfrm>
+          <a:prstGeom prst="rect">
+            <a:avLst/>
+          </a:prstGeom>
+          <a:noFill/>
+        </p:spPr>
+        <p:txBody>
+          <a:bodyPr wrap="square" rtlCol="0">
+            <a:spAutoFit/>
+          </a:bodyPr>
+          <a:lstStyle/>
+          <a:p>
+            <a:pPr algn="ctr"/>
+            <a:r>
+              <a:rPr lang="en-US" sz="1000" dirty="0">
+                <a:solidFill>
+                  <a:schemeClr val="bg1"/>
+                </a:solidFill>
+              </a:rPr>
+              <a:t> Encoder</a:t>
+            </a:r>
+          </a:p>
+          <a:p>
+            <a:pPr algn="ctr"/>
+            <a:r>
+              <a:rPr lang="en-US" sz="1000" dirty="0">
+                <a:solidFill>
+                  <a:schemeClr val="bg1"/>
+                </a:solidFill>
+              </a:rPr>
+              <a:t>From Scratch</a:t>
+            </a:r>
+          </a:p>
+          <a:p>
+            <a:pPr algn="ctr"/>
+            <a:r>
+              <a:rPr lang="en-US" sz="1000" dirty="0">
+                <a:solidFill>
+                  <a:schemeClr val="bg1"/>
+                </a:solidFill>
+              </a:rPr>
+              <a:t>(Trainable)</a:t>
+            </a:r>
+          </a:p>
+        </p:txBody>
+      </p:sp>
+      <p:sp>
+        <p:nvSpPr>
+          <p:cNvPr id="22" name="TextBox 21">
+            <a:extLst>
+              <a:ext uri="{FF2B5EF4-FFF2-40B4-BE49-F238E27FC236}">
+                <a16:creationId xmlns:a16="http://schemas.microsoft.com/office/drawing/2014/main" id="{D954FAC4-B49D-7332-08BA-83130A8C9678}"/>
+              </a:ext>
+            </a:extLst>
+          </p:cNvPr>
+          <p:cNvSpPr txBox="1"/>
+          <p:nvPr/>
+        </p:nvSpPr>
+        <p:spPr>
+          <a:xfrm>
+            <a:off x="1153959" y="6339221"/>
+            <a:ext cx="3442906" cy="369332"/>
+          </a:xfrm>
+          <a:prstGeom prst="rect">
+            <a:avLst/>
+          </a:prstGeom>
+          <a:noFill/>
+        </p:spPr>
+        <p:txBody>
+          <a:bodyPr wrap="square" rtlCol="0">
+            <a:spAutoFit/>
+          </a:bodyPr>
+          <a:lstStyle/>
+          <a:p>
+            <a:pPr algn="ctr"/>
+            <a:r>
+              <a:rPr lang="en-US" dirty="0"/>
+              <a:t>Test Result on 5 fold models</a:t>
+            </a:r>
+          </a:p>
+        </p:txBody>
+      </p:sp>
+      <p:sp>
+        <p:nvSpPr>
+          <p:cNvPr id="10" name="Oval 9">
+            <a:extLst>
+              <a:ext uri="{FF2B5EF4-FFF2-40B4-BE49-F238E27FC236}">
+                <a16:creationId xmlns:a16="http://schemas.microsoft.com/office/drawing/2014/main" id="{D6A75EE7-8B4B-AF88-D0D3-E5103DEF45E6}"/>
+              </a:ext>
+            </a:extLst>
+          </p:cNvPr>
+          <p:cNvSpPr/>
+          <p:nvPr/>
+        </p:nvSpPr>
+        <p:spPr>
+          <a:xfrm>
+            <a:off x="11382752" y="3114495"/>
+            <a:ext cx="726948" cy="580644"/>
+          </a:xfrm>
+          <a:prstGeom prst="ellipse">
+            <a:avLst/>
+          </a:prstGeom>
+        </p:spPr>
+        <p:style>
+          <a:lnRef idx="2">
+            <a:schemeClr val="accent1">
+              <a:shade val="15000"/>
+            </a:schemeClr>
+          </a:lnRef>
+          <a:fillRef idx="1">
+            <a:schemeClr val="accent1"/>
+          </a:fillRef>
+          <a:effectRef idx="0">
+            <a:schemeClr val="accent1"/>
+          </a:effectRef>
+          <a:fontRef idx="minor">
+            <a:schemeClr val="lt1"/>
+          </a:fontRef>
+        </p:style>
+        <p:txBody>
+          <a:bodyPr rtlCol="0" anchor="ctr"/>
+          <a:lstStyle/>
+          <a:p>
+            <a:pPr algn="ctr"/>
+            <a:r>
+              <a:rPr lang="en-US" dirty="0"/>
+              <a:t>0/1</a:t>
+            </a:r>
+          </a:p>
+        </p:txBody>
+      </p:sp>
+      <p:cxnSp>
+        <p:nvCxnSpPr>
+          <p:cNvPr id="24" name="Straight Arrow Connector 23">
+            <a:extLst>
+              <a:ext uri="{FF2B5EF4-FFF2-40B4-BE49-F238E27FC236}">
+                <a16:creationId xmlns:a16="http://schemas.microsoft.com/office/drawing/2014/main" id="{4E2ACA3B-7776-1FA9-8B96-A17D7DE0776E}"/>
+              </a:ext>
+            </a:extLst>
+          </p:cNvPr>
+          <p:cNvCxnSpPr>
+            <a:cxnSpLocks/>
+            <a:stCxn id="5" idx="2"/>
+            <a:endCxn id="6" idx="1"/>
+          </p:cNvCxnSpPr>
+          <p:nvPr/>
+        </p:nvCxnSpPr>
+        <p:spPr>
+          <a:xfrm flipV="1">
+            <a:off x="8724898" y="730557"/>
+            <a:ext cx="489204" cy="1815084"/>
+          </a:xfrm>
+          <a:prstGeom prst="straightConnector1">
+            <a:avLst/>
+          </a:prstGeom>
+          <a:ln>
+            <a:tailEnd type="triangle"/>
+          </a:ln>
+        </p:spPr>
+        <p:style>
+          <a:lnRef idx="2">
+            <a:schemeClr val="accent1"/>
+          </a:lnRef>
+          <a:fillRef idx="0">
+            <a:schemeClr val="accent1"/>
+          </a:fillRef>
+          <a:effectRef idx="1">
+            <a:schemeClr val="accent1"/>
+          </a:effectRef>
+          <a:fontRef idx="minor">
+            <a:schemeClr val="tx1"/>
+          </a:fontRef>
+        </p:style>
+      </p:cxnSp>
+      <p:cxnSp>
+        <p:nvCxnSpPr>
+          <p:cNvPr id="27" name="Straight Arrow Connector 26">
+            <a:extLst>
+              <a:ext uri="{FF2B5EF4-FFF2-40B4-BE49-F238E27FC236}">
+                <a16:creationId xmlns:a16="http://schemas.microsoft.com/office/drawing/2014/main" id="{94D1FDAB-A616-EF87-B5EE-3370B034F928}"/>
+              </a:ext>
+            </a:extLst>
+          </p:cNvPr>
+          <p:cNvCxnSpPr>
+            <a:stCxn id="8" idx="4"/>
+            <a:endCxn id="10" idx="0"/>
+          </p:cNvCxnSpPr>
+          <p:nvPr/>
+        </p:nvCxnSpPr>
+        <p:spPr>
+          <a:xfrm>
+            <a:off x="10860022" y="1096317"/>
+            <a:ext cx="886204" cy="2018178"/>
+          </a:xfrm>
+          <a:prstGeom prst="straightConnector1">
+            <a:avLst/>
+          </a:prstGeom>
+          <a:ln>
+            <a:tailEnd type="triangle"/>
+          </a:ln>
+        </p:spPr>
+        <p:style>
+          <a:lnRef idx="2">
+            <a:schemeClr val="accent1"/>
+          </a:lnRef>
+          <a:fillRef idx="0">
+            <a:schemeClr val="accent1"/>
+          </a:fillRef>
+          <a:effectRef idx="1">
+            <a:schemeClr val="accent1"/>
+          </a:effectRef>
+          <a:fontRef idx="minor">
+            <a:schemeClr val="tx1"/>
+          </a:fontRef>
+        </p:style>
+      </p:cxnSp>
+      <p:cxnSp>
+        <p:nvCxnSpPr>
+          <p:cNvPr id="35" name="Straight Arrow Connector 34">
+            <a:extLst>
+              <a:ext uri="{FF2B5EF4-FFF2-40B4-BE49-F238E27FC236}">
+                <a16:creationId xmlns:a16="http://schemas.microsoft.com/office/drawing/2014/main" id="{A6D9F2AE-D4C3-9ABE-0920-6EDA0BE30F66}"/>
+              </a:ext>
+            </a:extLst>
+          </p:cNvPr>
+          <p:cNvCxnSpPr>
+            <a:cxnSpLocks/>
+            <a:stCxn id="9" idx="0"/>
+            <a:endCxn id="10" idx="4"/>
+          </p:cNvCxnSpPr>
+          <p:nvPr/>
+        </p:nvCxnSpPr>
+        <p:spPr>
+          <a:xfrm>
+            <a:off x="10832590" y="2179881"/>
+            <a:ext cx="913636" cy="1515258"/>
+          </a:xfrm>
+          <a:prstGeom prst="straightConnector1">
+            <a:avLst/>
+          </a:prstGeom>
+          <a:ln>
+            <a:tailEnd type="triangle"/>
+          </a:ln>
+        </p:spPr>
+        <p:style>
+          <a:lnRef idx="2">
+            <a:schemeClr val="accent1"/>
+          </a:lnRef>
+          <a:fillRef idx="0">
+            <a:schemeClr val="accent1"/>
+          </a:fillRef>
+          <a:effectRef idx="1">
+            <a:schemeClr val="accent1"/>
+          </a:effectRef>
+          <a:fontRef idx="minor">
+            <a:schemeClr val="tx1"/>
+          </a:fontRef>
+        </p:style>
+      </p:cxnSp>
+      <p:sp>
+        <p:nvSpPr>
+          <p:cNvPr id="17" name="Flowchart: Manual Operation 16">
+            <a:extLst>
+              <a:ext uri="{FF2B5EF4-FFF2-40B4-BE49-F238E27FC236}">
+                <a16:creationId xmlns:a16="http://schemas.microsoft.com/office/drawing/2014/main" id="{F51CDCBA-8154-0099-5556-61D8E4836073}"/>
+              </a:ext>
+            </a:extLst>
+          </p:cNvPr>
+          <p:cNvSpPr/>
+          <p:nvPr/>
+        </p:nvSpPr>
+        <p:spPr>
+          <a:xfrm rot="16200000">
+            <a:off x="7339582" y="5149035"/>
+            <a:ext cx="1234440" cy="1536192"/>
+          </a:xfrm>
+          <a:prstGeom prst="flowChartManualOperation">
+            <a:avLst/>
+          </a:prstGeom>
+        </p:spPr>
+        <p:style>
+          <a:lnRef idx="2">
+            <a:schemeClr val="accent1">
+              <a:shade val="15000"/>
+            </a:schemeClr>
+          </a:lnRef>
+          <a:fillRef idx="1">
+            <a:schemeClr val="accent1"/>
+          </a:fillRef>
+          <a:effectRef idx="0">
+            <a:schemeClr val="accent1"/>
+          </a:effectRef>
+          <a:fontRef idx="minor">
+            <a:schemeClr val="lt1"/>
+          </a:fontRef>
+        </p:style>
+        <p:txBody>
+          <a:bodyPr rtlCol="0" anchor="ctr"/>
+          <a:lstStyle/>
+          <a:p>
+            <a:pPr algn="ctr"/>
+            <a:endParaRPr lang="en-US"/>
+          </a:p>
+        </p:txBody>
+      </p:sp>
+      <p:sp>
+        <p:nvSpPr>
+          <p:cNvPr id="18" name="Rectangle 17">
+            <a:extLst>
+              <a:ext uri="{FF2B5EF4-FFF2-40B4-BE49-F238E27FC236}">
+                <a16:creationId xmlns:a16="http://schemas.microsoft.com/office/drawing/2014/main" id="{79EB24D3-FB6C-E19B-C864-DD0BF11DC7B3}"/>
+              </a:ext>
+            </a:extLst>
+          </p:cNvPr>
+          <p:cNvSpPr/>
+          <p:nvPr/>
+        </p:nvSpPr>
+        <p:spPr>
+          <a:xfrm>
+            <a:off x="9214102" y="3695139"/>
+            <a:ext cx="612648" cy="813816"/>
+          </a:xfrm>
+          <a:prstGeom prst="rect">
+            <a:avLst/>
+          </a:prstGeom>
+        </p:spPr>
+        <p:style>
+          <a:lnRef idx="2">
+            <a:schemeClr val="accent1">
+              <a:shade val="15000"/>
+            </a:schemeClr>
+          </a:lnRef>
+          <a:fillRef idx="1">
+            <a:schemeClr val="accent1"/>
+          </a:fillRef>
+          <a:effectRef idx="0">
+            <a:schemeClr val="accent1"/>
+          </a:effectRef>
+          <a:fontRef idx="minor">
+            <a:schemeClr val="lt1"/>
+          </a:fontRef>
+        </p:style>
+        <p:txBody>
+          <a:bodyPr rtlCol="0" anchor="ctr"/>
+          <a:lstStyle/>
+          <a:p>
+            <a:pPr algn="ctr"/>
+            <a:r>
+              <a:rPr lang="en-US" sz="1000" dirty="0"/>
+              <a:t>FC Layer</a:t>
+            </a:r>
+          </a:p>
+        </p:txBody>
+      </p:sp>
+      <p:sp>
+        <p:nvSpPr>
+          <p:cNvPr id="20" name="Rectangle 19">
+            <a:extLst>
+              <a:ext uri="{FF2B5EF4-FFF2-40B4-BE49-F238E27FC236}">
+                <a16:creationId xmlns:a16="http://schemas.microsoft.com/office/drawing/2014/main" id="{CF9DCDBE-165E-AB12-5CBC-580AD34CF490}"/>
+              </a:ext>
+            </a:extLst>
+          </p:cNvPr>
+          <p:cNvSpPr/>
+          <p:nvPr/>
+        </p:nvSpPr>
+        <p:spPr>
+          <a:xfrm>
+            <a:off x="9214102" y="5510223"/>
+            <a:ext cx="612648" cy="813816"/>
+          </a:xfrm>
+          <a:prstGeom prst="rect">
+            <a:avLst/>
+          </a:prstGeom>
+        </p:spPr>
+        <p:style>
+          <a:lnRef idx="2">
+            <a:schemeClr val="accent1">
+              <a:shade val="15000"/>
+            </a:schemeClr>
+          </a:lnRef>
+          <a:fillRef idx="1">
+            <a:schemeClr val="accent1"/>
+          </a:fillRef>
+          <a:effectRef idx="0">
+            <a:schemeClr val="accent1"/>
+          </a:effectRef>
+          <a:fontRef idx="minor">
+            <a:schemeClr val="lt1"/>
+          </a:fontRef>
+        </p:style>
+        <p:txBody>
+          <a:bodyPr rtlCol="0" anchor="ctr"/>
+          <a:lstStyle/>
+          <a:p>
+            <a:pPr algn="ctr"/>
+            <a:r>
+              <a:rPr lang="en-US" sz="1000" dirty="0"/>
+              <a:t>FC Layer</a:t>
+            </a:r>
+          </a:p>
+        </p:txBody>
+      </p:sp>
+      <p:sp>
+        <p:nvSpPr>
+          <p:cNvPr id="23" name="Oval 22">
+            <a:extLst>
+              <a:ext uri="{FF2B5EF4-FFF2-40B4-BE49-F238E27FC236}">
+                <a16:creationId xmlns:a16="http://schemas.microsoft.com/office/drawing/2014/main" id="{3CE0E583-91BF-D30C-E37A-2488036EFBDA}"/>
+              </a:ext>
+            </a:extLst>
+          </p:cNvPr>
+          <p:cNvSpPr/>
+          <p:nvPr/>
+        </p:nvSpPr>
+        <p:spPr>
+          <a:xfrm>
+            <a:off x="10453114" y="3736287"/>
+            <a:ext cx="813816" cy="731520"/>
+          </a:xfrm>
+          <a:prstGeom prst="ellipse">
+            <a:avLst/>
+          </a:prstGeom>
+        </p:spPr>
+        <p:style>
+          <a:lnRef idx="2">
+            <a:schemeClr val="accent1">
+              <a:shade val="15000"/>
+            </a:schemeClr>
+          </a:lnRef>
+          <a:fillRef idx="1">
+            <a:schemeClr val="accent1"/>
+          </a:fillRef>
+          <a:effectRef idx="0">
+            <a:schemeClr val="accent1"/>
+          </a:effectRef>
+          <a:fontRef idx="minor">
+            <a:schemeClr val="lt1"/>
+          </a:fontRef>
+        </p:style>
+        <p:txBody>
+          <a:bodyPr rtlCol="0" anchor="ctr"/>
+          <a:lstStyle/>
+          <a:p>
+            <a:pPr algn="ctr"/>
+            <a:r>
+              <a:rPr lang="en-US" dirty="0"/>
+              <a:t>0/1</a:t>
+            </a:r>
+          </a:p>
+        </p:txBody>
+      </p:sp>
+      <p:sp>
+        <p:nvSpPr>
+          <p:cNvPr id="25" name="Oval 24">
+            <a:extLst>
+              <a:ext uri="{FF2B5EF4-FFF2-40B4-BE49-F238E27FC236}">
+                <a16:creationId xmlns:a16="http://schemas.microsoft.com/office/drawing/2014/main" id="{A1FB4B73-DD65-3031-1733-52B64974A288}"/>
+              </a:ext>
+            </a:extLst>
+          </p:cNvPr>
+          <p:cNvSpPr/>
+          <p:nvPr/>
+        </p:nvSpPr>
+        <p:spPr>
+          <a:xfrm>
+            <a:off x="10425682" y="5551371"/>
+            <a:ext cx="813816" cy="731520"/>
+          </a:xfrm>
+          <a:prstGeom prst="ellipse">
+            <a:avLst/>
+          </a:prstGeom>
+        </p:spPr>
+        <p:style>
+          <a:lnRef idx="2">
+            <a:schemeClr val="accent1">
+              <a:shade val="15000"/>
+            </a:schemeClr>
+          </a:lnRef>
+          <a:fillRef idx="1">
+            <a:schemeClr val="accent1"/>
+          </a:fillRef>
+          <a:effectRef idx="0">
+            <a:schemeClr val="accent1"/>
+          </a:effectRef>
+          <a:fontRef idx="minor">
+            <a:schemeClr val="lt1"/>
+          </a:fontRef>
+        </p:style>
+        <p:txBody>
+          <a:bodyPr rtlCol="0" anchor="ctr"/>
+          <a:lstStyle/>
+          <a:p>
+            <a:pPr algn="ctr"/>
+            <a:r>
+              <a:rPr lang="en-US" dirty="0"/>
+              <a:t>0/1</a:t>
+            </a:r>
+          </a:p>
+        </p:txBody>
+      </p:sp>
       <p:pic>
         <p:nvPicPr>
-          <p:cNvPr id="7" name="Picture 6" descr="A graph of a curve&#10;&#10;AI-generated content may be incorrect.">
-            <a:extLst>
-              <a:ext uri="{FF2B5EF4-FFF2-40B4-BE49-F238E27FC236}">
-                <a16:creationId xmlns:a16="http://schemas.microsoft.com/office/drawing/2014/main" id="{E9F44E64-34A2-EC9E-B396-061CEC691102}"/>
+          <p:cNvPr id="29" name="Picture 28" descr="An ultrasound of a baby&#10;&#10;AI-generated content may be incorrect.">
+            <a:extLst>
+              <a:ext uri="{FF2B5EF4-FFF2-40B4-BE49-F238E27FC236}">
+                <a16:creationId xmlns:a16="http://schemas.microsoft.com/office/drawing/2014/main" id="{D4378563-6B5B-F155-A29E-15ABE948D1C2}"/>
               </a:ext>
             </a:extLst>
           </p:cNvPr>
@@ -3816,7 +4978,7 @@
           <p:nvPr/>
         </p:nvPicPr>
         <p:blipFill>
-          <a:blip r:embed="rId3">
+          <a:blip r:embed="rId2">
             <a:extLst>
               <a:ext uri="{28A0092B-C50C-407E-A947-70E740481C1C}">
                 <a14:useLocalDpi xmlns:a14="http://schemas.microsoft.com/office/drawing/2010/main" val="0"/>
@@ -3829,20 +4991,310 @@
         </p:blipFill>
         <p:spPr>
           <a:xfrm>
-            <a:off x="699517" y="2629799"/>
-            <a:ext cx="4857314" cy="3642986"/>
+            <a:off x="5597650" y="3641061"/>
+            <a:ext cx="960120" cy="921972"/>
           </a:xfrm>
           <a:prstGeom prst="rect">
             <a:avLst/>
           </a:prstGeom>
         </p:spPr>
       </p:pic>
-      <p:sp>
-        <p:nvSpPr>
-          <p:cNvPr id="5" name="TextBox 4">
-            <a:extLst>
-              <a:ext uri="{FF2B5EF4-FFF2-40B4-BE49-F238E27FC236}">
-                <a16:creationId xmlns:a16="http://schemas.microsoft.com/office/drawing/2014/main" id="{F501B8E9-6D4D-ED38-6003-B5E5738E9DA8}"/>
+      <p:pic>
+        <p:nvPicPr>
+          <p:cNvPr id="31" name="Picture 30" descr="An ultrasound of a baby&#10;&#10;AI-generated content may be incorrect.">
+            <a:extLst>
+              <a:ext uri="{FF2B5EF4-FFF2-40B4-BE49-F238E27FC236}">
+                <a16:creationId xmlns:a16="http://schemas.microsoft.com/office/drawing/2014/main" id="{E5453CD8-BD70-DFFA-512A-6786D64DC833}"/>
+              </a:ext>
+            </a:extLst>
+          </p:cNvPr>
+          <p:cNvPicPr>
+            <a:picLocks noChangeAspect="1"/>
+          </p:cNvPicPr>
+          <p:nvPr/>
+        </p:nvPicPr>
+        <p:blipFill>
+          <a:blip r:embed="rId2">
+            <a:extLst>
+              <a:ext uri="{28A0092B-C50C-407E-A947-70E740481C1C}">
+                <a14:useLocalDpi xmlns:a14="http://schemas.microsoft.com/office/drawing/2010/main" val="0"/>
+              </a:ext>
+            </a:extLst>
+          </a:blip>
+          <a:stretch>
+            <a:fillRect/>
+          </a:stretch>
+        </p:blipFill>
+        <p:spPr>
+          <a:xfrm>
+            <a:off x="5597650" y="5456145"/>
+            <a:ext cx="960120" cy="921972"/>
+          </a:xfrm>
+          <a:prstGeom prst="rect">
+            <a:avLst/>
+          </a:prstGeom>
+        </p:spPr>
+      </p:pic>
+      <p:cxnSp>
+        <p:nvCxnSpPr>
+          <p:cNvPr id="33" name="Straight Arrow Connector 32">
+            <a:extLst>
+              <a:ext uri="{FF2B5EF4-FFF2-40B4-BE49-F238E27FC236}">
+                <a16:creationId xmlns:a16="http://schemas.microsoft.com/office/drawing/2014/main" id="{2F393520-5C75-3C48-B71A-9D19025E65BD}"/>
+              </a:ext>
+            </a:extLst>
+          </p:cNvPr>
+          <p:cNvCxnSpPr>
+            <a:stCxn id="29" idx="3"/>
+          </p:cNvCxnSpPr>
+          <p:nvPr/>
+        </p:nvCxnSpPr>
+        <p:spPr>
+          <a:xfrm>
+            <a:off x="6557770" y="4102047"/>
+            <a:ext cx="630936" cy="0"/>
+          </a:xfrm>
+          <a:prstGeom prst="straightConnector1">
+            <a:avLst/>
+          </a:prstGeom>
+          <a:ln>
+            <a:tailEnd type="triangle"/>
+          </a:ln>
+        </p:spPr>
+        <p:style>
+          <a:lnRef idx="2">
+            <a:schemeClr val="accent1"/>
+          </a:lnRef>
+          <a:fillRef idx="0">
+            <a:schemeClr val="accent1"/>
+          </a:fillRef>
+          <a:effectRef idx="1">
+            <a:schemeClr val="accent1"/>
+          </a:effectRef>
+          <a:fontRef idx="minor">
+            <a:schemeClr val="tx1"/>
+          </a:fontRef>
+        </p:style>
+      </p:cxnSp>
+      <p:cxnSp>
+        <p:nvCxnSpPr>
+          <p:cNvPr id="36" name="Straight Arrow Connector 35">
+            <a:extLst>
+              <a:ext uri="{FF2B5EF4-FFF2-40B4-BE49-F238E27FC236}">
+                <a16:creationId xmlns:a16="http://schemas.microsoft.com/office/drawing/2014/main" id="{ABEE3D9F-D2F2-D35F-B31B-4AAA87CE7E19}"/>
+              </a:ext>
+            </a:extLst>
+          </p:cNvPr>
+          <p:cNvCxnSpPr>
+            <a:endCxn id="18" idx="1"/>
+          </p:cNvCxnSpPr>
+          <p:nvPr/>
+        </p:nvCxnSpPr>
+        <p:spPr>
+          <a:xfrm>
+            <a:off x="8724898" y="4102047"/>
+            <a:ext cx="489204" cy="0"/>
+          </a:xfrm>
+          <a:prstGeom prst="straightConnector1">
+            <a:avLst/>
+          </a:prstGeom>
+          <a:ln>
+            <a:tailEnd type="triangle"/>
+          </a:ln>
+        </p:spPr>
+        <p:style>
+          <a:lnRef idx="2">
+            <a:schemeClr val="accent1"/>
+          </a:lnRef>
+          <a:fillRef idx="0">
+            <a:schemeClr val="accent1"/>
+          </a:fillRef>
+          <a:effectRef idx="1">
+            <a:schemeClr val="accent1"/>
+          </a:effectRef>
+          <a:fontRef idx="minor">
+            <a:schemeClr val="tx1"/>
+          </a:fontRef>
+        </p:style>
+      </p:cxnSp>
+      <p:cxnSp>
+        <p:nvCxnSpPr>
+          <p:cNvPr id="37" name="Straight Arrow Connector 36">
+            <a:extLst>
+              <a:ext uri="{FF2B5EF4-FFF2-40B4-BE49-F238E27FC236}">
+                <a16:creationId xmlns:a16="http://schemas.microsoft.com/office/drawing/2014/main" id="{B30AE34F-7688-891C-7347-6FD5350B7DDA}"/>
+              </a:ext>
+            </a:extLst>
+          </p:cNvPr>
+          <p:cNvCxnSpPr>
+            <a:cxnSpLocks/>
+            <a:stCxn id="18" idx="3"/>
+            <a:endCxn id="23" idx="2"/>
+          </p:cNvCxnSpPr>
+          <p:nvPr/>
+        </p:nvCxnSpPr>
+        <p:spPr>
+          <a:xfrm>
+            <a:off x="9826750" y="4102047"/>
+            <a:ext cx="626364" cy="0"/>
+          </a:xfrm>
+          <a:prstGeom prst="straightConnector1">
+            <a:avLst/>
+          </a:prstGeom>
+          <a:ln>
+            <a:tailEnd type="triangle"/>
+          </a:ln>
+        </p:spPr>
+        <p:style>
+          <a:lnRef idx="2">
+            <a:schemeClr val="accent1"/>
+          </a:lnRef>
+          <a:fillRef idx="0">
+            <a:schemeClr val="accent1"/>
+          </a:fillRef>
+          <a:effectRef idx="1">
+            <a:schemeClr val="accent1"/>
+          </a:effectRef>
+          <a:fontRef idx="minor">
+            <a:schemeClr val="tx1"/>
+          </a:fontRef>
+        </p:style>
+      </p:cxnSp>
+      <p:cxnSp>
+        <p:nvCxnSpPr>
+          <p:cNvPr id="38" name="Straight Arrow Connector 37">
+            <a:extLst>
+              <a:ext uri="{FF2B5EF4-FFF2-40B4-BE49-F238E27FC236}">
+                <a16:creationId xmlns:a16="http://schemas.microsoft.com/office/drawing/2014/main" id="{E6B8AE3D-6012-51C7-AFE7-FA64F79E548D}"/>
+              </a:ext>
+            </a:extLst>
+          </p:cNvPr>
+          <p:cNvCxnSpPr>
+            <a:cxnSpLocks/>
+            <a:stCxn id="31" idx="3"/>
+            <a:endCxn id="17" idx="0"/>
+          </p:cNvCxnSpPr>
+          <p:nvPr/>
+        </p:nvCxnSpPr>
+        <p:spPr>
+          <a:xfrm>
+            <a:off x="6557770" y="5917131"/>
+            <a:ext cx="630936" cy="0"/>
+          </a:xfrm>
+          <a:prstGeom prst="straightConnector1">
+            <a:avLst/>
+          </a:prstGeom>
+          <a:ln>
+            <a:tailEnd type="triangle"/>
+          </a:ln>
+        </p:spPr>
+        <p:style>
+          <a:lnRef idx="2">
+            <a:schemeClr val="accent1"/>
+          </a:lnRef>
+          <a:fillRef idx="0">
+            <a:schemeClr val="accent1"/>
+          </a:fillRef>
+          <a:effectRef idx="1">
+            <a:schemeClr val="accent1"/>
+          </a:effectRef>
+          <a:fontRef idx="minor">
+            <a:schemeClr val="tx1"/>
+          </a:fontRef>
+        </p:style>
+      </p:cxnSp>
+      <p:cxnSp>
+        <p:nvCxnSpPr>
+          <p:cNvPr id="39" name="Straight Arrow Connector 38">
+            <a:extLst>
+              <a:ext uri="{FF2B5EF4-FFF2-40B4-BE49-F238E27FC236}">
+                <a16:creationId xmlns:a16="http://schemas.microsoft.com/office/drawing/2014/main" id="{E5F8FBA0-750C-BC37-69DF-F2705EEDCA84}"/>
+              </a:ext>
+            </a:extLst>
+          </p:cNvPr>
+          <p:cNvCxnSpPr>
+            <a:cxnSpLocks/>
+            <a:stCxn id="17" idx="2"/>
+            <a:endCxn id="20" idx="1"/>
+          </p:cNvCxnSpPr>
+          <p:nvPr/>
+        </p:nvCxnSpPr>
+        <p:spPr>
+          <a:xfrm>
+            <a:off x="8724898" y="5917131"/>
+            <a:ext cx="489204" cy="0"/>
+          </a:xfrm>
+          <a:prstGeom prst="straightConnector1">
+            <a:avLst/>
+          </a:prstGeom>
+          <a:ln>
+            <a:tailEnd type="triangle"/>
+          </a:ln>
+        </p:spPr>
+        <p:style>
+          <a:lnRef idx="2">
+            <a:schemeClr val="accent1"/>
+          </a:lnRef>
+          <a:fillRef idx="0">
+            <a:schemeClr val="accent1"/>
+          </a:fillRef>
+          <a:effectRef idx="1">
+            <a:schemeClr val="accent1"/>
+          </a:effectRef>
+          <a:fontRef idx="minor">
+            <a:schemeClr val="tx1"/>
+          </a:fontRef>
+        </p:style>
+      </p:cxnSp>
+      <p:cxnSp>
+        <p:nvCxnSpPr>
+          <p:cNvPr id="40" name="Straight Arrow Connector 39">
+            <a:extLst>
+              <a:ext uri="{FF2B5EF4-FFF2-40B4-BE49-F238E27FC236}">
+                <a16:creationId xmlns:a16="http://schemas.microsoft.com/office/drawing/2014/main" id="{F7BA7C6E-FCAF-A740-5B72-8B09AD257519}"/>
+              </a:ext>
+            </a:extLst>
+          </p:cNvPr>
+          <p:cNvCxnSpPr>
+            <a:cxnSpLocks/>
+            <a:stCxn id="20" idx="3"/>
+            <a:endCxn id="25" idx="2"/>
+          </p:cNvCxnSpPr>
+          <p:nvPr/>
+        </p:nvCxnSpPr>
+        <p:spPr>
+          <a:xfrm>
+            <a:off x="9826750" y="5917131"/>
+            <a:ext cx="598932" cy="0"/>
+          </a:xfrm>
+          <a:prstGeom prst="straightConnector1">
+            <a:avLst/>
+          </a:prstGeom>
+          <a:ln>
+            <a:tailEnd type="triangle"/>
+          </a:ln>
+        </p:spPr>
+        <p:style>
+          <a:lnRef idx="2">
+            <a:schemeClr val="accent1"/>
+          </a:lnRef>
+          <a:fillRef idx="0">
+            <a:schemeClr val="accent1"/>
+          </a:fillRef>
+          <a:effectRef idx="1">
+            <a:schemeClr val="accent1"/>
+          </a:effectRef>
+          <a:fontRef idx="minor">
+            <a:schemeClr val="tx1"/>
+          </a:fontRef>
+        </p:style>
+      </p:cxnSp>
+      <p:sp>
+        <p:nvSpPr>
+          <p:cNvPr id="41" name="TextBox 40">
+            <a:extLst>
+              <a:ext uri="{FF2B5EF4-FFF2-40B4-BE49-F238E27FC236}">
+                <a16:creationId xmlns:a16="http://schemas.microsoft.com/office/drawing/2014/main" id="{54309AB0-F598-D1CA-27F9-12A1A103C21F}"/>
               </a:ext>
             </a:extLst>
           </p:cNvPr>
@@ -3851,8 +5303,8 @@
         </p:nvSpPr>
         <p:spPr>
           <a:xfrm>
-            <a:off x="1600200" y="6272785"/>
-            <a:ext cx="3619664" cy="369332"/>
+            <a:off x="7061640" y="3674767"/>
+            <a:ext cx="1500759" cy="1015663"/>
           </a:xfrm>
           <a:prstGeom prst="rect">
             <a:avLst/>
@@ -3865,9 +5317,258 @@
           </a:bodyPr>
           <a:lstStyle/>
           <a:p>
-            <a:r>
-              <a:rPr lang="en-US" dirty="0"/>
-              <a:t>Result on 5 Fold Validation Set</a:t>
+            <a:pPr algn="ctr"/>
+            <a:r>
+              <a:rPr lang="en-US" sz="1000" dirty="0">
+                <a:solidFill>
+                  <a:schemeClr val="bg1"/>
+                </a:solidFill>
+              </a:rPr>
+              <a:t>1. SDF-Model -&gt;</a:t>
+            </a:r>
+          </a:p>
+          <a:p>
+            <a:pPr marL="171450" indent="-171450" algn="ctr">
+              <a:buFont typeface="Wingdings" panose="05000000000000000000" pitchFamily="2" charset="2"/>
+              <a:buChar char="è"/>
+            </a:pPr>
+            <a:r>
+              <a:rPr lang="en-US" sz="1000" dirty="0">
+                <a:solidFill>
+                  <a:schemeClr val="bg1"/>
+                </a:solidFill>
+              </a:rPr>
+              <a:t>2 .Binary Boundary Mask-&gt;</a:t>
+            </a:r>
+          </a:p>
+          <a:p>
+            <a:pPr marL="171450" indent="-171450" algn="ctr">
+              <a:buFont typeface="Wingdings" panose="05000000000000000000" pitchFamily="2" charset="2"/>
+              <a:buChar char="è"/>
+            </a:pPr>
+            <a:r>
+              <a:rPr lang="en-US" sz="1000" dirty="0">
+                <a:solidFill>
+                  <a:schemeClr val="bg1"/>
+                </a:solidFill>
+              </a:rPr>
+              <a:t>3. US image within Boundary-&gt;</a:t>
+            </a:r>
+          </a:p>
+          <a:p>
+            <a:pPr marL="171450" indent="-171450" algn="ctr">
+              <a:buFont typeface="Wingdings" panose="05000000000000000000" pitchFamily="2" charset="2"/>
+              <a:buChar char="è"/>
+            </a:pPr>
+            <a:r>
+              <a:rPr lang="en-US" sz="1000" dirty="0">
+                <a:solidFill>
+                  <a:schemeClr val="bg1"/>
+                </a:solidFill>
+              </a:rPr>
+              <a:t>4. Encoder</a:t>
+            </a:r>
+          </a:p>
+        </p:txBody>
+      </p:sp>
+      <p:cxnSp>
+        <p:nvCxnSpPr>
+          <p:cNvPr id="45" name="Straight Arrow Connector 44">
+            <a:extLst>
+              <a:ext uri="{FF2B5EF4-FFF2-40B4-BE49-F238E27FC236}">
+                <a16:creationId xmlns:a16="http://schemas.microsoft.com/office/drawing/2014/main" id="{BCEF9908-D4F5-76AC-7BE0-5C592C680D1B}"/>
+              </a:ext>
+            </a:extLst>
+          </p:cNvPr>
+          <p:cNvCxnSpPr>
+            <a:cxnSpLocks/>
+            <a:stCxn id="23" idx="4"/>
+          </p:cNvCxnSpPr>
+          <p:nvPr/>
+        </p:nvCxnSpPr>
+        <p:spPr>
+          <a:xfrm flipV="1">
+            <a:off x="10860022" y="3114495"/>
+            <a:ext cx="913636" cy="1353312"/>
+          </a:xfrm>
+          <a:prstGeom prst="straightConnector1">
+            <a:avLst/>
+          </a:prstGeom>
+          <a:ln>
+            <a:tailEnd type="triangle"/>
+          </a:ln>
+        </p:spPr>
+        <p:style>
+          <a:lnRef idx="2">
+            <a:schemeClr val="accent1"/>
+          </a:lnRef>
+          <a:fillRef idx="0">
+            <a:schemeClr val="accent1"/>
+          </a:fillRef>
+          <a:effectRef idx="1">
+            <a:schemeClr val="accent1"/>
+          </a:effectRef>
+          <a:fontRef idx="minor">
+            <a:schemeClr val="tx1"/>
+          </a:fontRef>
+        </p:style>
+      </p:cxnSp>
+      <p:cxnSp>
+        <p:nvCxnSpPr>
+          <p:cNvPr id="46" name="Straight Arrow Connector 45">
+            <a:extLst>
+              <a:ext uri="{FF2B5EF4-FFF2-40B4-BE49-F238E27FC236}">
+                <a16:creationId xmlns:a16="http://schemas.microsoft.com/office/drawing/2014/main" id="{8F71745F-EF09-4614-95B3-BD5BFB24CBA5}"/>
+              </a:ext>
+            </a:extLst>
+          </p:cNvPr>
+          <p:cNvCxnSpPr>
+            <a:cxnSpLocks/>
+            <a:stCxn id="25" idx="0"/>
+          </p:cNvCxnSpPr>
+          <p:nvPr/>
+        </p:nvCxnSpPr>
+        <p:spPr>
+          <a:xfrm flipV="1">
+            <a:off x="10832590" y="3695139"/>
+            <a:ext cx="941068" cy="1856232"/>
+          </a:xfrm>
+          <a:prstGeom prst="straightConnector1">
+            <a:avLst/>
+          </a:prstGeom>
+          <a:ln>
+            <a:tailEnd type="triangle"/>
+          </a:ln>
+        </p:spPr>
+        <p:style>
+          <a:lnRef idx="2">
+            <a:schemeClr val="accent1"/>
+          </a:lnRef>
+          <a:fillRef idx="0">
+            <a:schemeClr val="accent1"/>
+          </a:fillRef>
+          <a:effectRef idx="1">
+            <a:schemeClr val="accent1"/>
+          </a:effectRef>
+          <a:fontRef idx="minor">
+            <a:schemeClr val="tx1"/>
+          </a:fontRef>
+        </p:style>
+      </p:cxnSp>
+      <p:pic>
+        <p:nvPicPr>
+          <p:cNvPr id="55" name="Picture 54" descr="A graph of a curve&#10;&#10;AI-generated content may be incorrect.">
+            <a:extLst>
+              <a:ext uri="{FF2B5EF4-FFF2-40B4-BE49-F238E27FC236}">
+                <a16:creationId xmlns:a16="http://schemas.microsoft.com/office/drawing/2014/main" id="{8078A5A7-35D8-B2A2-3F22-6295CC50EF61}"/>
+              </a:ext>
+            </a:extLst>
+          </p:cNvPr>
+          <p:cNvPicPr>
+            <a:picLocks noChangeAspect="1"/>
+          </p:cNvPicPr>
+          <p:nvPr/>
+        </p:nvPicPr>
+        <p:blipFill>
+          <a:blip r:embed="rId3">
+            <a:extLst>
+              <a:ext uri="{28A0092B-C50C-407E-A947-70E740481C1C}">
+                <a14:useLocalDpi xmlns:a14="http://schemas.microsoft.com/office/drawing/2010/main" val="0"/>
+              </a:ext>
+            </a:extLst>
+          </a:blip>
+          <a:stretch>
+            <a:fillRect/>
+          </a:stretch>
+        </p:blipFill>
+        <p:spPr>
+          <a:xfrm>
+            <a:off x="1399422" y="3865959"/>
+            <a:ext cx="3239255" cy="2429441"/>
+          </a:xfrm>
+          <a:prstGeom prst="rect">
+            <a:avLst/>
+          </a:prstGeom>
+        </p:spPr>
+      </p:pic>
+      <p:sp>
+        <p:nvSpPr>
+          <p:cNvPr id="56" name="TextBox 55">
+            <a:extLst>
+              <a:ext uri="{FF2B5EF4-FFF2-40B4-BE49-F238E27FC236}">
+                <a16:creationId xmlns:a16="http://schemas.microsoft.com/office/drawing/2014/main" id="{D3DD8806-F3AC-460F-B72B-CFE4C5F276B1}"/>
+              </a:ext>
+            </a:extLst>
+          </p:cNvPr>
+          <p:cNvSpPr txBox="1"/>
+          <p:nvPr/>
+        </p:nvSpPr>
+        <p:spPr>
+          <a:xfrm>
+            <a:off x="7061639" y="5405504"/>
+            <a:ext cx="1500759" cy="1015663"/>
+          </a:xfrm>
+          <a:prstGeom prst="rect">
+            <a:avLst/>
+          </a:prstGeom>
+          <a:noFill/>
+        </p:spPr>
+        <p:txBody>
+          <a:bodyPr wrap="square" rtlCol="0">
+            <a:spAutoFit/>
+          </a:bodyPr>
+          <a:lstStyle/>
+          <a:p>
+            <a:pPr algn="ctr"/>
+            <a:r>
+              <a:rPr lang="en-US" sz="1000" dirty="0">
+                <a:solidFill>
+                  <a:schemeClr val="bg1"/>
+                </a:solidFill>
+              </a:rPr>
+              <a:t>1. SDF-Model -&gt;</a:t>
+            </a:r>
+          </a:p>
+          <a:p>
+            <a:pPr marL="171450" indent="-171450" algn="ctr">
+              <a:buFont typeface="Wingdings" panose="05000000000000000000" pitchFamily="2" charset="2"/>
+              <a:buChar char="è"/>
+            </a:pPr>
+            <a:r>
+              <a:rPr lang="en-US" sz="1000" dirty="0">
+                <a:solidFill>
+                  <a:schemeClr val="bg1"/>
+                </a:solidFill>
+              </a:rPr>
+              <a:t>2 . Lesion Centre Mask-&gt;</a:t>
+            </a:r>
+          </a:p>
+          <a:p>
+            <a:pPr marL="171450" indent="-171450" algn="ctr">
+              <a:buFont typeface="Wingdings" panose="05000000000000000000" pitchFamily="2" charset="2"/>
+              <a:buChar char="è"/>
+            </a:pPr>
+            <a:r>
+              <a:rPr lang="en-US" sz="1000" dirty="0">
+                <a:solidFill>
+                  <a:schemeClr val="bg1"/>
+                </a:solidFill>
+              </a:rPr>
+              <a:t>3. US image within Lesion Center-&gt;</a:t>
+            </a:r>
+          </a:p>
+          <a:p>
+            <a:pPr marL="171450" indent="-171450" algn="ctr">
+              <a:buFont typeface="Wingdings" panose="05000000000000000000" pitchFamily="2" charset="2"/>
+              <a:buChar char="è"/>
+            </a:pPr>
+            <a:r>
+              <a:rPr lang="en-US" sz="1000" dirty="0">
+                <a:solidFill>
+                  <a:schemeClr val="bg1"/>
+                </a:solidFill>
+              </a:rPr>
+              <a:t>4. Encoder</a:t>
             </a:r>
           </a:p>
         </p:txBody>
@@ -3875,7 +5576,7 @@
     </p:spTree>
     <p:extLst>
       <p:ext uri="{BB962C8B-B14F-4D97-AF65-F5344CB8AC3E}">
-        <p14:creationId xmlns:p14="http://schemas.microsoft.com/office/powerpoint/2010/main" val="2306649895"/>
+        <p14:creationId xmlns:p14="http://schemas.microsoft.com/office/powerpoint/2010/main" val="4051501880"/>
       </p:ext>
     </p:extLst>
   </p:cSld>
@@ -3885,7 +5586,7 @@
 </p:sld>
 </file>
 
-<file path=ppt/slides/slide10.xml><?xml version="1.0" encoding="utf-8"?>
+<file path=ppt/slides/slide11.xml><?xml version="1.0" encoding="utf-8"?>
 <p:sld xmlns:a="http://schemas.openxmlformats.org/drawingml/2006/main" xmlns:r="http://schemas.openxmlformats.org/officeDocument/2006/relationships" xmlns:p="http://schemas.openxmlformats.org/presentationml/2006/main">
   <p:cSld>
     <p:spTree>
@@ -5930,7 +7631,7 @@
 </p:sld>
 </file>
 
-<file path=ppt/slides/slide11.xml><?xml version="1.0" encoding="utf-8"?>
+<file path=ppt/slides/slide12.xml><?xml version="1.0" encoding="utf-8"?>
 <p:sld xmlns:a="http://schemas.openxmlformats.org/drawingml/2006/main" xmlns:r="http://schemas.openxmlformats.org/officeDocument/2006/relationships" xmlns:p="http://schemas.openxmlformats.org/presentationml/2006/main">
   <p:cSld>
     <p:spTree>
@@ -8011,7 +9712,7 @@
 </p:sld>
 </file>
 
-<file path=ppt/slides/slide12.xml><?xml version="1.0" encoding="utf-8"?>
+<file path=ppt/slides/slide13.xml><?xml version="1.0" encoding="utf-8"?>
 <p:sld xmlns:a="http://schemas.openxmlformats.org/drawingml/2006/main" xmlns:r="http://schemas.openxmlformats.org/officeDocument/2006/relationships" xmlns:p="http://schemas.openxmlformats.org/presentationml/2006/main">
   <p:cSld>
     <p:spTree>
@@ -8049,6 +9750,571 @@
         <p:cNvPr id="1" name="">
           <a:extLst>
             <a:ext uri="{FF2B5EF4-FFF2-40B4-BE49-F238E27FC236}">
+              <a16:creationId xmlns:a16="http://schemas.microsoft.com/office/drawing/2014/main" id="{82192579-53EA-3844-A5B9-E024885DE246}"/>
+            </a:ext>
+          </a:extLst>
+        </p:cNvPr>
+        <p:cNvGrpSpPr/>
+        <p:nvPr/>
+      </p:nvGrpSpPr>
+      <p:grpSpPr>
+        <a:xfrm>
+          <a:off x="0" y="0"/>
+          <a:ext cx="0" cy="0"/>
+          <a:chOff x="0" y="0"/>
+          <a:chExt cx="0" cy="0"/>
+        </a:xfrm>
+      </p:grpSpPr>
+      <p:sp>
+        <p:nvSpPr>
+          <p:cNvPr id="2" name="TextBox 1">
+            <a:extLst>
+              <a:ext uri="{FF2B5EF4-FFF2-40B4-BE49-F238E27FC236}">
+                <a16:creationId xmlns:a16="http://schemas.microsoft.com/office/drawing/2014/main" id="{9A0F9B53-88A1-74B5-2F20-A14DEC41F9E1}"/>
+              </a:ext>
+            </a:extLst>
+          </p:cNvPr>
+          <p:cNvSpPr txBox="1"/>
+          <p:nvPr/>
+        </p:nvSpPr>
+        <p:spPr>
+          <a:xfrm>
+            <a:off x="1234440" y="722376"/>
+            <a:ext cx="2688336" cy="369332"/>
+          </a:xfrm>
+          <a:prstGeom prst="rect">
+            <a:avLst/>
+          </a:prstGeom>
+          <a:noFill/>
+        </p:spPr>
+        <p:txBody>
+          <a:bodyPr wrap="square" rtlCol="0">
+            <a:spAutoFit/>
+          </a:bodyPr>
+          <a:lstStyle/>
+          <a:p>
+            <a:r>
+              <a:rPr lang="en-US" dirty="0"/>
+              <a:t>Experiment 0: </a:t>
+            </a:r>
+          </a:p>
+        </p:txBody>
+      </p:sp>
+      <p:sp>
+        <p:nvSpPr>
+          <p:cNvPr id="3" name="TextBox 2">
+            <a:extLst>
+              <a:ext uri="{FF2B5EF4-FFF2-40B4-BE49-F238E27FC236}">
+                <a16:creationId xmlns:a16="http://schemas.microsoft.com/office/drawing/2014/main" id="{0FA8D6C2-7854-45EC-C95D-3D9DA78EB3CC}"/>
+              </a:ext>
+            </a:extLst>
+          </p:cNvPr>
+          <p:cNvSpPr txBox="1"/>
+          <p:nvPr/>
+        </p:nvSpPr>
+        <p:spPr>
+          <a:xfrm>
+            <a:off x="1325880" y="1335024"/>
+            <a:ext cx="5513832" cy="1477328"/>
+          </a:xfrm>
+          <a:prstGeom prst="rect">
+            <a:avLst/>
+          </a:prstGeom>
+          <a:noFill/>
+        </p:spPr>
+        <p:txBody>
+          <a:bodyPr wrap="square" rtlCol="0">
+            <a:spAutoFit/>
+          </a:bodyPr>
+          <a:lstStyle/>
+          <a:p>
+            <a:r>
+              <a:rPr lang="en-US" dirty="0"/>
+              <a:t>Details: </a:t>
+            </a:r>
+          </a:p>
+          <a:p>
+            <a:endParaRPr lang="en-US" dirty="0"/>
+          </a:p>
+          <a:p>
+            <a:pPr marL="285750" indent="-285750">
+              <a:buFont typeface="Arial" panose="020B0604020202020204" pitchFamily="34" charset="0"/>
+              <a:buChar char="•"/>
+            </a:pPr>
+            <a:r>
+              <a:rPr lang="en-US" dirty="0"/>
+              <a:t>Binary Classification Setup </a:t>
+            </a:r>
+          </a:p>
+          <a:p>
+            <a:pPr marL="285750" indent="-285750">
+              <a:buFont typeface="Arial" panose="020B0604020202020204" pitchFamily="34" charset="0"/>
+              <a:buChar char="•"/>
+            </a:pPr>
+            <a:r>
+              <a:rPr lang="en-US" dirty="0"/>
+              <a:t>Classification Based on US Image Only</a:t>
+            </a:r>
+          </a:p>
+          <a:p>
+            <a:pPr marL="285750" indent="-285750">
+              <a:buFont typeface="Arial" panose="020B0604020202020204" pitchFamily="34" charset="0"/>
+              <a:buChar char="•"/>
+            </a:pPr>
+            <a:endParaRPr lang="en-US" dirty="0"/>
+          </a:p>
+        </p:txBody>
+      </p:sp>
+      <p:sp>
+        <p:nvSpPr>
+          <p:cNvPr id="4" name="Flowchart: Manual Operation 3">
+            <a:extLst>
+              <a:ext uri="{FF2B5EF4-FFF2-40B4-BE49-F238E27FC236}">
+                <a16:creationId xmlns:a16="http://schemas.microsoft.com/office/drawing/2014/main" id="{7EEEEBCE-802B-F6BD-B951-E4348ECF2A14}"/>
+              </a:ext>
+            </a:extLst>
+          </p:cNvPr>
+          <p:cNvSpPr/>
+          <p:nvPr/>
+        </p:nvSpPr>
+        <p:spPr>
+          <a:xfrm rot="16200000">
+            <a:off x="7621524" y="2712095"/>
+            <a:ext cx="1234440" cy="1536192"/>
+          </a:xfrm>
+          <a:prstGeom prst="flowChartManualOperation">
+            <a:avLst/>
+          </a:prstGeom>
+        </p:spPr>
+        <p:style>
+          <a:lnRef idx="2">
+            <a:schemeClr val="accent1">
+              <a:shade val="15000"/>
+            </a:schemeClr>
+          </a:lnRef>
+          <a:fillRef idx="1">
+            <a:schemeClr val="accent1"/>
+          </a:fillRef>
+          <a:effectRef idx="0">
+            <a:schemeClr val="accent1"/>
+          </a:effectRef>
+          <a:fontRef idx="minor">
+            <a:schemeClr val="lt1"/>
+          </a:fontRef>
+        </p:style>
+        <p:txBody>
+          <a:bodyPr rtlCol="0" anchor="ctr"/>
+          <a:lstStyle/>
+          <a:p>
+            <a:pPr algn="ctr"/>
+            <a:endParaRPr lang="en-US" dirty="0"/>
+          </a:p>
+        </p:txBody>
+      </p:sp>
+      <p:sp>
+        <p:nvSpPr>
+          <p:cNvPr id="6" name="Rectangle 5">
+            <a:extLst>
+              <a:ext uri="{FF2B5EF4-FFF2-40B4-BE49-F238E27FC236}">
+                <a16:creationId xmlns:a16="http://schemas.microsoft.com/office/drawing/2014/main" id="{E7D6AA3B-2B0E-FEA6-3B09-6DDDBB02DFE3}"/>
+              </a:ext>
+            </a:extLst>
+          </p:cNvPr>
+          <p:cNvSpPr/>
+          <p:nvPr/>
+        </p:nvSpPr>
+        <p:spPr>
+          <a:xfrm>
+            <a:off x="9496044" y="3073283"/>
+            <a:ext cx="612648" cy="813816"/>
+          </a:xfrm>
+          <a:prstGeom prst="rect">
+            <a:avLst/>
+          </a:prstGeom>
+        </p:spPr>
+        <p:style>
+          <a:lnRef idx="2">
+            <a:schemeClr val="accent1">
+              <a:shade val="15000"/>
+            </a:schemeClr>
+          </a:lnRef>
+          <a:fillRef idx="1">
+            <a:schemeClr val="accent1"/>
+          </a:fillRef>
+          <a:effectRef idx="0">
+            <a:schemeClr val="accent1"/>
+          </a:effectRef>
+          <a:fontRef idx="minor">
+            <a:schemeClr val="lt1"/>
+          </a:fontRef>
+        </p:style>
+        <p:txBody>
+          <a:bodyPr rtlCol="0" anchor="ctr"/>
+          <a:lstStyle/>
+          <a:p>
+            <a:pPr algn="ctr"/>
+            <a:r>
+              <a:rPr lang="en-US" sz="1000" dirty="0"/>
+              <a:t>FC Layer</a:t>
+            </a:r>
+          </a:p>
+        </p:txBody>
+      </p:sp>
+      <p:sp>
+        <p:nvSpPr>
+          <p:cNvPr id="8" name="Oval 7">
+            <a:extLst>
+              <a:ext uri="{FF2B5EF4-FFF2-40B4-BE49-F238E27FC236}">
+                <a16:creationId xmlns:a16="http://schemas.microsoft.com/office/drawing/2014/main" id="{954107C6-7068-606E-847C-53570AC9B82D}"/>
+              </a:ext>
+            </a:extLst>
+          </p:cNvPr>
+          <p:cNvSpPr/>
+          <p:nvPr/>
+        </p:nvSpPr>
+        <p:spPr>
+          <a:xfrm>
+            <a:off x="10735056" y="3114431"/>
+            <a:ext cx="813816" cy="731520"/>
+          </a:xfrm>
+          <a:prstGeom prst="ellipse">
+            <a:avLst/>
+          </a:prstGeom>
+        </p:spPr>
+        <p:style>
+          <a:lnRef idx="2">
+            <a:schemeClr val="accent1">
+              <a:shade val="15000"/>
+            </a:schemeClr>
+          </a:lnRef>
+          <a:fillRef idx="1">
+            <a:schemeClr val="accent1"/>
+          </a:fillRef>
+          <a:effectRef idx="0">
+            <a:schemeClr val="accent1"/>
+          </a:effectRef>
+          <a:fontRef idx="minor">
+            <a:schemeClr val="lt1"/>
+          </a:fontRef>
+        </p:style>
+        <p:txBody>
+          <a:bodyPr rtlCol="0" anchor="ctr"/>
+          <a:lstStyle/>
+          <a:p>
+            <a:pPr algn="ctr"/>
+            <a:r>
+              <a:rPr lang="en-US" dirty="0"/>
+              <a:t>0/1</a:t>
+            </a:r>
+          </a:p>
+        </p:txBody>
+      </p:sp>
+      <p:pic>
+        <p:nvPicPr>
+          <p:cNvPr id="13" name="Picture 12" descr="An ultrasound of a baby&#10;&#10;AI-generated content may be incorrect.">
+            <a:extLst>
+              <a:ext uri="{FF2B5EF4-FFF2-40B4-BE49-F238E27FC236}">
+                <a16:creationId xmlns:a16="http://schemas.microsoft.com/office/drawing/2014/main" id="{AE5D36BE-6624-3E38-B85E-6875E5F68E43}"/>
+              </a:ext>
+            </a:extLst>
+          </p:cNvPr>
+          <p:cNvPicPr>
+            <a:picLocks noChangeAspect="1"/>
+          </p:cNvPicPr>
+          <p:nvPr/>
+        </p:nvPicPr>
+        <p:blipFill>
+          <a:blip r:embed="rId2">
+            <a:extLst>
+              <a:ext uri="{28A0092B-C50C-407E-A947-70E740481C1C}">
+                <a14:useLocalDpi xmlns:a14="http://schemas.microsoft.com/office/drawing/2010/main" val="0"/>
+              </a:ext>
+            </a:extLst>
+          </a:blip>
+          <a:stretch>
+            <a:fillRect/>
+          </a:stretch>
+        </p:blipFill>
+        <p:spPr>
+          <a:xfrm>
+            <a:off x="5879592" y="3019205"/>
+            <a:ext cx="960120" cy="921972"/>
+          </a:xfrm>
+          <a:prstGeom prst="rect">
+            <a:avLst/>
+          </a:prstGeom>
+        </p:spPr>
+      </p:pic>
+      <p:cxnSp>
+        <p:nvCxnSpPr>
+          <p:cNvPr id="16" name="Straight Arrow Connector 15">
+            <a:extLst>
+              <a:ext uri="{FF2B5EF4-FFF2-40B4-BE49-F238E27FC236}">
+                <a16:creationId xmlns:a16="http://schemas.microsoft.com/office/drawing/2014/main" id="{FB7810E9-2813-6A7D-4077-0340A5158DEE}"/>
+              </a:ext>
+            </a:extLst>
+          </p:cNvPr>
+          <p:cNvCxnSpPr>
+            <a:stCxn id="13" idx="3"/>
+            <a:endCxn id="4" idx="0"/>
+          </p:cNvCxnSpPr>
+          <p:nvPr/>
+        </p:nvCxnSpPr>
+        <p:spPr>
+          <a:xfrm>
+            <a:off x="6839712" y="3480191"/>
+            <a:ext cx="630936" cy="0"/>
+          </a:xfrm>
+          <a:prstGeom prst="straightConnector1">
+            <a:avLst/>
+          </a:prstGeom>
+          <a:ln>
+            <a:tailEnd type="triangle"/>
+          </a:ln>
+        </p:spPr>
+        <p:style>
+          <a:lnRef idx="2">
+            <a:schemeClr val="accent1"/>
+          </a:lnRef>
+          <a:fillRef idx="0">
+            <a:schemeClr val="accent1"/>
+          </a:fillRef>
+          <a:effectRef idx="1">
+            <a:schemeClr val="accent1"/>
+          </a:effectRef>
+          <a:fontRef idx="minor">
+            <a:schemeClr val="tx1"/>
+          </a:fontRef>
+        </p:style>
+      </p:cxnSp>
+      <p:cxnSp>
+        <p:nvCxnSpPr>
+          <p:cNvPr id="19" name="Straight Arrow Connector 18">
+            <a:extLst>
+              <a:ext uri="{FF2B5EF4-FFF2-40B4-BE49-F238E27FC236}">
+                <a16:creationId xmlns:a16="http://schemas.microsoft.com/office/drawing/2014/main" id="{DBA3FF26-E795-7E70-DF6C-5765A1767210}"/>
+              </a:ext>
+            </a:extLst>
+          </p:cNvPr>
+          <p:cNvCxnSpPr>
+            <a:stCxn id="4" idx="2"/>
+            <a:endCxn id="6" idx="1"/>
+          </p:cNvCxnSpPr>
+          <p:nvPr/>
+        </p:nvCxnSpPr>
+        <p:spPr>
+          <a:xfrm>
+            <a:off x="9006840" y="3480191"/>
+            <a:ext cx="489204" cy="0"/>
+          </a:xfrm>
+          <a:prstGeom prst="straightConnector1">
+            <a:avLst/>
+          </a:prstGeom>
+          <a:ln>
+            <a:tailEnd type="triangle"/>
+          </a:ln>
+        </p:spPr>
+        <p:style>
+          <a:lnRef idx="2">
+            <a:schemeClr val="accent1"/>
+          </a:lnRef>
+          <a:fillRef idx="0">
+            <a:schemeClr val="accent1"/>
+          </a:fillRef>
+          <a:effectRef idx="1">
+            <a:schemeClr val="accent1"/>
+          </a:effectRef>
+          <a:fontRef idx="minor">
+            <a:schemeClr val="tx1"/>
+          </a:fontRef>
+        </p:style>
+      </p:cxnSp>
+      <p:cxnSp>
+        <p:nvCxnSpPr>
+          <p:cNvPr id="21" name="Straight Arrow Connector 20">
+            <a:extLst>
+              <a:ext uri="{FF2B5EF4-FFF2-40B4-BE49-F238E27FC236}">
+                <a16:creationId xmlns:a16="http://schemas.microsoft.com/office/drawing/2014/main" id="{43E16731-950E-6139-72F8-B7D31EB1376E}"/>
+              </a:ext>
+            </a:extLst>
+          </p:cNvPr>
+          <p:cNvCxnSpPr>
+            <a:cxnSpLocks/>
+            <a:stCxn id="6" idx="3"/>
+            <a:endCxn id="8" idx="2"/>
+          </p:cNvCxnSpPr>
+          <p:nvPr/>
+        </p:nvCxnSpPr>
+        <p:spPr>
+          <a:xfrm>
+            <a:off x="10108692" y="3480191"/>
+            <a:ext cx="626364" cy="0"/>
+          </a:xfrm>
+          <a:prstGeom prst="straightConnector1">
+            <a:avLst/>
+          </a:prstGeom>
+          <a:ln>
+            <a:tailEnd type="triangle"/>
+          </a:ln>
+        </p:spPr>
+        <p:style>
+          <a:lnRef idx="2">
+            <a:schemeClr val="accent1"/>
+          </a:lnRef>
+          <a:fillRef idx="0">
+            <a:schemeClr val="accent1"/>
+          </a:fillRef>
+          <a:effectRef idx="1">
+            <a:schemeClr val="accent1"/>
+          </a:effectRef>
+          <a:fontRef idx="minor">
+            <a:schemeClr val="tx1"/>
+          </a:fontRef>
+        </p:style>
+      </p:cxnSp>
+      <p:sp>
+        <p:nvSpPr>
+          <p:cNvPr id="32" name="TextBox 31">
+            <a:extLst>
+              <a:ext uri="{FF2B5EF4-FFF2-40B4-BE49-F238E27FC236}">
+                <a16:creationId xmlns:a16="http://schemas.microsoft.com/office/drawing/2014/main" id="{F24FED50-EBAD-FA5D-FE77-079A9876B14F}"/>
+              </a:ext>
+            </a:extLst>
+          </p:cNvPr>
+          <p:cNvSpPr txBox="1"/>
+          <p:nvPr/>
+        </p:nvSpPr>
+        <p:spPr>
+          <a:xfrm>
+            <a:off x="7594092" y="3280136"/>
+            <a:ext cx="1106424" cy="553998"/>
+          </a:xfrm>
+          <a:prstGeom prst="rect">
+            <a:avLst/>
+          </a:prstGeom>
+          <a:noFill/>
+        </p:spPr>
+        <p:txBody>
+          <a:bodyPr wrap="square" rtlCol="0">
+            <a:spAutoFit/>
+          </a:bodyPr>
+          <a:lstStyle/>
+          <a:p>
+            <a:pPr algn="ctr"/>
+            <a:r>
+              <a:rPr lang="en-US" sz="1000" dirty="0">
+                <a:solidFill>
+                  <a:schemeClr val="bg1"/>
+                </a:solidFill>
+              </a:rPr>
+              <a:t>Pretrained Encoder</a:t>
+            </a:r>
+          </a:p>
+          <a:p>
+            <a:pPr algn="ctr"/>
+            <a:r>
+              <a:rPr lang="en-US" sz="1000" dirty="0">
+                <a:solidFill>
+                  <a:schemeClr val="bg1"/>
+                </a:solidFill>
+              </a:rPr>
+              <a:t>(Frozen)</a:t>
+            </a:r>
+          </a:p>
+        </p:txBody>
+      </p:sp>
+      <p:pic>
+        <p:nvPicPr>
+          <p:cNvPr id="7" name="Picture 6" descr="A graph of a curve&#10;&#10;AI-generated content may be incorrect.">
+            <a:extLst>
+              <a:ext uri="{FF2B5EF4-FFF2-40B4-BE49-F238E27FC236}">
+                <a16:creationId xmlns:a16="http://schemas.microsoft.com/office/drawing/2014/main" id="{E9F44E64-34A2-EC9E-B396-061CEC691102}"/>
+              </a:ext>
+            </a:extLst>
+          </p:cNvPr>
+          <p:cNvPicPr>
+            <a:picLocks noChangeAspect="1"/>
+          </p:cNvPicPr>
+          <p:nvPr/>
+        </p:nvPicPr>
+        <p:blipFill>
+          <a:blip r:embed="rId3">
+            <a:extLst>
+              <a:ext uri="{28A0092B-C50C-407E-A947-70E740481C1C}">
+                <a14:useLocalDpi xmlns:a14="http://schemas.microsoft.com/office/drawing/2010/main" val="0"/>
+              </a:ext>
+            </a:extLst>
+          </a:blip>
+          <a:stretch>
+            <a:fillRect/>
+          </a:stretch>
+        </p:blipFill>
+        <p:spPr>
+          <a:xfrm>
+            <a:off x="699517" y="2629799"/>
+            <a:ext cx="4857314" cy="3642986"/>
+          </a:xfrm>
+          <a:prstGeom prst="rect">
+            <a:avLst/>
+          </a:prstGeom>
+        </p:spPr>
+      </p:pic>
+      <p:sp>
+        <p:nvSpPr>
+          <p:cNvPr id="5" name="TextBox 4">
+            <a:extLst>
+              <a:ext uri="{FF2B5EF4-FFF2-40B4-BE49-F238E27FC236}">
+                <a16:creationId xmlns:a16="http://schemas.microsoft.com/office/drawing/2014/main" id="{F501B8E9-6D4D-ED38-6003-B5E5738E9DA8}"/>
+              </a:ext>
+            </a:extLst>
+          </p:cNvPr>
+          <p:cNvSpPr txBox="1"/>
+          <p:nvPr/>
+        </p:nvSpPr>
+        <p:spPr>
+          <a:xfrm>
+            <a:off x="1600200" y="6272785"/>
+            <a:ext cx="3619664" cy="369332"/>
+          </a:xfrm>
+          <a:prstGeom prst="rect">
+            <a:avLst/>
+          </a:prstGeom>
+          <a:noFill/>
+        </p:spPr>
+        <p:txBody>
+          <a:bodyPr wrap="square" rtlCol="0">
+            <a:spAutoFit/>
+          </a:bodyPr>
+          <a:lstStyle/>
+          <a:p>
+            <a:r>
+              <a:rPr lang="en-US" dirty="0"/>
+              <a:t>Result on 5 Fold Validation Set</a:t>
+            </a:r>
+          </a:p>
+        </p:txBody>
+      </p:sp>
+    </p:spTree>
+    <p:extLst>
+      <p:ext uri="{BB962C8B-B14F-4D97-AF65-F5344CB8AC3E}">
+        <p14:creationId xmlns:p14="http://schemas.microsoft.com/office/powerpoint/2010/main" val="2306649895"/>
+      </p:ext>
+    </p:extLst>
+  </p:cSld>
+  <p:clrMapOvr>
+    <a:masterClrMapping/>
+  </p:clrMapOvr>
+</p:sld>
+</file>
+
+<file path=ppt/slides/slide3.xml><?xml version="1.0" encoding="utf-8"?>
+<p:sld xmlns:a="http://schemas.openxmlformats.org/drawingml/2006/main" xmlns:r="http://schemas.openxmlformats.org/officeDocument/2006/relationships" xmlns:p="http://schemas.openxmlformats.org/presentationml/2006/main">
+  <p:cSld>
+    <p:spTree>
+      <p:nvGrpSpPr>
+        <p:cNvPr id="1" name="">
+          <a:extLst>
+            <a:ext uri="{FF2B5EF4-FFF2-40B4-BE49-F238E27FC236}">
               <a16:creationId xmlns:a16="http://schemas.microsoft.com/office/drawing/2014/main" id="{01430D4D-2BC7-F455-8ABF-9EB3FE1CCA70}"/>
             </a:ext>
           </a:extLst>
@@ -9006,7 +11272,7 @@
 </p:sld>
 </file>
 
-<file path=ppt/slides/slide3.xml><?xml version="1.0" encoding="utf-8"?>
+<file path=ppt/slides/slide4.xml><?xml version="1.0" encoding="utf-8"?>
 <p:sld xmlns:a="http://schemas.openxmlformats.org/drawingml/2006/main" xmlns:r="http://schemas.openxmlformats.org/officeDocument/2006/relationships" xmlns:p="http://schemas.openxmlformats.org/presentationml/2006/main">
   <p:cSld>
     <p:spTree>
@@ -10169,7 +12435,7 @@
 </p:sld>
 </file>
 
-<file path=ppt/slides/slide4.xml><?xml version="1.0" encoding="utf-8"?>
+<file path=ppt/slides/slide5.xml><?xml version="1.0" encoding="utf-8"?>
 <p:sld xmlns:a="http://schemas.openxmlformats.org/drawingml/2006/main" xmlns:r="http://schemas.openxmlformats.org/officeDocument/2006/relationships" xmlns:p="http://schemas.openxmlformats.org/presentationml/2006/main">
   <p:cSld>
     <p:spTree>
@@ -11208,7 +13474,7 @@
 </p:sld>
 </file>
 
-<file path=ppt/slides/slide5.xml><?xml version="1.0" encoding="utf-8"?>
+<file path=ppt/slides/slide6.xml><?xml version="1.0" encoding="utf-8"?>
 <p:sld xmlns:a="http://schemas.openxmlformats.org/drawingml/2006/main" xmlns:r="http://schemas.openxmlformats.org/officeDocument/2006/relationships" xmlns:p="http://schemas.openxmlformats.org/presentationml/2006/main">
   <p:cSld>
     <p:spTree>
@@ -12362,7 +14628,7 @@
 </p:sld>
 </file>
 
-<file path=ppt/slides/slide6.xml><?xml version="1.0" encoding="utf-8"?>
+<file path=ppt/slides/slide7.xml><?xml version="1.0" encoding="utf-8"?>
 <p:sld xmlns:a="http://schemas.openxmlformats.org/drawingml/2006/main" xmlns:r="http://schemas.openxmlformats.org/officeDocument/2006/relationships" xmlns:p="http://schemas.openxmlformats.org/presentationml/2006/main">
   <p:cSld>
     <p:spTree>
@@ -13526,7 +15792,7 @@
 </p:sld>
 </file>
 
-<file path=ppt/slides/slide7.xml><?xml version="1.0" encoding="utf-8"?>
+<file path=ppt/slides/slide8.xml><?xml version="1.0" encoding="utf-8"?>
 <p:sld xmlns:a="http://schemas.openxmlformats.org/drawingml/2006/main" xmlns:r="http://schemas.openxmlformats.org/officeDocument/2006/relationships" xmlns:p="http://schemas.openxmlformats.org/presentationml/2006/main">
   <p:cSld>
     <p:spTree>
@@ -14732,7 +16998,7 @@
 </p:sld>
 </file>
 
-<file path=ppt/slides/slide8.xml><?xml version="1.0" encoding="utf-8"?>
+<file path=ppt/slides/slide9.xml><?xml version="1.0" encoding="utf-8"?>
 <p:sld xmlns:a="http://schemas.openxmlformats.org/drawingml/2006/main" xmlns:r="http://schemas.openxmlformats.org/officeDocument/2006/relationships" xmlns:p="http://schemas.openxmlformats.org/presentationml/2006/main">
   <p:cSld>
     <p:spTree>
@@ -14753,2051 +17019,6 @@
     <p:extLst>
       <p:ext uri="{BB962C8B-B14F-4D97-AF65-F5344CB8AC3E}">
         <p14:creationId xmlns:p14="http://schemas.microsoft.com/office/powerpoint/2010/main" val="1355012303"/>
-      </p:ext>
-    </p:extLst>
-  </p:cSld>
-  <p:clrMapOvr>
-    <a:masterClrMapping/>
-  </p:clrMapOvr>
-</p:sld>
-</file>
-
-<file path=ppt/slides/slide9.xml><?xml version="1.0" encoding="utf-8"?>
-<p:sld xmlns:a="http://schemas.openxmlformats.org/drawingml/2006/main" xmlns:r="http://schemas.openxmlformats.org/officeDocument/2006/relationships" xmlns:p="http://schemas.openxmlformats.org/presentationml/2006/main">
-  <p:cSld>
-    <p:spTree>
-      <p:nvGrpSpPr>
-        <p:cNvPr id="1" name="">
-          <a:extLst>
-            <a:ext uri="{FF2B5EF4-FFF2-40B4-BE49-F238E27FC236}">
-              <a16:creationId xmlns:a16="http://schemas.microsoft.com/office/drawing/2014/main" id="{C725422C-9033-95CD-CFFB-AD12ABC5F95F}"/>
-            </a:ext>
-          </a:extLst>
-        </p:cNvPr>
-        <p:cNvGrpSpPr/>
-        <p:nvPr/>
-      </p:nvGrpSpPr>
-      <p:grpSpPr>
-        <a:xfrm>
-          <a:off x="0" y="0"/>
-          <a:ext cx="0" cy="0"/>
-          <a:chOff x="0" y="0"/>
-          <a:chExt cx="0" cy="0"/>
-        </a:xfrm>
-      </p:grpSpPr>
-      <p:sp>
-        <p:nvSpPr>
-          <p:cNvPr id="49" name="Flowchart: Manual Operation 48">
-            <a:extLst>
-              <a:ext uri="{FF2B5EF4-FFF2-40B4-BE49-F238E27FC236}">
-                <a16:creationId xmlns:a16="http://schemas.microsoft.com/office/drawing/2014/main" id="{0BB9B428-A661-2B2E-6B69-EEEEC9AA5086}"/>
-              </a:ext>
-            </a:extLst>
-          </p:cNvPr>
-          <p:cNvSpPr/>
-          <p:nvPr/>
-        </p:nvSpPr>
-        <p:spPr>
-          <a:xfrm rot="16200000">
-            <a:off x="7331960" y="3398895"/>
-            <a:ext cx="1234440" cy="1536192"/>
-          </a:xfrm>
-          <a:prstGeom prst="flowChartManualOperation">
-            <a:avLst/>
-          </a:prstGeom>
-        </p:spPr>
-        <p:style>
-          <a:lnRef idx="2">
-            <a:schemeClr val="accent1">
-              <a:shade val="15000"/>
-            </a:schemeClr>
-          </a:lnRef>
-          <a:fillRef idx="1">
-            <a:schemeClr val="accent1"/>
-          </a:fillRef>
-          <a:effectRef idx="0">
-            <a:schemeClr val="accent1"/>
-          </a:effectRef>
-          <a:fontRef idx="minor">
-            <a:schemeClr val="lt1"/>
-          </a:fontRef>
-        </p:style>
-        <p:txBody>
-          <a:bodyPr rtlCol="0" anchor="ctr"/>
-          <a:lstStyle/>
-          <a:p>
-            <a:pPr algn="ctr"/>
-            <a:endParaRPr lang="en-US" dirty="0"/>
-          </a:p>
-        </p:txBody>
-      </p:sp>
-      <p:sp>
-        <p:nvSpPr>
-          <p:cNvPr id="2" name="TextBox 1">
-            <a:extLst>
-              <a:ext uri="{FF2B5EF4-FFF2-40B4-BE49-F238E27FC236}">
-                <a16:creationId xmlns:a16="http://schemas.microsoft.com/office/drawing/2014/main" id="{8902DA50-BEE2-3646-12C9-9817174B6171}"/>
-              </a:ext>
-            </a:extLst>
-          </p:cNvPr>
-          <p:cNvSpPr txBox="1"/>
-          <p:nvPr/>
-        </p:nvSpPr>
-        <p:spPr>
-          <a:xfrm>
-            <a:off x="797050" y="714205"/>
-            <a:ext cx="2688336" cy="369332"/>
-          </a:xfrm>
-          <a:prstGeom prst="rect">
-            <a:avLst/>
-          </a:prstGeom>
-          <a:noFill/>
-        </p:spPr>
-        <p:txBody>
-          <a:bodyPr wrap="square" rtlCol="0">
-            <a:spAutoFit/>
-          </a:bodyPr>
-          <a:lstStyle/>
-          <a:p>
-            <a:r>
-              <a:rPr lang="en-US" dirty="0"/>
-              <a:t>Experiment 4.1: </a:t>
-            </a:r>
-          </a:p>
-        </p:txBody>
-      </p:sp>
-      <p:sp>
-        <p:nvSpPr>
-          <p:cNvPr id="3" name="TextBox 2">
-            <a:extLst>
-              <a:ext uri="{FF2B5EF4-FFF2-40B4-BE49-F238E27FC236}">
-                <a16:creationId xmlns:a16="http://schemas.microsoft.com/office/drawing/2014/main" id="{103F1B06-B3C8-057B-0821-DE4729575764}"/>
-              </a:ext>
-            </a:extLst>
-          </p:cNvPr>
-          <p:cNvSpPr txBox="1"/>
-          <p:nvPr/>
-        </p:nvSpPr>
-        <p:spPr>
-          <a:xfrm>
-            <a:off x="858201" y="914425"/>
-            <a:ext cx="4502277" cy="3416320"/>
-          </a:xfrm>
-          <a:prstGeom prst="rect">
-            <a:avLst/>
-          </a:prstGeom>
-          <a:noFill/>
-        </p:spPr>
-        <p:txBody>
-          <a:bodyPr wrap="square" rtlCol="0">
-            <a:spAutoFit/>
-          </a:bodyPr>
-          <a:lstStyle/>
-          <a:p>
-            <a:endParaRPr lang="en-US" dirty="0"/>
-          </a:p>
-          <a:p>
-            <a:pPr marL="285750" indent="-285750">
-              <a:buFont typeface="Arial" panose="020B0604020202020204" pitchFamily="34" charset="0"/>
-              <a:buChar char="•"/>
-            </a:pPr>
-            <a:r>
-              <a:rPr lang="en-US" dirty="0"/>
-              <a:t>Binary Classification Setup </a:t>
-            </a:r>
-          </a:p>
-          <a:p>
-            <a:pPr marL="285750" indent="-285750">
-              <a:buFont typeface="Arial" panose="020B0604020202020204" pitchFamily="34" charset="0"/>
-              <a:buChar char="•"/>
-            </a:pPr>
-            <a:r>
-              <a:rPr lang="en-US" dirty="0"/>
-              <a:t>Classification Based on US Image Only</a:t>
-            </a:r>
-          </a:p>
-          <a:p>
-            <a:pPr marL="285750" indent="-285750">
-              <a:buFont typeface="Arial" panose="020B0604020202020204" pitchFamily="34" charset="0"/>
-              <a:buChar char="•"/>
-            </a:pPr>
-            <a:r>
-              <a:rPr lang="en-US" dirty="0"/>
-              <a:t>4 separate encoder with different types of US input </a:t>
-            </a:r>
-          </a:p>
-          <a:p>
-            <a:pPr marL="285750" indent="-285750">
-              <a:buFont typeface="Arial" panose="020B0604020202020204" pitchFamily="34" charset="0"/>
-              <a:buChar char="•"/>
-            </a:pPr>
-            <a:r>
-              <a:rPr lang="en-US" dirty="0"/>
-              <a:t>Linear layer weighted score</a:t>
-            </a:r>
-          </a:p>
-          <a:p>
-            <a:pPr marL="285750" indent="-285750">
-              <a:buFont typeface="Arial" panose="020B0604020202020204" pitchFamily="34" charset="0"/>
-              <a:buChar char="•"/>
-            </a:pPr>
-            <a:r>
-              <a:rPr lang="en-US" dirty="0" err="1"/>
-              <a:t>BCEWithLogits</a:t>
-            </a:r>
-            <a:r>
-              <a:rPr lang="en-US" dirty="0"/>
-              <a:t> Loss</a:t>
-            </a:r>
-          </a:p>
-          <a:p>
-            <a:pPr marL="285750" indent="-285750">
-              <a:buFont typeface="Arial" panose="020B0604020202020204" pitchFamily="34" charset="0"/>
-              <a:buChar char="•"/>
-            </a:pPr>
-            <a:r>
-              <a:rPr lang="en-US" dirty="0" err="1"/>
-              <a:t>Testset</a:t>
-            </a:r>
-            <a:r>
-              <a:rPr lang="en-US" dirty="0"/>
-              <a:t> on 120 to 143 Patient IDs:</a:t>
-            </a:r>
-          </a:p>
-          <a:p>
-            <a:pPr marL="742950" lvl="1" indent="-285750">
-              <a:buFont typeface="Arial" panose="020B0604020202020204" pitchFamily="34" charset="0"/>
-              <a:buChar char="•"/>
-            </a:pPr>
-            <a:r>
-              <a:rPr lang="en-US" dirty="0"/>
-              <a:t>Total images 82</a:t>
-            </a:r>
-          </a:p>
-          <a:p>
-            <a:pPr marL="742950" lvl="1" indent="-285750">
-              <a:buFont typeface="Arial" panose="020B0604020202020204" pitchFamily="34" charset="0"/>
-              <a:buChar char="•"/>
-            </a:pPr>
-            <a:r>
-              <a:rPr lang="en-US" dirty="0"/>
-              <a:t>Malignant 35, Benign 47</a:t>
-            </a:r>
-          </a:p>
-          <a:p>
-            <a:pPr marL="285750" indent="-285750">
-              <a:buFont typeface="Arial" panose="020B0604020202020204" pitchFamily="34" charset="0"/>
-              <a:buChar char="•"/>
-            </a:pPr>
-            <a:endParaRPr lang="en-US" dirty="0"/>
-          </a:p>
-          <a:p>
-            <a:pPr marL="285750" indent="-285750">
-              <a:buFont typeface="Arial" panose="020B0604020202020204" pitchFamily="34" charset="0"/>
-              <a:buChar char="•"/>
-            </a:pPr>
-            <a:endParaRPr lang="en-US" dirty="0"/>
-          </a:p>
-        </p:txBody>
-      </p:sp>
-      <p:sp>
-        <p:nvSpPr>
-          <p:cNvPr id="4" name="Flowchart: Manual Operation 3">
-            <a:extLst>
-              <a:ext uri="{FF2B5EF4-FFF2-40B4-BE49-F238E27FC236}">
-                <a16:creationId xmlns:a16="http://schemas.microsoft.com/office/drawing/2014/main" id="{CCBFDF2A-8A27-7CF7-F8A0-9F647BCD04A2}"/>
-              </a:ext>
-            </a:extLst>
-          </p:cNvPr>
-          <p:cNvSpPr/>
-          <p:nvPr/>
-        </p:nvSpPr>
-        <p:spPr>
-          <a:xfrm rot="16200000">
-            <a:off x="7339582" y="-37539"/>
-            <a:ext cx="1234440" cy="1536192"/>
-          </a:xfrm>
-          <a:prstGeom prst="flowChartManualOperation">
-            <a:avLst/>
-          </a:prstGeom>
-        </p:spPr>
-        <p:style>
-          <a:lnRef idx="2">
-            <a:schemeClr val="accent1">
-              <a:shade val="15000"/>
-            </a:schemeClr>
-          </a:lnRef>
-          <a:fillRef idx="1">
-            <a:schemeClr val="accent1"/>
-          </a:fillRef>
-          <a:effectRef idx="0">
-            <a:schemeClr val="accent1"/>
-          </a:effectRef>
-          <a:fontRef idx="minor">
-            <a:schemeClr val="lt1"/>
-          </a:fontRef>
-        </p:style>
-        <p:txBody>
-          <a:bodyPr rtlCol="0" anchor="ctr"/>
-          <a:lstStyle/>
-          <a:p>
-            <a:pPr algn="ctr"/>
-            <a:endParaRPr lang="en-US" dirty="0"/>
-          </a:p>
-        </p:txBody>
-      </p:sp>
-      <p:sp>
-        <p:nvSpPr>
-          <p:cNvPr id="5" name="Flowchart: Manual Operation 4">
-            <a:extLst>
-              <a:ext uri="{FF2B5EF4-FFF2-40B4-BE49-F238E27FC236}">
-                <a16:creationId xmlns:a16="http://schemas.microsoft.com/office/drawing/2014/main" id="{ACE199C5-3769-70CE-9456-1B96C36D86EB}"/>
-              </a:ext>
-            </a:extLst>
-          </p:cNvPr>
-          <p:cNvSpPr/>
-          <p:nvPr/>
-        </p:nvSpPr>
-        <p:spPr>
-          <a:xfrm rot="16200000">
-            <a:off x="7339582" y="1777545"/>
-            <a:ext cx="1234440" cy="1536192"/>
-          </a:xfrm>
-          <a:prstGeom prst="flowChartManualOperation">
-            <a:avLst/>
-          </a:prstGeom>
-        </p:spPr>
-        <p:style>
-          <a:lnRef idx="2">
-            <a:schemeClr val="accent1">
-              <a:shade val="15000"/>
-            </a:schemeClr>
-          </a:lnRef>
-          <a:fillRef idx="1">
-            <a:schemeClr val="accent1"/>
-          </a:fillRef>
-          <a:effectRef idx="0">
-            <a:schemeClr val="accent1"/>
-          </a:effectRef>
-          <a:fontRef idx="minor">
-            <a:schemeClr val="lt1"/>
-          </a:fontRef>
-        </p:style>
-        <p:txBody>
-          <a:bodyPr rtlCol="0" anchor="ctr"/>
-          <a:lstStyle/>
-          <a:p>
-            <a:pPr algn="ctr"/>
-            <a:endParaRPr lang="en-US"/>
-          </a:p>
-        </p:txBody>
-      </p:sp>
-      <p:sp>
-        <p:nvSpPr>
-          <p:cNvPr id="6" name="Rectangle 5">
-            <a:extLst>
-              <a:ext uri="{FF2B5EF4-FFF2-40B4-BE49-F238E27FC236}">
-                <a16:creationId xmlns:a16="http://schemas.microsoft.com/office/drawing/2014/main" id="{873FB6F0-374A-360F-7B22-D9713AFF57BE}"/>
-              </a:ext>
-            </a:extLst>
-          </p:cNvPr>
-          <p:cNvSpPr/>
-          <p:nvPr/>
-        </p:nvSpPr>
-        <p:spPr>
-          <a:xfrm>
-            <a:off x="9214102" y="323649"/>
-            <a:ext cx="612648" cy="813816"/>
-          </a:xfrm>
-          <a:prstGeom prst="rect">
-            <a:avLst/>
-          </a:prstGeom>
-        </p:spPr>
-        <p:style>
-          <a:lnRef idx="2">
-            <a:schemeClr val="accent1">
-              <a:shade val="15000"/>
-            </a:schemeClr>
-          </a:lnRef>
-          <a:fillRef idx="1">
-            <a:schemeClr val="accent1"/>
-          </a:fillRef>
-          <a:effectRef idx="0">
-            <a:schemeClr val="accent1"/>
-          </a:effectRef>
-          <a:fontRef idx="minor">
-            <a:schemeClr val="lt1"/>
-          </a:fontRef>
-        </p:style>
-        <p:txBody>
-          <a:bodyPr rtlCol="0" anchor="ctr"/>
-          <a:lstStyle/>
-          <a:p>
-            <a:pPr algn="ctr"/>
-            <a:r>
-              <a:rPr lang="en-US" sz="1000" dirty="0"/>
-              <a:t>FC Layer</a:t>
-            </a:r>
-          </a:p>
-        </p:txBody>
-      </p:sp>
-      <p:sp>
-        <p:nvSpPr>
-          <p:cNvPr id="7" name="Rectangle 6">
-            <a:extLst>
-              <a:ext uri="{FF2B5EF4-FFF2-40B4-BE49-F238E27FC236}">
-                <a16:creationId xmlns:a16="http://schemas.microsoft.com/office/drawing/2014/main" id="{F56F813D-D5C2-B1D0-4973-15D93B1492D2}"/>
-              </a:ext>
-            </a:extLst>
-          </p:cNvPr>
-          <p:cNvSpPr/>
-          <p:nvPr/>
-        </p:nvSpPr>
-        <p:spPr>
-          <a:xfrm>
-            <a:off x="9214102" y="2138733"/>
-            <a:ext cx="612648" cy="813816"/>
-          </a:xfrm>
-          <a:prstGeom prst="rect">
-            <a:avLst/>
-          </a:prstGeom>
-        </p:spPr>
-        <p:style>
-          <a:lnRef idx="2">
-            <a:schemeClr val="accent1">
-              <a:shade val="15000"/>
-            </a:schemeClr>
-          </a:lnRef>
-          <a:fillRef idx="1">
-            <a:schemeClr val="accent1"/>
-          </a:fillRef>
-          <a:effectRef idx="0">
-            <a:schemeClr val="accent1"/>
-          </a:effectRef>
-          <a:fontRef idx="minor">
-            <a:schemeClr val="lt1"/>
-          </a:fontRef>
-        </p:style>
-        <p:txBody>
-          <a:bodyPr rtlCol="0" anchor="ctr"/>
-          <a:lstStyle/>
-          <a:p>
-            <a:pPr algn="ctr"/>
-            <a:r>
-              <a:rPr lang="en-US" sz="1000" dirty="0"/>
-              <a:t>FC Layer</a:t>
-            </a:r>
-          </a:p>
-        </p:txBody>
-      </p:sp>
-      <p:sp>
-        <p:nvSpPr>
-          <p:cNvPr id="8" name="Oval 7">
-            <a:extLst>
-              <a:ext uri="{FF2B5EF4-FFF2-40B4-BE49-F238E27FC236}">
-                <a16:creationId xmlns:a16="http://schemas.microsoft.com/office/drawing/2014/main" id="{2A3A6164-4302-73B7-F51C-9A2FC7188D95}"/>
-              </a:ext>
-            </a:extLst>
-          </p:cNvPr>
-          <p:cNvSpPr/>
-          <p:nvPr/>
-        </p:nvSpPr>
-        <p:spPr>
-          <a:xfrm>
-            <a:off x="10453114" y="364797"/>
-            <a:ext cx="813816" cy="731520"/>
-          </a:xfrm>
-          <a:prstGeom prst="ellipse">
-            <a:avLst/>
-          </a:prstGeom>
-        </p:spPr>
-        <p:style>
-          <a:lnRef idx="2">
-            <a:schemeClr val="accent1">
-              <a:shade val="15000"/>
-            </a:schemeClr>
-          </a:lnRef>
-          <a:fillRef idx="1">
-            <a:schemeClr val="accent1"/>
-          </a:fillRef>
-          <a:effectRef idx="0">
-            <a:schemeClr val="accent1"/>
-          </a:effectRef>
-          <a:fontRef idx="minor">
-            <a:schemeClr val="lt1"/>
-          </a:fontRef>
-        </p:style>
-        <p:txBody>
-          <a:bodyPr rtlCol="0" anchor="ctr"/>
-          <a:lstStyle/>
-          <a:p>
-            <a:pPr algn="ctr"/>
-            <a:r>
-              <a:rPr lang="en-US" dirty="0"/>
-              <a:t>0/1</a:t>
-            </a:r>
-          </a:p>
-        </p:txBody>
-      </p:sp>
-      <p:sp>
-        <p:nvSpPr>
-          <p:cNvPr id="9" name="Oval 8">
-            <a:extLst>
-              <a:ext uri="{FF2B5EF4-FFF2-40B4-BE49-F238E27FC236}">
-                <a16:creationId xmlns:a16="http://schemas.microsoft.com/office/drawing/2014/main" id="{BB6F1CE1-75A1-B714-5102-F4EF447EE099}"/>
-              </a:ext>
-            </a:extLst>
-          </p:cNvPr>
-          <p:cNvSpPr/>
-          <p:nvPr/>
-        </p:nvSpPr>
-        <p:spPr>
-          <a:xfrm>
-            <a:off x="10425682" y="2179881"/>
-            <a:ext cx="813816" cy="731520"/>
-          </a:xfrm>
-          <a:prstGeom prst="ellipse">
-            <a:avLst/>
-          </a:prstGeom>
-        </p:spPr>
-        <p:style>
-          <a:lnRef idx="2">
-            <a:schemeClr val="accent1">
-              <a:shade val="15000"/>
-            </a:schemeClr>
-          </a:lnRef>
-          <a:fillRef idx="1">
-            <a:schemeClr val="accent1"/>
-          </a:fillRef>
-          <a:effectRef idx="0">
-            <a:schemeClr val="accent1"/>
-          </a:effectRef>
-          <a:fontRef idx="minor">
-            <a:schemeClr val="lt1"/>
-          </a:fontRef>
-        </p:style>
-        <p:txBody>
-          <a:bodyPr rtlCol="0" anchor="ctr"/>
-          <a:lstStyle/>
-          <a:p>
-            <a:pPr algn="ctr"/>
-            <a:r>
-              <a:rPr lang="en-US" dirty="0"/>
-              <a:t>0/1</a:t>
-            </a:r>
-          </a:p>
-        </p:txBody>
-      </p:sp>
-      <p:pic>
-        <p:nvPicPr>
-          <p:cNvPr id="13" name="Picture 12" descr="An ultrasound of a baby&#10;&#10;AI-generated content may be incorrect.">
-            <a:extLst>
-              <a:ext uri="{FF2B5EF4-FFF2-40B4-BE49-F238E27FC236}">
-                <a16:creationId xmlns:a16="http://schemas.microsoft.com/office/drawing/2014/main" id="{36AC841C-9079-793F-08AA-507B098F7AD0}"/>
-              </a:ext>
-            </a:extLst>
-          </p:cNvPr>
-          <p:cNvPicPr>
-            <a:picLocks noChangeAspect="1"/>
-          </p:cNvPicPr>
-          <p:nvPr/>
-        </p:nvPicPr>
-        <p:blipFill>
-          <a:blip r:embed="rId2">
-            <a:extLst>
-              <a:ext uri="{28A0092B-C50C-407E-A947-70E740481C1C}">
-                <a14:useLocalDpi xmlns:a14="http://schemas.microsoft.com/office/drawing/2010/main" val="0"/>
-              </a:ext>
-            </a:extLst>
-          </a:blip>
-          <a:stretch>
-            <a:fillRect/>
-          </a:stretch>
-        </p:blipFill>
-        <p:spPr>
-          <a:xfrm>
-            <a:off x="5597650" y="269571"/>
-            <a:ext cx="960120" cy="921972"/>
-          </a:xfrm>
-          <a:prstGeom prst="rect">
-            <a:avLst/>
-          </a:prstGeom>
-        </p:spPr>
-      </p:pic>
-      <p:pic>
-        <p:nvPicPr>
-          <p:cNvPr id="14" name="Picture 13" descr="An ultrasound of a baby&#10;&#10;AI-generated content may be incorrect.">
-            <a:extLst>
-              <a:ext uri="{FF2B5EF4-FFF2-40B4-BE49-F238E27FC236}">
-                <a16:creationId xmlns:a16="http://schemas.microsoft.com/office/drawing/2014/main" id="{D7910DDD-0658-3254-C83F-DDB4118AAB01}"/>
-              </a:ext>
-            </a:extLst>
-          </p:cNvPr>
-          <p:cNvPicPr>
-            <a:picLocks noChangeAspect="1"/>
-          </p:cNvPicPr>
-          <p:nvPr/>
-        </p:nvPicPr>
-        <p:blipFill>
-          <a:blip r:embed="rId2">
-            <a:extLst>
-              <a:ext uri="{28A0092B-C50C-407E-A947-70E740481C1C}">
-                <a14:useLocalDpi xmlns:a14="http://schemas.microsoft.com/office/drawing/2010/main" val="0"/>
-              </a:ext>
-            </a:extLst>
-          </a:blip>
-          <a:stretch>
-            <a:fillRect/>
-          </a:stretch>
-        </p:blipFill>
-        <p:spPr>
-          <a:xfrm>
-            <a:off x="5597650" y="2084655"/>
-            <a:ext cx="960120" cy="921972"/>
-          </a:xfrm>
-          <a:prstGeom prst="rect">
-            <a:avLst/>
-          </a:prstGeom>
-        </p:spPr>
-      </p:pic>
-      <p:cxnSp>
-        <p:nvCxnSpPr>
-          <p:cNvPr id="16" name="Straight Arrow Connector 15">
-            <a:extLst>
-              <a:ext uri="{FF2B5EF4-FFF2-40B4-BE49-F238E27FC236}">
-                <a16:creationId xmlns:a16="http://schemas.microsoft.com/office/drawing/2014/main" id="{F1D01259-B7EC-A93E-43E3-C5791596E57D}"/>
-              </a:ext>
-            </a:extLst>
-          </p:cNvPr>
-          <p:cNvCxnSpPr>
-            <a:stCxn id="13" idx="3"/>
-            <a:endCxn id="4" idx="0"/>
-          </p:cNvCxnSpPr>
-          <p:nvPr/>
-        </p:nvCxnSpPr>
-        <p:spPr>
-          <a:xfrm>
-            <a:off x="6557770" y="730557"/>
-            <a:ext cx="630936" cy="0"/>
-          </a:xfrm>
-          <a:prstGeom prst="straightConnector1">
-            <a:avLst/>
-          </a:prstGeom>
-          <a:ln>
-            <a:tailEnd type="triangle"/>
-          </a:ln>
-        </p:spPr>
-        <p:style>
-          <a:lnRef idx="2">
-            <a:schemeClr val="accent1"/>
-          </a:lnRef>
-          <a:fillRef idx="0">
-            <a:schemeClr val="accent1"/>
-          </a:fillRef>
-          <a:effectRef idx="1">
-            <a:schemeClr val="accent1"/>
-          </a:effectRef>
-          <a:fontRef idx="minor">
-            <a:schemeClr val="tx1"/>
-          </a:fontRef>
-        </p:style>
-      </p:cxnSp>
-      <p:cxnSp>
-        <p:nvCxnSpPr>
-          <p:cNvPr id="19" name="Straight Arrow Connector 18">
-            <a:extLst>
-              <a:ext uri="{FF2B5EF4-FFF2-40B4-BE49-F238E27FC236}">
-                <a16:creationId xmlns:a16="http://schemas.microsoft.com/office/drawing/2014/main" id="{1D087629-8469-4DC6-9E1B-37C6F4339602}"/>
-              </a:ext>
-            </a:extLst>
-          </p:cNvPr>
-          <p:cNvCxnSpPr>
-            <a:stCxn id="4" idx="2"/>
-            <a:endCxn id="6" idx="1"/>
-          </p:cNvCxnSpPr>
-          <p:nvPr/>
-        </p:nvCxnSpPr>
-        <p:spPr>
-          <a:xfrm>
-            <a:off x="8724898" y="730557"/>
-            <a:ext cx="489204" cy="0"/>
-          </a:xfrm>
-          <a:prstGeom prst="straightConnector1">
-            <a:avLst/>
-          </a:prstGeom>
-          <a:ln>
-            <a:tailEnd type="triangle"/>
-          </a:ln>
-        </p:spPr>
-        <p:style>
-          <a:lnRef idx="2">
-            <a:schemeClr val="accent1"/>
-          </a:lnRef>
-          <a:fillRef idx="0">
-            <a:schemeClr val="accent1"/>
-          </a:fillRef>
-          <a:effectRef idx="1">
-            <a:schemeClr val="accent1"/>
-          </a:effectRef>
-          <a:fontRef idx="minor">
-            <a:schemeClr val="tx1"/>
-          </a:fontRef>
-        </p:style>
-      </p:cxnSp>
-      <p:cxnSp>
-        <p:nvCxnSpPr>
-          <p:cNvPr id="21" name="Straight Arrow Connector 20">
-            <a:extLst>
-              <a:ext uri="{FF2B5EF4-FFF2-40B4-BE49-F238E27FC236}">
-                <a16:creationId xmlns:a16="http://schemas.microsoft.com/office/drawing/2014/main" id="{E630FAE1-930D-C136-96FF-1733901E092C}"/>
-              </a:ext>
-            </a:extLst>
-          </p:cNvPr>
-          <p:cNvCxnSpPr>
-            <a:cxnSpLocks/>
-            <a:stCxn id="6" idx="3"/>
-            <a:endCxn id="8" idx="2"/>
-          </p:cNvCxnSpPr>
-          <p:nvPr/>
-        </p:nvCxnSpPr>
-        <p:spPr>
-          <a:xfrm>
-            <a:off x="9826750" y="730557"/>
-            <a:ext cx="626364" cy="0"/>
-          </a:xfrm>
-          <a:prstGeom prst="straightConnector1">
-            <a:avLst/>
-          </a:prstGeom>
-          <a:ln>
-            <a:tailEnd type="triangle"/>
-          </a:ln>
-        </p:spPr>
-        <p:style>
-          <a:lnRef idx="2">
-            <a:schemeClr val="accent1"/>
-          </a:lnRef>
-          <a:fillRef idx="0">
-            <a:schemeClr val="accent1"/>
-          </a:fillRef>
-          <a:effectRef idx="1">
-            <a:schemeClr val="accent1"/>
-          </a:effectRef>
-          <a:fontRef idx="minor">
-            <a:schemeClr val="tx1"/>
-          </a:fontRef>
-        </p:style>
-      </p:cxnSp>
-      <p:cxnSp>
-        <p:nvCxnSpPr>
-          <p:cNvPr id="26" name="Straight Arrow Connector 25">
-            <a:extLst>
-              <a:ext uri="{FF2B5EF4-FFF2-40B4-BE49-F238E27FC236}">
-                <a16:creationId xmlns:a16="http://schemas.microsoft.com/office/drawing/2014/main" id="{67869632-701E-5C16-DDDB-7524CA7C8C45}"/>
-              </a:ext>
-            </a:extLst>
-          </p:cNvPr>
-          <p:cNvCxnSpPr>
-            <a:cxnSpLocks/>
-            <a:stCxn id="14" idx="3"/>
-            <a:endCxn id="5" idx="0"/>
-          </p:cNvCxnSpPr>
-          <p:nvPr/>
-        </p:nvCxnSpPr>
-        <p:spPr>
-          <a:xfrm>
-            <a:off x="6557770" y="2545641"/>
-            <a:ext cx="630936" cy="0"/>
-          </a:xfrm>
-          <a:prstGeom prst="straightConnector1">
-            <a:avLst/>
-          </a:prstGeom>
-          <a:ln>
-            <a:tailEnd type="triangle"/>
-          </a:ln>
-        </p:spPr>
-        <p:style>
-          <a:lnRef idx="2">
-            <a:schemeClr val="accent1"/>
-          </a:lnRef>
-          <a:fillRef idx="0">
-            <a:schemeClr val="accent1"/>
-          </a:fillRef>
-          <a:effectRef idx="1">
-            <a:schemeClr val="accent1"/>
-          </a:effectRef>
-          <a:fontRef idx="minor">
-            <a:schemeClr val="tx1"/>
-          </a:fontRef>
-        </p:style>
-      </p:cxnSp>
-      <p:cxnSp>
-        <p:nvCxnSpPr>
-          <p:cNvPr id="28" name="Straight Arrow Connector 27">
-            <a:extLst>
-              <a:ext uri="{FF2B5EF4-FFF2-40B4-BE49-F238E27FC236}">
-                <a16:creationId xmlns:a16="http://schemas.microsoft.com/office/drawing/2014/main" id="{990373FD-EFEB-4B43-EF34-514755277E17}"/>
-              </a:ext>
-            </a:extLst>
-          </p:cNvPr>
-          <p:cNvCxnSpPr>
-            <a:cxnSpLocks/>
-            <a:stCxn id="5" idx="2"/>
-            <a:endCxn id="7" idx="1"/>
-          </p:cNvCxnSpPr>
-          <p:nvPr/>
-        </p:nvCxnSpPr>
-        <p:spPr>
-          <a:xfrm>
-            <a:off x="8724898" y="2545641"/>
-            <a:ext cx="489204" cy="0"/>
-          </a:xfrm>
-          <a:prstGeom prst="straightConnector1">
-            <a:avLst/>
-          </a:prstGeom>
-          <a:ln>
-            <a:tailEnd type="triangle"/>
-          </a:ln>
-        </p:spPr>
-        <p:style>
-          <a:lnRef idx="2">
-            <a:schemeClr val="accent1"/>
-          </a:lnRef>
-          <a:fillRef idx="0">
-            <a:schemeClr val="accent1"/>
-          </a:fillRef>
-          <a:effectRef idx="1">
-            <a:schemeClr val="accent1"/>
-          </a:effectRef>
-          <a:fontRef idx="minor">
-            <a:schemeClr val="tx1"/>
-          </a:fontRef>
-        </p:style>
-      </p:cxnSp>
-      <p:cxnSp>
-        <p:nvCxnSpPr>
-          <p:cNvPr id="30" name="Straight Arrow Connector 29">
-            <a:extLst>
-              <a:ext uri="{FF2B5EF4-FFF2-40B4-BE49-F238E27FC236}">
-                <a16:creationId xmlns:a16="http://schemas.microsoft.com/office/drawing/2014/main" id="{D14095D3-5249-6F4D-23EC-C77F8A7BF683}"/>
-              </a:ext>
-            </a:extLst>
-          </p:cNvPr>
-          <p:cNvCxnSpPr>
-            <a:cxnSpLocks/>
-            <a:stCxn id="7" idx="3"/>
-            <a:endCxn id="9" idx="2"/>
-          </p:cNvCxnSpPr>
-          <p:nvPr/>
-        </p:nvCxnSpPr>
-        <p:spPr>
-          <a:xfrm>
-            <a:off x="9826750" y="2545641"/>
-            <a:ext cx="598932" cy="0"/>
-          </a:xfrm>
-          <a:prstGeom prst="straightConnector1">
-            <a:avLst/>
-          </a:prstGeom>
-          <a:ln>
-            <a:tailEnd type="triangle"/>
-          </a:ln>
-        </p:spPr>
-        <p:style>
-          <a:lnRef idx="2">
-            <a:schemeClr val="accent1"/>
-          </a:lnRef>
-          <a:fillRef idx="0">
-            <a:schemeClr val="accent1"/>
-          </a:fillRef>
-          <a:effectRef idx="1">
-            <a:schemeClr val="accent1"/>
-          </a:effectRef>
-          <a:fontRef idx="minor">
-            <a:schemeClr val="tx1"/>
-          </a:fontRef>
-        </p:style>
-      </p:cxnSp>
-      <p:sp>
-        <p:nvSpPr>
-          <p:cNvPr id="32" name="TextBox 31">
-            <a:extLst>
-              <a:ext uri="{FF2B5EF4-FFF2-40B4-BE49-F238E27FC236}">
-                <a16:creationId xmlns:a16="http://schemas.microsoft.com/office/drawing/2014/main" id="{03E23939-4C4F-57C3-2255-B03A4000055B}"/>
-              </a:ext>
-            </a:extLst>
-          </p:cNvPr>
-          <p:cNvSpPr txBox="1"/>
-          <p:nvPr/>
-        </p:nvSpPr>
-        <p:spPr>
-          <a:xfrm>
-            <a:off x="7312150" y="530502"/>
-            <a:ext cx="1106424" cy="553998"/>
-          </a:xfrm>
-          <a:prstGeom prst="rect">
-            <a:avLst/>
-          </a:prstGeom>
-          <a:noFill/>
-        </p:spPr>
-        <p:txBody>
-          <a:bodyPr wrap="square" rtlCol="0">
-            <a:spAutoFit/>
-          </a:bodyPr>
-          <a:lstStyle/>
-          <a:p>
-            <a:pPr algn="ctr"/>
-            <a:r>
-              <a:rPr lang="en-US" sz="1000" dirty="0">
-                <a:solidFill>
-                  <a:schemeClr val="bg1"/>
-                </a:solidFill>
-              </a:rPr>
-              <a:t>Pretrained Encoder</a:t>
-            </a:r>
-          </a:p>
-          <a:p>
-            <a:pPr algn="ctr"/>
-            <a:r>
-              <a:rPr lang="en-US" sz="1000" dirty="0">
-                <a:solidFill>
-                  <a:schemeClr val="bg1"/>
-                </a:solidFill>
-              </a:rPr>
-              <a:t>(Frozen)</a:t>
-            </a:r>
-          </a:p>
-        </p:txBody>
-      </p:sp>
-      <p:sp>
-        <p:nvSpPr>
-          <p:cNvPr id="34" name="TextBox 33">
-            <a:extLst>
-              <a:ext uri="{FF2B5EF4-FFF2-40B4-BE49-F238E27FC236}">
-                <a16:creationId xmlns:a16="http://schemas.microsoft.com/office/drawing/2014/main" id="{7147B002-7A43-B620-E72C-8922C2199D80}"/>
-              </a:ext>
-            </a:extLst>
-          </p:cNvPr>
-          <p:cNvSpPr txBox="1"/>
-          <p:nvPr/>
-        </p:nvSpPr>
-        <p:spPr>
-          <a:xfrm>
-            <a:off x="7364728" y="2345586"/>
-            <a:ext cx="1106424" cy="553998"/>
-          </a:xfrm>
-          <a:prstGeom prst="rect">
-            <a:avLst/>
-          </a:prstGeom>
-          <a:noFill/>
-        </p:spPr>
-        <p:txBody>
-          <a:bodyPr wrap="square" rtlCol="0">
-            <a:spAutoFit/>
-          </a:bodyPr>
-          <a:lstStyle/>
-          <a:p>
-            <a:pPr algn="ctr"/>
-            <a:r>
-              <a:rPr lang="en-US" sz="1000" dirty="0">
-                <a:solidFill>
-                  <a:schemeClr val="bg1"/>
-                </a:solidFill>
-              </a:rPr>
-              <a:t> Encoder</a:t>
-            </a:r>
-          </a:p>
-          <a:p>
-            <a:pPr algn="ctr"/>
-            <a:r>
-              <a:rPr lang="en-US" sz="1000" dirty="0">
-                <a:solidFill>
-                  <a:schemeClr val="bg1"/>
-                </a:solidFill>
-              </a:rPr>
-              <a:t>From Scratch</a:t>
-            </a:r>
-          </a:p>
-          <a:p>
-            <a:pPr algn="ctr"/>
-            <a:r>
-              <a:rPr lang="en-US" sz="1000" dirty="0">
-                <a:solidFill>
-                  <a:schemeClr val="bg1"/>
-                </a:solidFill>
-              </a:rPr>
-              <a:t>(Trainable)</a:t>
-            </a:r>
-          </a:p>
-        </p:txBody>
-      </p:sp>
-      <p:sp>
-        <p:nvSpPr>
-          <p:cNvPr id="22" name="TextBox 21">
-            <a:extLst>
-              <a:ext uri="{FF2B5EF4-FFF2-40B4-BE49-F238E27FC236}">
-                <a16:creationId xmlns:a16="http://schemas.microsoft.com/office/drawing/2014/main" id="{D954FAC4-B49D-7332-08BA-83130A8C9678}"/>
-              </a:ext>
-            </a:extLst>
-          </p:cNvPr>
-          <p:cNvSpPr txBox="1"/>
-          <p:nvPr/>
-        </p:nvSpPr>
-        <p:spPr>
-          <a:xfrm>
-            <a:off x="1153959" y="6339221"/>
-            <a:ext cx="3442906" cy="369332"/>
-          </a:xfrm>
-          <a:prstGeom prst="rect">
-            <a:avLst/>
-          </a:prstGeom>
-          <a:noFill/>
-        </p:spPr>
-        <p:txBody>
-          <a:bodyPr wrap="square" rtlCol="0">
-            <a:spAutoFit/>
-          </a:bodyPr>
-          <a:lstStyle/>
-          <a:p>
-            <a:pPr algn="ctr"/>
-            <a:r>
-              <a:rPr lang="en-US" dirty="0"/>
-              <a:t>Test Result on 5 fold models</a:t>
-            </a:r>
-          </a:p>
-        </p:txBody>
-      </p:sp>
-      <p:sp>
-        <p:nvSpPr>
-          <p:cNvPr id="10" name="Oval 9">
-            <a:extLst>
-              <a:ext uri="{FF2B5EF4-FFF2-40B4-BE49-F238E27FC236}">
-                <a16:creationId xmlns:a16="http://schemas.microsoft.com/office/drawing/2014/main" id="{D6A75EE7-8B4B-AF88-D0D3-E5103DEF45E6}"/>
-              </a:ext>
-            </a:extLst>
-          </p:cNvPr>
-          <p:cNvSpPr/>
-          <p:nvPr/>
-        </p:nvSpPr>
-        <p:spPr>
-          <a:xfrm>
-            <a:off x="11382752" y="3114495"/>
-            <a:ext cx="726948" cy="580644"/>
-          </a:xfrm>
-          <a:prstGeom prst="ellipse">
-            <a:avLst/>
-          </a:prstGeom>
-        </p:spPr>
-        <p:style>
-          <a:lnRef idx="2">
-            <a:schemeClr val="accent1">
-              <a:shade val="15000"/>
-            </a:schemeClr>
-          </a:lnRef>
-          <a:fillRef idx="1">
-            <a:schemeClr val="accent1"/>
-          </a:fillRef>
-          <a:effectRef idx="0">
-            <a:schemeClr val="accent1"/>
-          </a:effectRef>
-          <a:fontRef idx="minor">
-            <a:schemeClr val="lt1"/>
-          </a:fontRef>
-        </p:style>
-        <p:txBody>
-          <a:bodyPr rtlCol="0" anchor="ctr"/>
-          <a:lstStyle/>
-          <a:p>
-            <a:pPr algn="ctr"/>
-            <a:r>
-              <a:rPr lang="en-US" dirty="0"/>
-              <a:t>0/1</a:t>
-            </a:r>
-          </a:p>
-        </p:txBody>
-      </p:sp>
-      <p:cxnSp>
-        <p:nvCxnSpPr>
-          <p:cNvPr id="24" name="Straight Arrow Connector 23">
-            <a:extLst>
-              <a:ext uri="{FF2B5EF4-FFF2-40B4-BE49-F238E27FC236}">
-                <a16:creationId xmlns:a16="http://schemas.microsoft.com/office/drawing/2014/main" id="{4E2ACA3B-7776-1FA9-8B96-A17D7DE0776E}"/>
-              </a:ext>
-            </a:extLst>
-          </p:cNvPr>
-          <p:cNvCxnSpPr>
-            <a:cxnSpLocks/>
-            <a:stCxn id="5" idx="2"/>
-            <a:endCxn id="6" idx="1"/>
-          </p:cNvCxnSpPr>
-          <p:nvPr/>
-        </p:nvCxnSpPr>
-        <p:spPr>
-          <a:xfrm flipV="1">
-            <a:off x="8724898" y="730557"/>
-            <a:ext cx="489204" cy="1815084"/>
-          </a:xfrm>
-          <a:prstGeom prst="straightConnector1">
-            <a:avLst/>
-          </a:prstGeom>
-          <a:ln>
-            <a:tailEnd type="triangle"/>
-          </a:ln>
-        </p:spPr>
-        <p:style>
-          <a:lnRef idx="2">
-            <a:schemeClr val="accent1"/>
-          </a:lnRef>
-          <a:fillRef idx="0">
-            <a:schemeClr val="accent1"/>
-          </a:fillRef>
-          <a:effectRef idx="1">
-            <a:schemeClr val="accent1"/>
-          </a:effectRef>
-          <a:fontRef idx="minor">
-            <a:schemeClr val="tx1"/>
-          </a:fontRef>
-        </p:style>
-      </p:cxnSp>
-      <p:cxnSp>
-        <p:nvCxnSpPr>
-          <p:cNvPr id="27" name="Straight Arrow Connector 26">
-            <a:extLst>
-              <a:ext uri="{FF2B5EF4-FFF2-40B4-BE49-F238E27FC236}">
-                <a16:creationId xmlns:a16="http://schemas.microsoft.com/office/drawing/2014/main" id="{94D1FDAB-A616-EF87-B5EE-3370B034F928}"/>
-              </a:ext>
-            </a:extLst>
-          </p:cNvPr>
-          <p:cNvCxnSpPr>
-            <a:stCxn id="8" idx="4"/>
-            <a:endCxn id="10" idx="0"/>
-          </p:cNvCxnSpPr>
-          <p:nvPr/>
-        </p:nvCxnSpPr>
-        <p:spPr>
-          <a:xfrm>
-            <a:off x="10860022" y="1096317"/>
-            <a:ext cx="886204" cy="2018178"/>
-          </a:xfrm>
-          <a:prstGeom prst="straightConnector1">
-            <a:avLst/>
-          </a:prstGeom>
-          <a:ln>
-            <a:tailEnd type="triangle"/>
-          </a:ln>
-        </p:spPr>
-        <p:style>
-          <a:lnRef idx="2">
-            <a:schemeClr val="accent1"/>
-          </a:lnRef>
-          <a:fillRef idx="0">
-            <a:schemeClr val="accent1"/>
-          </a:fillRef>
-          <a:effectRef idx="1">
-            <a:schemeClr val="accent1"/>
-          </a:effectRef>
-          <a:fontRef idx="minor">
-            <a:schemeClr val="tx1"/>
-          </a:fontRef>
-        </p:style>
-      </p:cxnSp>
-      <p:cxnSp>
-        <p:nvCxnSpPr>
-          <p:cNvPr id="35" name="Straight Arrow Connector 34">
-            <a:extLst>
-              <a:ext uri="{FF2B5EF4-FFF2-40B4-BE49-F238E27FC236}">
-                <a16:creationId xmlns:a16="http://schemas.microsoft.com/office/drawing/2014/main" id="{A6D9F2AE-D4C3-9ABE-0920-6EDA0BE30F66}"/>
-              </a:ext>
-            </a:extLst>
-          </p:cNvPr>
-          <p:cNvCxnSpPr>
-            <a:cxnSpLocks/>
-            <a:stCxn id="9" idx="0"/>
-            <a:endCxn id="10" idx="4"/>
-          </p:cNvCxnSpPr>
-          <p:nvPr/>
-        </p:nvCxnSpPr>
-        <p:spPr>
-          <a:xfrm>
-            <a:off x="10832590" y="2179881"/>
-            <a:ext cx="913636" cy="1515258"/>
-          </a:xfrm>
-          <a:prstGeom prst="straightConnector1">
-            <a:avLst/>
-          </a:prstGeom>
-          <a:ln>
-            <a:tailEnd type="triangle"/>
-          </a:ln>
-        </p:spPr>
-        <p:style>
-          <a:lnRef idx="2">
-            <a:schemeClr val="accent1"/>
-          </a:lnRef>
-          <a:fillRef idx="0">
-            <a:schemeClr val="accent1"/>
-          </a:fillRef>
-          <a:effectRef idx="1">
-            <a:schemeClr val="accent1"/>
-          </a:effectRef>
-          <a:fontRef idx="minor">
-            <a:schemeClr val="tx1"/>
-          </a:fontRef>
-        </p:style>
-      </p:cxnSp>
-      <p:sp>
-        <p:nvSpPr>
-          <p:cNvPr id="17" name="Flowchart: Manual Operation 16">
-            <a:extLst>
-              <a:ext uri="{FF2B5EF4-FFF2-40B4-BE49-F238E27FC236}">
-                <a16:creationId xmlns:a16="http://schemas.microsoft.com/office/drawing/2014/main" id="{F51CDCBA-8154-0099-5556-61D8E4836073}"/>
-              </a:ext>
-            </a:extLst>
-          </p:cNvPr>
-          <p:cNvSpPr/>
-          <p:nvPr/>
-        </p:nvSpPr>
-        <p:spPr>
-          <a:xfrm rot="16200000">
-            <a:off x="7339582" y="5149035"/>
-            <a:ext cx="1234440" cy="1536192"/>
-          </a:xfrm>
-          <a:prstGeom prst="flowChartManualOperation">
-            <a:avLst/>
-          </a:prstGeom>
-        </p:spPr>
-        <p:style>
-          <a:lnRef idx="2">
-            <a:schemeClr val="accent1">
-              <a:shade val="15000"/>
-            </a:schemeClr>
-          </a:lnRef>
-          <a:fillRef idx="1">
-            <a:schemeClr val="accent1"/>
-          </a:fillRef>
-          <a:effectRef idx="0">
-            <a:schemeClr val="accent1"/>
-          </a:effectRef>
-          <a:fontRef idx="minor">
-            <a:schemeClr val="lt1"/>
-          </a:fontRef>
-        </p:style>
-        <p:txBody>
-          <a:bodyPr rtlCol="0" anchor="ctr"/>
-          <a:lstStyle/>
-          <a:p>
-            <a:pPr algn="ctr"/>
-            <a:endParaRPr lang="en-US"/>
-          </a:p>
-        </p:txBody>
-      </p:sp>
-      <p:sp>
-        <p:nvSpPr>
-          <p:cNvPr id="18" name="Rectangle 17">
-            <a:extLst>
-              <a:ext uri="{FF2B5EF4-FFF2-40B4-BE49-F238E27FC236}">
-                <a16:creationId xmlns:a16="http://schemas.microsoft.com/office/drawing/2014/main" id="{79EB24D3-FB6C-E19B-C864-DD0BF11DC7B3}"/>
-              </a:ext>
-            </a:extLst>
-          </p:cNvPr>
-          <p:cNvSpPr/>
-          <p:nvPr/>
-        </p:nvSpPr>
-        <p:spPr>
-          <a:xfrm>
-            <a:off x="9214102" y="3695139"/>
-            <a:ext cx="612648" cy="813816"/>
-          </a:xfrm>
-          <a:prstGeom prst="rect">
-            <a:avLst/>
-          </a:prstGeom>
-        </p:spPr>
-        <p:style>
-          <a:lnRef idx="2">
-            <a:schemeClr val="accent1">
-              <a:shade val="15000"/>
-            </a:schemeClr>
-          </a:lnRef>
-          <a:fillRef idx="1">
-            <a:schemeClr val="accent1"/>
-          </a:fillRef>
-          <a:effectRef idx="0">
-            <a:schemeClr val="accent1"/>
-          </a:effectRef>
-          <a:fontRef idx="minor">
-            <a:schemeClr val="lt1"/>
-          </a:fontRef>
-        </p:style>
-        <p:txBody>
-          <a:bodyPr rtlCol="0" anchor="ctr"/>
-          <a:lstStyle/>
-          <a:p>
-            <a:pPr algn="ctr"/>
-            <a:r>
-              <a:rPr lang="en-US" sz="1000" dirty="0"/>
-              <a:t>FC Layer</a:t>
-            </a:r>
-          </a:p>
-        </p:txBody>
-      </p:sp>
-      <p:sp>
-        <p:nvSpPr>
-          <p:cNvPr id="20" name="Rectangle 19">
-            <a:extLst>
-              <a:ext uri="{FF2B5EF4-FFF2-40B4-BE49-F238E27FC236}">
-                <a16:creationId xmlns:a16="http://schemas.microsoft.com/office/drawing/2014/main" id="{CF9DCDBE-165E-AB12-5CBC-580AD34CF490}"/>
-              </a:ext>
-            </a:extLst>
-          </p:cNvPr>
-          <p:cNvSpPr/>
-          <p:nvPr/>
-        </p:nvSpPr>
-        <p:spPr>
-          <a:xfrm>
-            <a:off x="9214102" y="5510223"/>
-            <a:ext cx="612648" cy="813816"/>
-          </a:xfrm>
-          <a:prstGeom prst="rect">
-            <a:avLst/>
-          </a:prstGeom>
-        </p:spPr>
-        <p:style>
-          <a:lnRef idx="2">
-            <a:schemeClr val="accent1">
-              <a:shade val="15000"/>
-            </a:schemeClr>
-          </a:lnRef>
-          <a:fillRef idx="1">
-            <a:schemeClr val="accent1"/>
-          </a:fillRef>
-          <a:effectRef idx="0">
-            <a:schemeClr val="accent1"/>
-          </a:effectRef>
-          <a:fontRef idx="minor">
-            <a:schemeClr val="lt1"/>
-          </a:fontRef>
-        </p:style>
-        <p:txBody>
-          <a:bodyPr rtlCol="0" anchor="ctr"/>
-          <a:lstStyle/>
-          <a:p>
-            <a:pPr algn="ctr"/>
-            <a:r>
-              <a:rPr lang="en-US" sz="1000" dirty="0"/>
-              <a:t>FC Layer</a:t>
-            </a:r>
-          </a:p>
-        </p:txBody>
-      </p:sp>
-      <p:sp>
-        <p:nvSpPr>
-          <p:cNvPr id="23" name="Oval 22">
-            <a:extLst>
-              <a:ext uri="{FF2B5EF4-FFF2-40B4-BE49-F238E27FC236}">
-                <a16:creationId xmlns:a16="http://schemas.microsoft.com/office/drawing/2014/main" id="{3CE0E583-91BF-D30C-E37A-2488036EFBDA}"/>
-              </a:ext>
-            </a:extLst>
-          </p:cNvPr>
-          <p:cNvSpPr/>
-          <p:nvPr/>
-        </p:nvSpPr>
-        <p:spPr>
-          <a:xfrm>
-            <a:off x="10453114" y="3736287"/>
-            <a:ext cx="813816" cy="731520"/>
-          </a:xfrm>
-          <a:prstGeom prst="ellipse">
-            <a:avLst/>
-          </a:prstGeom>
-        </p:spPr>
-        <p:style>
-          <a:lnRef idx="2">
-            <a:schemeClr val="accent1">
-              <a:shade val="15000"/>
-            </a:schemeClr>
-          </a:lnRef>
-          <a:fillRef idx="1">
-            <a:schemeClr val="accent1"/>
-          </a:fillRef>
-          <a:effectRef idx="0">
-            <a:schemeClr val="accent1"/>
-          </a:effectRef>
-          <a:fontRef idx="minor">
-            <a:schemeClr val="lt1"/>
-          </a:fontRef>
-        </p:style>
-        <p:txBody>
-          <a:bodyPr rtlCol="0" anchor="ctr"/>
-          <a:lstStyle/>
-          <a:p>
-            <a:pPr algn="ctr"/>
-            <a:r>
-              <a:rPr lang="en-US" dirty="0"/>
-              <a:t>0/1</a:t>
-            </a:r>
-          </a:p>
-        </p:txBody>
-      </p:sp>
-      <p:sp>
-        <p:nvSpPr>
-          <p:cNvPr id="25" name="Oval 24">
-            <a:extLst>
-              <a:ext uri="{FF2B5EF4-FFF2-40B4-BE49-F238E27FC236}">
-                <a16:creationId xmlns:a16="http://schemas.microsoft.com/office/drawing/2014/main" id="{A1FB4B73-DD65-3031-1733-52B64974A288}"/>
-              </a:ext>
-            </a:extLst>
-          </p:cNvPr>
-          <p:cNvSpPr/>
-          <p:nvPr/>
-        </p:nvSpPr>
-        <p:spPr>
-          <a:xfrm>
-            <a:off x="10425682" y="5551371"/>
-            <a:ext cx="813816" cy="731520"/>
-          </a:xfrm>
-          <a:prstGeom prst="ellipse">
-            <a:avLst/>
-          </a:prstGeom>
-        </p:spPr>
-        <p:style>
-          <a:lnRef idx="2">
-            <a:schemeClr val="accent1">
-              <a:shade val="15000"/>
-            </a:schemeClr>
-          </a:lnRef>
-          <a:fillRef idx="1">
-            <a:schemeClr val="accent1"/>
-          </a:fillRef>
-          <a:effectRef idx="0">
-            <a:schemeClr val="accent1"/>
-          </a:effectRef>
-          <a:fontRef idx="minor">
-            <a:schemeClr val="lt1"/>
-          </a:fontRef>
-        </p:style>
-        <p:txBody>
-          <a:bodyPr rtlCol="0" anchor="ctr"/>
-          <a:lstStyle/>
-          <a:p>
-            <a:pPr algn="ctr"/>
-            <a:r>
-              <a:rPr lang="en-US" dirty="0"/>
-              <a:t>0/1</a:t>
-            </a:r>
-          </a:p>
-        </p:txBody>
-      </p:sp>
-      <p:pic>
-        <p:nvPicPr>
-          <p:cNvPr id="29" name="Picture 28" descr="An ultrasound of a baby&#10;&#10;AI-generated content may be incorrect.">
-            <a:extLst>
-              <a:ext uri="{FF2B5EF4-FFF2-40B4-BE49-F238E27FC236}">
-                <a16:creationId xmlns:a16="http://schemas.microsoft.com/office/drawing/2014/main" id="{D4378563-6B5B-F155-A29E-15ABE948D1C2}"/>
-              </a:ext>
-            </a:extLst>
-          </p:cNvPr>
-          <p:cNvPicPr>
-            <a:picLocks noChangeAspect="1"/>
-          </p:cNvPicPr>
-          <p:nvPr/>
-        </p:nvPicPr>
-        <p:blipFill>
-          <a:blip r:embed="rId2">
-            <a:extLst>
-              <a:ext uri="{28A0092B-C50C-407E-A947-70E740481C1C}">
-                <a14:useLocalDpi xmlns:a14="http://schemas.microsoft.com/office/drawing/2010/main" val="0"/>
-              </a:ext>
-            </a:extLst>
-          </a:blip>
-          <a:stretch>
-            <a:fillRect/>
-          </a:stretch>
-        </p:blipFill>
-        <p:spPr>
-          <a:xfrm>
-            <a:off x="5597650" y="3641061"/>
-            <a:ext cx="960120" cy="921972"/>
-          </a:xfrm>
-          <a:prstGeom prst="rect">
-            <a:avLst/>
-          </a:prstGeom>
-        </p:spPr>
-      </p:pic>
-      <p:pic>
-        <p:nvPicPr>
-          <p:cNvPr id="31" name="Picture 30" descr="An ultrasound of a baby&#10;&#10;AI-generated content may be incorrect.">
-            <a:extLst>
-              <a:ext uri="{FF2B5EF4-FFF2-40B4-BE49-F238E27FC236}">
-                <a16:creationId xmlns:a16="http://schemas.microsoft.com/office/drawing/2014/main" id="{E5453CD8-BD70-DFFA-512A-6786D64DC833}"/>
-              </a:ext>
-            </a:extLst>
-          </p:cNvPr>
-          <p:cNvPicPr>
-            <a:picLocks noChangeAspect="1"/>
-          </p:cNvPicPr>
-          <p:nvPr/>
-        </p:nvPicPr>
-        <p:blipFill>
-          <a:blip r:embed="rId2">
-            <a:extLst>
-              <a:ext uri="{28A0092B-C50C-407E-A947-70E740481C1C}">
-                <a14:useLocalDpi xmlns:a14="http://schemas.microsoft.com/office/drawing/2010/main" val="0"/>
-              </a:ext>
-            </a:extLst>
-          </a:blip>
-          <a:stretch>
-            <a:fillRect/>
-          </a:stretch>
-        </p:blipFill>
-        <p:spPr>
-          <a:xfrm>
-            <a:off x="5597650" y="5456145"/>
-            <a:ext cx="960120" cy="921972"/>
-          </a:xfrm>
-          <a:prstGeom prst="rect">
-            <a:avLst/>
-          </a:prstGeom>
-        </p:spPr>
-      </p:pic>
-      <p:cxnSp>
-        <p:nvCxnSpPr>
-          <p:cNvPr id="33" name="Straight Arrow Connector 32">
-            <a:extLst>
-              <a:ext uri="{FF2B5EF4-FFF2-40B4-BE49-F238E27FC236}">
-                <a16:creationId xmlns:a16="http://schemas.microsoft.com/office/drawing/2014/main" id="{2F393520-5C75-3C48-B71A-9D19025E65BD}"/>
-              </a:ext>
-            </a:extLst>
-          </p:cNvPr>
-          <p:cNvCxnSpPr>
-            <a:stCxn id="29" idx="3"/>
-          </p:cNvCxnSpPr>
-          <p:nvPr/>
-        </p:nvCxnSpPr>
-        <p:spPr>
-          <a:xfrm>
-            <a:off x="6557770" y="4102047"/>
-            <a:ext cx="630936" cy="0"/>
-          </a:xfrm>
-          <a:prstGeom prst="straightConnector1">
-            <a:avLst/>
-          </a:prstGeom>
-          <a:ln>
-            <a:tailEnd type="triangle"/>
-          </a:ln>
-        </p:spPr>
-        <p:style>
-          <a:lnRef idx="2">
-            <a:schemeClr val="accent1"/>
-          </a:lnRef>
-          <a:fillRef idx="0">
-            <a:schemeClr val="accent1"/>
-          </a:fillRef>
-          <a:effectRef idx="1">
-            <a:schemeClr val="accent1"/>
-          </a:effectRef>
-          <a:fontRef idx="minor">
-            <a:schemeClr val="tx1"/>
-          </a:fontRef>
-        </p:style>
-      </p:cxnSp>
-      <p:cxnSp>
-        <p:nvCxnSpPr>
-          <p:cNvPr id="36" name="Straight Arrow Connector 35">
-            <a:extLst>
-              <a:ext uri="{FF2B5EF4-FFF2-40B4-BE49-F238E27FC236}">
-                <a16:creationId xmlns:a16="http://schemas.microsoft.com/office/drawing/2014/main" id="{ABEE3D9F-D2F2-D35F-B31B-4AAA87CE7E19}"/>
-              </a:ext>
-            </a:extLst>
-          </p:cNvPr>
-          <p:cNvCxnSpPr>
-            <a:endCxn id="18" idx="1"/>
-          </p:cNvCxnSpPr>
-          <p:nvPr/>
-        </p:nvCxnSpPr>
-        <p:spPr>
-          <a:xfrm>
-            <a:off x="8724898" y="4102047"/>
-            <a:ext cx="489204" cy="0"/>
-          </a:xfrm>
-          <a:prstGeom prst="straightConnector1">
-            <a:avLst/>
-          </a:prstGeom>
-          <a:ln>
-            <a:tailEnd type="triangle"/>
-          </a:ln>
-        </p:spPr>
-        <p:style>
-          <a:lnRef idx="2">
-            <a:schemeClr val="accent1"/>
-          </a:lnRef>
-          <a:fillRef idx="0">
-            <a:schemeClr val="accent1"/>
-          </a:fillRef>
-          <a:effectRef idx="1">
-            <a:schemeClr val="accent1"/>
-          </a:effectRef>
-          <a:fontRef idx="minor">
-            <a:schemeClr val="tx1"/>
-          </a:fontRef>
-        </p:style>
-      </p:cxnSp>
-      <p:cxnSp>
-        <p:nvCxnSpPr>
-          <p:cNvPr id="37" name="Straight Arrow Connector 36">
-            <a:extLst>
-              <a:ext uri="{FF2B5EF4-FFF2-40B4-BE49-F238E27FC236}">
-                <a16:creationId xmlns:a16="http://schemas.microsoft.com/office/drawing/2014/main" id="{B30AE34F-7688-891C-7347-6FD5350B7DDA}"/>
-              </a:ext>
-            </a:extLst>
-          </p:cNvPr>
-          <p:cNvCxnSpPr>
-            <a:cxnSpLocks/>
-            <a:stCxn id="18" idx="3"/>
-            <a:endCxn id="23" idx="2"/>
-          </p:cNvCxnSpPr>
-          <p:nvPr/>
-        </p:nvCxnSpPr>
-        <p:spPr>
-          <a:xfrm>
-            <a:off x="9826750" y="4102047"/>
-            <a:ext cx="626364" cy="0"/>
-          </a:xfrm>
-          <a:prstGeom prst="straightConnector1">
-            <a:avLst/>
-          </a:prstGeom>
-          <a:ln>
-            <a:tailEnd type="triangle"/>
-          </a:ln>
-        </p:spPr>
-        <p:style>
-          <a:lnRef idx="2">
-            <a:schemeClr val="accent1"/>
-          </a:lnRef>
-          <a:fillRef idx="0">
-            <a:schemeClr val="accent1"/>
-          </a:fillRef>
-          <a:effectRef idx="1">
-            <a:schemeClr val="accent1"/>
-          </a:effectRef>
-          <a:fontRef idx="minor">
-            <a:schemeClr val="tx1"/>
-          </a:fontRef>
-        </p:style>
-      </p:cxnSp>
-      <p:cxnSp>
-        <p:nvCxnSpPr>
-          <p:cNvPr id="38" name="Straight Arrow Connector 37">
-            <a:extLst>
-              <a:ext uri="{FF2B5EF4-FFF2-40B4-BE49-F238E27FC236}">
-                <a16:creationId xmlns:a16="http://schemas.microsoft.com/office/drawing/2014/main" id="{E6B8AE3D-6012-51C7-AFE7-FA64F79E548D}"/>
-              </a:ext>
-            </a:extLst>
-          </p:cNvPr>
-          <p:cNvCxnSpPr>
-            <a:cxnSpLocks/>
-            <a:stCxn id="31" idx="3"/>
-            <a:endCxn id="17" idx="0"/>
-          </p:cNvCxnSpPr>
-          <p:nvPr/>
-        </p:nvCxnSpPr>
-        <p:spPr>
-          <a:xfrm>
-            <a:off x="6557770" y="5917131"/>
-            <a:ext cx="630936" cy="0"/>
-          </a:xfrm>
-          <a:prstGeom prst="straightConnector1">
-            <a:avLst/>
-          </a:prstGeom>
-          <a:ln>
-            <a:tailEnd type="triangle"/>
-          </a:ln>
-        </p:spPr>
-        <p:style>
-          <a:lnRef idx="2">
-            <a:schemeClr val="accent1"/>
-          </a:lnRef>
-          <a:fillRef idx="0">
-            <a:schemeClr val="accent1"/>
-          </a:fillRef>
-          <a:effectRef idx="1">
-            <a:schemeClr val="accent1"/>
-          </a:effectRef>
-          <a:fontRef idx="minor">
-            <a:schemeClr val="tx1"/>
-          </a:fontRef>
-        </p:style>
-      </p:cxnSp>
-      <p:cxnSp>
-        <p:nvCxnSpPr>
-          <p:cNvPr id="39" name="Straight Arrow Connector 38">
-            <a:extLst>
-              <a:ext uri="{FF2B5EF4-FFF2-40B4-BE49-F238E27FC236}">
-                <a16:creationId xmlns:a16="http://schemas.microsoft.com/office/drawing/2014/main" id="{E5F8FBA0-750C-BC37-69DF-F2705EEDCA84}"/>
-              </a:ext>
-            </a:extLst>
-          </p:cNvPr>
-          <p:cNvCxnSpPr>
-            <a:cxnSpLocks/>
-            <a:stCxn id="17" idx="2"/>
-            <a:endCxn id="20" idx="1"/>
-          </p:cNvCxnSpPr>
-          <p:nvPr/>
-        </p:nvCxnSpPr>
-        <p:spPr>
-          <a:xfrm>
-            <a:off x="8724898" y="5917131"/>
-            <a:ext cx="489204" cy="0"/>
-          </a:xfrm>
-          <a:prstGeom prst="straightConnector1">
-            <a:avLst/>
-          </a:prstGeom>
-          <a:ln>
-            <a:tailEnd type="triangle"/>
-          </a:ln>
-        </p:spPr>
-        <p:style>
-          <a:lnRef idx="2">
-            <a:schemeClr val="accent1"/>
-          </a:lnRef>
-          <a:fillRef idx="0">
-            <a:schemeClr val="accent1"/>
-          </a:fillRef>
-          <a:effectRef idx="1">
-            <a:schemeClr val="accent1"/>
-          </a:effectRef>
-          <a:fontRef idx="minor">
-            <a:schemeClr val="tx1"/>
-          </a:fontRef>
-        </p:style>
-      </p:cxnSp>
-      <p:cxnSp>
-        <p:nvCxnSpPr>
-          <p:cNvPr id="40" name="Straight Arrow Connector 39">
-            <a:extLst>
-              <a:ext uri="{FF2B5EF4-FFF2-40B4-BE49-F238E27FC236}">
-                <a16:creationId xmlns:a16="http://schemas.microsoft.com/office/drawing/2014/main" id="{F7BA7C6E-FCAF-A740-5B72-8B09AD257519}"/>
-              </a:ext>
-            </a:extLst>
-          </p:cNvPr>
-          <p:cNvCxnSpPr>
-            <a:cxnSpLocks/>
-            <a:stCxn id="20" idx="3"/>
-            <a:endCxn id="25" idx="2"/>
-          </p:cNvCxnSpPr>
-          <p:nvPr/>
-        </p:nvCxnSpPr>
-        <p:spPr>
-          <a:xfrm>
-            <a:off x="9826750" y="5917131"/>
-            <a:ext cx="598932" cy="0"/>
-          </a:xfrm>
-          <a:prstGeom prst="straightConnector1">
-            <a:avLst/>
-          </a:prstGeom>
-          <a:ln>
-            <a:tailEnd type="triangle"/>
-          </a:ln>
-        </p:spPr>
-        <p:style>
-          <a:lnRef idx="2">
-            <a:schemeClr val="accent1"/>
-          </a:lnRef>
-          <a:fillRef idx="0">
-            <a:schemeClr val="accent1"/>
-          </a:fillRef>
-          <a:effectRef idx="1">
-            <a:schemeClr val="accent1"/>
-          </a:effectRef>
-          <a:fontRef idx="minor">
-            <a:schemeClr val="tx1"/>
-          </a:fontRef>
-        </p:style>
-      </p:cxnSp>
-      <p:sp>
-        <p:nvSpPr>
-          <p:cNvPr id="41" name="TextBox 40">
-            <a:extLst>
-              <a:ext uri="{FF2B5EF4-FFF2-40B4-BE49-F238E27FC236}">
-                <a16:creationId xmlns:a16="http://schemas.microsoft.com/office/drawing/2014/main" id="{54309AB0-F598-D1CA-27F9-12A1A103C21F}"/>
-              </a:ext>
-            </a:extLst>
-          </p:cNvPr>
-          <p:cNvSpPr txBox="1"/>
-          <p:nvPr/>
-        </p:nvSpPr>
-        <p:spPr>
-          <a:xfrm>
-            <a:off x="7061640" y="3674767"/>
-            <a:ext cx="1500759" cy="1015663"/>
-          </a:xfrm>
-          <a:prstGeom prst="rect">
-            <a:avLst/>
-          </a:prstGeom>
-          <a:noFill/>
-        </p:spPr>
-        <p:txBody>
-          <a:bodyPr wrap="square" rtlCol="0">
-            <a:spAutoFit/>
-          </a:bodyPr>
-          <a:lstStyle/>
-          <a:p>
-            <a:pPr algn="ctr"/>
-            <a:r>
-              <a:rPr lang="en-US" sz="1000" dirty="0">
-                <a:solidFill>
-                  <a:schemeClr val="bg1"/>
-                </a:solidFill>
-              </a:rPr>
-              <a:t>1. SDF-Model -&gt;</a:t>
-            </a:r>
-          </a:p>
-          <a:p>
-            <a:pPr marL="171450" indent="-171450" algn="ctr">
-              <a:buFont typeface="Wingdings" panose="05000000000000000000" pitchFamily="2" charset="2"/>
-              <a:buChar char="è"/>
-            </a:pPr>
-            <a:r>
-              <a:rPr lang="en-US" sz="1000" dirty="0">
-                <a:solidFill>
-                  <a:schemeClr val="bg1"/>
-                </a:solidFill>
-              </a:rPr>
-              <a:t>2 .Binary Boundary Mask-&gt;</a:t>
-            </a:r>
-          </a:p>
-          <a:p>
-            <a:pPr marL="171450" indent="-171450" algn="ctr">
-              <a:buFont typeface="Wingdings" panose="05000000000000000000" pitchFamily="2" charset="2"/>
-              <a:buChar char="è"/>
-            </a:pPr>
-            <a:r>
-              <a:rPr lang="en-US" sz="1000" dirty="0">
-                <a:solidFill>
-                  <a:schemeClr val="bg1"/>
-                </a:solidFill>
-              </a:rPr>
-              <a:t>3. US image within Boundary-&gt;</a:t>
-            </a:r>
-          </a:p>
-          <a:p>
-            <a:pPr marL="171450" indent="-171450" algn="ctr">
-              <a:buFont typeface="Wingdings" panose="05000000000000000000" pitchFamily="2" charset="2"/>
-              <a:buChar char="è"/>
-            </a:pPr>
-            <a:r>
-              <a:rPr lang="en-US" sz="1000" dirty="0">
-                <a:solidFill>
-                  <a:schemeClr val="bg1"/>
-                </a:solidFill>
-              </a:rPr>
-              <a:t>4. Encoder</a:t>
-            </a:r>
-          </a:p>
-        </p:txBody>
-      </p:sp>
-      <p:cxnSp>
-        <p:nvCxnSpPr>
-          <p:cNvPr id="45" name="Straight Arrow Connector 44">
-            <a:extLst>
-              <a:ext uri="{FF2B5EF4-FFF2-40B4-BE49-F238E27FC236}">
-                <a16:creationId xmlns:a16="http://schemas.microsoft.com/office/drawing/2014/main" id="{BCEF9908-D4F5-76AC-7BE0-5C592C680D1B}"/>
-              </a:ext>
-            </a:extLst>
-          </p:cNvPr>
-          <p:cNvCxnSpPr>
-            <a:cxnSpLocks/>
-            <a:stCxn id="23" idx="4"/>
-          </p:cNvCxnSpPr>
-          <p:nvPr/>
-        </p:nvCxnSpPr>
-        <p:spPr>
-          <a:xfrm flipV="1">
-            <a:off x="10860022" y="3114495"/>
-            <a:ext cx="913636" cy="1353312"/>
-          </a:xfrm>
-          <a:prstGeom prst="straightConnector1">
-            <a:avLst/>
-          </a:prstGeom>
-          <a:ln>
-            <a:tailEnd type="triangle"/>
-          </a:ln>
-        </p:spPr>
-        <p:style>
-          <a:lnRef idx="2">
-            <a:schemeClr val="accent1"/>
-          </a:lnRef>
-          <a:fillRef idx="0">
-            <a:schemeClr val="accent1"/>
-          </a:fillRef>
-          <a:effectRef idx="1">
-            <a:schemeClr val="accent1"/>
-          </a:effectRef>
-          <a:fontRef idx="minor">
-            <a:schemeClr val="tx1"/>
-          </a:fontRef>
-        </p:style>
-      </p:cxnSp>
-      <p:cxnSp>
-        <p:nvCxnSpPr>
-          <p:cNvPr id="46" name="Straight Arrow Connector 45">
-            <a:extLst>
-              <a:ext uri="{FF2B5EF4-FFF2-40B4-BE49-F238E27FC236}">
-                <a16:creationId xmlns:a16="http://schemas.microsoft.com/office/drawing/2014/main" id="{8F71745F-EF09-4614-95B3-BD5BFB24CBA5}"/>
-              </a:ext>
-            </a:extLst>
-          </p:cNvPr>
-          <p:cNvCxnSpPr>
-            <a:cxnSpLocks/>
-            <a:stCxn id="25" idx="0"/>
-          </p:cNvCxnSpPr>
-          <p:nvPr/>
-        </p:nvCxnSpPr>
-        <p:spPr>
-          <a:xfrm flipV="1">
-            <a:off x="10832590" y="3695139"/>
-            <a:ext cx="941068" cy="1856232"/>
-          </a:xfrm>
-          <a:prstGeom prst="straightConnector1">
-            <a:avLst/>
-          </a:prstGeom>
-          <a:ln>
-            <a:tailEnd type="triangle"/>
-          </a:ln>
-        </p:spPr>
-        <p:style>
-          <a:lnRef idx="2">
-            <a:schemeClr val="accent1"/>
-          </a:lnRef>
-          <a:fillRef idx="0">
-            <a:schemeClr val="accent1"/>
-          </a:fillRef>
-          <a:effectRef idx="1">
-            <a:schemeClr val="accent1"/>
-          </a:effectRef>
-          <a:fontRef idx="minor">
-            <a:schemeClr val="tx1"/>
-          </a:fontRef>
-        </p:style>
-      </p:cxnSp>
-      <p:pic>
-        <p:nvPicPr>
-          <p:cNvPr id="55" name="Picture 54" descr="A graph of a curve&#10;&#10;AI-generated content may be incorrect.">
-            <a:extLst>
-              <a:ext uri="{FF2B5EF4-FFF2-40B4-BE49-F238E27FC236}">
-                <a16:creationId xmlns:a16="http://schemas.microsoft.com/office/drawing/2014/main" id="{8078A5A7-35D8-B2A2-3F22-6295CC50EF61}"/>
-              </a:ext>
-            </a:extLst>
-          </p:cNvPr>
-          <p:cNvPicPr>
-            <a:picLocks noChangeAspect="1"/>
-          </p:cNvPicPr>
-          <p:nvPr/>
-        </p:nvPicPr>
-        <p:blipFill>
-          <a:blip r:embed="rId3">
-            <a:extLst>
-              <a:ext uri="{28A0092B-C50C-407E-A947-70E740481C1C}">
-                <a14:useLocalDpi xmlns:a14="http://schemas.microsoft.com/office/drawing/2010/main" val="0"/>
-              </a:ext>
-            </a:extLst>
-          </a:blip>
-          <a:stretch>
-            <a:fillRect/>
-          </a:stretch>
-        </p:blipFill>
-        <p:spPr>
-          <a:xfrm>
-            <a:off x="1399422" y="3865959"/>
-            <a:ext cx="3239255" cy="2429441"/>
-          </a:xfrm>
-          <a:prstGeom prst="rect">
-            <a:avLst/>
-          </a:prstGeom>
-        </p:spPr>
-      </p:pic>
-      <p:sp>
-        <p:nvSpPr>
-          <p:cNvPr id="56" name="TextBox 55">
-            <a:extLst>
-              <a:ext uri="{FF2B5EF4-FFF2-40B4-BE49-F238E27FC236}">
-                <a16:creationId xmlns:a16="http://schemas.microsoft.com/office/drawing/2014/main" id="{D3DD8806-F3AC-460F-B72B-CFE4C5F276B1}"/>
-              </a:ext>
-            </a:extLst>
-          </p:cNvPr>
-          <p:cNvSpPr txBox="1"/>
-          <p:nvPr/>
-        </p:nvSpPr>
-        <p:spPr>
-          <a:xfrm>
-            <a:off x="7061639" y="5405504"/>
-            <a:ext cx="1500759" cy="1015663"/>
-          </a:xfrm>
-          <a:prstGeom prst="rect">
-            <a:avLst/>
-          </a:prstGeom>
-          <a:noFill/>
-        </p:spPr>
-        <p:txBody>
-          <a:bodyPr wrap="square" rtlCol="0">
-            <a:spAutoFit/>
-          </a:bodyPr>
-          <a:lstStyle/>
-          <a:p>
-            <a:pPr algn="ctr"/>
-            <a:r>
-              <a:rPr lang="en-US" sz="1000" dirty="0">
-                <a:solidFill>
-                  <a:schemeClr val="bg1"/>
-                </a:solidFill>
-              </a:rPr>
-              <a:t>1. SDF-Model -&gt;</a:t>
-            </a:r>
-          </a:p>
-          <a:p>
-            <a:pPr marL="171450" indent="-171450" algn="ctr">
-              <a:buFont typeface="Wingdings" panose="05000000000000000000" pitchFamily="2" charset="2"/>
-              <a:buChar char="è"/>
-            </a:pPr>
-            <a:r>
-              <a:rPr lang="en-US" sz="1000" dirty="0">
-                <a:solidFill>
-                  <a:schemeClr val="bg1"/>
-                </a:solidFill>
-              </a:rPr>
-              <a:t>2 . Lesion Centre Mask-&gt;</a:t>
-            </a:r>
-          </a:p>
-          <a:p>
-            <a:pPr marL="171450" indent="-171450" algn="ctr">
-              <a:buFont typeface="Wingdings" panose="05000000000000000000" pitchFamily="2" charset="2"/>
-              <a:buChar char="è"/>
-            </a:pPr>
-            <a:r>
-              <a:rPr lang="en-US" sz="1000" dirty="0">
-                <a:solidFill>
-                  <a:schemeClr val="bg1"/>
-                </a:solidFill>
-              </a:rPr>
-              <a:t>3. US image within Lesion Center-&gt;</a:t>
-            </a:r>
-          </a:p>
-          <a:p>
-            <a:pPr marL="171450" indent="-171450" algn="ctr">
-              <a:buFont typeface="Wingdings" panose="05000000000000000000" pitchFamily="2" charset="2"/>
-              <a:buChar char="è"/>
-            </a:pPr>
-            <a:r>
-              <a:rPr lang="en-US" sz="1000" dirty="0">
-                <a:solidFill>
-                  <a:schemeClr val="bg1"/>
-                </a:solidFill>
-              </a:rPr>
-              <a:t>4. Encoder</a:t>
-            </a:r>
-          </a:p>
-        </p:txBody>
-      </p:sp>
-    </p:spTree>
-    <p:extLst>
-      <p:ext uri="{BB962C8B-B14F-4D97-AF65-F5344CB8AC3E}">
-        <p14:creationId xmlns:p14="http://schemas.microsoft.com/office/powerpoint/2010/main" val="4051501880"/>
       </p:ext>
     </p:extLst>
   </p:cSld>

</xml_diff>

<commit_message>
densenet model with bceloss
</commit_message>
<xml_diff>
--- a/meeting_updates/07.07.25.pptx
+++ b/meeting_updates/07.07.25.pptx
@@ -6,18 +6,19 @@
   </p:sldMasterIdLst>
   <p:sldIdLst>
     <p:sldId id="289" r:id="rId2"/>
-    <p:sldId id="278" r:id="rId3"/>
-    <p:sldId id="277" r:id="rId4"/>
-    <p:sldId id="276" r:id="rId5"/>
-    <p:sldId id="288" r:id="rId6"/>
-    <p:sldId id="280" r:id="rId7"/>
-    <p:sldId id="281" r:id="rId8"/>
-    <p:sldId id="282" r:id="rId9"/>
-    <p:sldId id="283" r:id="rId10"/>
-    <p:sldId id="285" r:id="rId11"/>
-    <p:sldId id="286" r:id="rId12"/>
-    <p:sldId id="287" r:id="rId13"/>
-    <p:sldId id="284" r:id="rId14"/>
+    <p:sldId id="290" r:id="rId3"/>
+    <p:sldId id="278" r:id="rId4"/>
+    <p:sldId id="277" r:id="rId5"/>
+    <p:sldId id="276" r:id="rId6"/>
+    <p:sldId id="288" r:id="rId7"/>
+    <p:sldId id="280" r:id="rId8"/>
+    <p:sldId id="281" r:id="rId9"/>
+    <p:sldId id="282" r:id="rId10"/>
+    <p:sldId id="283" r:id="rId11"/>
+    <p:sldId id="285" r:id="rId12"/>
+    <p:sldId id="286" r:id="rId13"/>
+    <p:sldId id="287" r:id="rId14"/>
+    <p:sldId id="284" r:id="rId15"/>
   </p:sldIdLst>
   <p:sldSz cx="12192000" cy="6858000"/>
   <p:notesSz cx="6858000" cy="9144000"/>
@@ -3353,14 +3354,14 @@
           <p:nvPr>
             <p:extLst>
               <p:ext uri="{D42A27DB-BD31-4B8C-83A1-F6EECF244321}">
-                <p14:modId xmlns:p14="http://schemas.microsoft.com/office/powerpoint/2010/main" val="1228288310"/>
+                <p14:modId xmlns:p14="http://schemas.microsoft.com/office/powerpoint/2010/main" val="883059988"/>
               </p:ext>
             </p:extLst>
           </p:nvPr>
         </p:nvGraphicFramePr>
         <p:xfrm>
-          <a:off x="2032000" y="719666"/>
-          <a:ext cx="8127999" cy="1112520"/>
+          <a:off x="1922272" y="2054690"/>
+          <a:ext cx="8127999" cy="2595880"/>
         </p:xfrm>
         <a:graphic>
           <a:graphicData uri="http://schemas.openxmlformats.org/drawingml/2006/table">
@@ -3503,6 +3504,100 @@
                     <a:bodyPr/>
                     <a:lstStyle/>
                     <a:p>
+                      <a:r>
+                        <a:rPr lang="en-US" dirty="0"/>
+                        <a:t>Asymmetric + Focal</a:t>
+                      </a:r>
+                    </a:p>
+                  </a:txBody>
+                  <a:tcPr/>
+                </a:tc>
+                <a:tc>
+                  <a:txBody>
+                    <a:bodyPr/>
+                    <a:lstStyle/>
+                    <a:p>
+                      <a:r>
+                        <a:rPr lang="en-US" dirty="0"/>
+                        <a:t>0.60</a:t>
+                      </a:r>
+                    </a:p>
+                  </a:txBody>
+                  <a:tcPr/>
+                </a:tc>
+                <a:extLst>
+                  <a:ext uri="{0D108BD9-81ED-4DB2-BD59-A6C34878D82A}">
+                    <a16:rowId xmlns:a16="http://schemas.microsoft.com/office/drawing/2014/main" val="1423515265"/>
+                  </a:ext>
+                </a:extLst>
+              </a:tr>
+              <a:tr h="370840">
+                <a:tc>
+                  <a:txBody>
+                    <a:bodyPr/>
+                    <a:lstStyle/>
+                    <a:p>
+                      <a:r>
+                        <a:rPr lang="en-US" dirty="0"/>
+                        <a:t>VGG16</a:t>
+                      </a:r>
+                    </a:p>
+                  </a:txBody>
+                  <a:tcPr/>
+                </a:tc>
+                <a:tc>
+                  <a:txBody>
+                    <a:bodyPr/>
+                    <a:lstStyle/>
+                    <a:p>
+                      <a:r>
+                        <a:rPr lang="en-US" dirty="0"/>
+                        <a:t>Asymmetric + Focal</a:t>
+                      </a:r>
+                    </a:p>
+                  </a:txBody>
+                  <a:tcPr/>
+                </a:tc>
+                <a:tc>
+                  <a:txBody>
+                    <a:bodyPr/>
+                    <a:lstStyle/>
+                    <a:p>
+                      <a:endParaRPr lang="en-US" dirty="0"/>
+                    </a:p>
+                  </a:txBody>
+                  <a:tcPr/>
+                </a:tc>
+                <a:extLst>
+                  <a:ext uri="{0D108BD9-81ED-4DB2-BD59-A6C34878D82A}">
+                    <a16:rowId xmlns:a16="http://schemas.microsoft.com/office/drawing/2014/main" val="2709173101"/>
+                  </a:ext>
+                </a:extLst>
+              </a:tr>
+              <a:tr h="370840">
+                <a:tc>
+                  <a:txBody>
+                    <a:bodyPr/>
+                    <a:lstStyle/>
+                    <a:p>
+                      <a:r>
+                        <a:rPr lang="en-US" dirty="0" err="1"/>
+                        <a:t>Densenet</a:t>
+                      </a:r>
+                      <a:endParaRPr lang="en-US" dirty="0"/>
+                    </a:p>
+                  </a:txBody>
+                  <a:tcPr/>
+                </a:tc>
+                <a:tc>
+                  <a:txBody>
+                    <a:bodyPr/>
+                    <a:lstStyle/>
+                    <a:p>
+                      <a:r>
+                        <a:rPr lang="en-US" dirty="0" err="1"/>
+                        <a:t>BCEWithLogits</a:t>
+                      </a:r>
                       <a:endParaRPr lang="en-US" dirty="0"/>
                     </a:p>
                   </a:txBody>
@@ -3520,7 +3615,95 @@
                 </a:tc>
                 <a:extLst>
                   <a:ext uri="{0D108BD9-81ED-4DB2-BD59-A6C34878D82A}">
-                    <a16:rowId xmlns:a16="http://schemas.microsoft.com/office/drawing/2014/main" val="1423515265"/>
+                    <a16:rowId xmlns:a16="http://schemas.microsoft.com/office/drawing/2014/main" val="2569170905"/>
+                  </a:ext>
+                </a:extLst>
+              </a:tr>
+              <a:tr h="370840">
+                <a:tc>
+                  <a:txBody>
+                    <a:bodyPr/>
+                    <a:lstStyle/>
+                    <a:p>
+                      <a:r>
+                        <a:rPr lang="en-US" dirty="0"/>
+                        <a:t>Resnet50</a:t>
+                      </a:r>
+                    </a:p>
+                  </a:txBody>
+                  <a:tcPr/>
+                </a:tc>
+                <a:tc>
+                  <a:txBody>
+                    <a:bodyPr/>
+                    <a:lstStyle/>
+                    <a:p>
+                      <a:r>
+                        <a:rPr lang="en-US" dirty="0" err="1"/>
+                        <a:t>BCEWithLogits</a:t>
+                      </a:r>
+                      <a:endParaRPr lang="en-US" dirty="0"/>
+                    </a:p>
+                  </a:txBody>
+                  <a:tcPr/>
+                </a:tc>
+                <a:tc>
+                  <a:txBody>
+                    <a:bodyPr/>
+                    <a:lstStyle/>
+                    <a:p>
+                      <a:endParaRPr lang="en-US" dirty="0"/>
+                    </a:p>
+                  </a:txBody>
+                  <a:tcPr/>
+                </a:tc>
+                <a:extLst>
+                  <a:ext uri="{0D108BD9-81ED-4DB2-BD59-A6C34878D82A}">
+                    <a16:rowId xmlns:a16="http://schemas.microsoft.com/office/drawing/2014/main" val="2672632767"/>
+                  </a:ext>
+                </a:extLst>
+              </a:tr>
+              <a:tr h="370840">
+                <a:tc>
+                  <a:txBody>
+                    <a:bodyPr/>
+                    <a:lstStyle/>
+                    <a:p>
+                      <a:r>
+                        <a:rPr lang="en-US" dirty="0"/>
+                        <a:t>VGG16</a:t>
+                      </a:r>
+                    </a:p>
+                  </a:txBody>
+                  <a:tcPr/>
+                </a:tc>
+                <a:tc>
+                  <a:txBody>
+                    <a:bodyPr/>
+                    <a:lstStyle/>
+                    <a:p>
+                      <a:r>
+                        <a:rPr lang="en-US" dirty="0" err="1"/>
+                        <a:t>BCEWithLogits</a:t>
+                      </a:r>
+                      <a:endParaRPr lang="en-US" dirty="0"/>
+                    </a:p>
+                  </a:txBody>
+                  <a:tcPr/>
+                </a:tc>
+                <a:tc>
+                  <a:txBody>
+                    <a:bodyPr/>
+                    <a:lstStyle/>
+                    <a:p>
+                      <a:endParaRPr lang="en-US" dirty="0"/>
+                    </a:p>
+                  </a:txBody>
+                  <a:tcPr/>
+                </a:tc>
+                <a:extLst>
+                  <a:ext uri="{0D108BD9-81ED-4DB2-BD59-A6C34878D82A}">
+                    <a16:rowId xmlns:a16="http://schemas.microsoft.com/office/drawing/2014/main" val="3013686936"/>
                   </a:ext>
                 </a:extLst>
               </a:tr>
@@ -3528,6 +3711,69 @@
           </a:graphicData>
         </a:graphic>
       </p:graphicFrame>
+      <p:sp>
+        <p:nvSpPr>
+          <p:cNvPr id="3" name="TextBox 2">
+            <a:extLst>
+              <a:ext uri="{FF2B5EF4-FFF2-40B4-BE49-F238E27FC236}">
+                <a16:creationId xmlns:a16="http://schemas.microsoft.com/office/drawing/2014/main" id="{4AC6DF20-8487-6D3E-E20E-6FAE188E7BFB}"/>
+              </a:ext>
+            </a:extLst>
+          </p:cNvPr>
+          <p:cNvSpPr txBox="1"/>
+          <p:nvPr/>
+        </p:nvSpPr>
+        <p:spPr>
+          <a:xfrm>
+            <a:off x="832104" y="548640"/>
+            <a:ext cx="5020056" cy="369332"/>
+          </a:xfrm>
+          <a:prstGeom prst="rect">
+            <a:avLst/>
+          </a:prstGeom>
+          <a:noFill/>
+        </p:spPr>
+        <p:txBody>
+          <a:bodyPr wrap="square" rtlCol="0">
+            <a:spAutoFit/>
+          </a:bodyPr>
+          <a:lstStyle/>
+          <a:p>
+            <a:r>
+              <a:rPr lang="en-US" b="1" i="1" dirty="0" err="1">
+                <a:solidFill>
+                  <a:srgbClr val="FF0000"/>
+                </a:solidFill>
+              </a:rPr>
+              <a:t>Experiements</a:t>
+            </a:r>
+            <a:r>
+              <a:rPr lang="en-US" b="1" i="1" dirty="0">
+                <a:solidFill>
+                  <a:srgbClr val="FF0000"/>
+                </a:solidFill>
+              </a:rPr>
+              <a:t>: </a:t>
+            </a:r>
+            <a:r>
+              <a:rPr lang="en-US" b="1" i="1" dirty="0" err="1">
+                <a:solidFill>
+                  <a:srgbClr val="FF0000"/>
+                </a:solidFill>
+              </a:rPr>
+              <a:t>Imagenet</a:t>
+            </a:r>
+            <a:r>
+              <a:rPr lang="en-US" b="1" i="1" dirty="0">
+                <a:solidFill>
+                  <a:srgbClr val="FF0000"/>
+                </a:solidFill>
+              </a:rPr>
+              <a:t> Benchmark Models</a:t>
+            </a:r>
+          </a:p>
+        </p:txBody>
+      </p:sp>
     </p:spTree>
     <p:extLst>
       <p:ext uri="{BB962C8B-B14F-4D97-AF65-F5344CB8AC3E}">
@@ -3542,6 +3788,36 @@
 </file>
 
 <file path=ppt/slides/slide10.xml><?xml version="1.0" encoding="utf-8"?>
+<p:sld xmlns:a="http://schemas.openxmlformats.org/drawingml/2006/main" xmlns:r="http://schemas.openxmlformats.org/officeDocument/2006/relationships" xmlns:p="http://schemas.openxmlformats.org/presentationml/2006/main">
+  <p:cSld>
+    <p:spTree>
+      <p:nvGrpSpPr>
+        <p:cNvPr id="1" name=""/>
+        <p:cNvGrpSpPr/>
+        <p:nvPr/>
+      </p:nvGrpSpPr>
+      <p:grpSpPr>
+        <a:xfrm>
+          <a:off x="0" y="0"/>
+          <a:ext cx="0" cy="0"/>
+          <a:chOff x="0" y="0"/>
+          <a:chExt cx="0" cy="0"/>
+        </a:xfrm>
+      </p:grpSpPr>
+    </p:spTree>
+    <p:extLst>
+      <p:ext uri="{BB962C8B-B14F-4D97-AF65-F5344CB8AC3E}">
+        <p14:creationId xmlns:p14="http://schemas.microsoft.com/office/powerpoint/2010/main" val="1355012303"/>
+      </p:ext>
+    </p:extLst>
+  </p:cSld>
+  <p:clrMapOvr>
+    <a:masterClrMapping/>
+  </p:clrMapOvr>
+</p:sld>
+</file>
+
+<file path=ppt/slides/slide11.xml><?xml version="1.0" encoding="utf-8"?>
 <p:sld xmlns:a="http://schemas.openxmlformats.org/drawingml/2006/main" xmlns:r="http://schemas.openxmlformats.org/officeDocument/2006/relationships" xmlns:p="http://schemas.openxmlformats.org/presentationml/2006/main">
   <p:cSld>
     <p:spTree>
@@ -5586,7 +5862,7 @@
 </p:sld>
 </file>
 
-<file path=ppt/slides/slide11.xml><?xml version="1.0" encoding="utf-8"?>
+<file path=ppt/slides/slide12.xml><?xml version="1.0" encoding="utf-8"?>
 <p:sld xmlns:a="http://schemas.openxmlformats.org/drawingml/2006/main" xmlns:r="http://schemas.openxmlformats.org/officeDocument/2006/relationships" xmlns:p="http://schemas.openxmlformats.org/presentationml/2006/main">
   <p:cSld>
     <p:spTree>
@@ -7631,7 +7907,7 @@
 </p:sld>
 </file>
 
-<file path=ppt/slides/slide12.xml><?xml version="1.0" encoding="utf-8"?>
+<file path=ppt/slides/slide13.xml><?xml version="1.0" encoding="utf-8"?>
 <p:sld xmlns:a="http://schemas.openxmlformats.org/drawingml/2006/main" xmlns:r="http://schemas.openxmlformats.org/officeDocument/2006/relationships" xmlns:p="http://schemas.openxmlformats.org/presentationml/2006/main">
   <p:cSld>
     <p:spTree>
@@ -9712,7 +9988,7 @@
 </p:sld>
 </file>
 
-<file path=ppt/slides/slide13.xml><?xml version="1.0" encoding="utf-8"?>
+<file path=ppt/slides/slide14.xml><?xml version="1.0" encoding="utf-8"?>
 <p:sld xmlns:a="http://schemas.openxmlformats.org/drawingml/2006/main" xmlns:r="http://schemas.openxmlformats.org/officeDocument/2006/relationships" xmlns:p="http://schemas.openxmlformats.org/presentationml/2006/main">
   <p:cSld>
     <p:spTree>
@@ -9747,6 +10023,36 @@
   <p:cSld>
     <p:spTree>
       <p:nvGrpSpPr>
+        <p:cNvPr id="1" name=""/>
+        <p:cNvGrpSpPr/>
+        <p:nvPr/>
+      </p:nvGrpSpPr>
+      <p:grpSpPr>
+        <a:xfrm>
+          <a:off x="0" y="0"/>
+          <a:ext cx="0" cy="0"/>
+          <a:chOff x="0" y="0"/>
+          <a:chExt cx="0" cy="0"/>
+        </a:xfrm>
+      </p:grpSpPr>
+    </p:spTree>
+    <p:extLst>
+      <p:ext uri="{BB962C8B-B14F-4D97-AF65-F5344CB8AC3E}">
+        <p14:creationId xmlns:p14="http://schemas.microsoft.com/office/powerpoint/2010/main" val="6234880"/>
+      </p:ext>
+    </p:extLst>
+  </p:cSld>
+  <p:clrMapOvr>
+    <a:masterClrMapping/>
+  </p:clrMapOvr>
+</p:sld>
+</file>
+
+<file path=ppt/slides/slide3.xml><?xml version="1.0" encoding="utf-8"?>
+<p:sld xmlns:a="http://schemas.openxmlformats.org/drawingml/2006/main" xmlns:r="http://schemas.openxmlformats.org/officeDocument/2006/relationships" xmlns:p="http://schemas.openxmlformats.org/presentationml/2006/main">
+  <p:cSld>
+    <p:spTree>
+      <p:nvGrpSpPr>
         <p:cNvPr id="1" name="">
           <a:extLst>
             <a:ext uri="{FF2B5EF4-FFF2-40B4-BE49-F238E27FC236}">
@@ -10307,7 +10613,7 @@
 </p:sld>
 </file>
 
-<file path=ppt/slides/slide3.xml><?xml version="1.0" encoding="utf-8"?>
+<file path=ppt/slides/slide4.xml><?xml version="1.0" encoding="utf-8"?>
 <p:sld xmlns:a="http://schemas.openxmlformats.org/drawingml/2006/main" xmlns:r="http://schemas.openxmlformats.org/officeDocument/2006/relationships" xmlns:p="http://schemas.openxmlformats.org/presentationml/2006/main">
   <p:cSld>
     <p:spTree>
@@ -11272,7 +11578,7 @@
 </p:sld>
 </file>
 
-<file path=ppt/slides/slide4.xml><?xml version="1.0" encoding="utf-8"?>
+<file path=ppt/slides/slide5.xml><?xml version="1.0" encoding="utf-8"?>
 <p:sld xmlns:a="http://schemas.openxmlformats.org/drawingml/2006/main" xmlns:r="http://schemas.openxmlformats.org/officeDocument/2006/relationships" xmlns:p="http://schemas.openxmlformats.org/presentationml/2006/main">
   <p:cSld>
     <p:spTree>
@@ -12435,7 +12741,7 @@
 </p:sld>
 </file>
 
-<file path=ppt/slides/slide5.xml><?xml version="1.0" encoding="utf-8"?>
+<file path=ppt/slides/slide6.xml><?xml version="1.0" encoding="utf-8"?>
 <p:sld xmlns:a="http://schemas.openxmlformats.org/drawingml/2006/main" xmlns:r="http://schemas.openxmlformats.org/officeDocument/2006/relationships" xmlns:p="http://schemas.openxmlformats.org/presentationml/2006/main">
   <p:cSld>
     <p:spTree>
@@ -13474,7 +13780,7 @@
 </p:sld>
 </file>
 
-<file path=ppt/slides/slide6.xml><?xml version="1.0" encoding="utf-8"?>
+<file path=ppt/slides/slide7.xml><?xml version="1.0" encoding="utf-8"?>
 <p:sld xmlns:a="http://schemas.openxmlformats.org/drawingml/2006/main" xmlns:r="http://schemas.openxmlformats.org/officeDocument/2006/relationships" xmlns:p="http://schemas.openxmlformats.org/presentationml/2006/main">
   <p:cSld>
     <p:spTree>
@@ -14628,7 +14934,7 @@
 </p:sld>
 </file>
 
-<file path=ppt/slides/slide7.xml><?xml version="1.0" encoding="utf-8"?>
+<file path=ppt/slides/slide8.xml><?xml version="1.0" encoding="utf-8"?>
 <p:sld xmlns:a="http://schemas.openxmlformats.org/drawingml/2006/main" xmlns:r="http://schemas.openxmlformats.org/officeDocument/2006/relationships" xmlns:p="http://schemas.openxmlformats.org/presentationml/2006/main">
   <p:cSld>
     <p:spTree>
@@ -15792,7 +16098,7 @@
 </p:sld>
 </file>
 
-<file path=ppt/slides/slide8.xml><?xml version="1.0" encoding="utf-8"?>
+<file path=ppt/slides/slide9.xml><?xml version="1.0" encoding="utf-8"?>
 <p:sld xmlns:a="http://schemas.openxmlformats.org/drawingml/2006/main" xmlns:r="http://schemas.openxmlformats.org/officeDocument/2006/relationships" xmlns:p="http://schemas.openxmlformats.org/presentationml/2006/main">
   <p:cSld>
     <p:spTree>
@@ -16989,36 +17295,6 @@
     <p:extLst>
       <p:ext uri="{BB962C8B-B14F-4D97-AF65-F5344CB8AC3E}">
         <p14:creationId xmlns:p14="http://schemas.microsoft.com/office/powerpoint/2010/main" val="1431494686"/>
-      </p:ext>
-    </p:extLst>
-  </p:cSld>
-  <p:clrMapOvr>
-    <a:masterClrMapping/>
-  </p:clrMapOvr>
-</p:sld>
-</file>
-
-<file path=ppt/slides/slide9.xml><?xml version="1.0" encoding="utf-8"?>
-<p:sld xmlns:a="http://schemas.openxmlformats.org/drawingml/2006/main" xmlns:r="http://schemas.openxmlformats.org/officeDocument/2006/relationships" xmlns:p="http://schemas.openxmlformats.org/presentationml/2006/main">
-  <p:cSld>
-    <p:spTree>
-      <p:nvGrpSpPr>
-        <p:cNvPr id="1" name=""/>
-        <p:cNvGrpSpPr/>
-        <p:nvPr/>
-      </p:nvGrpSpPr>
-      <p:grpSpPr>
-        <a:xfrm>
-          <a:off x="0" y="0"/>
-          <a:ext cx="0" cy="0"/>
-          <a:chOff x="0" y="0"/>
-          <a:chExt cx="0" cy="0"/>
-        </a:xfrm>
-      </p:grpSpPr>
-    </p:spTree>
-    <p:extLst>
-      <p:ext uri="{BB962C8B-B14F-4D97-AF65-F5344CB8AC3E}">
-        <p14:creationId xmlns:p14="http://schemas.microsoft.com/office/powerpoint/2010/main" val="1355012303"/>
       </p:ext>
     </p:extLst>
   </p:cSld>

</xml_diff>

<commit_message>
multihead 4 for binary classfication
</commit_message>
<xml_diff>
--- a/meeting_updates/07.07.25.pptx
+++ b/meeting_updates/07.07.25.pptx
@@ -7,18 +7,19 @@
   <p:sldIdLst>
     <p:sldId id="289" r:id="rId2"/>
     <p:sldId id="290" r:id="rId3"/>
-    <p:sldId id="278" r:id="rId4"/>
-    <p:sldId id="277" r:id="rId5"/>
-    <p:sldId id="276" r:id="rId6"/>
-    <p:sldId id="288" r:id="rId7"/>
-    <p:sldId id="280" r:id="rId8"/>
-    <p:sldId id="281" r:id="rId9"/>
-    <p:sldId id="282" r:id="rId10"/>
-    <p:sldId id="283" r:id="rId11"/>
-    <p:sldId id="285" r:id="rId12"/>
-    <p:sldId id="286" r:id="rId13"/>
-    <p:sldId id="287" r:id="rId14"/>
-    <p:sldId id="284" r:id="rId15"/>
+    <p:sldId id="292" r:id="rId4"/>
+    <p:sldId id="278" r:id="rId5"/>
+    <p:sldId id="277" r:id="rId6"/>
+    <p:sldId id="276" r:id="rId7"/>
+    <p:sldId id="288" r:id="rId8"/>
+    <p:sldId id="280" r:id="rId9"/>
+    <p:sldId id="281" r:id="rId10"/>
+    <p:sldId id="282" r:id="rId11"/>
+    <p:sldId id="283" r:id="rId12"/>
+    <p:sldId id="285" r:id="rId13"/>
+    <p:sldId id="286" r:id="rId14"/>
+    <p:sldId id="287" r:id="rId15"/>
+    <p:sldId id="284" r:id="rId16"/>
   </p:sldIdLst>
   <p:sldSz cx="12192000" cy="6858000"/>
   <p:notesSz cx="6858000" cy="9144000"/>
@@ -3354,14 +3355,14 @@
           <p:nvPr>
             <p:extLst>
               <p:ext uri="{D42A27DB-BD31-4B8C-83A1-F6EECF244321}">
-                <p14:modId xmlns:p14="http://schemas.microsoft.com/office/powerpoint/2010/main" val="883059988"/>
+                <p14:modId xmlns:p14="http://schemas.microsoft.com/office/powerpoint/2010/main" val="1744630346"/>
               </p:ext>
             </p:extLst>
           </p:nvPr>
         </p:nvGraphicFramePr>
         <p:xfrm>
-          <a:off x="1922272" y="2054690"/>
-          <a:ext cx="8127999" cy="2595880"/>
+          <a:off x="1327912" y="2246714"/>
+          <a:ext cx="5418666" cy="1483360"/>
         </p:xfrm>
         <a:graphic>
           <a:graphicData uri="http://schemas.openxmlformats.org/drawingml/2006/table">
@@ -3374,13 +3375,6 @@
                   <a:extLst>
                     <a:ext uri="{9D8B030D-6E8A-4147-A177-3AD203B41FA5}">
                       <a16:colId xmlns:a16="http://schemas.microsoft.com/office/drawing/2014/main" val="1034557421"/>
-                    </a:ext>
-                  </a:extLst>
-                </a:gridCol>
-                <a:gridCol w="2709333">
-                  <a:extLst>
-                    <a:ext uri="{9D8B030D-6E8A-4147-A177-3AD203B41FA5}">
-                      <a16:colId xmlns:a16="http://schemas.microsoft.com/office/drawing/2014/main" val="614273410"/>
                     </a:ext>
                   </a:extLst>
                 </a:gridCol>
@@ -3401,19 +3395,6 @@
                       <a:r>
                         <a:rPr lang="en-US" dirty="0"/>
                         <a:t>Model</a:t>
-                      </a:r>
-                    </a:p>
-                  </a:txBody>
-                  <a:tcPr/>
-                </a:tc>
-                <a:tc>
-                  <a:txBody>
-                    <a:bodyPr/>
-                    <a:lstStyle/>
-                    <a:p>
-                      <a:r>
-                        <a:rPr lang="en-US" dirty="0"/>
-                        <a:t>Loss Functions</a:t>
                       </a:r>
                     </a:p>
                   </a:txBody>
@@ -3460,19 +3441,6 @@
                     <a:p>
                       <a:r>
                         <a:rPr lang="en-US" dirty="0"/>
-                        <a:t>Asymmetric + Focal </a:t>
-                      </a:r>
-                    </a:p>
-                  </a:txBody>
-                  <a:tcPr/>
-                </a:tc>
-                <a:tc>
-                  <a:txBody>
-                    <a:bodyPr/>
-                    <a:lstStyle/>
-                    <a:p>
-                      <a:r>
-                        <a:rPr lang="en-US" dirty="0"/>
                         <a:t>0.60</a:t>
                       </a:r>
                     </a:p>
@@ -3494,19 +3462,6 @@
                       <a:r>
                         <a:rPr lang="en-US" dirty="0"/>
                         <a:t>Resnet50</a:t>
-                      </a:r>
-                    </a:p>
-                  </a:txBody>
-                  <a:tcPr/>
-                </a:tc>
-                <a:tc>
-                  <a:txBody>
-                    <a:bodyPr/>
-                    <a:lstStyle/>
-                    <a:p>
-                      <a:r>
-                        <a:rPr lang="en-US" dirty="0"/>
-                        <a:t>Asymmetric + Focal</a:t>
                       </a:r>
                     </a:p>
                   </a:txBody>
@@ -3552,18 +3507,8 @@
                     <a:p>
                       <a:r>
                         <a:rPr lang="en-US" dirty="0"/>
-                        <a:t>Asymmetric + Focal</a:t>
+                        <a:t>In progress</a:t>
                       </a:r>
-                    </a:p>
-                  </a:txBody>
-                  <a:tcPr/>
-                </a:tc>
-                <a:tc>
-                  <a:txBody>
-                    <a:bodyPr/>
-                    <a:lstStyle/>
-                    <a:p>
-                      <a:endParaRPr lang="en-US" dirty="0"/>
                     </a:p>
                   </a:txBody>
                   <a:tcPr/>
@@ -3574,139 +3519,6 @@
                   </a:ext>
                 </a:extLst>
               </a:tr>
-              <a:tr h="370840">
-                <a:tc>
-                  <a:txBody>
-                    <a:bodyPr/>
-                    <a:lstStyle/>
-                    <a:p>
-                      <a:r>
-                        <a:rPr lang="en-US" dirty="0" err="1"/>
-                        <a:t>Densenet</a:t>
-                      </a:r>
-                      <a:endParaRPr lang="en-US" dirty="0"/>
-                    </a:p>
-                  </a:txBody>
-                  <a:tcPr/>
-                </a:tc>
-                <a:tc>
-                  <a:txBody>
-                    <a:bodyPr/>
-                    <a:lstStyle/>
-                    <a:p>
-                      <a:r>
-                        <a:rPr lang="en-US" dirty="0" err="1"/>
-                        <a:t>BCEWithLogits</a:t>
-                      </a:r>
-                      <a:endParaRPr lang="en-US" dirty="0"/>
-                    </a:p>
-                  </a:txBody>
-                  <a:tcPr/>
-                </a:tc>
-                <a:tc>
-                  <a:txBody>
-                    <a:bodyPr/>
-                    <a:lstStyle/>
-                    <a:p>
-                      <a:endParaRPr lang="en-US" dirty="0"/>
-                    </a:p>
-                  </a:txBody>
-                  <a:tcPr/>
-                </a:tc>
-                <a:extLst>
-                  <a:ext uri="{0D108BD9-81ED-4DB2-BD59-A6C34878D82A}">
-                    <a16:rowId xmlns:a16="http://schemas.microsoft.com/office/drawing/2014/main" val="2569170905"/>
-                  </a:ext>
-                </a:extLst>
-              </a:tr>
-              <a:tr h="370840">
-                <a:tc>
-                  <a:txBody>
-                    <a:bodyPr/>
-                    <a:lstStyle/>
-                    <a:p>
-                      <a:r>
-                        <a:rPr lang="en-US" dirty="0"/>
-                        <a:t>Resnet50</a:t>
-                      </a:r>
-                    </a:p>
-                  </a:txBody>
-                  <a:tcPr/>
-                </a:tc>
-                <a:tc>
-                  <a:txBody>
-                    <a:bodyPr/>
-                    <a:lstStyle/>
-                    <a:p>
-                      <a:r>
-                        <a:rPr lang="en-US" dirty="0" err="1"/>
-                        <a:t>BCEWithLogits</a:t>
-                      </a:r>
-                      <a:endParaRPr lang="en-US" dirty="0"/>
-                    </a:p>
-                  </a:txBody>
-                  <a:tcPr/>
-                </a:tc>
-                <a:tc>
-                  <a:txBody>
-                    <a:bodyPr/>
-                    <a:lstStyle/>
-                    <a:p>
-                      <a:endParaRPr lang="en-US" dirty="0"/>
-                    </a:p>
-                  </a:txBody>
-                  <a:tcPr/>
-                </a:tc>
-                <a:extLst>
-                  <a:ext uri="{0D108BD9-81ED-4DB2-BD59-A6C34878D82A}">
-                    <a16:rowId xmlns:a16="http://schemas.microsoft.com/office/drawing/2014/main" val="2672632767"/>
-                  </a:ext>
-                </a:extLst>
-              </a:tr>
-              <a:tr h="370840">
-                <a:tc>
-                  <a:txBody>
-                    <a:bodyPr/>
-                    <a:lstStyle/>
-                    <a:p>
-                      <a:r>
-                        <a:rPr lang="en-US" dirty="0"/>
-                        <a:t>VGG16</a:t>
-                      </a:r>
-                    </a:p>
-                  </a:txBody>
-                  <a:tcPr/>
-                </a:tc>
-                <a:tc>
-                  <a:txBody>
-                    <a:bodyPr/>
-                    <a:lstStyle/>
-                    <a:p>
-                      <a:r>
-                        <a:rPr lang="en-US" dirty="0" err="1"/>
-                        <a:t>BCEWithLogits</a:t>
-                      </a:r>
-                      <a:endParaRPr lang="en-US" dirty="0"/>
-                    </a:p>
-                  </a:txBody>
-                  <a:tcPr/>
-                </a:tc>
-                <a:tc>
-                  <a:txBody>
-                    <a:bodyPr/>
-                    <a:lstStyle/>
-                    <a:p>
-                      <a:endParaRPr lang="en-US" dirty="0"/>
-                    </a:p>
-                  </a:txBody>
-                  <a:tcPr/>
-                </a:tc>
-                <a:extLst>
-                  <a:ext uri="{0D108BD9-81ED-4DB2-BD59-A6C34878D82A}">
-                    <a16:rowId xmlns:a16="http://schemas.microsoft.com/office/drawing/2014/main" val="3013686936"/>
-                  </a:ext>
-                </a:extLst>
-              </a:tr>
             </a:tbl>
           </a:graphicData>
         </a:graphic>
@@ -3774,6 +3586,78 @@
           </a:p>
         </p:txBody>
       </p:sp>
+      <p:pic>
+        <p:nvPicPr>
+          <p:cNvPr id="5" name="Picture 4" descr="A graph of a curve&#10;&#10;AI-generated content may be incorrect.">
+            <a:extLst>
+              <a:ext uri="{FF2B5EF4-FFF2-40B4-BE49-F238E27FC236}">
+                <a16:creationId xmlns:a16="http://schemas.microsoft.com/office/drawing/2014/main" id="{93D7D3AC-37F6-19F5-FECC-14EC7FBEEFA6}"/>
+              </a:ext>
+            </a:extLst>
+          </p:cNvPr>
+          <p:cNvPicPr>
+            <a:picLocks noChangeAspect="1"/>
+          </p:cNvPicPr>
+          <p:nvPr/>
+        </p:nvPicPr>
+        <p:blipFill>
+          <a:blip r:embed="rId2">
+            <a:extLst>
+              <a:ext uri="{28A0092B-C50C-407E-A947-70E740481C1C}">
+                <a14:useLocalDpi xmlns:a14="http://schemas.microsoft.com/office/drawing/2010/main" val="0"/>
+              </a:ext>
+            </a:extLst>
+          </a:blip>
+          <a:stretch>
+            <a:fillRect/>
+          </a:stretch>
+        </p:blipFill>
+        <p:spPr>
+          <a:xfrm>
+            <a:off x="7451187" y="365759"/>
+            <a:ext cx="3774831" cy="2831123"/>
+          </a:xfrm>
+          <a:prstGeom prst="rect">
+            <a:avLst/>
+          </a:prstGeom>
+        </p:spPr>
+      </p:pic>
+      <p:pic>
+        <p:nvPicPr>
+          <p:cNvPr id="7" name="Picture 6" descr="A graph with different colored lines&#10;&#10;AI-generated content may be incorrect.">
+            <a:extLst>
+              <a:ext uri="{FF2B5EF4-FFF2-40B4-BE49-F238E27FC236}">
+                <a16:creationId xmlns:a16="http://schemas.microsoft.com/office/drawing/2014/main" id="{F13B1315-41F7-F8F2-5183-341DABE18BD1}"/>
+              </a:ext>
+            </a:extLst>
+          </p:cNvPr>
+          <p:cNvPicPr>
+            <a:picLocks noChangeAspect="1"/>
+          </p:cNvPicPr>
+          <p:nvPr/>
+        </p:nvPicPr>
+        <p:blipFill>
+          <a:blip r:embed="rId3">
+            <a:extLst>
+              <a:ext uri="{28A0092B-C50C-407E-A947-70E740481C1C}">
+                <a14:useLocalDpi xmlns:a14="http://schemas.microsoft.com/office/drawing/2010/main" val="0"/>
+              </a:ext>
+            </a:extLst>
+          </a:blip>
+          <a:stretch>
+            <a:fillRect/>
+          </a:stretch>
+        </p:blipFill>
+        <p:spPr>
+          <a:xfrm>
+            <a:off x="7451186" y="3361200"/>
+            <a:ext cx="3774831" cy="2831123"/>
+          </a:xfrm>
+          <a:prstGeom prst="rect">
+            <a:avLst/>
+          </a:prstGeom>
+        </p:spPr>
+      </p:pic>
     </p:spTree>
     <p:extLst>
       <p:ext uri="{BB962C8B-B14F-4D97-AF65-F5344CB8AC3E}">
@@ -3788,6 +3672,1212 @@
 </file>
 
 <file path=ppt/slides/slide10.xml><?xml version="1.0" encoding="utf-8"?>
+<p:sld xmlns:a="http://schemas.openxmlformats.org/drawingml/2006/main" xmlns:r="http://schemas.openxmlformats.org/officeDocument/2006/relationships" xmlns:p="http://schemas.openxmlformats.org/presentationml/2006/main">
+  <p:cSld>
+    <p:spTree>
+      <p:nvGrpSpPr>
+        <p:cNvPr id="1" name="">
+          <a:extLst>
+            <a:ext uri="{FF2B5EF4-FFF2-40B4-BE49-F238E27FC236}">
+              <a16:creationId xmlns:a16="http://schemas.microsoft.com/office/drawing/2014/main" id="{D5D22F4C-4B89-6033-F76D-C9CBE392ABF9}"/>
+            </a:ext>
+          </a:extLst>
+        </p:cNvPr>
+        <p:cNvGrpSpPr/>
+        <p:nvPr/>
+      </p:nvGrpSpPr>
+      <p:grpSpPr>
+        <a:xfrm>
+          <a:off x="0" y="0"/>
+          <a:ext cx="0" cy="0"/>
+          <a:chOff x="0" y="0"/>
+          <a:chExt cx="0" cy="0"/>
+        </a:xfrm>
+      </p:grpSpPr>
+      <p:sp>
+        <p:nvSpPr>
+          <p:cNvPr id="2" name="TextBox 1">
+            <a:extLst>
+              <a:ext uri="{FF2B5EF4-FFF2-40B4-BE49-F238E27FC236}">
+                <a16:creationId xmlns:a16="http://schemas.microsoft.com/office/drawing/2014/main" id="{BBAC367F-A540-B93A-F915-53FC2BF88A6F}"/>
+              </a:ext>
+            </a:extLst>
+          </p:cNvPr>
+          <p:cNvSpPr txBox="1"/>
+          <p:nvPr/>
+        </p:nvSpPr>
+        <p:spPr>
+          <a:xfrm>
+            <a:off x="1234440" y="722376"/>
+            <a:ext cx="2688336" cy="369332"/>
+          </a:xfrm>
+          <a:prstGeom prst="rect">
+            <a:avLst/>
+          </a:prstGeom>
+          <a:noFill/>
+        </p:spPr>
+        <p:txBody>
+          <a:bodyPr wrap="square" rtlCol="0">
+            <a:spAutoFit/>
+          </a:bodyPr>
+          <a:lstStyle/>
+          <a:p>
+            <a:r>
+              <a:rPr lang="en-US" dirty="0"/>
+              <a:t>Experiment 3.3: </a:t>
+            </a:r>
+          </a:p>
+        </p:txBody>
+      </p:sp>
+      <p:sp>
+        <p:nvSpPr>
+          <p:cNvPr id="3" name="TextBox 2">
+            <a:extLst>
+              <a:ext uri="{FF2B5EF4-FFF2-40B4-BE49-F238E27FC236}">
+                <a16:creationId xmlns:a16="http://schemas.microsoft.com/office/drawing/2014/main" id="{2C9F5D81-DD1F-992D-FE20-575EBC7D3B94}"/>
+              </a:ext>
+            </a:extLst>
+          </p:cNvPr>
+          <p:cNvSpPr txBox="1"/>
+          <p:nvPr/>
+        </p:nvSpPr>
+        <p:spPr>
+          <a:xfrm>
+            <a:off x="1229489" y="1031272"/>
+            <a:ext cx="4502277" cy="2862322"/>
+          </a:xfrm>
+          <a:prstGeom prst="rect">
+            <a:avLst/>
+          </a:prstGeom>
+          <a:noFill/>
+        </p:spPr>
+        <p:txBody>
+          <a:bodyPr wrap="square" rtlCol="0">
+            <a:spAutoFit/>
+          </a:bodyPr>
+          <a:lstStyle/>
+          <a:p>
+            <a:endParaRPr lang="en-US" dirty="0"/>
+          </a:p>
+          <a:p>
+            <a:pPr marL="285750" indent="-285750">
+              <a:buFont typeface="Arial" panose="020B0604020202020204" pitchFamily="34" charset="0"/>
+              <a:buChar char="•"/>
+            </a:pPr>
+            <a:r>
+              <a:rPr lang="en-US" dirty="0"/>
+              <a:t>Binary Classification Setup </a:t>
+            </a:r>
+          </a:p>
+          <a:p>
+            <a:pPr marL="285750" indent="-285750">
+              <a:buFont typeface="Arial" panose="020B0604020202020204" pitchFamily="34" charset="0"/>
+              <a:buChar char="•"/>
+            </a:pPr>
+            <a:r>
+              <a:rPr lang="en-US" dirty="0"/>
+              <a:t>Classification Based on US Image Only</a:t>
+            </a:r>
+          </a:p>
+          <a:p>
+            <a:pPr marL="285750" indent="-285750">
+              <a:buFont typeface="Arial" panose="020B0604020202020204" pitchFamily="34" charset="0"/>
+              <a:buChar char="•"/>
+            </a:pPr>
+            <a:r>
+              <a:rPr lang="en-US" dirty="0"/>
+              <a:t>Two separate encoder with detached tail</a:t>
+            </a:r>
+          </a:p>
+          <a:p>
+            <a:pPr marL="285750" indent="-285750">
+              <a:buFont typeface="Arial" panose="020B0604020202020204" pitchFamily="34" charset="0"/>
+              <a:buChar char="•"/>
+            </a:pPr>
+            <a:r>
+              <a:rPr lang="en-US" dirty="0"/>
+              <a:t>Weighted Score</a:t>
+            </a:r>
+          </a:p>
+          <a:p>
+            <a:pPr marL="285750" indent="-285750">
+              <a:buFont typeface="Arial" panose="020B0604020202020204" pitchFamily="34" charset="0"/>
+              <a:buChar char="•"/>
+            </a:pPr>
+            <a:r>
+              <a:rPr lang="en-US" dirty="0" err="1"/>
+              <a:t>Testset</a:t>
+            </a:r>
+            <a:r>
+              <a:rPr lang="en-US" dirty="0"/>
+              <a:t> on 120 to 143 Patient IDs:</a:t>
+            </a:r>
+          </a:p>
+          <a:p>
+            <a:pPr marL="742950" lvl="1" indent="-285750">
+              <a:buFont typeface="Arial" panose="020B0604020202020204" pitchFamily="34" charset="0"/>
+              <a:buChar char="•"/>
+            </a:pPr>
+            <a:r>
+              <a:rPr lang="en-US" dirty="0"/>
+              <a:t>Total images 82</a:t>
+            </a:r>
+          </a:p>
+          <a:p>
+            <a:pPr marL="742950" lvl="1" indent="-285750">
+              <a:buFont typeface="Arial" panose="020B0604020202020204" pitchFamily="34" charset="0"/>
+              <a:buChar char="•"/>
+            </a:pPr>
+            <a:r>
+              <a:rPr lang="en-US" dirty="0"/>
+              <a:t>Malignant 35, Benign 47</a:t>
+            </a:r>
+          </a:p>
+          <a:p>
+            <a:pPr marL="285750" indent="-285750">
+              <a:buFont typeface="Arial" panose="020B0604020202020204" pitchFamily="34" charset="0"/>
+              <a:buChar char="•"/>
+            </a:pPr>
+            <a:endParaRPr lang="en-US" dirty="0"/>
+          </a:p>
+          <a:p>
+            <a:pPr marL="285750" indent="-285750">
+              <a:buFont typeface="Arial" panose="020B0604020202020204" pitchFamily="34" charset="0"/>
+              <a:buChar char="•"/>
+            </a:pPr>
+            <a:endParaRPr lang="en-US" dirty="0"/>
+          </a:p>
+        </p:txBody>
+      </p:sp>
+      <p:sp>
+        <p:nvSpPr>
+          <p:cNvPr id="4" name="Flowchart: Manual Operation 3">
+            <a:extLst>
+              <a:ext uri="{FF2B5EF4-FFF2-40B4-BE49-F238E27FC236}">
+                <a16:creationId xmlns:a16="http://schemas.microsoft.com/office/drawing/2014/main" id="{1CE917B8-B257-5BA8-8FA6-BA325A3AA7E6}"/>
+              </a:ext>
+            </a:extLst>
+          </p:cNvPr>
+          <p:cNvSpPr/>
+          <p:nvPr/>
+        </p:nvSpPr>
+        <p:spPr>
+          <a:xfrm rot="16200000">
+            <a:off x="7597142" y="1399032"/>
+            <a:ext cx="1234440" cy="1536192"/>
+          </a:xfrm>
+          <a:prstGeom prst="flowChartManualOperation">
+            <a:avLst/>
+          </a:prstGeom>
+        </p:spPr>
+        <p:style>
+          <a:lnRef idx="2">
+            <a:schemeClr val="accent1">
+              <a:shade val="15000"/>
+            </a:schemeClr>
+          </a:lnRef>
+          <a:fillRef idx="1">
+            <a:schemeClr val="accent1"/>
+          </a:fillRef>
+          <a:effectRef idx="0">
+            <a:schemeClr val="accent1"/>
+          </a:effectRef>
+          <a:fontRef idx="minor">
+            <a:schemeClr val="lt1"/>
+          </a:fontRef>
+        </p:style>
+        <p:txBody>
+          <a:bodyPr rtlCol="0" anchor="ctr"/>
+          <a:lstStyle/>
+          <a:p>
+            <a:pPr algn="ctr"/>
+            <a:endParaRPr lang="en-US" dirty="0"/>
+          </a:p>
+        </p:txBody>
+      </p:sp>
+      <p:sp>
+        <p:nvSpPr>
+          <p:cNvPr id="5" name="Flowchart: Manual Operation 4">
+            <a:extLst>
+              <a:ext uri="{FF2B5EF4-FFF2-40B4-BE49-F238E27FC236}">
+                <a16:creationId xmlns:a16="http://schemas.microsoft.com/office/drawing/2014/main" id="{1B7629C8-4436-163A-FB13-86E43541C074}"/>
+              </a:ext>
+            </a:extLst>
+          </p:cNvPr>
+          <p:cNvSpPr/>
+          <p:nvPr/>
+        </p:nvSpPr>
+        <p:spPr>
+          <a:xfrm rot="16200000">
+            <a:off x="7597142" y="3214116"/>
+            <a:ext cx="1234440" cy="1536192"/>
+          </a:xfrm>
+          <a:prstGeom prst="flowChartManualOperation">
+            <a:avLst/>
+          </a:prstGeom>
+        </p:spPr>
+        <p:style>
+          <a:lnRef idx="2">
+            <a:schemeClr val="accent1">
+              <a:shade val="15000"/>
+            </a:schemeClr>
+          </a:lnRef>
+          <a:fillRef idx="1">
+            <a:schemeClr val="accent1"/>
+          </a:fillRef>
+          <a:effectRef idx="0">
+            <a:schemeClr val="accent1"/>
+          </a:effectRef>
+          <a:fontRef idx="minor">
+            <a:schemeClr val="lt1"/>
+          </a:fontRef>
+        </p:style>
+        <p:txBody>
+          <a:bodyPr rtlCol="0" anchor="ctr"/>
+          <a:lstStyle/>
+          <a:p>
+            <a:pPr algn="ctr"/>
+            <a:endParaRPr lang="en-US"/>
+          </a:p>
+        </p:txBody>
+      </p:sp>
+      <p:sp>
+        <p:nvSpPr>
+          <p:cNvPr id="6" name="Rectangle 5">
+            <a:extLst>
+              <a:ext uri="{FF2B5EF4-FFF2-40B4-BE49-F238E27FC236}">
+                <a16:creationId xmlns:a16="http://schemas.microsoft.com/office/drawing/2014/main" id="{8E8A2F4D-F8F9-510A-CF04-E82A4153BB2C}"/>
+              </a:ext>
+            </a:extLst>
+          </p:cNvPr>
+          <p:cNvSpPr/>
+          <p:nvPr/>
+        </p:nvSpPr>
+        <p:spPr>
+          <a:xfrm>
+            <a:off x="9471662" y="1760220"/>
+            <a:ext cx="612648" cy="813816"/>
+          </a:xfrm>
+          <a:prstGeom prst="rect">
+            <a:avLst/>
+          </a:prstGeom>
+        </p:spPr>
+        <p:style>
+          <a:lnRef idx="2">
+            <a:schemeClr val="accent1">
+              <a:shade val="15000"/>
+            </a:schemeClr>
+          </a:lnRef>
+          <a:fillRef idx="1">
+            <a:schemeClr val="accent1"/>
+          </a:fillRef>
+          <a:effectRef idx="0">
+            <a:schemeClr val="accent1"/>
+          </a:effectRef>
+          <a:fontRef idx="minor">
+            <a:schemeClr val="lt1"/>
+          </a:fontRef>
+        </p:style>
+        <p:txBody>
+          <a:bodyPr rtlCol="0" anchor="ctr"/>
+          <a:lstStyle/>
+          <a:p>
+            <a:pPr algn="ctr"/>
+            <a:r>
+              <a:rPr lang="en-US" sz="1000" dirty="0"/>
+              <a:t>FC Layer</a:t>
+            </a:r>
+          </a:p>
+        </p:txBody>
+      </p:sp>
+      <p:sp>
+        <p:nvSpPr>
+          <p:cNvPr id="7" name="Rectangle 6">
+            <a:extLst>
+              <a:ext uri="{FF2B5EF4-FFF2-40B4-BE49-F238E27FC236}">
+                <a16:creationId xmlns:a16="http://schemas.microsoft.com/office/drawing/2014/main" id="{DA21FA5E-A756-BB57-B491-7D711FAD8ED6}"/>
+              </a:ext>
+            </a:extLst>
+          </p:cNvPr>
+          <p:cNvSpPr/>
+          <p:nvPr/>
+        </p:nvSpPr>
+        <p:spPr>
+          <a:xfrm>
+            <a:off x="9471662" y="3575304"/>
+            <a:ext cx="612648" cy="813816"/>
+          </a:xfrm>
+          <a:prstGeom prst="rect">
+            <a:avLst/>
+          </a:prstGeom>
+        </p:spPr>
+        <p:style>
+          <a:lnRef idx="2">
+            <a:schemeClr val="accent1">
+              <a:shade val="15000"/>
+            </a:schemeClr>
+          </a:lnRef>
+          <a:fillRef idx="1">
+            <a:schemeClr val="accent1"/>
+          </a:fillRef>
+          <a:effectRef idx="0">
+            <a:schemeClr val="accent1"/>
+          </a:effectRef>
+          <a:fontRef idx="minor">
+            <a:schemeClr val="lt1"/>
+          </a:fontRef>
+        </p:style>
+        <p:txBody>
+          <a:bodyPr rtlCol="0" anchor="ctr"/>
+          <a:lstStyle/>
+          <a:p>
+            <a:pPr algn="ctr"/>
+            <a:r>
+              <a:rPr lang="en-US" sz="1000" dirty="0"/>
+              <a:t>FC Layer</a:t>
+            </a:r>
+          </a:p>
+        </p:txBody>
+      </p:sp>
+      <p:sp>
+        <p:nvSpPr>
+          <p:cNvPr id="8" name="Oval 7">
+            <a:extLst>
+              <a:ext uri="{FF2B5EF4-FFF2-40B4-BE49-F238E27FC236}">
+                <a16:creationId xmlns:a16="http://schemas.microsoft.com/office/drawing/2014/main" id="{92A30AC3-1129-4BE7-21A2-663AC8CC2971}"/>
+              </a:ext>
+            </a:extLst>
+          </p:cNvPr>
+          <p:cNvSpPr/>
+          <p:nvPr/>
+        </p:nvSpPr>
+        <p:spPr>
+          <a:xfrm>
+            <a:off x="10710674" y="1801368"/>
+            <a:ext cx="813816" cy="731520"/>
+          </a:xfrm>
+          <a:prstGeom prst="ellipse">
+            <a:avLst/>
+          </a:prstGeom>
+        </p:spPr>
+        <p:style>
+          <a:lnRef idx="2">
+            <a:schemeClr val="accent1">
+              <a:shade val="15000"/>
+            </a:schemeClr>
+          </a:lnRef>
+          <a:fillRef idx="1">
+            <a:schemeClr val="accent1"/>
+          </a:fillRef>
+          <a:effectRef idx="0">
+            <a:schemeClr val="accent1"/>
+          </a:effectRef>
+          <a:fontRef idx="minor">
+            <a:schemeClr val="lt1"/>
+          </a:fontRef>
+        </p:style>
+        <p:txBody>
+          <a:bodyPr rtlCol="0" anchor="ctr"/>
+          <a:lstStyle/>
+          <a:p>
+            <a:pPr algn="ctr"/>
+            <a:r>
+              <a:rPr lang="en-US" dirty="0"/>
+              <a:t>0/1</a:t>
+            </a:r>
+          </a:p>
+        </p:txBody>
+      </p:sp>
+      <p:sp>
+        <p:nvSpPr>
+          <p:cNvPr id="9" name="Oval 8">
+            <a:extLst>
+              <a:ext uri="{FF2B5EF4-FFF2-40B4-BE49-F238E27FC236}">
+                <a16:creationId xmlns:a16="http://schemas.microsoft.com/office/drawing/2014/main" id="{B5128894-C6E4-96A9-B167-DBA72AF226CE}"/>
+              </a:ext>
+            </a:extLst>
+          </p:cNvPr>
+          <p:cNvSpPr/>
+          <p:nvPr/>
+        </p:nvSpPr>
+        <p:spPr>
+          <a:xfrm>
+            <a:off x="10683242" y="3616452"/>
+            <a:ext cx="813816" cy="731520"/>
+          </a:xfrm>
+          <a:prstGeom prst="ellipse">
+            <a:avLst/>
+          </a:prstGeom>
+        </p:spPr>
+        <p:style>
+          <a:lnRef idx="2">
+            <a:schemeClr val="accent1">
+              <a:shade val="15000"/>
+            </a:schemeClr>
+          </a:lnRef>
+          <a:fillRef idx="1">
+            <a:schemeClr val="accent1"/>
+          </a:fillRef>
+          <a:effectRef idx="0">
+            <a:schemeClr val="accent1"/>
+          </a:effectRef>
+          <a:fontRef idx="minor">
+            <a:schemeClr val="lt1"/>
+          </a:fontRef>
+        </p:style>
+        <p:txBody>
+          <a:bodyPr rtlCol="0" anchor="ctr"/>
+          <a:lstStyle/>
+          <a:p>
+            <a:pPr algn="ctr"/>
+            <a:r>
+              <a:rPr lang="en-US" dirty="0"/>
+              <a:t>0/1</a:t>
+            </a:r>
+          </a:p>
+        </p:txBody>
+      </p:sp>
+      <p:pic>
+        <p:nvPicPr>
+          <p:cNvPr id="13" name="Picture 12" descr="An ultrasound of a baby&#10;&#10;AI-generated content may be incorrect.">
+            <a:extLst>
+              <a:ext uri="{FF2B5EF4-FFF2-40B4-BE49-F238E27FC236}">
+                <a16:creationId xmlns:a16="http://schemas.microsoft.com/office/drawing/2014/main" id="{0F85744C-19BA-51DF-4EB8-79FA3C9730A9}"/>
+              </a:ext>
+            </a:extLst>
+          </p:cNvPr>
+          <p:cNvPicPr>
+            <a:picLocks noChangeAspect="1"/>
+          </p:cNvPicPr>
+          <p:nvPr/>
+        </p:nvPicPr>
+        <p:blipFill>
+          <a:blip r:embed="rId2">
+            <a:extLst>
+              <a:ext uri="{28A0092B-C50C-407E-A947-70E740481C1C}">
+                <a14:useLocalDpi xmlns:a14="http://schemas.microsoft.com/office/drawing/2010/main" val="0"/>
+              </a:ext>
+            </a:extLst>
+          </a:blip>
+          <a:stretch>
+            <a:fillRect/>
+          </a:stretch>
+        </p:blipFill>
+        <p:spPr>
+          <a:xfrm>
+            <a:off x="5855210" y="1706142"/>
+            <a:ext cx="960120" cy="921972"/>
+          </a:xfrm>
+          <a:prstGeom prst="rect">
+            <a:avLst/>
+          </a:prstGeom>
+        </p:spPr>
+      </p:pic>
+      <p:pic>
+        <p:nvPicPr>
+          <p:cNvPr id="14" name="Picture 13" descr="An ultrasound of a baby&#10;&#10;AI-generated content may be incorrect.">
+            <a:extLst>
+              <a:ext uri="{FF2B5EF4-FFF2-40B4-BE49-F238E27FC236}">
+                <a16:creationId xmlns:a16="http://schemas.microsoft.com/office/drawing/2014/main" id="{0CFF7A12-0C6D-132D-AED2-AF1DFDB6D55C}"/>
+              </a:ext>
+            </a:extLst>
+          </p:cNvPr>
+          <p:cNvPicPr>
+            <a:picLocks noChangeAspect="1"/>
+          </p:cNvPicPr>
+          <p:nvPr/>
+        </p:nvPicPr>
+        <p:blipFill>
+          <a:blip r:embed="rId2">
+            <a:extLst>
+              <a:ext uri="{28A0092B-C50C-407E-A947-70E740481C1C}">
+                <a14:useLocalDpi xmlns:a14="http://schemas.microsoft.com/office/drawing/2010/main" val="0"/>
+              </a:ext>
+            </a:extLst>
+          </a:blip>
+          <a:stretch>
+            <a:fillRect/>
+          </a:stretch>
+        </p:blipFill>
+        <p:spPr>
+          <a:xfrm>
+            <a:off x="5855210" y="3521226"/>
+            <a:ext cx="960120" cy="921972"/>
+          </a:xfrm>
+          <a:prstGeom prst="rect">
+            <a:avLst/>
+          </a:prstGeom>
+        </p:spPr>
+      </p:pic>
+      <p:cxnSp>
+        <p:nvCxnSpPr>
+          <p:cNvPr id="16" name="Straight Arrow Connector 15">
+            <a:extLst>
+              <a:ext uri="{FF2B5EF4-FFF2-40B4-BE49-F238E27FC236}">
+                <a16:creationId xmlns:a16="http://schemas.microsoft.com/office/drawing/2014/main" id="{634BE88D-5907-E546-7E93-DA0740B19C75}"/>
+              </a:ext>
+            </a:extLst>
+          </p:cNvPr>
+          <p:cNvCxnSpPr>
+            <a:stCxn id="13" idx="3"/>
+            <a:endCxn id="4" idx="0"/>
+          </p:cNvCxnSpPr>
+          <p:nvPr/>
+        </p:nvCxnSpPr>
+        <p:spPr>
+          <a:xfrm>
+            <a:off x="6815330" y="2167128"/>
+            <a:ext cx="630936" cy="0"/>
+          </a:xfrm>
+          <a:prstGeom prst="straightConnector1">
+            <a:avLst/>
+          </a:prstGeom>
+          <a:ln>
+            <a:tailEnd type="triangle"/>
+          </a:ln>
+        </p:spPr>
+        <p:style>
+          <a:lnRef idx="2">
+            <a:schemeClr val="accent1"/>
+          </a:lnRef>
+          <a:fillRef idx="0">
+            <a:schemeClr val="accent1"/>
+          </a:fillRef>
+          <a:effectRef idx="1">
+            <a:schemeClr val="accent1"/>
+          </a:effectRef>
+          <a:fontRef idx="minor">
+            <a:schemeClr val="tx1"/>
+          </a:fontRef>
+        </p:style>
+      </p:cxnSp>
+      <p:cxnSp>
+        <p:nvCxnSpPr>
+          <p:cNvPr id="19" name="Straight Arrow Connector 18">
+            <a:extLst>
+              <a:ext uri="{FF2B5EF4-FFF2-40B4-BE49-F238E27FC236}">
+                <a16:creationId xmlns:a16="http://schemas.microsoft.com/office/drawing/2014/main" id="{E0599FE0-DC2D-EFF4-D4B5-99417688203F}"/>
+              </a:ext>
+            </a:extLst>
+          </p:cNvPr>
+          <p:cNvCxnSpPr>
+            <a:stCxn id="4" idx="2"/>
+            <a:endCxn id="6" idx="1"/>
+          </p:cNvCxnSpPr>
+          <p:nvPr/>
+        </p:nvCxnSpPr>
+        <p:spPr>
+          <a:xfrm>
+            <a:off x="8982458" y="2167128"/>
+            <a:ext cx="489204" cy="0"/>
+          </a:xfrm>
+          <a:prstGeom prst="straightConnector1">
+            <a:avLst/>
+          </a:prstGeom>
+          <a:ln>
+            <a:tailEnd type="triangle"/>
+          </a:ln>
+        </p:spPr>
+        <p:style>
+          <a:lnRef idx="2">
+            <a:schemeClr val="accent1"/>
+          </a:lnRef>
+          <a:fillRef idx="0">
+            <a:schemeClr val="accent1"/>
+          </a:fillRef>
+          <a:effectRef idx="1">
+            <a:schemeClr val="accent1"/>
+          </a:effectRef>
+          <a:fontRef idx="minor">
+            <a:schemeClr val="tx1"/>
+          </a:fontRef>
+        </p:style>
+      </p:cxnSp>
+      <p:cxnSp>
+        <p:nvCxnSpPr>
+          <p:cNvPr id="21" name="Straight Arrow Connector 20">
+            <a:extLst>
+              <a:ext uri="{FF2B5EF4-FFF2-40B4-BE49-F238E27FC236}">
+                <a16:creationId xmlns:a16="http://schemas.microsoft.com/office/drawing/2014/main" id="{81B2BC32-1F14-72B3-1CF3-97020A123C0B}"/>
+              </a:ext>
+            </a:extLst>
+          </p:cNvPr>
+          <p:cNvCxnSpPr>
+            <a:cxnSpLocks/>
+            <a:stCxn id="6" idx="3"/>
+            <a:endCxn id="8" idx="2"/>
+          </p:cNvCxnSpPr>
+          <p:nvPr/>
+        </p:nvCxnSpPr>
+        <p:spPr>
+          <a:xfrm>
+            <a:off x="10084310" y="2167128"/>
+            <a:ext cx="626364" cy="0"/>
+          </a:xfrm>
+          <a:prstGeom prst="straightConnector1">
+            <a:avLst/>
+          </a:prstGeom>
+          <a:ln>
+            <a:tailEnd type="triangle"/>
+          </a:ln>
+        </p:spPr>
+        <p:style>
+          <a:lnRef idx="2">
+            <a:schemeClr val="accent1"/>
+          </a:lnRef>
+          <a:fillRef idx="0">
+            <a:schemeClr val="accent1"/>
+          </a:fillRef>
+          <a:effectRef idx="1">
+            <a:schemeClr val="accent1"/>
+          </a:effectRef>
+          <a:fontRef idx="minor">
+            <a:schemeClr val="tx1"/>
+          </a:fontRef>
+        </p:style>
+      </p:cxnSp>
+      <p:cxnSp>
+        <p:nvCxnSpPr>
+          <p:cNvPr id="26" name="Straight Arrow Connector 25">
+            <a:extLst>
+              <a:ext uri="{FF2B5EF4-FFF2-40B4-BE49-F238E27FC236}">
+                <a16:creationId xmlns:a16="http://schemas.microsoft.com/office/drawing/2014/main" id="{96657093-2547-28E8-E422-D9D31D6C5FF7}"/>
+              </a:ext>
+            </a:extLst>
+          </p:cNvPr>
+          <p:cNvCxnSpPr>
+            <a:stCxn id="14" idx="3"/>
+            <a:endCxn id="5" idx="0"/>
+          </p:cNvCxnSpPr>
+          <p:nvPr/>
+        </p:nvCxnSpPr>
+        <p:spPr>
+          <a:xfrm>
+            <a:off x="6815330" y="3982212"/>
+            <a:ext cx="630936" cy="0"/>
+          </a:xfrm>
+          <a:prstGeom prst="straightConnector1">
+            <a:avLst/>
+          </a:prstGeom>
+          <a:ln>
+            <a:tailEnd type="triangle"/>
+          </a:ln>
+        </p:spPr>
+        <p:style>
+          <a:lnRef idx="2">
+            <a:schemeClr val="accent1"/>
+          </a:lnRef>
+          <a:fillRef idx="0">
+            <a:schemeClr val="accent1"/>
+          </a:fillRef>
+          <a:effectRef idx="1">
+            <a:schemeClr val="accent1"/>
+          </a:effectRef>
+          <a:fontRef idx="minor">
+            <a:schemeClr val="tx1"/>
+          </a:fontRef>
+        </p:style>
+      </p:cxnSp>
+      <p:cxnSp>
+        <p:nvCxnSpPr>
+          <p:cNvPr id="28" name="Straight Arrow Connector 27">
+            <a:extLst>
+              <a:ext uri="{FF2B5EF4-FFF2-40B4-BE49-F238E27FC236}">
+                <a16:creationId xmlns:a16="http://schemas.microsoft.com/office/drawing/2014/main" id="{E19E4B86-0056-913A-1A74-AF77DF9A413C}"/>
+              </a:ext>
+            </a:extLst>
+          </p:cNvPr>
+          <p:cNvCxnSpPr>
+            <a:stCxn id="5" idx="2"/>
+            <a:endCxn id="7" idx="1"/>
+          </p:cNvCxnSpPr>
+          <p:nvPr/>
+        </p:nvCxnSpPr>
+        <p:spPr>
+          <a:xfrm>
+            <a:off x="8982458" y="3982212"/>
+            <a:ext cx="489204" cy="0"/>
+          </a:xfrm>
+          <a:prstGeom prst="straightConnector1">
+            <a:avLst/>
+          </a:prstGeom>
+          <a:ln>
+            <a:tailEnd type="triangle"/>
+          </a:ln>
+        </p:spPr>
+        <p:style>
+          <a:lnRef idx="2">
+            <a:schemeClr val="accent1"/>
+          </a:lnRef>
+          <a:fillRef idx="0">
+            <a:schemeClr val="accent1"/>
+          </a:fillRef>
+          <a:effectRef idx="1">
+            <a:schemeClr val="accent1"/>
+          </a:effectRef>
+          <a:fontRef idx="minor">
+            <a:schemeClr val="tx1"/>
+          </a:fontRef>
+        </p:style>
+      </p:cxnSp>
+      <p:cxnSp>
+        <p:nvCxnSpPr>
+          <p:cNvPr id="30" name="Straight Arrow Connector 29">
+            <a:extLst>
+              <a:ext uri="{FF2B5EF4-FFF2-40B4-BE49-F238E27FC236}">
+                <a16:creationId xmlns:a16="http://schemas.microsoft.com/office/drawing/2014/main" id="{0EAB1C72-5838-03AC-D947-0C99D47013E9}"/>
+              </a:ext>
+            </a:extLst>
+          </p:cNvPr>
+          <p:cNvCxnSpPr>
+            <a:stCxn id="7" idx="3"/>
+            <a:endCxn id="9" idx="2"/>
+          </p:cNvCxnSpPr>
+          <p:nvPr/>
+        </p:nvCxnSpPr>
+        <p:spPr>
+          <a:xfrm>
+            <a:off x="10084310" y="3982212"/>
+            <a:ext cx="598932" cy="0"/>
+          </a:xfrm>
+          <a:prstGeom prst="straightConnector1">
+            <a:avLst/>
+          </a:prstGeom>
+          <a:ln>
+            <a:tailEnd type="triangle"/>
+          </a:ln>
+        </p:spPr>
+        <p:style>
+          <a:lnRef idx="2">
+            <a:schemeClr val="accent1"/>
+          </a:lnRef>
+          <a:fillRef idx="0">
+            <a:schemeClr val="accent1"/>
+          </a:fillRef>
+          <a:effectRef idx="1">
+            <a:schemeClr val="accent1"/>
+          </a:effectRef>
+          <a:fontRef idx="minor">
+            <a:schemeClr val="tx1"/>
+          </a:fontRef>
+        </p:style>
+      </p:cxnSp>
+      <p:sp>
+        <p:nvSpPr>
+          <p:cNvPr id="32" name="TextBox 31">
+            <a:extLst>
+              <a:ext uri="{FF2B5EF4-FFF2-40B4-BE49-F238E27FC236}">
+                <a16:creationId xmlns:a16="http://schemas.microsoft.com/office/drawing/2014/main" id="{2DB193EB-1B6C-9987-B832-62EB42D8E83A}"/>
+              </a:ext>
+            </a:extLst>
+          </p:cNvPr>
+          <p:cNvSpPr txBox="1"/>
+          <p:nvPr/>
+        </p:nvSpPr>
+        <p:spPr>
+          <a:xfrm>
+            <a:off x="7569710" y="1967073"/>
+            <a:ext cx="1106424" cy="553998"/>
+          </a:xfrm>
+          <a:prstGeom prst="rect">
+            <a:avLst/>
+          </a:prstGeom>
+          <a:noFill/>
+        </p:spPr>
+        <p:txBody>
+          <a:bodyPr wrap="square" rtlCol="0">
+            <a:spAutoFit/>
+          </a:bodyPr>
+          <a:lstStyle/>
+          <a:p>
+            <a:pPr algn="ctr"/>
+            <a:r>
+              <a:rPr lang="en-US" sz="1000" dirty="0">
+                <a:solidFill>
+                  <a:schemeClr val="bg1"/>
+                </a:solidFill>
+              </a:rPr>
+              <a:t>Pretrained Encoder</a:t>
+            </a:r>
+          </a:p>
+          <a:p>
+            <a:pPr algn="ctr"/>
+            <a:r>
+              <a:rPr lang="en-US" sz="1000" dirty="0">
+                <a:solidFill>
+                  <a:schemeClr val="bg1"/>
+                </a:solidFill>
+              </a:rPr>
+              <a:t>(Frozen)</a:t>
+            </a:r>
+          </a:p>
+        </p:txBody>
+      </p:sp>
+      <p:sp>
+        <p:nvSpPr>
+          <p:cNvPr id="34" name="TextBox 33">
+            <a:extLst>
+              <a:ext uri="{FF2B5EF4-FFF2-40B4-BE49-F238E27FC236}">
+                <a16:creationId xmlns:a16="http://schemas.microsoft.com/office/drawing/2014/main" id="{72F67960-9E73-763B-45B9-46B120A5DE32}"/>
+              </a:ext>
+            </a:extLst>
+          </p:cNvPr>
+          <p:cNvSpPr txBox="1"/>
+          <p:nvPr/>
+        </p:nvSpPr>
+        <p:spPr>
+          <a:xfrm>
+            <a:off x="7622288" y="3782157"/>
+            <a:ext cx="1106424" cy="553998"/>
+          </a:xfrm>
+          <a:prstGeom prst="rect">
+            <a:avLst/>
+          </a:prstGeom>
+          <a:noFill/>
+        </p:spPr>
+        <p:txBody>
+          <a:bodyPr wrap="square" rtlCol="0">
+            <a:spAutoFit/>
+          </a:bodyPr>
+          <a:lstStyle/>
+          <a:p>
+            <a:pPr algn="ctr"/>
+            <a:r>
+              <a:rPr lang="en-US" sz="1000" dirty="0">
+                <a:solidFill>
+                  <a:schemeClr val="bg1"/>
+                </a:solidFill>
+              </a:rPr>
+              <a:t> Encoder</a:t>
+            </a:r>
+          </a:p>
+          <a:p>
+            <a:pPr algn="ctr"/>
+            <a:r>
+              <a:rPr lang="en-US" sz="1000" dirty="0">
+                <a:solidFill>
+                  <a:schemeClr val="bg1"/>
+                </a:solidFill>
+              </a:rPr>
+              <a:t>From Scratch</a:t>
+            </a:r>
+          </a:p>
+          <a:p>
+            <a:pPr algn="ctr"/>
+            <a:r>
+              <a:rPr lang="en-US" sz="1000" dirty="0">
+                <a:solidFill>
+                  <a:schemeClr val="bg1"/>
+                </a:solidFill>
+              </a:rPr>
+              <a:t>(Trainable)</a:t>
+            </a:r>
+          </a:p>
+        </p:txBody>
+      </p:sp>
+      <p:sp>
+        <p:nvSpPr>
+          <p:cNvPr id="22" name="TextBox 21">
+            <a:extLst>
+              <a:ext uri="{FF2B5EF4-FFF2-40B4-BE49-F238E27FC236}">
+                <a16:creationId xmlns:a16="http://schemas.microsoft.com/office/drawing/2014/main" id="{19120E76-F3E4-A94E-13FB-FFBF80FAEB8E}"/>
+              </a:ext>
+            </a:extLst>
+          </p:cNvPr>
+          <p:cNvSpPr txBox="1"/>
+          <p:nvPr/>
+        </p:nvSpPr>
+        <p:spPr>
+          <a:xfrm>
+            <a:off x="1153959" y="6339221"/>
+            <a:ext cx="3442906" cy="369332"/>
+          </a:xfrm>
+          <a:prstGeom prst="rect">
+            <a:avLst/>
+          </a:prstGeom>
+          <a:noFill/>
+        </p:spPr>
+        <p:txBody>
+          <a:bodyPr wrap="square" rtlCol="0">
+            <a:spAutoFit/>
+          </a:bodyPr>
+          <a:lstStyle/>
+          <a:p>
+            <a:pPr algn="ctr"/>
+            <a:r>
+              <a:rPr lang="en-US" dirty="0"/>
+              <a:t>Test Result on 5 fold models</a:t>
+            </a:r>
+          </a:p>
+        </p:txBody>
+      </p:sp>
+      <p:sp>
+        <p:nvSpPr>
+          <p:cNvPr id="10" name="Oval 9">
+            <a:extLst>
+              <a:ext uri="{FF2B5EF4-FFF2-40B4-BE49-F238E27FC236}">
+                <a16:creationId xmlns:a16="http://schemas.microsoft.com/office/drawing/2014/main" id="{2CCB7B9F-0748-BF90-A364-A14A85294C26}"/>
+              </a:ext>
+            </a:extLst>
+          </p:cNvPr>
+          <p:cNvSpPr/>
+          <p:nvPr/>
+        </p:nvSpPr>
+        <p:spPr>
+          <a:xfrm>
+            <a:off x="11146536" y="2784348"/>
+            <a:ext cx="726948" cy="580644"/>
+          </a:xfrm>
+          <a:prstGeom prst="ellipse">
+            <a:avLst/>
+          </a:prstGeom>
+        </p:spPr>
+        <p:style>
+          <a:lnRef idx="2">
+            <a:schemeClr val="accent1">
+              <a:shade val="15000"/>
+            </a:schemeClr>
+          </a:lnRef>
+          <a:fillRef idx="1">
+            <a:schemeClr val="accent1"/>
+          </a:fillRef>
+          <a:effectRef idx="0">
+            <a:schemeClr val="accent1"/>
+          </a:effectRef>
+          <a:fontRef idx="minor">
+            <a:schemeClr val="lt1"/>
+          </a:fontRef>
+        </p:style>
+        <p:txBody>
+          <a:bodyPr rtlCol="0" anchor="ctr"/>
+          <a:lstStyle/>
+          <a:p>
+            <a:pPr algn="ctr"/>
+            <a:r>
+              <a:rPr lang="en-US" dirty="0"/>
+              <a:t>0/1</a:t>
+            </a:r>
+          </a:p>
+        </p:txBody>
+      </p:sp>
+      <p:cxnSp>
+        <p:nvCxnSpPr>
+          <p:cNvPr id="24" name="Straight Arrow Connector 23">
+            <a:extLst>
+              <a:ext uri="{FF2B5EF4-FFF2-40B4-BE49-F238E27FC236}">
+                <a16:creationId xmlns:a16="http://schemas.microsoft.com/office/drawing/2014/main" id="{B7C2FBD6-985B-D9CE-79A8-E6589FF70C52}"/>
+              </a:ext>
+            </a:extLst>
+          </p:cNvPr>
+          <p:cNvCxnSpPr>
+            <a:stCxn id="5" idx="2"/>
+            <a:endCxn id="6" idx="1"/>
+          </p:cNvCxnSpPr>
+          <p:nvPr/>
+        </p:nvCxnSpPr>
+        <p:spPr>
+          <a:xfrm flipV="1">
+            <a:off x="8982458" y="2167128"/>
+            <a:ext cx="489204" cy="1815084"/>
+          </a:xfrm>
+          <a:prstGeom prst="straightConnector1">
+            <a:avLst/>
+          </a:prstGeom>
+          <a:ln>
+            <a:tailEnd type="triangle"/>
+          </a:ln>
+        </p:spPr>
+        <p:style>
+          <a:lnRef idx="2">
+            <a:schemeClr val="accent1"/>
+          </a:lnRef>
+          <a:fillRef idx="0">
+            <a:schemeClr val="accent1"/>
+          </a:fillRef>
+          <a:effectRef idx="1">
+            <a:schemeClr val="accent1"/>
+          </a:effectRef>
+          <a:fontRef idx="minor">
+            <a:schemeClr val="tx1"/>
+          </a:fontRef>
+        </p:style>
+      </p:cxnSp>
+      <p:cxnSp>
+        <p:nvCxnSpPr>
+          <p:cNvPr id="27" name="Straight Arrow Connector 26">
+            <a:extLst>
+              <a:ext uri="{FF2B5EF4-FFF2-40B4-BE49-F238E27FC236}">
+                <a16:creationId xmlns:a16="http://schemas.microsoft.com/office/drawing/2014/main" id="{B3973300-8DCB-453E-342A-6DD701055923}"/>
+              </a:ext>
+            </a:extLst>
+          </p:cNvPr>
+          <p:cNvCxnSpPr>
+            <a:stCxn id="8" idx="4"/>
+            <a:endCxn id="10" idx="0"/>
+          </p:cNvCxnSpPr>
+          <p:nvPr/>
+        </p:nvCxnSpPr>
+        <p:spPr>
+          <a:xfrm>
+            <a:off x="11117582" y="2532888"/>
+            <a:ext cx="392428" cy="251460"/>
+          </a:xfrm>
+          <a:prstGeom prst="straightConnector1">
+            <a:avLst/>
+          </a:prstGeom>
+          <a:ln>
+            <a:tailEnd type="triangle"/>
+          </a:ln>
+        </p:spPr>
+        <p:style>
+          <a:lnRef idx="2">
+            <a:schemeClr val="accent1"/>
+          </a:lnRef>
+          <a:fillRef idx="0">
+            <a:schemeClr val="accent1"/>
+          </a:fillRef>
+          <a:effectRef idx="1">
+            <a:schemeClr val="accent1"/>
+          </a:effectRef>
+          <a:fontRef idx="minor">
+            <a:schemeClr val="tx1"/>
+          </a:fontRef>
+        </p:style>
+      </p:cxnSp>
+      <p:cxnSp>
+        <p:nvCxnSpPr>
+          <p:cNvPr id="35" name="Straight Arrow Connector 34">
+            <a:extLst>
+              <a:ext uri="{FF2B5EF4-FFF2-40B4-BE49-F238E27FC236}">
+                <a16:creationId xmlns:a16="http://schemas.microsoft.com/office/drawing/2014/main" id="{6D2D2F39-2175-E20E-91D6-997F2B2000B4}"/>
+              </a:ext>
+            </a:extLst>
+          </p:cNvPr>
+          <p:cNvCxnSpPr>
+            <a:stCxn id="9" idx="0"/>
+            <a:endCxn id="10" idx="4"/>
+          </p:cNvCxnSpPr>
+          <p:nvPr/>
+        </p:nvCxnSpPr>
+        <p:spPr>
+          <a:xfrm flipV="1">
+            <a:off x="11090150" y="3364992"/>
+            <a:ext cx="419860" cy="251460"/>
+          </a:xfrm>
+          <a:prstGeom prst="straightConnector1">
+            <a:avLst/>
+          </a:prstGeom>
+          <a:ln>
+            <a:tailEnd type="triangle"/>
+          </a:ln>
+        </p:spPr>
+        <p:style>
+          <a:lnRef idx="2">
+            <a:schemeClr val="accent1"/>
+          </a:lnRef>
+          <a:fillRef idx="0">
+            <a:schemeClr val="accent1"/>
+          </a:fillRef>
+          <a:effectRef idx="1">
+            <a:schemeClr val="accent1"/>
+          </a:effectRef>
+          <a:fontRef idx="minor">
+            <a:schemeClr val="tx1"/>
+          </a:fontRef>
+        </p:style>
+      </p:cxnSp>
+      <p:cxnSp>
+        <p:nvCxnSpPr>
+          <p:cNvPr id="15" name="Straight Arrow Connector 14">
+            <a:extLst>
+              <a:ext uri="{FF2B5EF4-FFF2-40B4-BE49-F238E27FC236}">
+                <a16:creationId xmlns:a16="http://schemas.microsoft.com/office/drawing/2014/main" id="{F67DCF1E-A549-CCBA-67C1-F0FD0B1391F4}"/>
+              </a:ext>
+            </a:extLst>
+          </p:cNvPr>
+          <p:cNvCxnSpPr>
+            <a:stCxn id="4" idx="2"/>
+            <a:endCxn id="7" idx="1"/>
+          </p:cNvCxnSpPr>
+          <p:nvPr/>
+        </p:nvCxnSpPr>
+        <p:spPr>
+          <a:xfrm>
+            <a:off x="8982458" y="2167128"/>
+            <a:ext cx="489204" cy="1815084"/>
+          </a:xfrm>
+          <a:prstGeom prst="straightConnector1">
+            <a:avLst/>
+          </a:prstGeom>
+          <a:ln>
+            <a:tailEnd type="triangle"/>
+          </a:ln>
+        </p:spPr>
+        <p:style>
+          <a:lnRef idx="2">
+            <a:schemeClr val="accent1"/>
+          </a:lnRef>
+          <a:fillRef idx="0">
+            <a:schemeClr val="accent1"/>
+          </a:fillRef>
+          <a:effectRef idx="1">
+            <a:schemeClr val="accent1"/>
+          </a:effectRef>
+          <a:fontRef idx="minor">
+            <a:schemeClr val="tx1"/>
+          </a:fontRef>
+        </p:style>
+      </p:cxnSp>
+      <p:pic>
+        <p:nvPicPr>
+          <p:cNvPr id="12" name="Picture 11" descr="A graph of a curve&#10;&#10;AI-generated content may be incorrect.">
+            <a:extLst>
+              <a:ext uri="{FF2B5EF4-FFF2-40B4-BE49-F238E27FC236}">
+                <a16:creationId xmlns:a16="http://schemas.microsoft.com/office/drawing/2014/main" id="{37D73EFA-1008-61C4-6691-234B17A1BA19}"/>
+              </a:ext>
+            </a:extLst>
+          </p:cNvPr>
+          <p:cNvPicPr>
+            <a:picLocks noChangeAspect="1"/>
+          </p:cNvPicPr>
+          <p:nvPr/>
+        </p:nvPicPr>
+        <p:blipFill>
+          <a:blip r:embed="rId3">
+            <a:extLst>
+              <a:ext uri="{28A0092B-C50C-407E-A947-70E740481C1C}">
+                <a14:useLocalDpi xmlns:a14="http://schemas.microsoft.com/office/drawing/2010/main" val="0"/>
+              </a:ext>
+            </a:extLst>
+          </a:blip>
+          <a:stretch>
+            <a:fillRect/>
+          </a:stretch>
+        </p:blipFill>
+        <p:spPr>
+          <a:xfrm>
+            <a:off x="1252774" y="3521226"/>
+            <a:ext cx="3196307" cy="2397231"/>
+          </a:xfrm>
+          <a:prstGeom prst="rect">
+            <a:avLst/>
+          </a:prstGeom>
+        </p:spPr>
+      </p:pic>
+    </p:spTree>
+    <p:extLst>
+      <p:ext uri="{BB962C8B-B14F-4D97-AF65-F5344CB8AC3E}">
+        <p14:creationId xmlns:p14="http://schemas.microsoft.com/office/powerpoint/2010/main" val="1431494686"/>
+      </p:ext>
+    </p:extLst>
+  </p:cSld>
+  <p:clrMapOvr>
+    <a:masterClrMapping/>
+  </p:clrMapOvr>
+</p:sld>
+</file>
+
+<file path=ppt/slides/slide11.xml><?xml version="1.0" encoding="utf-8"?>
 <p:sld xmlns:a="http://schemas.openxmlformats.org/drawingml/2006/main" xmlns:r="http://schemas.openxmlformats.org/officeDocument/2006/relationships" xmlns:p="http://schemas.openxmlformats.org/presentationml/2006/main">
   <p:cSld>
     <p:spTree>
@@ -3817,7 +4907,7 @@
 </p:sld>
 </file>
 
-<file path=ppt/slides/slide11.xml><?xml version="1.0" encoding="utf-8"?>
+<file path=ppt/slides/slide12.xml><?xml version="1.0" encoding="utf-8"?>
 <p:sld xmlns:a="http://schemas.openxmlformats.org/drawingml/2006/main" xmlns:r="http://schemas.openxmlformats.org/officeDocument/2006/relationships" xmlns:p="http://schemas.openxmlformats.org/presentationml/2006/main">
   <p:cSld>
     <p:spTree>
@@ -5862,7 +6952,7 @@
 </p:sld>
 </file>
 
-<file path=ppt/slides/slide12.xml><?xml version="1.0" encoding="utf-8"?>
+<file path=ppt/slides/slide13.xml><?xml version="1.0" encoding="utf-8"?>
 <p:sld xmlns:a="http://schemas.openxmlformats.org/drawingml/2006/main" xmlns:r="http://schemas.openxmlformats.org/officeDocument/2006/relationships" xmlns:p="http://schemas.openxmlformats.org/presentationml/2006/main">
   <p:cSld>
     <p:spTree>
@@ -7907,7 +8997,7 @@
 </p:sld>
 </file>
 
-<file path=ppt/slides/slide13.xml><?xml version="1.0" encoding="utf-8"?>
+<file path=ppt/slides/slide14.xml><?xml version="1.0" encoding="utf-8"?>
 <p:sld xmlns:a="http://schemas.openxmlformats.org/drawingml/2006/main" xmlns:r="http://schemas.openxmlformats.org/officeDocument/2006/relationships" xmlns:p="http://schemas.openxmlformats.org/presentationml/2006/main">
   <p:cSld>
     <p:spTree>
@@ -9988,7 +11078,7 @@
 </p:sld>
 </file>
 
-<file path=ppt/slides/slide14.xml><?xml version="1.0" encoding="utf-8"?>
+<file path=ppt/slides/slide15.xml><?xml version="1.0" encoding="utf-8"?>
 <p:sld xmlns:a="http://schemas.openxmlformats.org/drawingml/2006/main" xmlns:r="http://schemas.openxmlformats.org/officeDocument/2006/relationships" xmlns:p="http://schemas.openxmlformats.org/presentationml/2006/main">
   <p:cSld>
     <p:spTree>
@@ -10056,6 +11146,561 @@
         <p:cNvPr id="1" name="">
           <a:extLst>
             <a:ext uri="{FF2B5EF4-FFF2-40B4-BE49-F238E27FC236}">
+              <a16:creationId xmlns:a16="http://schemas.microsoft.com/office/drawing/2014/main" id="{1418196B-5FB5-2A56-220C-9C55735337C9}"/>
+            </a:ext>
+          </a:extLst>
+        </p:cNvPr>
+        <p:cNvGrpSpPr/>
+        <p:nvPr/>
+      </p:nvGrpSpPr>
+      <p:grpSpPr>
+        <a:xfrm>
+          <a:off x="0" y="0"/>
+          <a:ext cx="0" cy="0"/>
+          <a:chOff x="0" y="0"/>
+          <a:chExt cx="0" cy="0"/>
+        </a:xfrm>
+      </p:grpSpPr>
+      <p:sp>
+        <p:nvSpPr>
+          <p:cNvPr id="4" name="Flowchart: Manual Operation 3">
+            <a:extLst>
+              <a:ext uri="{FF2B5EF4-FFF2-40B4-BE49-F238E27FC236}">
+                <a16:creationId xmlns:a16="http://schemas.microsoft.com/office/drawing/2014/main" id="{7DA02712-1316-C246-A775-F68117BE18DC}"/>
+              </a:ext>
+            </a:extLst>
+          </p:cNvPr>
+          <p:cNvSpPr/>
+          <p:nvPr/>
+        </p:nvSpPr>
+        <p:spPr>
+          <a:xfrm rot="16200000">
+            <a:off x="4710684" y="2460635"/>
+            <a:ext cx="1234440" cy="1536192"/>
+          </a:xfrm>
+          <a:prstGeom prst="flowChartManualOperation">
+            <a:avLst/>
+          </a:prstGeom>
+        </p:spPr>
+        <p:style>
+          <a:lnRef idx="2">
+            <a:schemeClr val="accent1">
+              <a:shade val="15000"/>
+            </a:schemeClr>
+          </a:lnRef>
+          <a:fillRef idx="1">
+            <a:schemeClr val="accent1"/>
+          </a:fillRef>
+          <a:effectRef idx="0">
+            <a:schemeClr val="accent1"/>
+          </a:effectRef>
+          <a:fontRef idx="minor">
+            <a:schemeClr val="lt1"/>
+          </a:fontRef>
+        </p:style>
+        <p:txBody>
+          <a:bodyPr rtlCol="0" anchor="ctr"/>
+          <a:lstStyle/>
+          <a:p>
+            <a:pPr algn="ctr"/>
+            <a:r>
+              <a:rPr lang="en-US" dirty="0"/>
+              <a:t>Encoder</a:t>
+            </a:r>
+          </a:p>
+        </p:txBody>
+      </p:sp>
+      <p:pic>
+        <p:nvPicPr>
+          <p:cNvPr id="13" name="Picture 12" descr="An ultrasound of a baby&#10;&#10;AI-generated content may be incorrect.">
+            <a:extLst>
+              <a:ext uri="{FF2B5EF4-FFF2-40B4-BE49-F238E27FC236}">
+                <a16:creationId xmlns:a16="http://schemas.microsoft.com/office/drawing/2014/main" id="{5E64D000-EE91-D666-E7FA-52AEE1E986C3}"/>
+              </a:ext>
+            </a:extLst>
+          </p:cNvPr>
+          <p:cNvPicPr>
+            <a:picLocks noChangeAspect="1"/>
+          </p:cNvPicPr>
+          <p:nvPr/>
+        </p:nvPicPr>
+        <p:blipFill>
+          <a:blip r:embed="rId2">
+            <a:extLst>
+              <a:ext uri="{28A0092B-C50C-407E-A947-70E740481C1C}">
+                <a14:useLocalDpi xmlns:a14="http://schemas.microsoft.com/office/drawing/2010/main" val="0"/>
+              </a:ext>
+            </a:extLst>
+          </a:blip>
+          <a:stretch>
+            <a:fillRect/>
+          </a:stretch>
+        </p:blipFill>
+        <p:spPr>
+          <a:xfrm>
+            <a:off x="2968752" y="2767745"/>
+            <a:ext cx="960120" cy="921972"/>
+          </a:xfrm>
+          <a:prstGeom prst="rect">
+            <a:avLst/>
+          </a:prstGeom>
+        </p:spPr>
+      </p:pic>
+      <p:cxnSp>
+        <p:nvCxnSpPr>
+          <p:cNvPr id="16" name="Straight Arrow Connector 15">
+            <a:extLst>
+              <a:ext uri="{FF2B5EF4-FFF2-40B4-BE49-F238E27FC236}">
+                <a16:creationId xmlns:a16="http://schemas.microsoft.com/office/drawing/2014/main" id="{D938D7A9-EFAA-89A3-B843-0EA8BDA172BA}"/>
+              </a:ext>
+            </a:extLst>
+          </p:cNvPr>
+          <p:cNvCxnSpPr>
+            <a:stCxn id="13" idx="3"/>
+            <a:endCxn id="4" idx="0"/>
+          </p:cNvCxnSpPr>
+          <p:nvPr/>
+        </p:nvCxnSpPr>
+        <p:spPr>
+          <a:xfrm>
+            <a:off x="3928872" y="3228731"/>
+            <a:ext cx="630936" cy="0"/>
+          </a:xfrm>
+          <a:prstGeom prst="straightConnector1">
+            <a:avLst/>
+          </a:prstGeom>
+          <a:ln>
+            <a:tailEnd type="triangle"/>
+          </a:ln>
+        </p:spPr>
+        <p:style>
+          <a:lnRef idx="2">
+            <a:schemeClr val="accent1"/>
+          </a:lnRef>
+          <a:fillRef idx="0">
+            <a:schemeClr val="accent1"/>
+          </a:fillRef>
+          <a:effectRef idx="1">
+            <a:schemeClr val="accent1"/>
+          </a:effectRef>
+          <a:fontRef idx="minor">
+            <a:schemeClr val="tx1"/>
+          </a:fontRef>
+        </p:style>
+      </p:cxnSp>
+      <p:cxnSp>
+        <p:nvCxnSpPr>
+          <p:cNvPr id="19" name="Straight Arrow Connector 18">
+            <a:extLst>
+              <a:ext uri="{FF2B5EF4-FFF2-40B4-BE49-F238E27FC236}">
+                <a16:creationId xmlns:a16="http://schemas.microsoft.com/office/drawing/2014/main" id="{DD1CBFE5-9AD2-7D3F-2C1D-3FB2DBF78F06}"/>
+              </a:ext>
+            </a:extLst>
+          </p:cNvPr>
+          <p:cNvCxnSpPr>
+            <a:cxnSpLocks/>
+            <a:stCxn id="4" idx="2"/>
+          </p:cNvCxnSpPr>
+          <p:nvPr/>
+        </p:nvCxnSpPr>
+        <p:spPr>
+          <a:xfrm>
+            <a:off x="6096000" y="3228731"/>
+            <a:ext cx="489204" cy="0"/>
+          </a:xfrm>
+          <a:prstGeom prst="straightConnector1">
+            <a:avLst/>
+          </a:prstGeom>
+          <a:ln>
+            <a:tailEnd type="triangle"/>
+          </a:ln>
+        </p:spPr>
+        <p:style>
+          <a:lnRef idx="2">
+            <a:schemeClr val="accent1"/>
+          </a:lnRef>
+          <a:fillRef idx="0">
+            <a:schemeClr val="accent1"/>
+          </a:fillRef>
+          <a:effectRef idx="1">
+            <a:schemeClr val="accent1"/>
+          </a:effectRef>
+          <a:fontRef idx="minor">
+            <a:schemeClr val="tx1"/>
+          </a:fontRef>
+        </p:style>
+      </p:cxnSp>
+      <p:sp>
+        <p:nvSpPr>
+          <p:cNvPr id="9" name="Flowchart: Manual Operation 8">
+            <a:extLst>
+              <a:ext uri="{FF2B5EF4-FFF2-40B4-BE49-F238E27FC236}">
+                <a16:creationId xmlns:a16="http://schemas.microsoft.com/office/drawing/2014/main" id="{9268D06A-FE2D-080F-A250-60E72CABA1E1}"/>
+              </a:ext>
+            </a:extLst>
+          </p:cNvPr>
+          <p:cNvSpPr/>
+          <p:nvPr/>
+        </p:nvSpPr>
+        <p:spPr>
+          <a:xfrm rot="5400000">
+            <a:off x="6736080" y="2460635"/>
+            <a:ext cx="1234440" cy="1536192"/>
+          </a:xfrm>
+          <a:prstGeom prst="flowChartManualOperation">
+            <a:avLst/>
+          </a:prstGeom>
+        </p:spPr>
+        <p:style>
+          <a:lnRef idx="2">
+            <a:schemeClr val="accent1">
+              <a:shade val="15000"/>
+            </a:schemeClr>
+          </a:lnRef>
+          <a:fillRef idx="1">
+            <a:schemeClr val="accent1"/>
+          </a:fillRef>
+          <a:effectRef idx="0">
+            <a:schemeClr val="accent1"/>
+          </a:effectRef>
+          <a:fontRef idx="minor">
+            <a:schemeClr val="lt1"/>
+          </a:fontRef>
+        </p:style>
+        <p:txBody>
+          <a:bodyPr rtlCol="0" anchor="ctr"/>
+          <a:lstStyle/>
+          <a:p>
+            <a:pPr algn="ctr"/>
+            <a:r>
+              <a:rPr lang="en-US" dirty="0"/>
+              <a:t>Decoder</a:t>
+            </a:r>
+          </a:p>
+        </p:txBody>
+      </p:sp>
+      <p:cxnSp>
+        <p:nvCxnSpPr>
+          <p:cNvPr id="11" name="Straight Arrow Connector 10">
+            <a:extLst>
+              <a:ext uri="{FF2B5EF4-FFF2-40B4-BE49-F238E27FC236}">
+                <a16:creationId xmlns:a16="http://schemas.microsoft.com/office/drawing/2014/main" id="{BD8653D0-6148-0A2C-8829-8D269E48CA8F}"/>
+              </a:ext>
+            </a:extLst>
+          </p:cNvPr>
+          <p:cNvCxnSpPr/>
+          <p:nvPr/>
+        </p:nvCxnSpPr>
+        <p:spPr>
+          <a:xfrm flipV="1">
+            <a:off x="8121396" y="2130552"/>
+            <a:ext cx="848868" cy="1098178"/>
+          </a:xfrm>
+          <a:prstGeom prst="straightConnector1">
+            <a:avLst/>
+          </a:prstGeom>
+          <a:ln>
+            <a:tailEnd type="triangle"/>
+          </a:ln>
+        </p:spPr>
+        <p:style>
+          <a:lnRef idx="2">
+            <a:schemeClr val="accent1"/>
+          </a:lnRef>
+          <a:fillRef idx="0">
+            <a:schemeClr val="accent1"/>
+          </a:fillRef>
+          <a:effectRef idx="1">
+            <a:schemeClr val="accent1"/>
+          </a:effectRef>
+          <a:fontRef idx="minor">
+            <a:schemeClr val="tx1"/>
+          </a:fontRef>
+        </p:style>
+      </p:cxnSp>
+      <p:cxnSp>
+        <p:nvCxnSpPr>
+          <p:cNvPr id="14" name="Straight Arrow Connector 13">
+            <a:extLst>
+              <a:ext uri="{FF2B5EF4-FFF2-40B4-BE49-F238E27FC236}">
+                <a16:creationId xmlns:a16="http://schemas.microsoft.com/office/drawing/2014/main" id="{46E29E22-3655-A36B-8677-8F740CF7FB4A}"/>
+              </a:ext>
+            </a:extLst>
+          </p:cNvPr>
+          <p:cNvCxnSpPr>
+            <a:stCxn id="9" idx="0"/>
+          </p:cNvCxnSpPr>
+          <p:nvPr/>
+        </p:nvCxnSpPr>
+        <p:spPr>
+          <a:xfrm>
+            <a:off x="8121396" y="3228731"/>
+            <a:ext cx="949452" cy="1343269"/>
+          </a:xfrm>
+          <a:prstGeom prst="straightConnector1">
+            <a:avLst/>
+          </a:prstGeom>
+          <a:ln>
+            <a:tailEnd type="triangle"/>
+          </a:ln>
+        </p:spPr>
+        <p:style>
+          <a:lnRef idx="2">
+            <a:schemeClr val="accent1"/>
+          </a:lnRef>
+          <a:fillRef idx="0">
+            <a:schemeClr val="accent1"/>
+          </a:fillRef>
+          <a:effectRef idx="1">
+            <a:schemeClr val="accent1"/>
+          </a:effectRef>
+          <a:fontRef idx="minor">
+            <a:schemeClr val="tx1"/>
+          </a:fontRef>
+        </p:style>
+      </p:cxnSp>
+      <p:sp>
+        <p:nvSpPr>
+          <p:cNvPr id="15" name="Oval 14">
+            <a:extLst>
+              <a:ext uri="{FF2B5EF4-FFF2-40B4-BE49-F238E27FC236}">
+                <a16:creationId xmlns:a16="http://schemas.microsoft.com/office/drawing/2014/main" id="{CA97FFA3-69AD-6AE3-78E2-EED332EA1B93}"/>
+              </a:ext>
+            </a:extLst>
+          </p:cNvPr>
+          <p:cNvSpPr/>
+          <p:nvPr/>
+        </p:nvSpPr>
+        <p:spPr>
+          <a:xfrm>
+            <a:off x="8970264" y="1601097"/>
+            <a:ext cx="1176528" cy="1010413"/>
+          </a:xfrm>
+          <a:prstGeom prst="ellipse">
+            <a:avLst/>
+          </a:prstGeom>
+        </p:spPr>
+        <p:style>
+          <a:lnRef idx="2">
+            <a:schemeClr val="accent1">
+              <a:shade val="15000"/>
+            </a:schemeClr>
+          </a:lnRef>
+          <a:fillRef idx="1">
+            <a:schemeClr val="accent1"/>
+          </a:fillRef>
+          <a:effectRef idx="0">
+            <a:schemeClr val="accent1"/>
+          </a:effectRef>
+          <a:fontRef idx="minor">
+            <a:schemeClr val="lt1"/>
+          </a:fontRef>
+        </p:style>
+        <p:txBody>
+          <a:bodyPr rtlCol="0" anchor="ctr"/>
+          <a:lstStyle/>
+          <a:p>
+            <a:pPr algn="ctr"/>
+            <a:r>
+              <a:rPr lang="en-US" dirty="0"/>
+              <a:t>Binary Mask</a:t>
+            </a:r>
+          </a:p>
+        </p:txBody>
+      </p:sp>
+      <p:sp>
+        <p:nvSpPr>
+          <p:cNvPr id="17" name="Oval 16">
+            <a:extLst>
+              <a:ext uri="{FF2B5EF4-FFF2-40B4-BE49-F238E27FC236}">
+                <a16:creationId xmlns:a16="http://schemas.microsoft.com/office/drawing/2014/main" id="{723E2E57-4F1C-8E8A-1B53-DAA87478959A}"/>
+              </a:ext>
+            </a:extLst>
+          </p:cNvPr>
+          <p:cNvSpPr/>
+          <p:nvPr/>
+        </p:nvSpPr>
+        <p:spPr>
+          <a:xfrm>
+            <a:off x="9070848" y="3978537"/>
+            <a:ext cx="1463040" cy="1010413"/>
+          </a:xfrm>
+          <a:prstGeom prst="ellipse">
+            <a:avLst/>
+          </a:prstGeom>
+        </p:spPr>
+        <p:style>
+          <a:lnRef idx="2">
+            <a:schemeClr val="accent1">
+              <a:shade val="15000"/>
+            </a:schemeClr>
+          </a:lnRef>
+          <a:fillRef idx="1">
+            <a:schemeClr val="accent1"/>
+          </a:fillRef>
+          <a:effectRef idx="0">
+            <a:schemeClr val="accent1"/>
+          </a:effectRef>
+          <a:fontRef idx="minor">
+            <a:schemeClr val="lt1"/>
+          </a:fontRef>
+        </p:style>
+        <p:txBody>
+          <a:bodyPr rtlCol="0" anchor="ctr"/>
+          <a:lstStyle/>
+          <a:p>
+            <a:pPr algn="ctr"/>
+            <a:r>
+              <a:rPr lang="en-US" dirty="0"/>
+              <a:t>Lesion Roi</a:t>
+            </a:r>
+          </a:p>
+        </p:txBody>
+      </p:sp>
+      <p:cxnSp>
+        <p:nvCxnSpPr>
+          <p:cNvPr id="22" name="Straight Arrow Connector 21">
+            <a:extLst>
+              <a:ext uri="{FF2B5EF4-FFF2-40B4-BE49-F238E27FC236}">
+                <a16:creationId xmlns:a16="http://schemas.microsoft.com/office/drawing/2014/main" id="{4D20A0B1-6757-6BFD-375D-98788A899FBE}"/>
+              </a:ext>
+            </a:extLst>
+          </p:cNvPr>
+          <p:cNvCxnSpPr/>
+          <p:nvPr/>
+        </p:nvCxnSpPr>
+        <p:spPr>
+          <a:xfrm>
+            <a:off x="6227064" y="3228730"/>
+            <a:ext cx="0" cy="1498718"/>
+          </a:xfrm>
+          <a:prstGeom prst="straightConnector1">
+            <a:avLst/>
+          </a:prstGeom>
+          <a:ln>
+            <a:tailEnd type="triangle"/>
+          </a:ln>
+        </p:spPr>
+        <p:style>
+          <a:lnRef idx="2">
+            <a:schemeClr val="accent1"/>
+          </a:lnRef>
+          <a:fillRef idx="0">
+            <a:schemeClr val="accent1"/>
+          </a:fillRef>
+          <a:effectRef idx="1">
+            <a:schemeClr val="accent1"/>
+          </a:effectRef>
+          <a:fontRef idx="minor">
+            <a:schemeClr val="tx1"/>
+          </a:fontRef>
+        </p:style>
+      </p:cxnSp>
+      <p:sp>
+        <p:nvSpPr>
+          <p:cNvPr id="23" name="Rectangle 22">
+            <a:extLst>
+              <a:ext uri="{FF2B5EF4-FFF2-40B4-BE49-F238E27FC236}">
+                <a16:creationId xmlns:a16="http://schemas.microsoft.com/office/drawing/2014/main" id="{9C14D21B-150B-E6B2-3812-BC1E2842615C}"/>
+              </a:ext>
+            </a:extLst>
+          </p:cNvPr>
+          <p:cNvSpPr/>
+          <p:nvPr/>
+        </p:nvSpPr>
+        <p:spPr>
+          <a:xfrm>
+            <a:off x="5458968" y="4778638"/>
+            <a:ext cx="1600200" cy="1010411"/>
+          </a:xfrm>
+          <a:prstGeom prst="rect">
+            <a:avLst/>
+          </a:prstGeom>
+        </p:spPr>
+        <p:style>
+          <a:lnRef idx="2">
+            <a:schemeClr val="accent1">
+              <a:shade val="15000"/>
+            </a:schemeClr>
+          </a:lnRef>
+          <a:fillRef idx="1">
+            <a:schemeClr val="accent1"/>
+          </a:fillRef>
+          <a:effectRef idx="0">
+            <a:schemeClr val="accent1"/>
+          </a:effectRef>
+          <a:fontRef idx="minor">
+            <a:schemeClr val="lt1"/>
+          </a:fontRef>
+        </p:style>
+        <p:txBody>
+          <a:bodyPr rtlCol="0" anchor="ctr"/>
+          <a:lstStyle/>
+          <a:p>
+            <a:pPr algn="ctr"/>
+            <a:r>
+              <a:rPr lang="en-US" dirty="0"/>
+              <a:t>Bottleneck Feature</a:t>
+            </a:r>
+          </a:p>
+        </p:txBody>
+      </p:sp>
+      <p:sp>
+        <p:nvSpPr>
+          <p:cNvPr id="24" name="TextBox 23">
+            <a:extLst>
+              <a:ext uri="{FF2B5EF4-FFF2-40B4-BE49-F238E27FC236}">
+                <a16:creationId xmlns:a16="http://schemas.microsoft.com/office/drawing/2014/main" id="{669F8484-9357-CD83-832E-DEB88213C9E8}"/>
+              </a:ext>
+            </a:extLst>
+          </p:cNvPr>
+          <p:cNvSpPr txBox="1"/>
+          <p:nvPr/>
+        </p:nvSpPr>
+        <p:spPr>
+          <a:xfrm>
+            <a:off x="694944" y="438912"/>
+            <a:ext cx="2816352" cy="369332"/>
+          </a:xfrm>
+          <a:prstGeom prst="rect">
+            <a:avLst/>
+          </a:prstGeom>
+          <a:noFill/>
+        </p:spPr>
+        <p:txBody>
+          <a:bodyPr wrap="square" rtlCol="0">
+            <a:spAutoFit/>
+          </a:bodyPr>
+          <a:lstStyle/>
+          <a:p>
+            <a:r>
+              <a:rPr lang="en-US" dirty="0"/>
+              <a:t>Feature extraction network</a:t>
+            </a:r>
+          </a:p>
+        </p:txBody>
+      </p:sp>
+    </p:spTree>
+    <p:extLst>
+      <p:ext uri="{BB962C8B-B14F-4D97-AF65-F5344CB8AC3E}">
+        <p14:creationId xmlns:p14="http://schemas.microsoft.com/office/powerpoint/2010/main" val="912406239"/>
+      </p:ext>
+    </p:extLst>
+  </p:cSld>
+  <p:clrMapOvr>
+    <a:masterClrMapping/>
+  </p:clrMapOvr>
+</p:sld>
+</file>
+
+<file path=ppt/slides/slide4.xml><?xml version="1.0" encoding="utf-8"?>
+<p:sld xmlns:a="http://schemas.openxmlformats.org/drawingml/2006/main" xmlns:r="http://schemas.openxmlformats.org/officeDocument/2006/relationships" xmlns:p="http://schemas.openxmlformats.org/presentationml/2006/main">
+  <p:cSld>
+    <p:spTree>
+      <p:nvGrpSpPr>
+        <p:cNvPr id="1" name="">
+          <a:extLst>
+            <a:ext uri="{FF2B5EF4-FFF2-40B4-BE49-F238E27FC236}">
               <a16:creationId xmlns:a16="http://schemas.microsoft.com/office/drawing/2014/main" id="{82192579-53EA-3844-A5B9-E024885DE246}"/>
             </a:ext>
           </a:extLst>
@@ -10613,7 +12258,7 @@
 </p:sld>
 </file>
 
-<file path=ppt/slides/slide4.xml><?xml version="1.0" encoding="utf-8"?>
+<file path=ppt/slides/slide5.xml><?xml version="1.0" encoding="utf-8"?>
 <p:sld xmlns:a="http://schemas.openxmlformats.org/drawingml/2006/main" xmlns:r="http://schemas.openxmlformats.org/officeDocument/2006/relationships" xmlns:p="http://schemas.openxmlformats.org/presentationml/2006/main">
   <p:cSld>
     <p:spTree>
@@ -11578,7 +13223,7 @@
 </p:sld>
 </file>
 
-<file path=ppt/slides/slide5.xml><?xml version="1.0" encoding="utf-8"?>
+<file path=ppt/slides/slide6.xml><?xml version="1.0" encoding="utf-8"?>
 <p:sld xmlns:a="http://schemas.openxmlformats.org/drawingml/2006/main" xmlns:r="http://schemas.openxmlformats.org/officeDocument/2006/relationships" xmlns:p="http://schemas.openxmlformats.org/presentationml/2006/main">
   <p:cSld>
     <p:spTree>
@@ -12741,7 +14386,7 @@
 </p:sld>
 </file>
 
-<file path=ppt/slides/slide6.xml><?xml version="1.0" encoding="utf-8"?>
+<file path=ppt/slides/slide7.xml><?xml version="1.0" encoding="utf-8"?>
 <p:sld xmlns:a="http://schemas.openxmlformats.org/drawingml/2006/main" xmlns:r="http://schemas.openxmlformats.org/officeDocument/2006/relationships" xmlns:p="http://schemas.openxmlformats.org/presentationml/2006/main">
   <p:cSld>
     <p:spTree>
@@ -13780,7 +15425,7 @@
 </p:sld>
 </file>
 
-<file path=ppt/slides/slide7.xml><?xml version="1.0" encoding="utf-8"?>
+<file path=ppt/slides/slide8.xml><?xml version="1.0" encoding="utf-8"?>
 <p:sld xmlns:a="http://schemas.openxmlformats.org/drawingml/2006/main" xmlns:r="http://schemas.openxmlformats.org/officeDocument/2006/relationships" xmlns:p="http://schemas.openxmlformats.org/presentationml/2006/main">
   <p:cSld>
     <p:spTree>
@@ -14934,7 +16579,7 @@
 </p:sld>
 </file>
 
-<file path=ppt/slides/slide8.xml><?xml version="1.0" encoding="utf-8"?>
+<file path=ppt/slides/slide9.xml><?xml version="1.0" encoding="utf-8"?>
 <p:sld xmlns:a="http://schemas.openxmlformats.org/drawingml/2006/main" xmlns:r="http://schemas.openxmlformats.org/officeDocument/2006/relationships" xmlns:p="http://schemas.openxmlformats.org/presentationml/2006/main">
   <p:cSld>
     <p:spTree>
@@ -16089,1212 +17734,6 @@
     <p:extLst>
       <p:ext uri="{BB962C8B-B14F-4D97-AF65-F5344CB8AC3E}">
         <p14:creationId xmlns:p14="http://schemas.microsoft.com/office/powerpoint/2010/main" val="4233127886"/>
-      </p:ext>
-    </p:extLst>
-  </p:cSld>
-  <p:clrMapOvr>
-    <a:masterClrMapping/>
-  </p:clrMapOvr>
-</p:sld>
-</file>
-
-<file path=ppt/slides/slide9.xml><?xml version="1.0" encoding="utf-8"?>
-<p:sld xmlns:a="http://schemas.openxmlformats.org/drawingml/2006/main" xmlns:r="http://schemas.openxmlformats.org/officeDocument/2006/relationships" xmlns:p="http://schemas.openxmlformats.org/presentationml/2006/main">
-  <p:cSld>
-    <p:spTree>
-      <p:nvGrpSpPr>
-        <p:cNvPr id="1" name="">
-          <a:extLst>
-            <a:ext uri="{FF2B5EF4-FFF2-40B4-BE49-F238E27FC236}">
-              <a16:creationId xmlns:a16="http://schemas.microsoft.com/office/drawing/2014/main" id="{D5D22F4C-4B89-6033-F76D-C9CBE392ABF9}"/>
-            </a:ext>
-          </a:extLst>
-        </p:cNvPr>
-        <p:cNvGrpSpPr/>
-        <p:nvPr/>
-      </p:nvGrpSpPr>
-      <p:grpSpPr>
-        <a:xfrm>
-          <a:off x="0" y="0"/>
-          <a:ext cx="0" cy="0"/>
-          <a:chOff x="0" y="0"/>
-          <a:chExt cx="0" cy="0"/>
-        </a:xfrm>
-      </p:grpSpPr>
-      <p:sp>
-        <p:nvSpPr>
-          <p:cNvPr id="2" name="TextBox 1">
-            <a:extLst>
-              <a:ext uri="{FF2B5EF4-FFF2-40B4-BE49-F238E27FC236}">
-                <a16:creationId xmlns:a16="http://schemas.microsoft.com/office/drawing/2014/main" id="{BBAC367F-A540-B93A-F915-53FC2BF88A6F}"/>
-              </a:ext>
-            </a:extLst>
-          </p:cNvPr>
-          <p:cNvSpPr txBox="1"/>
-          <p:nvPr/>
-        </p:nvSpPr>
-        <p:spPr>
-          <a:xfrm>
-            <a:off x="1234440" y="722376"/>
-            <a:ext cx="2688336" cy="369332"/>
-          </a:xfrm>
-          <a:prstGeom prst="rect">
-            <a:avLst/>
-          </a:prstGeom>
-          <a:noFill/>
-        </p:spPr>
-        <p:txBody>
-          <a:bodyPr wrap="square" rtlCol="0">
-            <a:spAutoFit/>
-          </a:bodyPr>
-          <a:lstStyle/>
-          <a:p>
-            <a:r>
-              <a:rPr lang="en-US" dirty="0"/>
-              <a:t>Experiment 3.3: </a:t>
-            </a:r>
-          </a:p>
-        </p:txBody>
-      </p:sp>
-      <p:sp>
-        <p:nvSpPr>
-          <p:cNvPr id="3" name="TextBox 2">
-            <a:extLst>
-              <a:ext uri="{FF2B5EF4-FFF2-40B4-BE49-F238E27FC236}">
-                <a16:creationId xmlns:a16="http://schemas.microsoft.com/office/drawing/2014/main" id="{2C9F5D81-DD1F-992D-FE20-575EBC7D3B94}"/>
-              </a:ext>
-            </a:extLst>
-          </p:cNvPr>
-          <p:cNvSpPr txBox="1"/>
-          <p:nvPr/>
-        </p:nvSpPr>
-        <p:spPr>
-          <a:xfrm>
-            <a:off x="1229489" y="1031272"/>
-            <a:ext cx="4502277" cy="2862322"/>
-          </a:xfrm>
-          <a:prstGeom prst="rect">
-            <a:avLst/>
-          </a:prstGeom>
-          <a:noFill/>
-        </p:spPr>
-        <p:txBody>
-          <a:bodyPr wrap="square" rtlCol="0">
-            <a:spAutoFit/>
-          </a:bodyPr>
-          <a:lstStyle/>
-          <a:p>
-            <a:endParaRPr lang="en-US" dirty="0"/>
-          </a:p>
-          <a:p>
-            <a:pPr marL="285750" indent="-285750">
-              <a:buFont typeface="Arial" panose="020B0604020202020204" pitchFamily="34" charset="0"/>
-              <a:buChar char="•"/>
-            </a:pPr>
-            <a:r>
-              <a:rPr lang="en-US" dirty="0"/>
-              <a:t>Binary Classification Setup </a:t>
-            </a:r>
-          </a:p>
-          <a:p>
-            <a:pPr marL="285750" indent="-285750">
-              <a:buFont typeface="Arial" panose="020B0604020202020204" pitchFamily="34" charset="0"/>
-              <a:buChar char="•"/>
-            </a:pPr>
-            <a:r>
-              <a:rPr lang="en-US" dirty="0"/>
-              <a:t>Classification Based on US Image Only</a:t>
-            </a:r>
-          </a:p>
-          <a:p>
-            <a:pPr marL="285750" indent="-285750">
-              <a:buFont typeface="Arial" panose="020B0604020202020204" pitchFamily="34" charset="0"/>
-              <a:buChar char="•"/>
-            </a:pPr>
-            <a:r>
-              <a:rPr lang="en-US" dirty="0"/>
-              <a:t>Two separate encoder with detached tail</a:t>
-            </a:r>
-          </a:p>
-          <a:p>
-            <a:pPr marL="285750" indent="-285750">
-              <a:buFont typeface="Arial" panose="020B0604020202020204" pitchFamily="34" charset="0"/>
-              <a:buChar char="•"/>
-            </a:pPr>
-            <a:r>
-              <a:rPr lang="en-US" dirty="0"/>
-              <a:t>Weighted Score</a:t>
-            </a:r>
-          </a:p>
-          <a:p>
-            <a:pPr marL="285750" indent="-285750">
-              <a:buFont typeface="Arial" panose="020B0604020202020204" pitchFamily="34" charset="0"/>
-              <a:buChar char="•"/>
-            </a:pPr>
-            <a:r>
-              <a:rPr lang="en-US" dirty="0" err="1"/>
-              <a:t>Testset</a:t>
-            </a:r>
-            <a:r>
-              <a:rPr lang="en-US" dirty="0"/>
-              <a:t> on 120 to 143 Patient IDs:</a:t>
-            </a:r>
-          </a:p>
-          <a:p>
-            <a:pPr marL="742950" lvl="1" indent="-285750">
-              <a:buFont typeface="Arial" panose="020B0604020202020204" pitchFamily="34" charset="0"/>
-              <a:buChar char="•"/>
-            </a:pPr>
-            <a:r>
-              <a:rPr lang="en-US" dirty="0"/>
-              <a:t>Total images 82</a:t>
-            </a:r>
-          </a:p>
-          <a:p>
-            <a:pPr marL="742950" lvl="1" indent="-285750">
-              <a:buFont typeface="Arial" panose="020B0604020202020204" pitchFamily="34" charset="0"/>
-              <a:buChar char="•"/>
-            </a:pPr>
-            <a:r>
-              <a:rPr lang="en-US" dirty="0"/>
-              <a:t>Malignant 35, Benign 47</a:t>
-            </a:r>
-          </a:p>
-          <a:p>
-            <a:pPr marL="285750" indent="-285750">
-              <a:buFont typeface="Arial" panose="020B0604020202020204" pitchFamily="34" charset="0"/>
-              <a:buChar char="•"/>
-            </a:pPr>
-            <a:endParaRPr lang="en-US" dirty="0"/>
-          </a:p>
-          <a:p>
-            <a:pPr marL="285750" indent="-285750">
-              <a:buFont typeface="Arial" panose="020B0604020202020204" pitchFamily="34" charset="0"/>
-              <a:buChar char="•"/>
-            </a:pPr>
-            <a:endParaRPr lang="en-US" dirty="0"/>
-          </a:p>
-        </p:txBody>
-      </p:sp>
-      <p:sp>
-        <p:nvSpPr>
-          <p:cNvPr id="4" name="Flowchart: Manual Operation 3">
-            <a:extLst>
-              <a:ext uri="{FF2B5EF4-FFF2-40B4-BE49-F238E27FC236}">
-                <a16:creationId xmlns:a16="http://schemas.microsoft.com/office/drawing/2014/main" id="{1CE917B8-B257-5BA8-8FA6-BA325A3AA7E6}"/>
-              </a:ext>
-            </a:extLst>
-          </p:cNvPr>
-          <p:cNvSpPr/>
-          <p:nvPr/>
-        </p:nvSpPr>
-        <p:spPr>
-          <a:xfrm rot="16200000">
-            <a:off x="7597142" y="1399032"/>
-            <a:ext cx="1234440" cy="1536192"/>
-          </a:xfrm>
-          <a:prstGeom prst="flowChartManualOperation">
-            <a:avLst/>
-          </a:prstGeom>
-        </p:spPr>
-        <p:style>
-          <a:lnRef idx="2">
-            <a:schemeClr val="accent1">
-              <a:shade val="15000"/>
-            </a:schemeClr>
-          </a:lnRef>
-          <a:fillRef idx="1">
-            <a:schemeClr val="accent1"/>
-          </a:fillRef>
-          <a:effectRef idx="0">
-            <a:schemeClr val="accent1"/>
-          </a:effectRef>
-          <a:fontRef idx="minor">
-            <a:schemeClr val="lt1"/>
-          </a:fontRef>
-        </p:style>
-        <p:txBody>
-          <a:bodyPr rtlCol="0" anchor="ctr"/>
-          <a:lstStyle/>
-          <a:p>
-            <a:pPr algn="ctr"/>
-            <a:endParaRPr lang="en-US" dirty="0"/>
-          </a:p>
-        </p:txBody>
-      </p:sp>
-      <p:sp>
-        <p:nvSpPr>
-          <p:cNvPr id="5" name="Flowchart: Manual Operation 4">
-            <a:extLst>
-              <a:ext uri="{FF2B5EF4-FFF2-40B4-BE49-F238E27FC236}">
-                <a16:creationId xmlns:a16="http://schemas.microsoft.com/office/drawing/2014/main" id="{1B7629C8-4436-163A-FB13-86E43541C074}"/>
-              </a:ext>
-            </a:extLst>
-          </p:cNvPr>
-          <p:cNvSpPr/>
-          <p:nvPr/>
-        </p:nvSpPr>
-        <p:spPr>
-          <a:xfrm rot="16200000">
-            <a:off x="7597142" y="3214116"/>
-            <a:ext cx="1234440" cy="1536192"/>
-          </a:xfrm>
-          <a:prstGeom prst="flowChartManualOperation">
-            <a:avLst/>
-          </a:prstGeom>
-        </p:spPr>
-        <p:style>
-          <a:lnRef idx="2">
-            <a:schemeClr val="accent1">
-              <a:shade val="15000"/>
-            </a:schemeClr>
-          </a:lnRef>
-          <a:fillRef idx="1">
-            <a:schemeClr val="accent1"/>
-          </a:fillRef>
-          <a:effectRef idx="0">
-            <a:schemeClr val="accent1"/>
-          </a:effectRef>
-          <a:fontRef idx="minor">
-            <a:schemeClr val="lt1"/>
-          </a:fontRef>
-        </p:style>
-        <p:txBody>
-          <a:bodyPr rtlCol="0" anchor="ctr"/>
-          <a:lstStyle/>
-          <a:p>
-            <a:pPr algn="ctr"/>
-            <a:endParaRPr lang="en-US"/>
-          </a:p>
-        </p:txBody>
-      </p:sp>
-      <p:sp>
-        <p:nvSpPr>
-          <p:cNvPr id="6" name="Rectangle 5">
-            <a:extLst>
-              <a:ext uri="{FF2B5EF4-FFF2-40B4-BE49-F238E27FC236}">
-                <a16:creationId xmlns:a16="http://schemas.microsoft.com/office/drawing/2014/main" id="{8E8A2F4D-F8F9-510A-CF04-E82A4153BB2C}"/>
-              </a:ext>
-            </a:extLst>
-          </p:cNvPr>
-          <p:cNvSpPr/>
-          <p:nvPr/>
-        </p:nvSpPr>
-        <p:spPr>
-          <a:xfrm>
-            <a:off x="9471662" y="1760220"/>
-            <a:ext cx="612648" cy="813816"/>
-          </a:xfrm>
-          <a:prstGeom prst="rect">
-            <a:avLst/>
-          </a:prstGeom>
-        </p:spPr>
-        <p:style>
-          <a:lnRef idx="2">
-            <a:schemeClr val="accent1">
-              <a:shade val="15000"/>
-            </a:schemeClr>
-          </a:lnRef>
-          <a:fillRef idx="1">
-            <a:schemeClr val="accent1"/>
-          </a:fillRef>
-          <a:effectRef idx="0">
-            <a:schemeClr val="accent1"/>
-          </a:effectRef>
-          <a:fontRef idx="minor">
-            <a:schemeClr val="lt1"/>
-          </a:fontRef>
-        </p:style>
-        <p:txBody>
-          <a:bodyPr rtlCol="0" anchor="ctr"/>
-          <a:lstStyle/>
-          <a:p>
-            <a:pPr algn="ctr"/>
-            <a:r>
-              <a:rPr lang="en-US" sz="1000" dirty="0"/>
-              <a:t>FC Layer</a:t>
-            </a:r>
-          </a:p>
-        </p:txBody>
-      </p:sp>
-      <p:sp>
-        <p:nvSpPr>
-          <p:cNvPr id="7" name="Rectangle 6">
-            <a:extLst>
-              <a:ext uri="{FF2B5EF4-FFF2-40B4-BE49-F238E27FC236}">
-                <a16:creationId xmlns:a16="http://schemas.microsoft.com/office/drawing/2014/main" id="{DA21FA5E-A756-BB57-B491-7D711FAD8ED6}"/>
-              </a:ext>
-            </a:extLst>
-          </p:cNvPr>
-          <p:cNvSpPr/>
-          <p:nvPr/>
-        </p:nvSpPr>
-        <p:spPr>
-          <a:xfrm>
-            <a:off x="9471662" y="3575304"/>
-            <a:ext cx="612648" cy="813816"/>
-          </a:xfrm>
-          <a:prstGeom prst="rect">
-            <a:avLst/>
-          </a:prstGeom>
-        </p:spPr>
-        <p:style>
-          <a:lnRef idx="2">
-            <a:schemeClr val="accent1">
-              <a:shade val="15000"/>
-            </a:schemeClr>
-          </a:lnRef>
-          <a:fillRef idx="1">
-            <a:schemeClr val="accent1"/>
-          </a:fillRef>
-          <a:effectRef idx="0">
-            <a:schemeClr val="accent1"/>
-          </a:effectRef>
-          <a:fontRef idx="minor">
-            <a:schemeClr val="lt1"/>
-          </a:fontRef>
-        </p:style>
-        <p:txBody>
-          <a:bodyPr rtlCol="0" anchor="ctr"/>
-          <a:lstStyle/>
-          <a:p>
-            <a:pPr algn="ctr"/>
-            <a:r>
-              <a:rPr lang="en-US" sz="1000" dirty="0"/>
-              <a:t>FC Layer</a:t>
-            </a:r>
-          </a:p>
-        </p:txBody>
-      </p:sp>
-      <p:sp>
-        <p:nvSpPr>
-          <p:cNvPr id="8" name="Oval 7">
-            <a:extLst>
-              <a:ext uri="{FF2B5EF4-FFF2-40B4-BE49-F238E27FC236}">
-                <a16:creationId xmlns:a16="http://schemas.microsoft.com/office/drawing/2014/main" id="{92A30AC3-1129-4BE7-21A2-663AC8CC2971}"/>
-              </a:ext>
-            </a:extLst>
-          </p:cNvPr>
-          <p:cNvSpPr/>
-          <p:nvPr/>
-        </p:nvSpPr>
-        <p:spPr>
-          <a:xfrm>
-            <a:off x="10710674" y="1801368"/>
-            <a:ext cx="813816" cy="731520"/>
-          </a:xfrm>
-          <a:prstGeom prst="ellipse">
-            <a:avLst/>
-          </a:prstGeom>
-        </p:spPr>
-        <p:style>
-          <a:lnRef idx="2">
-            <a:schemeClr val="accent1">
-              <a:shade val="15000"/>
-            </a:schemeClr>
-          </a:lnRef>
-          <a:fillRef idx="1">
-            <a:schemeClr val="accent1"/>
-          </a:fillRef>
-          <a:effectRef idx="0">
-            <a:schemeClr val="accent1"/>
-          </a:effectRef>
-          <a:fontRef idx="minor">
-            <a:schemeClr val="lt1"/>
-          </a:fontRef>
-        </p:style>
-        <p:txBody>
-          <a:bodyPr rtlCol="0" anchor="ctr"/>
-          <a:lstStyle/>
-          <a:p>
-            <a:pPr algn="ctr"/>
-            <a:r>
-              <a:rPr lang="en-US" dirty="0"/>
-              <a:t>0/1</a:t>
-            </a:r>
-          </a:p>
-        </p:txBody>
-      </p:sp>
-      <p:sp>
-        <p:nvSpPr>
-          <p:cNvPr id="9" name="Oval 8">
-            <a:extLst>
-              <a:ext uri="{FF2B5EF4-FFF2-40B4-BE49-F238E27FC236}">
-                <a16:creationId xmlns:a16="http://schemas.microsoft.com/office/drawing/2014/main" id="{B5128894-C6E4-96A9-B167-DBA72AF226CE}"/>
-              </a:ext>
-            </a:extLst>
-          </p:cNvPr>
-          <p:cNvSpPr/>
-          <p:nvPr/>
-        </p:nvSpPr>
-        <p:spPr>
-          <a:xfrm>
-            <a:off x="10683242" y="3616452"/>
-            <a:ext cx="813816" cy="731520"/>
-          </a:xfrm>
-          <a:prstGeom prst="ellipse">
-            <a:avLst/>
-          </a:prstGeom>
-        </p:spPr>
-        <p:style>
-          <a:lnRef idx="2">
-            <a:schemeClr val="accent1">
-              <a:shade val="15000"/>
-            </a:schemeClr>
-          </a:lnRef>
-          <a:fillRef idx="1">
-            <a:schemeClr val="accent1"/>
-          </a:fillRef>
-          <a:effectRef idx="0">
-            <a:schemeClr val="accent1"/>
-          </a:effectRef>
-          <a:fontRef idx="minor">
-            <a:schemeClr val="lt1"/>
-          </a:fontRef>
-        </p:style>
-        <p:txBody>
-          <a:bodyPr rtlCol="0" anchor="ctr"/>
-          <a:lstStyle/>
-          <a:p>
-            <a:pPr algn="ctr"/>
-            <a:r>
-              <a:rPr lang="en-US" dirty="0"/>
-              <a:t>0/1</a:t>
-            </a:r>
-          </a:p>
-        </p:txBody>
-      </p:sp>
-      <p:pic>
-        <p:nvPicPr>
-          <p:cNvPr id="13" name="Picture 12" descr="An ultrasound of a baby&#10;&#10;AI-generated content may be incorrect.">
-            <a:extLst>
-              <a:ext uri="{FF2B5EF4-FFF2-40B4-BE49-F238E27FC236}">
-                <a16:creationId xmlns:a16="http://schemas.microsoft.com/office/drawing/2014/main" id="{0F85744C-19BA-51DF-4EB8-79FA3C9730A9}"/>
-              </a:ext>
-            </a:extLst>
-          </p:cNvPr>
-          <p:cNvPicPr>
-            <a:picLocks noChangeAspect="1"/>
-          </p:cNvPicPr>
-          <p:nvPr/>
-        </p:nvPicPr>
-        <p:blipFill>
-          <a:blip r:embed="rId2">
-            <a:extLst>
-              <a:ext uri="{28A0092B-C50C-407E-A947-70E740481C1C}">
-                <a14:useLocalDpi xmlns:a14="http://schemas.microsoft.com/office/drawing/2010/main" val="0"/>
-              </a:ext>
-            </a:extLst>
-          </a:blip>
-          <a:stretch>
-            <a:fillRect/>
-          </a:stretch>
-        </p:blipFill>
-        <p:spPr>
-          <a:xfrm>
-            <a:off x="5855210" y="1706142"/>
-            <a:ext cx="960120" cy="921972"/>
-          </a:xfrm>
-          <a:prstGeom prst="rect">
-            <a:avLst/>
-          </a:prstGeom>
-        </p:spPr>
-      </p:pic>
-      <p:pic>
-        <p:nvPicPr>
-          <p:cNvPr id="14" name="Picture 13" descr="An ultrasound of a baby&#10;&#10;AI-generated content may be incorrect.">
-            <a:extLst>
-              <a:ext uri="{FF2B5EF4-FFF2-40B4-BE49-F238E27FC236}">
-                <a16:creationId xmlns:a16="http://schemas.microsoft.com/office/drawing/2014/main" id="{0CFF7A12-0C6D-132D-AED2-AF1DFDB6D55C}"/>
-              </a:ext>
-            </a:extLst>
-          </p:cNvPr>
-          <p:cNvPicPr>
-            <a:picLocks noChangeAspect="1"/>
-          </p:cNvPicPr>
-          <p:nvPr/>
-        </p:nvPicPr>
-        <p:blipFill>
-          <a:blip r:embed="rId2">
-            <a:extLst>
-              <a:ext uri="{28A0092B-C50C-407E-A947-70E740481C1C}">
-                <a14:useLocalDpi xmlns:a14="http://schemas.microsoft.com/office/drawing/2010/main" val="0"/>
-              </a:ext>
-            </a:extLst>
-          </a:blip>
-          <a:stretch>
-            <a:fillRect/>
-          </a:stretch>
-        </p:blipFill>
-        <p:spPr>
-          <a:xfrm>
-            <a:off x="5855210" y="3521226"/>
-            <a:ext cx="960120" cy="921972"/>
-          </a:xfrm>
-          <a:prstGeom prst="rect">
-            <a:avLst/>
-          </a:prstGeom>
-        </p:spPr>
-      </p:pic>
-      <p:cxnSp>
-        <p:nvCxnSpPr>
-          <p:cNvPr id="16" name="Straight Arrow Connector 15">
-            <a:extLst>
-              <a:ext uri="{FF2B5EF4-FFF2-40B4-BE49-F238E27FC236}">
-                <a16:creationId xmlns:a16="http://schemas.microsoft.com/office/drawing/2014/main" id="{634BE88D-5907-E546-7E93-DA0740B19C75}"/>
-              </a:ext>
-            </a:extLst>
-          </p:cNvPr>
-          <p:cNvCxnSpPr>
-            <a:stCxn id="13" idx="3"/>
-            <a:endCxn id="4" idx="0"/>
-          </p:cNvCxnSpPr>
-          <p:nvPr/>
-        </p:nvCxnSpPr>
-        <p:spPr>
-          <a:xfrm>
-            <a:off x="6815330" y="2167128"/>
-            <a:ext cx="630936" cy="0"/>
-          </a:xfrm>
-          <a:prstGeom prst="straightConnector1">
-            <a:avLst/>
-          </a:prstGeom>
-          <a:ln>
-            <a:tailEnd type="triangle"/>
-          </a:ln>
-        </p:spPr>
-        <p:style>
-          <a:lnRef idx="2">
-            <a:schemeClr val="accent1"/>
-          </a:lnRef>
-          <a:fillRef idx="0">
-            <a:schemeClr val="accent1"/>
-          </a:fillRef>
-          <a:effectRef idx="1">
-            <a:schemeClr val="accent1"/>
-          </a:effectRef>
-          <a:fontRef idx="minor">
-            <a:schemeClr val="tx1"/>
-          </a:fontRef>
-        </p:style>
-      </p:cxnSp>
-      <p:cxnSp>
-        <p:nvCxnSpPr>
-          <p:cNvPr id="19" name="Straight Arrow Connector 18">
-            <a:extLst>
-              <a:ext uri="{FF2B5EF4-FFF2-40B4-BE49-F238E27FC236}">
-                <a16:creationId xmlns:a16="http://schemas.microsoft.com/office/drawing/2014/main" id="{E0599FE0-DC2D-EFF4-D4B5-99417688203F}"/>
-              </a:ext>
-            </a:extLst>
-          </p:cNvPr>
-          <p:cNvCxnSpPr>
-            <a:stCxn id="4" idx="2"/>
-            <a:endCxn id="6" idx="1"/>
-          </p:cNvCxnSpPr>
-          <p:nvPr/>
-        </p:nvCxnSpPr>
-        <p:spPr>
-          <a:xfrm>
-            <a:off x="8982458" y="2167128"/>
-            <a:ext cx="489204" cy="0"/>
-          </a:xfrm>
-          <a:prstGeom prst="straightConnector1">
-            <a:avLst/>
-          </a:prstGeom>
-          <a:ln>
-            <a:tailEnd type="triangle"/>
-          </a:ln>
-        </p:spPr>
-        <p:style>
-          <a:lnRef idx="2">
-            <a:schemeClr val="accent1"/>
-          </a:lnRef>
-          <a:fillRef idx="0">
-            <a:schemeClr val="accent1"/>
-          </a:fillRef>
-          <a:effectRef idx="1">
-            <a:schemeClr val="accent1"/>
-          </a:effectRef>
-          <a:fontRef idx="minor">
-            <a:schemeClr val="tx1"/>
-          </a:fontRef>
-        </p:style>
-      </p:cxnSp>
-      <p:cxnSp>
-        <p:nvCxnSpPr>
-          <p:cNvPr id="21" name="Straight Arrow Connector 20">
-            <a:extLst>
-              <a:ext uri="{FF2B5EF4-FFF2-40B4-BE49-F238E27FC236}">
-                <a16:creationId xmlns:a16="http://schemas.microsoft.com/office/drawing/2014/main" id="{81B2BC32-1F14-72B3-1CF3-97020A123C0B}"/>
-              </a:ext>
-            </a:extLst>
-          </p:cNvPr>
-          <p:cNvCxnSpPr>
-            <a:cxnSpLocks/>
-            <a:stCxn id="6" idx="3"/>
-            <a:endCxn id="8" idx="2"/>
-          </p:cNvCxnSpPr>
-          <p:nvPr/>
-        </p:nvCxnSpPr>
-        <p:spPr>
-          <a:xfrm>
-            <a:off x="10084310" y="2167128"/>
-            <a:ext cx="626364" cy="0"/>
-          </a:xfrm>
-          <a:prstGeom prst="straightConnector1">
-            <a:avLst/>
-          </a:prstGeom>
-          <a:ln>
-            <a:tailEnd type="triangle"/>
-          </a:ln>
-        </p:spPr>
-        <p:style>
-          <a:lnRef idx="2">
-            <a:schemeClr val="accent1"/>
-          </a:lnRef>
-          <a:fillRef idx="0">
-            <a:schemeClr val="accent1"/>
-          </a:fillRef>
-          <a:effectRef idx="1">
-            <a:schemeClr val="accent1"/>
-          </a:effectRef>
-          <a:fontRef idx="minor">
-            <a:schemeClr val="tx1"/>
-          </a:fontRef>
-        </p:style>
-      </p:cxnSp>
-      <p:cxnSp>
-        <p:nvCxnSpPr>
-          <p:cNvPr id="26" name="Straight Arrow Connector 25">
-            <a:extLst>
-              <a:ext uri="{FF2B5EF4-FFF2-40B4-BE49-F238E27FC236}">
-                <a16:creationId xmlns:a16="http://schemas.microsoft.com/office/drawing/2014/main" id="{96657093-2547-28E8-E422-D9D31D6C5FF7}"/>
-              </a:ext>
-            </a:extLst>
-          </p:cNvPr>
-          <p:cNvCxnSpPr>
-            <a:stCxn id="14" idx="3"/>
-            <a:endCxn id="5" idx="0"/>
-          </p:cNvCxnSpPr>
-          <p:nvPr/>
-        </p:nvCxnSpPr>
-        <p:spPr>
-          <a:xfrm>
-            <a:off x="6815330" y="3982212"/>
-            <a:ext cx="630936" cy="0"/>
-          </a:xfrm>
-          <a:prstGeom prst="straightConnector1">
-            <a:avLst/>
-          </a:prstGeom>
-          <a:ln>
-            <a:tailEnd type="triangle"/>
-          </a:ln>
-        </p:spPr>
-        <p:style>
-          <a:lnRef idx="2">
-            <a:schemeClr val="accent1"/>
-          </a:lnRef>
-          <a:fillRef idx="0">
-            <a:schemeClr val="accent1"/>
-          </a:fillRef>
-          <a:effectRef idx="1">
-            <a:schemeClr val="accent1"/>
-          </a:effectRef>
-          <a:fontRef idx="minor">
-            <a:schemeClr val="tx1"/>
-          </a:fontRef>
-        </p:style>
-      </p:cxnSp>
-      <p:cxnSp>
-        <p:nvCxnSpPr>
-          <p:cNvPr id="28" name="Straight Arrow Connector 27">
-            <a:extLst>
-              <a:ext uri="{FF2B5EF4-FFF2-40B4-BE49-F238E27FC236}">
-                <a16:creationId xmlns:a16="http://schemas.microsoft.com/office/drawing/2014/main" id="{E19E4B86-0056-913A-1A74-AF77DF9A413C}"/>
-              </a:ext>
-            </a:extLst>
-          </p:cNvPr>
-          <p:cNvCxnSpPr>
-            <a:stCxn id="5" idx="2"/>
-            <a:endCxn id="7" idx="1"/>
-          </p:cNvCxnSpPr>
-          <p:nvPr/>
-        </p:nvCxnSpPr>
-        <p:spPr>
-          <a:xfrm>
-            <a:off x="8982458" y="3982212"/>
-            <a:ext cx="489204" cy="0"/>
-          </a:xfrm>
-          <a:prstGeom prst="straightConnector1">
-            <a:avLst/>
-          </a:prstGeom>
-          <a:ln>
-            <a:tailEnd type="triangle"/>
-          </a:ln>
-        </p:spPr>
-        <p:style>
-          <a:lnRef idx="2">
-            <a:schemeClr val="accent1"/>
-          </a:lnRef>
-          <a:fillRef idx="0">
-            <a:schemeClr val="accent1"/>
-          </a:fillRef>
-          <a:effectRef idx="1">
-            <a:schemeClr val="accent1"/>
-          </a:effectRef>
-          <a:fontRef idx="minor">
-            <a:schemeClr val="tx1"/>
-          </a:fontRef>
-        </p:style>
-      </p:cxnSp>
-      <p:cxnSp>
-        <p:nvCxnSpPr>
-          <p:cNvPr id="30" name="Straight Arrow Connector 29">
-            <a:extLst>
-              <a:ext uri="{FF2B5EF4-FFF2-40B4-BE49-F238E27FC236}">
-                <a16:creationId xmlns:a16="http://schemas.microsoft.com/office/drawing/2014/main" id="{0EAB1C72-5838-03AC-D947-0C99D47013E9}"/>
-              </a:ext>
-            </a:extLst>
-          </p:cNvPr>
-          <p:cNvCxnSpPr>
-            <a:stCxn id="7" idx="3"/>
-            <a:endCxn id="9" idx="2"/>
-          </p:cNvCxnSpPr>
-          <p:nvPr/>
-        </p:nvCxnSpPr>
-        <p:spPr>
-          <a:xfrm>
-            <a:off x="10084310" y="3982212"/>
-            <a:ext cx="598932" cy="0"/>
-          </a:xfrm>
-          <a:prstGeom prst="straightConnector1">
-            <a:avLst/>
-          </a:prstGeom>
-          <a:ln>
-            <a:tailEnd type="triangle"/>
-          </a:ln>
-        </p:spPr>
-        <p:style>
-          <a:lnRef idx="2">
-            <a:schemeClr val="accent1"/>
-          </a:lnRef>
-          <a:fillRef idx="0">
-            <a:schemeClr val="accent1"/>
-          </a:fillRef>
-          <a:effectRef idx="1">
-            <a:schemeClr val="accent1"/>
-          </a:effectRef>
-          <a:fontRef idx="minor">
-            <a:schemeClr val="tx1"/>
-          </a:fontRef>
-        </p:style>
-      </p:cxnSp>
-      <p:sp>
-        <p:nvSpPr>
-          <p:cNvPr id="32" name="TextBox 31">
-            <a:extLst>
-              <a:ext uri="{FF2B5EF4-FFF2-40B4-BE49-F238E27FC236}">
-                <a16:creationId xmlns:a16="http://schemas.microsoft.com/office/drawing/2014/main" id="{2DB193EB-1B6C-9987-B832-62EB42D8E83A}"/>
-              </a:ext>
-            </a:extLst>
-          </p:cNvPr>
-          <p:cNvSpPr txBox="1"/>
-          <p:nvPr/>
-        </p:nvSpPr>
-        <p:spPr>
-          <a:xfrm>
-            <a:off x="7569710" y="1967073"/>
-            <a:ext cx="1106424" cy="553998"/>
-          </a:xfrm>
-          <a:prstGeom prst="rect">
-            <a:avLst/>
-          </a:prstGeom>
-          <a:noFill/>
-        </p:spPr>
-        <p:txBody>
-          <a:bodyPr wrap="square" rtlCol="0">
-            <a:spAutoFit/>
-          </a:bodyPr>
-          <a:lstStyle/>
-          <a:p>
-            <a:pPr algn="ctr"/>
-            <a:r>
-              <a:rPr lang="en-US" sz="1000" dirty="0">
-                <a:solidFill>
-                  <a:schemeClr val="bg1"/>
-                </a:solidFill>
-              </a:rPr>
-              <a:t>Pretrained Encoder</a:t>
-            </a:r>
-          </a:p>
-          <a:p>
-            <a:pPr algn="ctr"/>
-            <a:r>
-              <a:rPr lang="en-US" sz="1000" dirty="0">
-                <a:solidFill>
-                  <a:schemeClr val="bg1"/>
-                </a:solidFill>
-              </a:rPr>
-              <a:t>(Frozen)</a:t>
-            </a:r>
-          </a:p>
-        </p:txBody>
-      </p:sp>
-      <p:sp>
-        <p:nvSpPr>
-          <p:cNvPr id="34" name="TextBox 33">
-            <a:extLst>
-              <a:ext uri="{FF2B5EF4-FFF2-40B4-BE49-F238E27FC236}">
-                <a16:creationId xmlns:a16="http://schemas.microsoft.com/office/drawing/2014/main" id="{72F67960-9E73-763B-45B9-46B120A5DE32}"/>
-              </a:ext>
-            </a:extLst>
-          </p:cNvPr>
-          <p:cNvSpPr txBox="1"/>
-          <p:nvPr/>
-        </p:nvSpPr>
-        <p:spPr>
-          <a:xfrm>
-            <a:off x="7622288" y="3782157"/>
-            <a:ext cx="1106424" cy="553998"/>
-          </a:xfrm>
-          <a:prstGeom prst="rect">
-            <a:avLst/>
-          </a:prstGeom>
-          <a:noFill/>
-        </p:spPr>
-        <p:txBody>
-          <a:bodyPr wrap="square" rtlCol="0">
-            <a:spAutoFit/>
-          </a:bodyPr>
-          <a:lstStyle/>
-          <a:p>
-            <a:pPr algn="ctr"/>
-            <a:r>
-              <a:rPr lang="en-US" sz="1000" dirty="0">
-                <a:solidFill>
-                  <a:schemeClr val="bg1"/>
-                </a:solidFill>
-              </a:rPr>
-              <a:t> Encoder</a:t>
-            </a:r>
-          </a:p>
-          <a:p>
-            <a:pPr algn="ctr"/>
-            <a:r>
-              <a:rPr lang="en-US" sz="1000" dirty="0">
-                <a:solidFill>
-                  <a:schemeClr val="bg1"/>
-                </a:solidFill>
-              </a:rPr>
-              <a:t>From Scratch</a:t>
-            </a:r>
-          </a:p>
-          <a:p>
-            <a:pPr algn="ctr"/>
-            <a:r>
-              <a:rPr lang="en-US" sz="1000" dirty="0">
-                <a:solidFill>
-                  <a:schemeClr val="bg1"/>
-                </a:solidFill>
-              </a:rPr>
-              <a:t>(Trainable)</a:t>
-            </a:r>
-          </a:p>
-        </p:txBody>
-      </p:sp>
-      <p:sp>
-        <p:nvSpPr>
-          <p:cNvPr id="22" name="TextBox 21">
-            <a:extLst>
-              <a:ext uri="{FF2B5EF4-FFF2-40B4-BE49-F238E27FC236}">
-                <a16:creationId xmlns:a16="http://schemas.microsoft.com/office/drawing/2014/main" id="{19120E76-F3E4-A94E-13FB-FFBF80FAEB8E}"/>
-              </a:ext>
-            </a:extLst>
-          </p:cNvPr>
-          <p:cNvSpPr txBox="1"/>
-          <p:nvPr/>
-        </p:nvSpPr>
-        <p:spPr>
-          <a:xfrm>
-            <a:off x="1153959" y="6339221"/>
-            <a:ext cx="3442906" cy="369332"/>
-          </a:xfrm>
-          <a:prstGeom prst="rect">
-            <a:avLst/>
-          </a:prstGeom>
-          <a:noFill/>
-        </p:spPr>
-        <p:txBody>
-          <a:bodyPr wrap="square" rtlCol="0">
-            <a:spAutoFit/>
-          </a:bodyPr>
-          <a:lstStyle/>
-          <a:p>
-            <a:pPr algn="ctr"/>
-            <a:r>
-              <a:rPr lang="en-US" dirty="0"/>
-              <a:t>Test Result on 5 fold models</a:t>
-            </a:r>
-          </a:p>
-        </p:txBody>
-      </p:sp>
-      <p:sp>
-        <p:nvSpPr>
-          <p:cNvPr id="10" name="Oval 9">
-            <a:extLst>
-              <a:ext uri="{FF2B5EF4-FFF2-40B4-BE49-F238E27FC236}">
-                <a16:creationId xmlns:a16="http://schemas.microsoft.com/office/drawing/2014/main" id="{2CCB7B9F-0748-BF90-A364-A14A85294C26}"/>
-              </a:ext>
-            </a:extLst>
-          </p:cNvPr>
-          <p:cNvSpPr/>
-          <p:nvPr/>
-        </p:nvSpPr>
-        <p:spPr>
-          <a:xfrm>
-            <a:off x="11146536" y="2784348"/>
-            <a:ext cx="726948" cy="580644"/>
-          </a:xfrm>
-          <a:prstGeom prst="ellipse">
-            <a:avLst/>
-          </a:prstGeom>
-        </p:spPr>
-        <p:style>
-          <a:lnRef idx="2">
-            <a:schemeClr val="accent1">
-              <a:shade val="15000"/>
-            </a:schemeClr>
-          </a:lnRef>
-          <a:fillRef idx="1">
-            <a:schemeClr val="accent1"/>
-          </a:fillRef>
-          <a:effectRef idx="0">
-            <a:schemeClr val="accent1"/>
-          </a:effectRef>
-          <a:fontRef idx="minor">
-            <a:schemeClr val="lt1"/>
-          </a:fontRef>
-        </p:style>
-        <p:txBody>
-          <a:bodyPr rtlCol="0" anchor="ctr"/>
-          <a:lstStyle/>
-          <a:p>
-            <a:pPr algn="ctr"/>
-            <a:r>
-              <a:rPr lang="en-US" dirty="0"/>
-              <a:t>0/1</a:t>
-            </a:r>
-          </a:p>
-        </p:txBody>
-      </p:sp>
-      <p:cxnSp>
-        <p:nvCxnSpPr>
-          <p:cNvPr id="24" name="Straight Arrow Connector 23">
-            <a:extLst>
-              <a:ext uri="{FF2B5EF4-FFF2-40B4-BE49-F238E27FC236}">
-                <a16:creationId xmlns:a16="http://schemas.microsoft.com/office/drawing/2014/main" id="{B7C2FBD6-985B-D9CE-79A8-E6589FF70C52}"/>
-              </a:ext>
-            </a:extLst>
-          </p:cNvPr>
-          <p:cNvCxnSpPr>
-            <a:stCxn id="5" idx="2"/>
-            <a:endCxn id="6" idx="1"/>
-          </p:cNvCxnSpPr>
-          <p:nvPr/>
-        </p:nvCxnSpPr>
-        <p:spPr>
-          <a:xfrm flipV="1">
-            <a:off x="8982458" y="2167128"/>
-            <a:ext cx="489204" cy="1815084"/>
-          </a:xfrm>
-          <a:prstGeom prst="straightConnector1">
-            <a:avLst/>
-          </a:prstGeom>
-          <a:ln>
-            <a:tailEnd type="triangle"/>
-          </a:ln>
-        </p:spPr>
-        <p:style>
-          <a:lnRef idx="2">
-            <a:schemeClr val="accent1"/>
-          </a:lnRef>
-          <a:fillRef idx="0">
-            <a:schemeClr val="accent1"/>
-          </a:fillRef>
-          <a:effectRef idx="1">
-            <a:schemeClr val="accent1"/>
-          </a:effectRef>
-          <a:fontRef idx="minor">
-            <a:schemeClr val="tx1"/>
-          </a:fontRef>
-        </p:style>
-      </p:cxnSp>
-      <p:cxnSp>
-        <p:nvCxnSpPr>
-          <p:cNvPr id="27" name="Straight Arrow Connector 26">
-            <a:extLst>
-              <a:ext uri="{FF2B5EF4-FFF2-40B4-BE49-F238E27FC236}">
-                <a16:creationId xmlns:a16="http://schemas.microsoft.com/office/drawing/2014/main" id="{B3973300-8DCB-453E-342A-6DD701055923}"/>
-              </a:ext>
-            </a:extLst>
-          </p:cNvPr>
-          <p:cNvCxnSpPr>
-            <a:stCxn id="8" idx="4"/>
-            <a:endCxn id="10" idx="0"/>
-          </p:cNvCxnSpPr>
-          <p:nvPr/>
-        </p:nvCxnSpPr>
-        <p:spPr>
-          <a:xfrm>
-            <a:off x="11117582" y="2532888"/>
-            <a:ext cx="392428" cy="251460"/>
-          </a:xfrm>
-          <a:prstGeom prst="straightConnector1">
-            <a:avLst/>
-          </a:prstGeom>
-          <a:ln>
-            <a:tailEnd type="triangle"/>
-          </a:ln>
-        </p:spPr>
-        <p:style>
-          <a:lnRef idx="2">
-            <a:schemeClr val="accent1"/>
-          </a:lnRef>
-          <a:fillRef idx="0">
-            <a:schemeClr val="accent1"/>
-          </a:fillRef>
-          <a:effectRef idx="1">
-            <a:schemeClr val="accent1"/>
-          </a:effectRef>
-          <a:fontRef idx="minor">
-            <a:schemeClr val="tx1"/>
-          </a:fontRef>
-        </p:style>
-      </p:cxnSp>
-      <p:cxnSp>
-        <p:nvCxnSpPr>
-          <p:cNvPr id="35" name="Straight Arrow Connector 34">
-            <a:extLst>
-              <a:ext uri="{FF2B5EF4-FFF2-40B4-BE49-F238E27FC236}">
-                <a16:creationId xmlns:a16="http://schemas.microsoft.com/office/drawing/2014/main" id="{6D2D2F39-2175-E20E-91D6-997F2B2000B4}"/>
-              </a:ext>
-            </a:extLst>
-          </p:cNvPr>
-          <p:cNvCxnSpPr>
-            <a:stCxn id="9" idx="0"/>
-            <a:endCxn id="10" idx="4"/>
-          </p:cNvCxnSpPr>
-          <p:nvPr/>
-        </p:nvCxnSpPr>
-        <p:spPr>
-          <a:xfrm flipV="1">
-            <a:off x="11090150" y="3364992"/>
-            <a:ext cx="419860" cy="251460"/>
-          </a:xfrm>
-          <a:prstGeom prst="straightConnector1">
-            <a:avLst/>
-          </a:prstGeom>
-          <a:ln>
-            <a:tailEnd type="triangle"/>
-          </a:ln>
-        </p:spPr>
-        <p:style>
-          <a:lnRef idx="2">
-            <a:schemeClr val="accent1"/>
-          </a:lnRef>
-          <a:fillRef idx="0">
-            <a:schemeClr val="accent1"/>
-          </a:fillRef>
-          <a:effectRef idx="1">
-            <a:schemeClr val="accent1"/>
-          </a:effectRef>
-          <a:fontRef idx="minor">
-            <a:schemeClr val="tx1"/>
-          </a:fontRef>
-        </p:style>
-      </p:cxnSp>
-      <p:cxnSp>
-        <p:nvCxnSpPr>
-          <p:cNvPr id="15" name="Straight Arrow Connector 14">
-            <a:extLst>
-              <a:ext uri="{FF2B5EF4-FFF2-40B4-BE49-F238E27FC236}">
-                <a16:creationId xmlns:a16="http://schemas.microsoft.com/office/drawing/2014/main" id="{F67DCF1E-A549-CCBA-67C1-F0FD0B1391F4}"/>
-              </a:ext>
-            </a:extLst>
-          </p:cNvPr>
-          <p:cNvCxnSpPr>
-            <a:stCxn id="4" idx="2"/>
-            <a:endCxn id="7" idx="1"/>
-          </p:cNvCxnSpPr>
-          <p:nvPr/>
-        </p:nvCxnSpPr>
-        <p:spPr>
-          <a:xfrm>
-            <a:off x="8982458" y="2167128"/>
-            <a:ext cx="489204" cy="1815084"/>
-          </a:xfrm>
-          <a:prstGeom prst="straightConnector1">
-            <a:avLst/>
-          </a:prstGeom>
-          <a:ln>
-            <a:tailEnd type="triangle"/>
-          </a:ln>
-        </p:spPr>
-        <p:style>
-          <a:lnRef idx="2">
-            <a:schemeClr val="accent1"/>
-          </a:lnRef>
-          <a:fillRef idx="0">
-            <a:schemeClr val="accent1"/>
-          </a:fillRef>
-          <a:effectRef idx="1">
-            <a:schemeClr val="accent1"/>
-          </a:effectRef>
-          <a:fontRef idx="minor">
-            <a:schemeClr val="tx1"/>
-          </a:fontRef>
-        </p:style>
-      </p:cxnSp>
-      <p:pic>
-        <p:nvPicPr>
-          <p:cNvPr id="12" name="Picture 11" descr="A graph of a curve&#10;&#10;AI-generated content may be incorrect.">
-            <a:extLst>
-              <a:ext uri="{FF2B5EF4-FFF2-40B4-BE49-F238E27FC236}">
-                <a16:creationId xmlns:a16="http://schemas.microsoft.com/office/drawing/2014/main" id="{37D73EFA-1008-61C4-6691-234B17A1BA19}"/>
-              </a:ext>
-            </a:extLst>
-          </p:cNvPr>
-          <p:cNvPicPr>
-            <a:picLocks noChangeAspect="1"/>
-          </p:cNvPicPr>
-          <p:nvPr/>
-        </p:nvPicPr>
-        <p:blipFill>
-          <a:blip r:embed="rId3">
-            <a:extLst>
-              <a:ext uri="{28A0092B-C50C-407E-A947-70E740481C1C}">
-                <a14:useLocalDpi xmlns:a14="http://schemas.microsoft.com/office/drawing/2010/main" val="0"/>
-              </a:ext>
-            </a:extLst>
-          </a:blip>
-          <a:stretch>
-            <a:fillRect/>
-          </a:stretch>
-        </p:blipFill>
-        <p:spPr>
-          <a:xfrm>
-            <a:off x="1252774" y="3521226"/>
-            <a:ext cx="3196307" cy="2397231"/>
-          </a:xfrm>
-          <a:prstGeom prst="rect">
-            <a:avLst/>
-          </a:prstGeom>
-        </p:spPr>
-      </p:pic>
-    </p:spTree>
-    <p:extLst>
-      <p:ext uri="{BB962C8B-B14F-4D97-AF65-F5344CB8AC3E}">
-        <p14:creationId xmlns:p14="http://schemas.microsoft.com/office/powerpoint/2010/main" val="1431494686"/>
       </p:ext>
     </p:extLst>
   </p:cSld>

</xml_diff>